<commit_message>
Update ppt presentation, add graphics for presentation
</commit_message>
<xml_diff>
--- a/Disputation/grei14.pptx
+++ b/Disputation/grei14.pptx
@@ -5,16 +5,23 @@
     <p:sldMasterId id="2147483652" r:id="rId1"/>
   </p:sldMasterIdLst>
   <p:notesMasterIdLst>
-    <p:notesMasterId r:id="rId6"/>
+    <p:notesMasterId r:id="rId13"/>
   </p:notesMasterIdLst>
   <p:handoutMasterIdLst>
-    <p:handoutMasterId r:id="rId7"/>
+    <p:handoutMasterId r:id="rId14"/>
   </p:handoutMasterIdLst>
   <p:sldIdLst>
     <p:sldId id="836" r:id="rId2"/>
     <p:sldId id="837" r:id="rId3"/>
     <p:sldId id="838" r:id="rId4"/>
     <p:sldId id="839" r:id="rId5"/>
+    <p:sldId id="841" r:id="rId6"/>
+    <p:sldId id="840" r:id="rId7"/>
+    <p:sldId id="842" r:id="rId8"/>
+    <p:sldId id="843" r:id="rId9"/>
+    <p:sldId id="844" r:id="rId10"/>
+    <p:sldId id="846" r:id="rId11"/>
+    <p:sldId id="845" r:id="rId12"/>
   </p:sldIdLst>
   <p:sldSz cx="9144000" cy="6858000" type="screen4x3"/>
   <p:notesSz cx="6781800" cy="9855200"/>
@@ -302,7 +309,7 @@
           <a:p>
             <a:fld id="{4C476B9A-09E8-F547-B409-8F77FB8D3140}" type="datetime1">
               <a:rPr lang="de-DE" smtClean="0"/>
-              <a:t>19.06.14</a:t>
+              <a:t>21.06.14</a:t>
             </a:fld>
             <a:endParaRPr lang="de-DE"/>
           </a:p>
@@ -728,6 +735,91 @@
 </p:notes>
 </file>
 
+<file path=ppt/notesSlides/notesSlide10.xml><?xml version="1.0" encoding="utf-8"?>
+<p:notes xmlns:a="http://schemas.openxmlformats.org/drawingml/2006/main" xmlns:r="http://schemas.openxmlformats.org/officeDocument/2006/relationships" xmlns:p="http://schemas.openxmlformats.org/presentationml/2006/main">
+  <p:cSld>
+    <p:spTree>
+      <p:nvGrpSpPr>
+        <p:cNvPr id="1" name=""/>
+        <p:cNvGrpSpPr/>
+        <p:nvPr/>
+      </p:nvGrpSpPr>
+      <p:grpSpPr>
+        <a:xfrm>
+          <a:off x="0" y="0"/>
+          <a:ext cx="0" cy="0"/>
+          <a:chOff x="0" y="0"/>
+          <a:chExt cx="0" cy="0"/>
+        </a:xfrm>
+      </p:grpSpPr>
+      <p:sp>
+        <p:nvSpPr>
+          <p:cNvPr id="2" name="Folienbildplatzhalter 1"/>
+          <p:cNvSpPr>
+            <a:spLocks noGrp="1" noRot="1" noChangeAspect="1"/>
+          </p:cNvSpPr>
+          <p:nvPr>
+            <p:ph type="sldImg"/>
+          </p:nvPr>
+        </p:nvSpPr>
+        <p:spPr/>
+      </p:sp>
+      <p:sp>
+        <p:nvSpPr>
+          <p:cNvPr id="3" name="Notizenplatzhalter 2"/>
+          <p:cNvSpPr>
+            <a:spLocks noGrp="1"/>
+          </p:cNvSpPr>
+          <p:nvPr>
+            <p:ph type="body" idx="1"/>
+          </p:nvPr>
+        </p:nvSpPr>
+        <p:spPr/>
+        <p:txBody>
+          <a:bodyPr/>
+          <a:lstStyle/>
+          <a:p>
+            <a:endParaRPr lang="de-DE"/>
+          </a:p>
+        </p:txBody>
+      </p:sp>
+      <p:sp>
+        <p:nvSpPr>
+          <p:cNvPr id="4" name="Foliennummernplatzhalter 3"/>
+          <p:cNvSpPr>
+            <a:spLocks noGrp="1"/>
+          </p:cNvSpPr>
+          <p:nvPr>
+            <p:ph type="sldNum" sz="quarter" idx="10"/>
+          </p:nvPr>
+        </p:nvSpPr>
+        <p:spPr/>
+        <p:txBody>
+          <a:bodyPr/>
+          <a:lstStyle/>
+          <a:p>
+            <a:fld id="{87E9C61A-9B5E-4580-98DD-1AC874081FFB}" type="slidenum">
+              <a:rPr lang="de-DE" smtClean="0"/>
+              <a:pPr/>
+              <a:t>11</a:t>
+            </a:fld>
+            <a:endParaRPr lang="de-DE"/>
+          </a:p>
+        </p:txBody>
+      </p:sp>
+    </p:spTree>
+    <p:extLst>
+      <p:ext uri="{BB962C8B-B14F-4D97-AF65-F5344CB8AC3E}">
+        <p14:creationId xmlns:p14="http://schemas.microsoft.com/office/powerpoint/2010/main" val="1952917371"/>
+      </p:ext>
+    </p:extLst>
+  </p:cSld>
+  <p:clrMapOvr>
+    <a:masterClrMapping/>
+  </p:clrMapOvr>
+</p:notes>
+</file>
+
 <file path=ppt/notesSlides/notesSlide2.xml><?xml version="1.0" encoding="utf-8"?>
 <p:notes xmlns:a="http://schemas.openxmlformats.org/drawingml/2006/main" xmlns:r="http://schemas.openxmlformats.org/officeDocument/2006/relationships" xmlns:p="http://schemas.openxmlformats.org/presentationml/2006/main">
   <p:cSld>
@@ -772,7 +864,7 @@
           <a:bodyPr/>
           <a:lstStyle/>
           <a:p>
-            <a:endParaRPr lang="de-DE"/>
+            <a:endParaRPr lang="de-DE" dirty="0"/>
           </a:p>
         </p:txBody>
       </p:sp>
@@ -880,6 +972,516 @@
               <a:rPr lang="de-DE" smtClean="0"/>
               <a:pPr/>
               <a:t>4</a:t>
+            </a:fld>
+            <a:endParaRPr lang="de-DE"/>
+          </a:p>
+        </p:txBody>
+      </p:sp>
+    </p:spTree>
+    <p:extLst>
+      <p:ext uri="{BB962C8B-B14F-4D97-AF65-F5344CB8AC3E}">
+        <p14:creationId xmlns:p14="http://schemas.microsoft.com/office/powerpoint/2010/main" val="1952917371"/>
+      </p:ext>
+    </p:extLst>
+  </p:cSld>
+  <p:clrMapOvr>
+    <a:masterClrMapping/>
+  </p:clrMapOvr>
+</p:notes>
+</file>
+
+<file path=ppt/notesSlides/notesSlide4.xml><?xml version="1.0" encoding="utf-8"?>
+<p:notes xmlns:a="http://schemas.openxmlformats.org/drawingml/2006/main" xmlns:r="http://schemas.openxmlformats.org/officeDocument/2006/relationships" xmlns:p="http://schemas.openxmlformats.org/presentationml/2006/main">
+  <p:cSld>
+    <p:spTree>
+      <p:nvGrpSpPr>
+        <p:cNvPr id="1" name=""/>
+        <p:cNvGrpSpPr/>
+        <p:nvPr/>
+      </p:nvGrpSpPr>
+      <p:grpSpPr>
+        <a:xfrm>
+          <a:off x="0" y="0"/>
+          <a:ext cx="0" cy="0"/>
+          <a:chOff x="0" y="0"/>
+          <a:chExt cx="0" cy="0"/>
+        </a:xfrm>
+      </p:grpSpPr>
+      <p:sp>
+        <p:nvSpPr>
+          <p:cNvPr id="2" name="Folienbildplatzhalter 1"/>
+          <p:cNvSpPr>
+            <a:spLocks noGrp="1" noRot="1" noChangeAspect="1"/>
+          </p:cNvSpPr>
+          <p:nvPr>
+            <p:ph type="sldImg"/>
+          </p:nvPr>
+        </p:nvSpPr>
+        <p:spPr/>
+      </p:sp>
+      <p:sp>
+        <p:nvSpPr>
+          <p:cNvPr id="3" name="Notizenplatzhalter 2"/>
+          <p:cNvSpPr>
+            <a:spLocks noGrp="1"/>
+          </p:cNvSpPr>
+          <p:nvPr>
+            <p:ph type="body" idx="1"/>
+          </p:nvPr>
+        </p:nvSpPr>
+        <p:spPr/>
+        <p:txBody>
+          <a:bodyPr/>
+          <a:lstStyle/>
+          <a:p>
+            <a:endParaRPr lang="de-DE"/>
+          </a:p>
+        </p:txBody>
+      </p:sp>
+      <p:sp>
+        <p:nvSpPr>
+          <p:cNvPr id="4" name="Foliennummernplatzhalter 3"/>
+          <p:cNvSpPr>
+            <a:spLocks noGrp="1"/>
+          </p:cNvSpPr>
+          <p:nvPr>
+            <p:ph type="sldNum" sz="quarter" idx="10"/>
+          </p:nvPr>
+        </p:nvSpPr>
+        <p:spPr/>
+        <p:txBody>
+          <a:bodyPr/>
+          <a:lstStyle/>
+          <a:p>
+            <a:fld id="{87E9C61A-9B5E-4580-98DD-1AC874081FFB}" type="slidenum">
+              <a:rPr lang="de-DE" smtClean="0"/>
+              <a:pPr/>
+              <a:t>5</a:t>
+            </a:fld>
+            <a:endParaRPr lang="de-DE"/>
+          </a:p>
+        </p:txBody>
+      </p:sp>
+    </p:spTree>
+    <p:extLst>
+      <p:ext uri="{BB962C8B-B14F-4D97-AF65-F5344CB8AC3E}">
+        <p14:creationId xmlns:p14="http://schemas.microsoft.com/office/powerpoint/2010/main" val="1952917371"/>
+      </p:ext>
+    </p:extLst>
+  </p:cSld>
+  <p:clrMapOvr>
+    <a:masterClrMapping/>
+  </p:clrMapOvr>
+</p:notes>
+</file>
+
+<file path=ppt/notesSlides/notesSlide5.xml><?xml version="1.0" encoding="utf-8"?>
+<p:notes xmlns:a="http://schemas.openxmlformats.org/drawingml/2006/main" xmlns:r="http://schemas.openxmlformats.org/officeDocument/2006/relationships" xmlns:p="http://schemas.openxmlformats.org/presentationml/2006/main">
+  <p:cSld>
+    <p:spTree>
+      <p:nvGrpSpPr>
+        <p:cNvPr id="1" name=""/>
+        <p:cNvGrpSpPr/>
+        <p:nvPr/>
+      </p:nvGrpSpPr>
+      <p:grpSpPr>
+        <a:xfrm>
+          <a:off x="0" y="0"/>
+          <a:ext cx="0" cy="0"/>
+          <a:chOff x="0" y="0"/>
+          <a:chExt cx="0" cy="0"/>
+        </a:xfrm>
+      </p:grpSpPr>
+      <p:sp>
+        <p:nvSpPr>
+          <p:cNvPr id="2" name="Folienbildplatzhalter 1"/>
+          <p:cNvSpPr>
+            <a:spLocks noGrp="1" noRot="1" noChangeAspect="1"/>
+          </p:cNvSpPr>
+          <p:nvPr>
+            <p:ph type="sldImg"/>
+          </p:nvPr>
+        </p:nvSpPr>
+        <p:spPr/>
+      </p:sp>
+      <p:sp>
+        <p:nvSpPr>
+          <p:cNvPr id="3" name="Notizenplatzhalter 2"/>
+          <p:cNvSpPr>
+            <a:spLocks noGrp="1"/>
+          </p:cNvSpPr>
+          <p:nvPr>
+            <p:ph type="body" idx="1"/>
+          </p:nvPr>
+        </p:nvSpPr>
+        <p:spPr/>
+        <p:txBody>
+          <a:bodyPr/>
+          <a:lstStyle/>
+          <a:p>
+            <a:endParaRPr lang="de-DE"/>
+          </a:p>
+        </p:txBody>
+      </p:sp>
+      <p:sp>
+        <p:nvSpPr>
+          <p:cNvPr id="4" name="Foliennummernplatzhalter 3"/>
+          <p:cNvSpPr>
+            <a:spLocks noGrp="1"/>
+          </p:cNvSpPr>
+          <p:nvPr>
+            <p:ph type="sldNum" sz="quarter" idx="10"/>
+          </p:nvPr>
+        </p:nvSpPr>
+        <p:spPr/>
+        <p:txBody>
+          <a:bodyPr/>
+          <a:lstStyle/>
+          <a:p>
+            <a:fld id="{87E9C61A-9B5E-4580-98DD-1AC874081FFB}" type="slidenum">
+              <a:rPr lang="de-DE" smtClean="0"/>
+              <a:pPr/>
+              <a:t>6</a:t>
+            </a:fld>
+            <a:endParaRPr lang="de-DE"/>
+          </a:p>
+        </p:txBody>
+      </p:sp>
+    </p:spTree>
+    <p:extLst>
+      <p:ext uri="{BB962C8B-B14F-4D97-AF65-F5344CB8AC3E}">
+        <p14:creationId xmlns:p14="http://schemas.microsoft.com/office/powerpoint/2010/main" val="1952917371"/>
+      </p:ext>
+    </p:extLst>
+  </p:cSld>
+  <p:clrMapOvr>
+    <a:masterClrMapping/>
+  </p:clrMapOvr>
+</p:notes>
+</file>
+
+<file path=ppt/notesSlides/notesSlide6.xml><?xml version="1.0" encoding="utf-8"?>
+<p:notes xmlns:a="http://schemas.openxmlformats.org/drawingml/2006/main" xmlns:r="http://schemas.openxmlformats.org/officeDocument/2006/relationships" xmlns:p="http://schemas.openxmlformats.org/presentationml/2006/main">
+  <p:cSld>
+    <p:spTree>
+      <p:nvGrpSpPr>
+        <p:cNvPr id="1" name=""/>
+        <p:cNvGrpSpPr/>
+        <p:nvPr/>
+      </p:nvGrpSpPr>
+      <p:grpSpPr>
+        <a:xfrm>
+          <a:off x="0" y="0"/>
+          <a:ext cx="0" cy="0"/>
+          <a:chOff x="0" y="0"/>
+          <a:chExt cx="0" cy="0"/>
+        </a:xfrm>
+      </p:grpSpPr>
+      <p:sp>
+        <p:nvSpPr>
+          <p:cNvPr id="2" name="Folienbildplatzhalter 1"/>
+          <p:cNvSpPr>
+            <a:spLocks noGrp="1" noRot="1" noChangeAspect="1"/>
+          </p:cNvSpPr>
+          <p:nvPr>
+            <p:ph type="sldImg"/>
+          </p:nvPr>
+        </p:nvSpPr>
+        <p:spPr/>
+      </p:sp>
+      <p:sp>
+        <p:nvSpPr>
+          <p:cNvPr id="3" name="Notizenplatzhalter 2"/>
+          <p:cNvSpPr>
+            <a:spLocks noGrp="1"/>
+          </p:cNvSpPr>
+          <p:nvPr>
+            <p:ph type="body" idx="1"/>
+          </p:nvPr>
+        </p:nvSpPr>
+        <p:spPr/>
+        <p:txBody>
+          <a:bodyPr/>
+          <a:lstStyle/>
+          <a:p>
+            <a:endParaRPr lang="de-DE"/>
+          </a:p>
+        </p:txBody>
+      </p:sp>
+      <p:sp>
+        <p:nvSpPr>
+          <p:cNvPr id="4" name="Foliennummernplatzhalter 3"/>
+          <p:cNvSpPr>
+            <a:spLocks noGrp="1"/>
+          </p:cNvSpPr>
+          <p:nvPr>
+            <p:ph type="sldNum" sz="quarter" idx="10"/>
+          </p:nvPr>
+        </p:nvSpPr>
+        <p:spPr/>
+        <p:txBody>
+          <a:bodyPr/>
+          <a:lstStyle/>
+          <a:p>
+            <a:fld id="{87E9C61A-9B5E-4580-98DD-1AC874081FFB}" type="slidenum">
+              <a:rPr lang="de-DE" smtClean="0"/>
+              <a:pPr/>
+              <a:t>7</a:t>
+            </a:fld>
+            <a:endParaRPr lang="de-DE"/>
+          </a:p>
+        </p:txBody>
+      </p:sp>
+    </p:spTree>
+    <p:extLst>
+      <p:ext uri="{BB962C8B-B14F-4D97-AF65-F5344CB8AC3E}">
+        <p14:creationId xmlns:p14="http://schemas.microsoft.com/office/powerpoint/2010/main" val="1952917371"/>
+      </p:ext>
+    </p:extLst>
+  </p:cSld>
+  <p:clrMapOvr>
+    <a:masterClrMapping/>
+  </p:clrMapOvr>
+</p:notes>
+</file>
+
+<file path=ppt/notesSlides/notesSlide7.xml><?xml version="1.0" encoding="utf-8"?>
+<p:notes xmlns:a="http://schemas.openxmlformats.org/drawingml/2006/main" xmlns:r="http://schemas.openxmlformats.org/officeDocument/2006/relationships" xmlns:p="http://schemas.openxmlformats.org/presentationml/2006/main">
+  <p:cSld>
+    <p:spTree>
+      <p:nvGrpSpPr>
+        <p:cNvPr id="1" name=""/>
+        <p:cNvGrpSpPr/>
+        <p:nvPr/>
+      </p:nvGrpSpPr>
+      <p:grpSpPr>
+        <a:xfrm>
+          <a:off x="0" y="0"/>
+          <a:ext cx="0" cy="0"/>
+          <a:chOff x="0" y="0"/>
+          <a:chExt cx="0" cy="0"/>
+        </a:xfrm>
+      </p:grpSpPr>
+      <p:sp>
+        <p:nvSpPr>
+          <p:cNvPr id="2" name="Folienbildplatzhalter 1"/>
+          <p:cNvSpPr>
+            <a:spLocks noGrp="1" noRot="1" noChangeAspect="1"/>
+          </p:cNvSpPr>
+          <p:nvPr>
+            <p:ph type="sldImg"/>
+          </p:nvPr>
+        </p:nvSpPr>
+        <p:spPr/>
+      </p:sp>
+      <p:sp>
+        <p:nvSpPr>
+          <p:cNvPr id="3" name="Notizenplatzhalter 2"/>
+          <p:cNvSpPr>
+            <a:spLocks noGrp="1"/>
+          </p:cNvSpPr>
+          <p:nvPr>
+            <p:ph type="body" idx="1"/>
+          </p:nvPr>
+        </p:nvSpPr>
+        <p:spPr/>
+        <p:txBody>
+          <a:bodyPr/>
+          <a:lstStyle/>
+          <a:p>
+            <a:endParaRPr lang="de-DE"/>
+          </a:p>
+        </p:txBody>
+      </p:sp>
+      <p:sp>
+        <p:nvSpPr>
+          <p:cNvPr id="4" name="Foliennummernplatzhalter 3"/>
+          <p:cNvSpPr>
+            <a:spLocks noGrp="1"/>
+          </p:cNvSpPr>
+          <p:nvPr>
+            <p:ph type="sldNum" sz="quarter" idx="10"/>
+          </p:nvPr>
+        </p:nvSpPr>
+        <p:spPr/>
+        <p:txBody>
+          <a:bodyPr/>
+          <a:lstStyle/>
+          <a:p>
+            <a:fld id="{87E9C61A-9B5E-4580-98DD-1AC874081FFB}" type="slidenum">
+              <a:rPr lang="de-DE" smtClean="0"/>
+              <a:pPr/>
+              <a:t>8</a:t>
+            </a:fld>
+            <a:endParaRPr lang="de-DE"/>
+          </a:p>
+        </p:txBody>
+      </p:sp>
+    </p:spTree>
+    <p:extLst>
+      <p:ext uri="{BB962C8B-B14F-4D97-AF65-F5344CB8AC3E}">
+        <p14:creationId xmlns:p14="http://schemas.microsoft.com/office/powerpoint/2010/main" val="1952917371"/>
+      </p:ext>
+    </p:extLst>
+  </p:cSld>
+  <p:clrMapOvr>
+    <a:masterClrMapping/>
+  </p:clrMapOvr>
+</p:notes>
+</file>
+
+<file path=ppt/notesSlides/notesSlide8.xml><?xml version="1.0" encoding="utf-8"?>
+<p:notes xmlns:a="http://schemas.openxmlformats.org/drawingml/2006/main" xmlns:r="http://schemas.openxmlformats.org/officeDocument/2006/relationships" xmlns:p="http://schemas.openxmlformats.org/presentationml/2006/main">
+  <p:cSld>
+    <p:spTree>
+      <p:nvGrpSpPr>
+        <p:cNvPr id="1" name=""/>
+        <p:cNvGrpSpPr/>
+        <p:nvPr/>
+      </p:nvGrpSpPr>
+      <p:grpSpPr>
+        <a:xfrm>
+          <a:off x="0" y="0"/>
+          <a:ext cx="0" cy="0"/>
+          <a:chOff x="0" y="0"/>
+          <a:chExt cx="0" cy="0"/>
+        </a:xfrm>
+      </p:grpSpPr>
+      <p:sp>
+        <p:nvSpPr>
+          <p:cNvPr id="2" name="Folienbildplatzhalter 1"/>
+          <p:cNvSpPr>
+            <a:spLocks noGrp="1" noRot="1" noChangeAspect="1"/>
+          </p:cNvSpPr>
+          <p:nvPr>
+            <p:ph type="sldImg"/>
+          </p:nvPr>
+        </p:nvSpPr>
+        <p:spPr/>
+      </p:sp>
+      <p:sp>
+        <p:nvSpPr>
+          <p:cNvPr id="3" name="Notizenplatzhalter 2"/>
+          <p:cNvSpPr>
+            <a:spLocks noGrp="1"/>
+          </p:cNvSpPr>
+          <p:nvPr>
+            <p:ph type="body" idx="1"/>
+          </p:nvPr>
+        </p:nvSpPr>
+        <p:spPr/>
+        <p:txBody>
+          <a:bodyPr/>
+          <a:lstStyle/>
+          <a:p>
+            <a:endParaRPr lang="de-DE"/>
+          </a:p>
+        </p:txBody>
+      </p:sp>
+      <p:sp>
+        <p:nvSpPr>
+          <p:cNvPr id="4" name="Foliennummernplatzhalter 3"/>
+          <p:cNvSpPr>
+            <a:spLocks noGrp="1"/>
+          </p:cNvSpPr>
+          <p:nvPr>
+            <p:ph type="sldNum" sz="quarter" idx="10"/>
+          </p:nvPr>
+        </p:nvSpPr>
+        <p:spPr/>
+        <p:txBody>
+          <a:bodyPr/>
+          <a:lstStyle/>
+          <a:p>
+            <a:fld id="{87E9C61A-9B5E-4580-98DD-1AC874081FFB}" type="slidenum">
+              <a:rPr lang="de-DE" smtClean="0"/>
+              <a:pPr/>
+              <a:t>9</a:t>
+            </a:fld>
+            <a:endParaRPr lang="de-DE"/>
+          </a:p>
+        </p:txBody>
+      </p:sp>
+    </p:spTree>
+    <p:extLst>
+      <p:ext uri="{BB962C8B-B14F-4D97-AF65-F5344CB8AC3E}">
+        <p14:creationId xmlns:p14="http://schemas.microsoft.com/office/powerpoint/2010/main" val="1952917371"/>
+      </p:ext>
+    </p:extLst>
+  </p:cSld>
+  <p:clrMapOvr>
+    <a:masterClrMapping/>
+  </p:clrMapOvr>
+</p:notes>
+</file>
+
+<file path=ppt/notesSlides/notesSlide9.xml><?xml version="1.0" encoding="utf-8"?>
+<p:notes xmlns:a="http://schemas.openxmlformats.org/drawingml/2006/main" xmlns:r="http://schemas.openxmlformats.org/officeDocument/2006/relationships" xmlns:p="http://schemas.openxmlformats.org/presentationml/2006/main">
+  <p:cSld>
+    <p:spTree>
+      <p:nvGrpSpPr>
+        <p:cNvPr id="1" name=""/>
+        <p:cNvGrpSpPr/>
+        <p:nvPr/>
+      </p:nvGrpSpPr>
+      <p:grpSpPr>
+        <a:xfrm>
+          <a:off x="0" y="0"/>
+          <a:ext cx="0" cy="0"/>
+          <a:chOff x="0" y="0"/>
+          <a:chExt cx="0" cy="0"/>
+        </a:xfrm>
+      </p:grpSpPr>
+      <p:sp>
+        <p:nvSpPr>
+          <p:cNvPr id="2" name="Folienbildplatzhalter 1"/>
+          <p:cNvSpPr>
+            <a:spLocks noGrp="1" noRot="1" noChangeAspect="1"/>
+          </p:cNvSpPr>
+          <p:nvPr>
+            <p:ph type="sldImg"/>
+          </p:nvPr>
+        </p:nvSpPr>
+        <p:spPr/>
+      </p:sp>
+      <p:sp>
+        <p:nvSpPr>
+          <p:cNvPr id="3" name="Notizenplatzhalter 2"/>
+          <p:cNvSpPr>
+            <a:spLocks noGrp="1"/>
+          </p:cNvSpPr>
+          <p:nvPr>
+            <p:ph type="body" idx="1"/>
+          </p:nvPr>
+        </p:nvSpPr>
+        <p:spPr/>
+        <p:txBody>
+          <a:bodyPr/>
+          <a:lstStyle/>
+          <a:p>
+            <a:endParaRPr lang="de-DE"/>
+          </a:p>
+        </p:txBody>
+      </p:sp>
+      <p:sp>
+        <p:nvSpPr>
+          <p:cNvPr id="4" name="Foliennummernplatzhalter 3"/>
+          <p:cNvSpPr>
+            <a:spLocks noGrp="1"/>
+          </p:cNvSpPr>
+          <p:nvPr>
+            <p:ph type="sldNum" sz="quarter" idx="10"/>
+          </p:nvPr>
+        </p:nvSpPr>
+        <p:spPr/>
+        <p:txBody>
+          <a:bodyPr/>
+          <a:lstStyle/>
+          <a:p>
+            <a:fld id="{87E9C61A-9B5E-4580-98DD-1AC874081FFB}" type="slidenum">
+              <a:rPr lang="de-DE" smtClean="0"/>
+              <a:pPr/>
+              <a:t>10</a:t>
             </a:fld>
             <a:endParaRPr lang="de-DE"/>
           </a:p>
@@ -2374,11 +2976,7 @@
             </a:br>
             <a:r>
               <a:rPr lang="de-DE" sz="2800" dirty="0" smtClean="0"/>
-              <a:t>unter Verwendun</a:t>
-            </a:r>
-            <a:r>
-              <a:rPr lang="de-DE" sz="2800" dirty="0" smtClean="0"/>
-              <a:t>g von HPC</a:t>
+              <a:t>unter Verwendung von HPC</a:t>
             </a:r>
             <a:r>
               <a:rPr lang="de-DE" sz="2800" dirty="0"/>
@@ -2419,6 +3017,426 @@
     <p:extLst>
       <p:ext uri="{BB962C8B-B14F-4D97-AF65-F5344CB8AC3E}">
         <p14:creationId xmlns:p14="http://schemas.microsoft.com/office/powerpoint/2010/main" val="2931754677"/>
+      </p:ext>
+    </p:extLst>
+  </p:cSld>
+  <p:clrMapOvr>
+    <a:masterClrMapping/>
+  </p:clrMapOvr>
+  <p:transition xmlns:p14="http://schemas.microsoft.com/office/powerpoint/2010/main" spd="med"/>
+</p:sld>
+</file>
+
+<file path=ppt/slides/slide10.xml><?xml version="1.0" encoding="utf-8"?>
+<p:sld xmlns:a="http://schemas.openxmlformats.org/drawingml/2006/main" xmlns:r="http://schemas.openxmlformats.org/officeDocument/2006/relationships" xmlns:p="http://schemas.openxmlformats.org/presentationml/2006/main">
+  <p:cSld>
+    <p:spTree>
+      <p:nvGrpSpPr>
+        <p:cNvPr id="1" name=""/>
+        <p:cNvGrpSpPr/>
+        <p:nvPr/>
+      </p:nvGrpSpPr>
+      <p:grpSpPr>
+        <a:xfrm>
+          <a:off x="0" y="0"/>
+          <a:ext cx="0" cy="0"/>
+          <a:chOff x="0" y="0"/>
+          <a:chExt cx="0" cy="0"/>
+        </a:xfrm>
+      </p:grpSpPr>
+      <p:sp>
+        <p:nvSpPr>
+          <p:cNvPr id="2" name="Titel 1"/>
+          <p:cNvSpPr>
+            <a:spLocks noGrp="1"/>
+          </p:cNvSpPr>
+          <p:nvPr>
+            <p:ph type="title"/>
+          </p:nvPr>
+        </p:nvSpPr>
+        <p:spPr/>
+        <p:txBody>
+          <a:bodyPr/>
+          <a:lstStyle/>
+          <a:p>
+            <a:r>
+              <a:rPr lang="de-DE" sz="1800" dirty="0" smtClean="0"/>
+              <a:t>Beschreibung der Benchmarks</a:t>
+            </a:r>
+            <a:endParaRPr lang="de-DE" sz="1800" dirty="0"/>
+          </a:p>
+        </p:txBody>
+      </p:sp>
+      <p:sp>
+        <p:nvSpPr>
+          <p:cNvPr id="3" name="Inhaltsplatzhalter 2"/>
+          <p:cNvSpPr>
+            <a:spLocks noGrp="1"/>
+          </p:cNvSpPr>
+          <p:nvPr>
+            <p:ph idx="1"/>
+          </p:nvPr>
+        </p:nvSpPr>
+        <p:spPr/>
+        <p:txBody>
+          <a:bodyPr/>
+          <a:lstStyle/>
+          <a:p>
+            <a:pPr marL="514350" indent="-514350">
+              <a:buFont typeface="+mj-lt"/>
+              <a:buAutoNum type="arabicPeriod" startAt="2"/>
+            </a:pPr>
+            <a:r>
+              <a:rPr lang="de-DE" dirty="0" smtClean="0"/>
+              <a:t>Beschreibung der Benchmarks</a:t>
+            </a:r>
+            <a:endParaRPr lang="de-DE" b="1" dirty="0" smtClean="0"/>
+          </a:p>
+          <a:p>
+            <a:pPr marL="857250" lvl="1" indent="-457200">
+              <a:buFont typeface="+mj-lt"/>
+              <a:buAutoNum type="arabicPeriod"/>
+            </a:pPr>
+            <a:r>
+              <a:rPr lang="de-DE" b="1" dirty="0" smtClean="0"/>
+              <a:t>HPL </a:t>
+            </a:r>
+          </a:p>
+          <a:p>
+            <a:pPr marL="685800" lvl="1"/>
+            <a:r>
+              <a:rPr lang="de-DE" dirty="0" smtClean="0"/>
+              <a:t>Frei verfügbare Implementierung von </a:t>
+            </a:r>
+            <a:r>
+              <a:rPr lang="de-DE" dirty="0" err="1" smtClean="0"/>
+              <a:t>HPLinpack</a:t>
+            </a:r>
+            <a:r>
+              <a:rPr lang="de-DE" smtClean="0"/>
+              <a:t> (Ermittlung der Top500</a:t>
+            </a:r>
+            <a:r>
+              <a:rPr lang="de-DE" dirty="0" smtClean="0"/>
+              <a:t>-Rangliste)</a:t>
+            </a:r>
+          </a:p>
+          <a:p>
+            <a:pPr marL="685800" lvl="1"/>
+            <a:r>
+              <a:rPr lang="de-DE" dirty="0" smtClean="0"/>
+              <a:t>Prinzip: Fließpunktoperationen auf dicht besetzter Matrix (Matrixmultiplikation)</a:t>
+            </a:r>
+          </a:p>
+          <a:p>
+            <a:pPr marL="685800" lvl="1"/>
+            <a:r>
+              <a:rPr lang="de-DE" dirty="0" smtClean="0"/>
+              <a:t>Anpassung an </a:t>
+            </a:r>
+            <a:r>
+              <a:rPr lang="de-DE" dirty="0" err="1" smtClean="0"/>
+              <a:t>Testsytem</a:t>
+            </a:r>
+            <a:r>
+              <a:rPr lang="de-DE" dirty="0" smtClean="0"/>
+              <a:t> erforderlich (v.a. Problemgröße, Blockgröße, Prozessnetz, Panel- und Subpanel-</a:t>
+            </a:r>
+            <a:r>
+              <a:rPr lang="de-DE" dirty="0" err="1" smtClean="0"/>
+              <a:t>Faktorisierungsstrategien</a:t>
+            </a:r>
+            <a:r>
+              <a:rPr lang="de-DE" dirty="0" smtClean="0"/>
+              <a:t>)</a:t>
+            </a:r>
+          </a:p>
+          <a:p>
+            <a:pPr marL="857250" lvl="1" indent="-457200">
+              <a:buFont typeface="+mj-lt"/>
+              <a:buAutoNum type="arabicPeriod"/>
+            </a:pPr>
+            <a:r>
+              <a:rPr lang="de-DE" b="1" dirty="0" smtClean="0"/>
+              <a:t>STREAM</a:t>
+            </a:r>
+            <a:endParaRPr lang="de-DE" b="1" dirty="0" smtClean="0"/>
+          </a:p>
+        </p:txBody>
+      </p:sp>
+      <p:sp>
+        <p:nvSpPr>
+          <p:cNvPr id="4" name="Foliennummernplatzhalter 3"/>
+          <p:cNvSpPr>
+            <a:spLocks noGrp="1"/>
+          </p:cNvSpPr>
+          <p:nvPr>
+            <p:ph type="sldNum" sz="quarter" idx="4"/>
+          </p:nvPr>
+        </p:nvSpPr>
+        <p:spPr/>
+        <p:txBody>
+          <a:bodyPr/>
+          <a:lstStyle/>
+          <a:p>
+            <a:pPr>
+              <a:defRPr/>
+            </a:pPr>
+            <a:fld id="{70BFFA52-4234-45F6-B1A6-074E24FF43A2}" type="slidenum">
+              <a:rPr lang="de-DE" smtClean="0"/>
+              <a:pPr>
+                <a:defRPr/>
+              </a:pPr>
+              <a:t>10</a:t>
+            </a:fld>
+            <a:endParaRPr lang="de-DE" dirty="0"/>
+          </a:p>
+        </p:txBody>
+      </p:sp>
+      <p:sp>
+        <p:nvSpPr>
+          <p:cNvPr id="5" name="Fußzeilenplatzhalter 4"/>
+          <p:cNvSpPr>
+            <a:spLocks noGrp="1"/>
+          </p:cNvSpPr>
+          <p:nvPr>
+            <p:ph type="ftr" sz="quarter" idx="3"/>
+          </p:nvPr>
+        </p:nvSpPr>
+        <p:spPr/>
+        <p:txBody>
+          <a:bodyPr/>
+          <a:lstStyle/>
+          <a:p>
+            <a:r>
+              <a:rPr lang="de-DE" dirty="0" smtClean="0"/>
+              <a:t>Skalierungsverhalten eines </a:t>
+            </a:r>
+            <a:r>
+              <a:rPr lang="de-DE" dirty="0" err="1" smtClean="0"/>
+              <a:t>Raspberry</a:t>
+            </a:r>
+            <a:r>
+              <a:rPr lang="de-DE" dirty="0" smtClean="0"/>
+              <a:t> Pi-Clusters mit HPC-Benchmarks</a:t>
+            </a:r>
+            <a:endParaRPr lang="de-DE" dirty="0"/>
+          </a:p>
+        </p:txBody>
+      </p:sp>
+      <p:sp>
+        <p:nvSpPr>
+          <p:cNvPr id="6" name="Textfeld 5"/>
+          <p:cNvSpPr txBox="1"/>
+          <p:nvPr/>
+        </p:nvSpPr>
+        <p:spPr>
+          <a:xfrm>
+            <a:off x="5725583" y="889000"/>
+            <a:ext cx="184666" cy="276999"/>
+          </a:xfrm>
+          <a:prstGeom prst="rect">
+            <a:avLst/>
+          </a:prstGeom>
+          <a:noFill/>
+        </p:spPr>
+        <p:txBody>
+          <a:bodyPr wrap="none" rtlCol="0">
+            <a:spAutoFit/>
+          </a:bodyPr>
+          <a:lstStyle/>
+          <a:p>
+            <a:endParaRPr lang="de-DE" dirty="0"/>
+          </a:p>
+        </p:txBody>
+      </p:sp>
+    </p:spTree>
+    <p:extLst>
+      <p:ext uri="{BB962C8B-B14F-4D97-AF65-F5344CB8AC3E}">
+        <p14:creationId xmlns:p14="http://schemas.microsoft.com/office/powerpoint/2010/main" val="2584458772"/>
+      </p:ext>
+    </p:extLst>
+  </p:cSld>
+  <p:clrMapOvr>
+    <a:masterClrMapping/>
+  </p:clrMapOvr>
+  <p:transition xmlns:p14="http://schemas.microsoft.com/office/powerpoint/2010/main" spd="med"/>
+</p:sld>
+</file>
+
+<file path=ppt/slides/slide11.xml><?xml version="1.0" encoding="utf-8"?>
+<p:sld xmlns:a="http://schemas.openxmlformats.org/drawingml/2006/main" xmlns:r="http://schemas.openxmlformats.org/officeDocument/2006/relationships" xmlns:p="http://schemas.openxmlformats.org/presentationml/2006/main">
+  <p:cSld>
+    <p:spTree>
+      <p:nvGrpSpPr>
+        <p:cNvPr id="1" name=""/>
+        <p:cNvGrpSpPr/>
+        <p:nvPr/>
+      </p:nvGrpSpPr>
+      <p:grpSpPr>
+        <a:xfrm>
+          <a:off x="0" y="0"/>
+          <a:ext cx="0" cy="0"/>
+          <a:chOff x="0" y="0"/>
+          <a:chExt cx="0" cy="0"/>
+        </a:xfrm>
+      </p:grpSpPr>
+      <p:sp>
+        <p:nvSpPr>
+          <p:cNvPr id="2" name="Titel 1"/>
+          <p:cNvSpPr>
+            <a:spLocks noGrp="1"/>
+          </p:cNvSpPr>
+          <p:nvPr>
+            <p:ph type="title"/>
+          </p:nvPr>
+        </p:nvSpPr>
+        <p:spPr/>
+        <p:txBody>
+          <a:bodyPr/>
+          <a:lstStyle/>
+          <a:p>
+            <a:r>
+              <a:rPr lang="de-DE" sz="1800" dirty="0" smtClean="0"/>
+              <a:t>Versuchsaufbau</a:t>
+            </a:r>
+            <a:endParaRPr lang="de-DE" sz="1800" dirty="0"/>
+          </a:p>
+        </p:txBody>
+      </p:sp>
+      <p:sp>
+        <p:nvSpPr>
+          <p:cNvPr id="3" name="Inhaltsplatzhalter 2"/>
+          <p:cNvSpPr>
+            <a:spLocks noGrp="1"/>
+          </p:cNvSpPr>
+          <p:nvPr>
+            <p:ph idx="1"/>
+          </p:nvPr>
+        </p:nvSpPr>
+        <p:spPr/>
+        <p:txBody>
+          <a:bodyPr/>
+          <a:lstStyle/>
+          <a:p>
+            <a:pPr marL="514350" indent="-514350">
+              <a:buFont typeface="+mj-lt"/>
+              <a:buAutoNum type="arabicPeriod" startAt="2"/>
+            </a:pPr>
+            <a:r>
+              <a:rPr lang="de-DE" dirty="0"/>
+              <a:t>Versuchsaufbau </a:t>
+            </a:r>
+            <a:endParaRPr lang="de-DE" dirty="0" smtClean="0"/>
+          </a:p>
+          <a:p>
+            <a:pPr marL="914400" lvl="1" indent="-514350">
+              <a:buFont typeface="+mj-lt"/>
+              <a:buAutoNum type="arabicPeriod"/>
+            </a:pPr>
+            <a:r>
+              <a:rPr lang="de-DE" dirty="0" smtClean="0"/>
+              <a:t>Vorarbeiten </a:t>
+            </a:r>
+          </a:p>
+          <a:p>
+            <a:pPr marL="914400" lvl="1" indent="-514350">
+              <a:buFont typeface="+mj-lt"/>
+              <a:buAutoNum type="arabicPeriod"/>
+            </a:pPr>
+            <a:r>
+              <a:rPr lang="de-DE" dirty="0" smtClean="0"/>
+              <a:t>Schritte </a:t>
+            </a:r>
+            <a:endParaRPr lang="de-DE" dirty="0"/>
+          </a:p>
+          <a:p>
+            <a:pPr marL="514350" indent="-514350">
+              <a:buFont typeface="+mj-lt"/>
+              <a:buAutoNum type="arabicPeriod" startAt="2"/>
+            </a:pPr>
+            <a:r>
+              <a:rPr lang="de-DE" dirty="0" smtClean="0"/>
+              <a:t>Versuchsdurchführung</a:t>
+            </a:r>
+          </a:p>
+          <a:p>
+            <a:pPr marL="914400" lvl="1" indent="-514350">
+              <a:buFont typeface="+mj-lt"/>
+              <a:buAutoNum type="arabicPeriod"/>
+            </a:pPr>
+            <a:r>
+              <a:rPr lang="de-DE" dirty="0" smtClean="0"/>
+              <a:t>Umsetzung</a:t>
+            </a:r>
+            <a:endParaRPr lang="de-DE" dirty="0"/>
+          </a:p>
+        </p:txBody>
+      </p:sp>
+      <p:sp>
+        <p:nvSpPr>
+          <p:cNvPr id="4" name="Foliennummernplatzhalter 3"/>
+          <p:cNvSpPr>
+            <a:spLocks noGrp="1"/>
+          </p:cNvSpPr>
+          <p:nvPr>
+            <p:ph type="sldNum" sz="quarter" idx="4"/>
+          </p:nvPr>
+        </p:nvSpPr>
+        <p:spPr/>
+        <p:txBody>
+          <a:bodyPr/>
+          <a:lstStyle/>
+          <a:p>
+            <a:pPr>
+              <a:defRPr/>
+            </a:pPr>
+            <a:fld id="{70BFFA52-4234-45F6-B1A6-074E24FF43A2}" type="slidenum">
+              <a:rPr lang="de-DE" smtClean="0"/>
+              <a:pPr>
+                <a:defRPr/>
+              </a:pPr>
+              <a:t>11</a:t>
+            </a:fld>
+            <a:endParaRPr lang="de-DE" dirty="0"/>
+          </a:p>
+        </p:txBody>
+      </p:sp>
+      <p:sp>
+        <p:nvSpPr>
+          <p:cNvPr id="5" name="Fußzeilenplatzhalter 4"/>
+          <p:cNvSpPr>
+            <a:spLocks noGrp="1"/>
+          </p:cNvSpPr>
+          <p:nvPr>
+            <p:ph type="ftr" sz="quarter" idx="3"/>
+          </p:nvPr>
+        </p:nvSpPr>
+        <p:spPr/>
+        <p:txBody>
+          <a:bodyPr/>
+          <a:lstStyle/>
+          <a:p>
+            <a:r>
+              <a:rPr lang="de-DE" dirty="0" smtClean="0"/>
+              <a:t>Skalierungsverhalten eines </a:t>
+            </a:r>
+            <a:r>
+              <a:rPr lang="de-DE" dirty="0" err="1" smtClean="0"/>
+              <a:t>Raspberry</a:t>
+            </a:r>
+            <a:r>
+              <a:rPr lang="de-DE" dirty="0" smtClean="0"/>
+              <a:t> Pi-Clusters mit HPC-Benchmarks</a:t>
+            </a:r>
+            <a:endParaRPr lang="de-DE" dirty="0"/>
+          </a:p>
+        </p:txBody>
+      </p:sp>
+    </p:spTree>
+    <p:extLst>
+      <p:ext uri="{BB962C8B-B14F-4D97-AF65-F5344CB8AC3E}">
+        <p14:creationId xmlns:p14="http://schemas.microsoft.com/office/powerpoint/2010/main" val="557452951"/>
       </p:ext>
     </p:extLst>
   </p:cSld>
@@ -2567,18 +3585,9 @@
             </a:pPr>
             <a:r>
               <a:rPr lang="de-DE" dirty="0" smtClean="0"/>
-              <a:t>Beschreibung der HPC-Benchmarks </a:t>
-            </a:r>
-          </a:p>
-          <a:p>
-            <a:pPr marL="914400" lvl="1" indent="-514350">
-              <a:buFont typeface="+mj-lt"/>
-              <a:buAutoNum type="arabicPeriod"/>
-            </a:pPr>
-            <a:r>
-              <a:rPr lang="de-DE" dirty="0" smtClean="0"/>
               <a:t>Versuchsaufbau </a:t>
             </a:r>
+            <a:endParaRPr lang="de-DE" dirty="0" smtClean="0"/>
           </a:p>
           <a:p>
             <a:pPr marL="914400" lvl="1" indent="-514350">
@@ -2750,8 +3759,12 @@
           <a:lstStyle/>
           <a:p>
             <a:r>
+              <a:rPr lang="de-DE" sz="1800" dirty="0" err="1" smtClean="0"/>
+              <a:t>Raspberry</a:t>
+            </a:r>
+            <a:r>
               <a:rPr lang="de-DE" sz="1800" dirty="0" smtClean="0"/>
-              <a:t>Einführung und Aufgabenstellung</a:t>
+              <a:t> Pi</a:t>
             </a:r>
             <a:endParaRPr lang="de-DE" sz="1800" dirty="0"/>
           </a:p>
@@ -2782,16 +3795,29 @@
             </a:r>
             <a:r>
               <a:rPr lang="de-DE" dirty="0" smtClean="0"/>
-              <a:t> Pi</a:t>
-            </a:r>
-          </a:p>
-          <a:p>
+              <a:t> </a:t>
+            </a:r>
+            <a:r>
+              <a:rPr lang="de-DE" dirty="0" smtClean="0"/>
+              <a:t>Pi</a:t>
+            </a:r>
+          </a:p>
+          <a:p>
+            <a:r>
+              <a:rPr lang="de-DE" dirty="0" smtClean="0"/>
+              <a:t>Allgemeines</a:t>
+            </a:r>
+            <a:endParaRPr lang="de-DE" dirty="0" smtClean="0"/>
+          </a:p>
+          <a:p>
+            <a:pPr lvl="1"/>
             <a:r>
               <a:rPr lang="de-DE" dirty="0" smtClean="0"/>
               <a:t>Mini-Computer (Kreditkartengröße)</a:t>
             </a:r>
           </a:p>
           <a:p>
+            <a:pPr lvl="1"/>
             <a:r>
               <a:rPr lang="de-DE" dirty="0" smtClean="0"/>
               <a:t>Entwicklung seit 2009 durch die </a:t>
@@ -2811,17 +3837,30 @@
             <a:endParaRPr lang="de-DE" dirty="0" smtClean="0"/>
           </a:p>
           <a:p>
-            <a:r>
-              <a:rPr lang="de-DE" dirty="0" smtClean="0"/>
-              <a:t>Aktuell: Modell B, im Juni 2014 über 3 Mio. Mal verkauft</a:t>
+            <a:pPr lvl="1"/>
+            <a:r>
+              <a:rPr lang="de-DE" dirty="0" smtClean="0"/>
+              <a:t>Aktuell: Modell B, im Juni 2014 über 3 Mio. Mal </a:t>
+            </a:r>
+            <a:r>
+              <a:rPr lang="de-DE" dirty="0" smtClean="0"/>
+              <a:t>verkauft</a:t>
+            </a:r>
+          </a:p>
+          <a:p>
+            <a:pPr lvl="1"/>
+            <a:r>
+              <a:rPr lang="de-DE" dirty="0" smtClean="0"/>
+              <a:t>Kosten insgesamt: ca. 50 Euro </a:t>
             </a:r>
             <a:endParaRPr lang="de-DE" dirty="0"/>
           </a:p>
           <a:p>
             <a:r>
               <a:rPr lang="de-DE" dirty="0" smtClean="0"/>
-              <a:t>Spezifikation:</a:t>
-            </a:r>
+              <a:t>Spezifikation</a:t>
+            </a:r>
+            <a:endParaRPr lang="de-DE" dirty="0" smtClean="0"/>
           </a:p>
           <a:p>
             <a:pPr lvl="1"/>
@@ -2868,8 +3907,13 @@
             </a:r>
             <a:r>
               <a:rPr lang="de-DE" dirty="0"/>
-              <a:t>Festplatte“: 4 GB SD-Karte (Klasse 10)</a:t>
-            </a:r>
+              <a:t>Festplatte“: 4 GB SD-Karte (Klasse </a:t>
+            </a:r>
+            <a:r>
+              <a:rPr lang="de-DE" dirty="0" smtClean="0"/>
+              <a:t>4)</a:t>
+            </a:r>
+            <a:endParaRPr lang="de-DE" dirty="0"/>
           </a:p>
           <a:p>
             <a:pPr lvl="1"/>
@@ -2894,29 +3938,12 @@
             <a:pPr lvl="1"/>
             <a:r>
               <a:rPr lang="de-DE" dirty="0"/>
-              <a:t>Betriebssysteme: hauptsächlich Linux-Varianten wie </a:t>
-            </a:r>
-            <a:r>
-              <a:rPr lang="de-DE" dirty="0" err="1"/>
-              <a:t>Raspbian</a:t>
-            </a:r>
-            <a:r>
-              <a:rPr lang="de-DE" dirty="0"/>
-              <a:t> (Debian-Variante)</a:t>
-            </a:r>
-            <a:endParaRPr lang="de-DE" dirty="0" smtClean="0"/>
-          </a:p>
-          <a:p>
-            <a:r>
-              <a:rPr lang="de-DE" dirty="0" smtClean="0"/>
-              <a:t>Kosten insgesamt: ca. 50 Euro </a:t>
-            </a:r>
-            <a:endParaRPr lang="de-DE" dirty="0"/>
-          </a:p>
-          <a:p>
-            <a:pPr marL="457200" lvl="1" indent="0">
-              <a:buNone/>
-            </a:pPr>
+              <a:t>Betriebssysteme: hauptsächlich </a:t>
+            </a:r>
+            <a:r>
+              <a:rPr lang="de-DE" dirty="0" smtClean="0"/>
+              <a:t>Linux/Unix-Varianten</a:t>
+            </a:r>
             <a:endParaRPr lang="de-DE" dirty="0"/>
           </a:p>
         </p:txBody>
@@ -2981,74 +4008,89 @@
           </a:p>
         </p:txBody>
       </p:sp>
-      <p:pic>
-        <p:nvPicPr>
-          <p:cNvPr id="7" name="Bild 6" descr="570px-Raspberry_Pi_Logo.svg.png" title="Quelle: http://www.raspberrypi.org/wp-content/uploads/2011/10/Raspi-PGB001-300x267.png"/>
-          <p:cNvPicPr>
-            <a:picLocks noChangeAspect="1"/>
-          </p:cNvPicPr>
+      <p:grpSp>
+        <p:nvGrpSpPr>
+          <p:cNvPr id="6" name="Gruppierung 5"/>
+          <p:cNvGrpSpPr/>
           <p:nvPr/>
-        </p:nvPicPr>
-        <p:blipFill>
-          <a:blip r:embed="rId3">
-            <a:extLst>
-              <a:ext uri="{28A0092B-C50C-407E-A947-70E740481C1C}">
-                <a14:useLocalDpi xmlns:a14="http://schemas.microsoft.com/office/drawing/2010/main" val="0"/>
-              </a:ext>
-            </a:extLst>
-          </a:blip>
-          <a:stretch>
-            <a:fillRect/>
-          </a:stretch>
-        </p:blipFill>
-        <p:spPr>
+        </p:nvGrpSpPr>
+        <p:grpSpPr>
           <a:xfrm>
-            <a:off x="6912260" y="3429000"/>
-            <a:ext cx="1085850" cy="1371600"/>
+            <a:off x="6300192" y="3429000"/>
+            <a:ext cx="2545288" cy="1717159"/>
+            <a:chOff x="6300192" y="3429000"/>
+            <a:chExt cx="2545288" cy="1717159"/>
           </a:xfrm>
-          <a:prstGeom prst="rect">
-            <a:avLst/>
-          </a:prstGeom>
-        </p:spPr>
-      </p:pic>
-      <p:sp>
-        <p:nvSpPr>
-          <p:cNvPr id="8" name="Textfeld 7"/>
-          <p:cNvSpPr txBox="1"/>
-          <p:nvPr/>
-        </p:nvSpPr>
-        <p:spPr>
-          <a:xfrm>
-            <a:off x="2666145" y="4689140"/>
-            <a:ext cx="2545288" cy="276999"/>
-          </a:xfrm>
-          <a:prstGeom prst="rect">
-            <a:avLst/>
-          </a:prstGeom>
-          <a:noFill/>
-        </p:spPr>
-        <p:txBody>
-          <a:bodyPr wrap="none" rtlCol="0">
-            <a:spAutoFit/>
-          </a:bodyPr>
-          <a:lstStyle/>
-          <a:p>
-            <a:r>
-              <a:rPr lang="de-DE" dirty="0"/>
-              <a:t>Quelle: http://</a:t>
-            </a:r>
-            <a:r>
-              <a:rPr lang="de-DE" dirty="0" err="1"/>
-              <a:t>www.raspberrypi.org</a:t>
-            </a:r>
-            <a:r>
-              <a:rPr lang="de-DE" smtClean="0"/>
-              <a:t>/</a:t>
-            </a:r>
-            <a:endParaRPr lang="de-DE" dirty="0"/>
-          </a:p>
-        </p:txBody>
-      </p:sp>
+        </p:grpSpPr>
+        <p:pic>
+          <p:nvPicPr>
+            <p:cNvPr id="7" name="Bild 6" descr="570px-Raspberry_Pi_Logo.svg.png" title="Quelle: http://www.raspberrypi.org/wp-content/uploads/2011/10/Raspi-PGB001-300x267.png"/>
+            <p:cNvPicPr>
+              <a:picLocks noChangeAspect="1"/>
+            </p:cNvPicPr>
+            <p:nvPr/>
+          </p:nvPicPr>
+          <p:blipFill>
+            <a:blip r:embed="rId3">
+              <a:extLst>
+                <a:ext uri="{28A0092B-C50C-407E-A947-70E740481C1C}">
+                  <a14:useLocalDpi xmlns:a14="http://schemas.microsoft.com/office/drawing/2010/main" val="0"/>
+                </a:ext>
+              </a:extLst>
+            </a:blip>
+            <a:stretch>
+              <a:fillRect/>
+            </a:stretch>
+          </p:blipFill>
+          <p:spPr>
+            <a:xfrm>
+              <a:off x="6912260" y="3429000"/>
+              <a:ext cx="1085850" cy="1371600"/>
+            </a:xfrm>
+            <a:prstGeom prst="rect">
+              <a:avLst/>
+            </a:prstGeom>
+          </p:spPr>
+        </p:pic>
+        <p:sp>
+          <p:nvSpPr>
+            <p:cNvPr id="8" name="Textfeld 7"/>
+            <p:cNvSpPr txBox="1"/>
+            <p:nvPr/>
+          </p:nvSpPr>
+          <p:spPr>
+            <a:xfrm>
+              <a:off x="6300192" y="4869160"/>
+              <a:ext cx="2545288" cy="276999"/>
+            </a:xfrm>
+            <a:prstGeom prst="rect">
+              <a:avLst/>
+            </a:prstGeom>
+            <a:noFill/>
+          </p:spPr>
+          <p:txBody>
+            <a:bodyPr wrap="none" rtlCol="0">
+              <a:spAutoFit/>
+            </a:bodyPr>
+            <a:lstStyle/>
+            <a:p>
+              <a:r>
+                <a:rPr lang="de-DE" dirty="0"/>
+                <a:t>Quelle: http://</a:t>
+              </a:r>
+              <a:r>
+                <a:rPr lang="de-DE" dirty="0" err="1"/>
+                <a:t>www.raspberrypi.org</a:t>
+              </a:r>
+              <a:r>
+                <a:rPr lang="de-DE" dirty="0" smtClean="0"/>
+                <a:t>/</a:t>
+              </a:r>
+              <a:endParaRPr lang="de-DE" dirty="0"/>
+            </a:p>
+          </p:txBody>
+        </p:sp>
+      </p:grpSp>
     </p:spTree>
     <p:extLst>
       <p:ext uri="{BB962C8B-B14F-4D97-AF65-F5344CB8AC3E}">
@@ -3096,46 +4138,42 @@
           <a:lstStyle/>
           <a:p>
             <a:r>
+              <a:rPr lang="de-DE" sz="1800" dirty="0" err="1" smtClean="0"/>
+              <a:t>Raspberry</a:t>
+            </a:r>
+            <a:r>
               <a:rPr lang="de-DE" sz="1800" dirty="0" smtClean="0"/>
-              <a:t>Einführung und Aufgabenstellung</a:t>
+              <a:t> Pi: Aufbau</a:t>
             </a:r>
             <a:endParaRPr lang="de-DE" sz="1800" dirty="0"/>
           </a:p>
         </p:txBody>
       </p:sp>
-      <p:sp>
-        <p:nvSpPr>
-          <p:cNvPr id="3" name="Inhaltsplatzhalter 2"/>
-          <p:cNvSpPr>
-            <a:spLocks noGrp="1"/>
-          </p:cNvSpPr>
+      <p:pic>
+        <p:nvPicPr>
+          <p:cNvPr id="7" name="Inhaltsplatzhalter 6" descr="RaspiModelB.png"/>
+          <p:cNvPicPr>
+            <a:picLocks noGrp="1" noChangeAspect="1"/>
+          </p:cNvPicPr>
           <p:nvPr>
             <p:ph idx="1"/>
           </p:nvPr>
-        </p:nvSpPr>
-        <p:spPr/>
-        <p:txBody>
-          <a:bodyPr/>
-          <a:lstStyle/>
-          <a:p>
-            <a:pPr marL="514350" indent="-514350">
-              <a:buFont typeface="+mj-lt"/>
-              <a:buAutoNum type="arabicPeriod" startAt="2"/>
-            </a:pPr>
-            <a:r>
-              <a:rPr lang="de-DE" dirty="0" err="1" smtClean="0"/>
-              <a:t>Bramble</a:t>
-            </a:r>
-            <a:endParaRPr lang="de-DE" dirty="0" smtClean="0"/>
-          </a:p>
-          <a:p>
-            <a:pPr marL="457200" lvl="1" indent="0">
-              <a:buNone/>
-            </a:pPr>
-            <a:endParaRPr lang="de-DE" dirty="0"/>
-          </a:p>
-        </p:txBody>
-      </p:sp>
+        </p:nvPicPr>
+        <p:blipFill>
+          <a:blip r:embed="rId3">
+            <a:extLst>
+              <a:ext uri="{28A0092B-C50C-407E-A947-70E740481C1C}">
+                <a14:useLocalDpi xmlns:a14="http://schemas.microsoft.com/office/drawing/2010/main" val="0"/>
+              </a:ext>
+            </a:extLst>
+          </a:blip>
+          <a:srcRect l="-27959" r="-27959"/>
+          <a:stretch>
+            <a:fillRect/>
+          </a:stretch>
+        </p:blipFill>
+        <p:spPr/>
+      </p:pic>
       <p:sp>
         <p:nvSpPr>
           <p:cNvPr id="4" name="Foliennummernplatzhalter 3"/>
@@ -3196,10 +4234,1134 @@
           </a:p>
         </p:txBody>
       </p:sp>
+      <p:sp>
+        <p:nvSpPr>
+          <p:cNvPr id="9" name="Textfeld 8"/>
+          <p:cNvSpPr txBox="1"/>
+          <p:nvPr/>
+        </p:nvSpPr>
+        <p:spPr>
+          <a:xfrm>
+            <a:off x="3527884" y="6093296"/>
+            <a:ext cx="2545288" cy="276999"/>
+          </a:xfrm>
+          <a:prstGeom prst="rect">
+            <a:avLst/>
+          </a:prstGeom>
+          <a:noFill/>
+        </p:spPr>
+        <p:txBody>
+          <a:bodyPr wrap="none" rtlCol="0">
+            <a:spAutoFit/>
+          </a:bodyPr>
+          <a:lstStyle/>
+          <a:p>
+            <a:r>
+              <a:rPr lang="de-DE" dirty="0" smtClean="0"/>
+              <a:t>Quelle: http</a:t>
+            </a:r>
+            <a:r>
+              <a:rPr lang="de-DE" dirty="0"/>
+              <a:t>://</a:t>
+            </a:r>
+            <a:r>
+              <a:rPr lang="de-DE" dirty="0" err="1"/>
+              <a:t>www.raspberrypi.org</a:t>
+            </a:r>
+            <a:r>
+              <a:rPr lang="de-DE" dirty="0" smtClean="0"/>
+              <a:t>/</a:t>
+            </a:r>
+            <a:endParaRPr lang="de-DE" dirty="0"/>
+          </a:p>
+        </p:txBody>
+      </p:sp>
     </p:spTree>
     <p:extLst>
       <p:ext uri="{BB962C8B-B14F-4D97-AF65-F5344CB8AC3E}">
         <p14:creationId xmlns:p14="http://schemas.microsoft.com/office/powerpoint/2010/main" val="2203826736"/>
+      </p:ext>
+    </p:extLst>
+  </p:cSld>
+  <p:clrMapOvr>
+    <a:masterClrMapping/>
+  </p:clrMapOvr>
+  <p:transition xmlns:p14="http://schemas.microsoft.com/office/powerpoint/2010/main" spd="med"/>
+</p:sld>
+</file>
+
+<file path=ppt/slides/slide5.xml><?xml version="1.0" encoding="utf-8"?>
+<p:sld xmlns:a="http://schemas.openxmlformats.org/drawingml/2006/main" xmlns:r="http://schemas.openxmlformats.org/officeDocument/2006/relationships" xmlns:p="http://schemas.openxmlformats.org/presentationml/2006/main">
+  <p:cSld>
+    <p:spTree>
+      <p:nvGrpSpPr>
+        <p:cNvPr id="1" name=""/>
+        <p:cNvGrpSpPr/>
+        <p:nvPr/>
+      </p:nvGrpSpPr>
+      <p:grpSpPr>
+        <a:xfrm>
+          <a:off x="0" y="0"/>
+          <a:ext cx="0" cy="0"/>
+          <a:chOff x="0" y="0"/>
+          <a:chExt cx="0" cy="0"/>
+        </a:xfrm>
+      </p:grpSpPr>
+      <p:sp>
+        <p:nvSpPr>
+          <p:cNvPr id="2" name="Titel 1"/>
+          <p:cNvSpPr>
+            <a:spLocks noGrp="1"/>
+          </p:cNvSpPr>
+          <p:nvPr>
+            <p:ph type="title"/>
+          </p:nvPr>
+        </p:nvSpPr>
+        <p:spPr/>
+        <p:txBody>
+          <a:bodyPr/>
+          <a:lstStyle/>
+          <a:p>
+            <a:r>
+              <a:rPr lang="de-DE" sz="1800" dirty="0" err="1" smtClean="0"/>
+              <a:t>Bramble</a:t>
+            </a:r>
+            <a:endParaRPr lang="de-DE" sz="1800" dirty="0"/>
+          </a:p>
+        </p:txBody>
+      </p:sp>
+      <p:sp>
+        <p:nvSpPr>
+          <p:cNvPr id="3" name="Inhaltsplatzhalter 2"/>
+          <p:cNvSpPr>
+            <a:spLocks noGrp="1"/>
+          </p:cNvSpPr>
+          <p:nvPr>
+            <p:ph idx="1"/>
+          </p:nvPr>
+        </p:nvSpPr>
+        <p:spPr/>
+        <p:txBody>
+          <a:bodyPr/>
+          <a:lstStyle/>
+          <a:p>
+            <a:pPr marL="514350" indent="-514350">
+              <a:buFont typeface="+mj-lt"/>
+              <a:buAutoNum type="arabicPeriod" startAt="2"/>
+            </a:pPr>
+            <a:r>
+              <a:rPr lang="de-DE" dirty="0" err="1" smtClean="0"/>
+              <a:t>Bramble</a:t>
+            </a:r>
+            <a:endParaRPr lang="de-DE" dirty="0" smtClean="0"/>
+          </a:p>
+          <a:p>
+            <a:r>
+              <a:rPr lang="de-DE" dirty="0" smtClean="0"/>
+              <a:t>Definition Beowulf-Cluster: </a:t>
+            </a:r>
+          </a:p>
+          <a:p>
+            <a:pPr lvl="1"/>
+            <a:r>
+              <a:rPr lang="de-DE" dirty="0" smtClean="0"/>
+              <a:t>Lose gekoppeltes System kostengünstiger Rechner</a:t>
+            </a:r>
+          </a:p>
+          <a:p>
+            <a:pPr lvl="1"/>
+            <a:r>
+              <a:rPr lang="de-DE" dirty="0" smtClean="0"/>
+              <a:t>Betriebssystem: Linux/BSD</a:t>
+            </a:r>
+          </a:p>
+          <a:p>
+            <a:pPr lvl="1"/>
+            <a:r>
+              <a:rPr lang="de-DE" dirty="0" smtClean="0"/>
+              <a:t>Kommunikation über IP </a:t>
+            </a:r>
+          </a:p>
+          <a:p>
+            <a:pPr lvl="1"/>
+            <a:r>
+              <a:rPr lang="de-DE" dirty="0" smtClean="0"/>
+              <a:t>Kein gemeinsamer Speicher, keine Cache-Kohärenz</a:t>
+            </a:r>
+          </a:p>
+          <a:p>
+            <a:pPr lvl="1"/>
+            <a:r>
+              <a:rPr lang="de-DE" dirty="0" smtClean="0"/>
+              <a:t>Definition </a:t>
+            </a:r>
+            <a:r>
+              <a:rPr lang="de-DE" dirty="0" err="1" smtClean="0"/>
+              <a:t>Bramble</a:t>
+            </a:r>
+            <a:r>
+              <a:rPr lang="de-DE" dirty="0" smtClean="0"/>
+              <a:t>: Beowulf-Cluster aus </a:t>
+            </a:r>
+            <a:r>
+              <a:rPr lang="de-DE" dirty="0" err="1" smtClean="0"/>
+              <a:t>Raspberry</a:t>
+            </a:r>
+            <a:r>
+              <a:rPr lang="de-DE" dirty="0" smtClean="0"/>
+              <a:t> Pis </a:t>
+            </a:r>
+          </a:p>
+          <a:p>
+            <a:r>
+              <a:rPr lang="de-DE" dirty="0" smtClean="0"/>
+              <a:t>Spezifikation: </a:t>
+            </a:r>
+          </a:p>
+          <a:p>
+            <a:pPr lvl="1"/>
+            <a:r>
+              <a:rPr lang="de-DE" dirty="0" smtClean="0"/>
+              <a:t>20 </a:t>
+            </a:r>
+            <a:r>
+              <a:rPr lang="de-DE" dirty="0" err="1" smtClean="0"/>
+              <a:t>Raspberry</a:t>
+            </a:r>
+            <a:r>
+              <a:rPr lang="de-DE" dirty="0" smtClean="0"/>
+              <a:t> Pi Modell B-Einzelrechner (1)</a:t>
+            </a:r>
+          </a:p>
+          <a:p>
+            <a:pPr lvl="1"/>
+            <a:r>
+              <a:rPr lang="de-DE" dirty="0" smtClean="0"/>
+              <a:t>Verbindung über Ethernet-Kabel und </a:t>
+            </a:r>
+            <a:r>
+              <a:rPr lang="de-DE" dirty="0" smtClean="0"/>
+              <a:t>24 Port Gigabit-Switch (2, 3)</a:t>
+            </a:r>
+          </a:p>
+          <a:p>
+            <a:pPr lvl="1"/>
+            <a:r>
+              <a:rPr lang="de-DE" dirty="0" smtClean="0"/>
+              <a:t>Server: Mini-ITX-Mainboard (4), Festplatten mit RAID Level 5-System (5)</a:t>
+            </a:r>
+          </a:p>
+          <a:p>
+            <a:pPr lvl="1"/>
+            <a:r>
+              <a:rPr lang="de-DE" dirty="0" smtClean="0"/>
+              <a:t>Stromversorgung: zentrales Netzteil (6), 2 Verteiler (7), 20 Mikro-USB-Kabel (8)</a:t>
+            </a:r>
+          </a:p>
+          <a:p>
+            <a:pPr lvl="1"/>
+            <a:r>
+              <a:rPr lang="de-DE" dirty="0" smtClean="0"/>
+              <a:t>Kühlung: 4 Kühlgebläse (9)</a:t>
+            </a:r>
+          </a:p>
+          <a:p>
+            <a:pPr lvl="1"/>
+            <a:r>
+              <a:rPr lang="de-DE" dirty="0" smtClean="0"/>
+              <a:t>Betriebssystem: Debian (Server), </a:t>
+            </a:r>
+            <a:r>
+              <a:rPr lang="de-DE" dirty="0" err="1" smtClean="0"/>
+              <a:t>Raspbian</a:t>
+            </a:r>
+            <a:r>
+              <a:rPr lang="de-DE" dirty="0" smtClean="0"/>
+              <a:t> (Knoten)</a:t>
+            </a:r>
+          </a:p>
+          <a:p>
+            <a:pPr lvl="1"/>
+            <a:endParaRPr lang="de-DE" dirty="0" smtClean="0"/>
+          </a:p>
+        </p:txBody>
+      </p:sp>
+      <p:sp>
+        <p:nvSpPr>
+          <p:cNvPr id="4" name="Foliennummernplatzhalter 3"/>
+          <p:cNvSpPr>
+            <a:spLocks noGrp="1"/>
+          </p:cNvSpPr>
+          <p:nvPr>
+            <p:ph type="sldNum" sz="quarter" idx="4"/>
+          </p:nvPr>
+        </p:nvSpPr>
+        <p:spPr/>
+        <p:txBody>
+          <a:bodyPr/>
+          <a:lstStyle/>
+          <a:p>
+            <a:pPr>
+              <a:defRPr/>
+            </a:pPr>
+            <a:fld id="{70BFFA52-4234-45F6-B1A6-074E24FF43A2}" type="slidenum">
+              <a:rPr lang="de-DE" smtClean="0"/>
+              <a:pPr>
+                <a:defRPr/>
+              </a:pPr>
+              <a:t>5</a:t>
+            </a:fld>
+            <a:endParaRPr lang="de-DE" dirty="0"/>
+          </a:p>
+        </p:txBody>
+      </p:sp>
+      <p:sp>
+        <p:nvSpPr>
+          <p:cNvPr id="5" name="Fußzeilenplatzhalter 4"/>
+          <p:cNvSpPr>
+            <a:spLocks noGrp="1"/>
+          </p:cNvSpPr>
+          <p:nvPr>
+            <p:ph type="ftr" sz="quarter" idx="3"/>
+          </p:nvPr>
+        </p:nvSpPr>
+        <p:spPr/>
+        <p:txBody>
+          <a:bodyPr/>
+          <a:lstStyle/>
+          <a:p>
+            <a:r>
+              <a:rPr lang="de-DE" dirty="0" smtClean="0"/>
+              <a:t>Skalierungsverhalten eines </a:t>
+            </a:r>
+            <a:r>
+              <a:rPr lang="de-DE" dirty="0" err="1" smtClean="0"/>
+              <a:t>Raspberry</a:t>
+            </a:r>
+            <a:r>
+              <a:rPr lang="de-DE" dirty="0" smtClean="0"/>
+              <a:t> Pi-Clusters mit HPC-Benchmarks</a:t>
+            </a:r>
+            <a:endParaRPr lang="de-DE" dirty="0"/>
+          </a:p>
+        </p:txBody>
+      </p:sp>
+    </p:spTree>
+    <p:extLst>
+      <p:ext uri="{BB962C8B-B14F-4D97-AF65-F5344CB8AC3E}">
+        <p14:creationId xmlns:p14="http://schemas.microsoft.com/office/powerpoint/2010/main" val="1697037626"/>
+      </p:ext>
+    </p:extLst>
+  </p:cSld>
+  <p:clrMapOvr>
+    <a:masterClrMapping/>
+  </p:clrMapOvr>
+  <p:transition xmlns:p14="http://schemas.microsoft.com/office/powerpoint/2010/main" spd="med"/>
+</p:sld>
+</file>
+
+<file path=ppt/slides/slide6.xml><?xml version="1.0" encoding="utf-8"?>
+<p:sld xmlns:a="http://schemas.openxmlformats.org/drawingml/2006/main" xmlns:r="http://schemas.openxmlformats.org/officeDocument/2006/relationships" xmlns:p="http://schemas.openxmlformats.org/presentationml/2006/main">
+  <p:cSld>
+    <p:spTree>
+      <p:nvGrpSpPr>
+        <p:cNvPr id="1" name=""/>
+        <p:cNvGrpSpPr/>
+        <p:nvPr/>
+      </p:nvGrpSpPr>
+      <p:grpSpPr>
+        <a:xfrm>
+          <a:off x="0" y="0"/>
+          <a:ext cx="0" cy="0"/>
+          <a:chOff x="0" y="0"/>
+          <a:chExt cx="0" cy="0"/>
+        </a:xfrm>
+      </p:grpSpPr>
+      <p:sp>
+        <p:nvSpPr>
+          <p:cNvPr id="2" name="Titel 1"/>
+          <p:cNvSpPr>
+            <a:spLocks noGrp="1"/>
+          </p:cNvSpPr>
+          <p:nvPr>
+            <p:ph type="title"/>
+          </p:nvPr>
+        </p:nvSpPr>
+        <p:spPr/>
+        <p:txBody>
+          <a:bodyPr/>
+          <a:lstStyle/>
+          <a:p>
+            <a:r>
+              <a:rPr lang="de-DE" sz="1800" dirty="0" err="1" smtClean="0"/>
+              <a:t>Bramble</a:t>
+            </a:r>
+            <a:r>
+              <a:rPr lang="de-DE" sz="1800" dirty="0" smtClean="0"/>
+              <a:t>: Aufbau</a:t>
+            </a:r>
+            <a:endParaRPr lang="de-DE" sz="1800" dirty="0"/>
+          </a:p>
+        </p:txBody>
+      </p:sp>
+      <p:pic>
+        <p:nvPicPr>
+          <p:cNvPr id="7" name="Inhaltsplatzhalter 6" descr="bramble.pdf"/>
+          <p:cNvPicPr>
+            <a:picLocks noGrp="1" noChangeAspect="1"/>
+          </p:cNvPicPr>
+          <p:nvPr>
+            <p:ph idx="1"/>
+          </p:nvPr>
+        </p:nvPicPr>
+        <p:blipFill>
+          <a:blip r:embed="rId3">
+            <a:extLst>
+              <a:ext uri="{28A0092B-C50C-407E-A947-70E740481C1C}">
+                <a14:useLocalDpi xmlns:a14="http://schemas.microsoft.com/office/drawing/2010/main" val="0"/>
+              </a:ext>
+            </a:extLst>
+          </a:blip>
+          <a:srcRect l="-5262" r="-5262"/>
+          <a:stretch>
+            <a:fillRect/>
+          </a:stretch>
+        </p:blipFill>
+        <p:spPr/>
+      </p:pic>
+      <p:sp>
+        <p:nvSpPr>
+          <p:cNvPr id="4" name="Foliennummernplatzhalter 3"/>
+          <p:cNvSpPr>
+            <a:spLocks noGrp="1"/>
+          </p:cNvSpPr>
+          <p:nvPr>
+            <p:ph type="sldNum" sz="quarter" idx="4"/>
+          </p:nvPr>
+        </p:nvSpPr>
+        <p:spPr/>
+        <p:txBody>
+          <a:bodyPr/>
+          <a:lstStyle/>
+          <a:p>
+            <a:pPr>
+              <a:defRPr/>
+            </a:pPr>
+            <a:fld id="{70BFFA52-4234-45F6-B1A6-074E24FF43A2}" type="slidenum">
+              <a:rPr lang="de-DE" smtClean="0"/>
+              <a:pPr>
+                <a:defRPr/>
+              </a:pPr>
+              <a:t>6</a:t>
+            </a:fld>
+            <a:endParaRPr lang="de-DE" dirty="0"/>
+          </a:p>
+        </p:txBody>
+      </p:sp>
+      <p:sp>
+        <p:nvSpPr>
+          <p:cNvPr id="5" name="Fußzeilenplatzhalter 4"/>
+          <p:cNvSpPr>
+            <a:spLocks noGrp="1"/>
+          </p:cNvSpPr>
+          <p:nvPr>
+            <p:ph type="ftr" sz="quarter" idx="3"/>
+          </p:nvPr>
+        </p:nvSpPr>
+        <p:spPr/>
+        <p:txBody>
+          <a:bodyPr/>
+          <a:lstStyle/>
+          <a:p>
+            <a:r>
+              <a:rPr lang="de-DE" dirty="0" smtClean="0"/>
+              <a:t>Skalierungsverhalten eines </a:t>
+            </a:r>
+            <a:r>
+              <a:rPr lang="de-DE" dirty="0" err="1" smtClean="0"/>
+              <a:t>Raspberry</a:t>
+            </a:r>
+            <a:r>
+              <a:rPr lang="de-DE" dirty="0" smtClean="0"/>
+              <a:t> Pi-Clusters mit HPC-Benchmarks</a:t>
+            </a:r>
+            <a:endParaRPr lang="de-DE" dirty="0"/>
+          </a:p>
+        </p:txBody>
+      </p:sp>
+    </p:spTree>
+    <p:extLst>
+      <p:ext uri="{BB962C8B-B14F-4D97-AF65-F5344CB8AC3E}">
+        <p14:creationId xmlns:p14="http://schemas.microsoft.com/office/powerpoint/2010/main" val="4048106483"/>
+      </p:ext>
+    </p:extLst>
+  </p:cSld>
+  <p:clrMapOvr>
+    <a:masterClrMapping/>
+  </p:clrMapOvr>
+  <p:transition xmlns:p14="http://schemas.microsoft.com/office/powerpoint/2010/main" spd="med"/>
+</p:sld>
+</file>
+
+<file path=ppt/slides/slide7.xml><?xml version="1.0" encoding="utf-8"?>
+<p:sld xmlns:a="http://schemas.openxmlformats.org/drawingml/2006/main" xmlns:r="http://schemas.openxmlformats.org/officeDocument/2006/relationships" xmlns:p="http://schemas.openxmlformats.org/presentationml/2006/main">
+  <p:cSld>
+    <p:spTree>
+      <p:nvGrpSpPr>
+        <p:cNvPr id="1" name=""/>
+        <p:cNvGrpSpPr/>
+        <p:nvPr/>
+      </p:nvGrpSpPr>
+      <p:grpSpPr>
+        <a:xfrm>
+          <a:off x="0" y="0"/>
+          <a:ext cx="0" cy="0"/>
+          <a:chOff x="0" y="0"/>
+          <a:chExt cx="0" cy="0"/>
+        </a:xfrm>
+      </p:grpSpPr>
+      <p:sp>
+        <p:nvSpPr>
+          <p:cNvPr id="2" name="Titel 1"/>
+          <p:cNvSpPr>
+            <a:spLocks noGrp="1"/>
+          </p:cNvSpPr>
+          <p:nvPr>
+            <p:ph type="title"/>
+          </p:nvPr>
+        </p:nvSpPr>
+        <p:spPr/>
+        <p:txBody>
+          <a:bodyPr/>
+          <a:lstStyle/>
+          <a:p>
+            <a:r>
+              <a:rPr lang="de-DE" sz="1800" dirty="0" err="1" smtClean="0"/>
+              <a:t>Bramble</a:t>
+            </a:r>
+            <a:r>
+              <a:rPr lang="de-DE" sz="1800" dirty="0" smtClean="0"/>
+              <a:t>: Aufbau</a:t>
+            </a:r>
+            <a:endParaRPr lang="de-DE" sz="1800" dirty="0"/>
+          </a:p>
+        </p:txBody>
+      </p:sp>
+      <p:sp>
+        <p:nvSpPr>
+          <p:cNvPr id="4" name="Foliennummernplatzhalter 3"/>
+          <p:cNvSpPr>
+            <a:spLocks noGrp="1"/>
+          </p:cNvSpPr>
+          <p:nvPr>
+            <p:ph type="sldNum" sz="quarter" idx="4"/>
+          </p:nvPr>
+        </p:nvSpPr>
+        <p:spPr/>
+        <p:txBody>
+          <a:bodyPr/>
+          <a:lstStyle/>
+          <a:p>
+            <a:pPr>
+              <a:defRPr/>
+            </a:pPr>
+            <a:fld id="{70BFFA52-4234-45F6-B1A6-074E24FF43A2}" type="slidenum">
+              <a:rPr lang="de-DE" smtClean="0"/>
+              <a:pPr>
+                <a:defRPr/>
+              </a:pPr>
+              <a:t>7</a:t>
+            </a:fld>
+            <a:endParaRPr lang="de-DE" dirty="0"/>
+          </a:p>
+        </p:txBody>
+      </p:sp>
+      <p:sp>
+        <p:nvSpPr>
+          <p:cNvPr id="5" name="Fußzeilenplatzhalter 4"/>
+          <p:cNvSpPr>
+            <a:spLocks noGrp="1"/>
+          </p:cNvSpPr>
+          <p:nvPr>
+            <p:ph type="ftr" sz="quarter" idx="3"/>
+          </p:nvPr>
+        </p:nvSpPr>
+        <p:spPr/>
+        <p:txBody>
+          <a:bodyPr/>
+          <a:lstStyle/>
+          <a:p>
+            <a:r>
+              <a:rPr lang="de-DE" dirty="0" smtClean="0"/>
+              <a:t>Skalierungsverhalten eines </a:t>
+            </a:r>
+            <a:r>
+              <a:rPr lang="de-DE" dirty="0" err="1" smtClean="0"/>
+              <a:t>Raspberry</a:t>
+            </a:r>
+            <a:r>
+              <a:rPr lang="de-DE" dirty="0" smtClean="0"/>
+              <a:t> Pi-Clusters mit HPC-Benchmarks</a:t>
+            </a:r>
+            <a:endParaRPr lang="de-DE" dirty="0"/>
+          </a:p>
+        </p:txBody>
+      </p:sp>
+      <p:pic>
+        <p:nvPicPr>
+          <p:cNvPr id="6" name="Inhaltsplatzhalter 5" descr="DSC01572.JPG"/>
+          <p:cNvPicPr>
+            <a:picLocks noGrp="1" noChangeAspect="1"/>
+          </p:cNvPicPr>
+          <p:nvPr>
+            <p:ph idx="1"/>
+          </p:nvPr>
+        </p:nvPicPr>
+        <p:blipFill>
+          <a:blip r:embed="rId3" cstate="print">
+            <a:extLst>
+              <a:ext uri="{28A0092B-C50C-407E-A947-70E740481C1C}">
+                <a14:useLocalDpi xmlns:a14="http://schemas.microsoft.com/office/drawing/2010/main" val="0"/>
+              </a:ext>
+            </a:extLst>
+          </a:blip>
+          <a:srcRect l="-67878" r="-67878"/>
+          <a:stretch>
+            <a:fillRect/>
+          </a:stretch>
+        </p:blipFill>
+        <p:spPr/>
+      </p:pic>
+    </p:spTree>
+    <p:extLst>
+      <p:ext uri="{BB962C8B-B14F-4D97-AF65-F5344CB8AC3E}">
+        <p14:creationId xmlns:p14="http://schemas.microsoft.com/office/powerpoint/2010/main" val="2792876788"/>
+      </p:ext>
+    </p:extLst>
+  </p:cSld>
+  <p:clrMapOvr>
+    <a:masterClrMapping/>
+  </p:clrMapOvr>
+  <p:transition xmlns:p14="http://schemas.microsoft.com/office/powerpoint/2010/main" spd="med"/>
+</p:sld>
+</file>
+
+<file path=ppt/slides/slide8.xml><?xml version="1.0" encoding="utf-8"?>
+<p:sld xmlns:a="http://schemas.openxmlformats.org/drawingml/2006/main" xmlns:r="http://schemas.openxmlformats.org/officeDocument/2006/relationships" xmlns:p="http://schemas.openxmlformats.org/presentationml/2006/main">
+  <p:cSld>
+    <p:spTree>
+      <p:nvGrpSpPr>
+        <p:cNvPr id="1" name=""/>
+        <p:cNvGrpSpPr/>
+        <p:nvPr/>
+      </p:nvGrpSpPr>
+      <p:grpSpPr>
+        <a:xfrm>
+          <a:off x="0" y="0"/>
+          <a:ext cx="0" cy="0"/>
+          <a:chOff x="0" y="0"/>
+          <a:chExt cx="0" cy="0"/>
+        </a:xfrm>
+      </p:grpSpPr>
+      <p:sp>
+        <p:nvSpPr>
+          <p:cNvPr id="2" name="Titel 1"/>
+          <p:cNvSpPr>
+            <a:spLocks noGrp="1"/>
+          </p:cNvSpPr>
+          <p:nvPr>
+            <p:ph type="title"/>
+          </p:nvPr>
+        </p:nvSpPr>
+        <p:spPr/>
+        <p:txBody>
+          <a:bodyPr/>
+          <a:lstStyle/>
+          <a:p>
+            <a:r>
+              <a:rPr lang="de-DE" sz="1800" dirty="0" smtClean="0"/>
+              <a:t>Aufgabenstellung</a:t>
+            </a:r>
+            <a:endParaRPr lang="de-DE" sz="1800" dirty="0"/>
+          </a:p>
+        </p:txBody>
+      </p:sp>
+      <p:sp>
+        <p:nvSpPr>
+          <p:cNvPr id="3" name="Inhaltsplatzhalter 2"/>
+          <p:cNvSpPr>
+            <a:spLocks noGrp="1"/>
+          </p:cNvSpPr>
+          <p:nvPr>
+            <p:ph idx="1"/>
+          </p:nvPr>
+        </p:nvSpPr>
+        <p:spPr/>
+        <p:txBody>
+          <a:bodyPr/>
+          <a:lstStyle/>
+          <a:p>
+            <a:pPr marL="514350" indent="-514350">
+              <a:buFont typeface="+mj-lt"/>
+              <a:buAutoNum type="arabicPeriod" startAt="3"/>
+            </a:pPr>
+            <a:r>
+              <a:rPr lang="de-DE" dirty="0" smtClean="0"/>
+              <a:t>Aufgabenstellung</a:t>
+            </a:r>
+          </a:p>
+          <a:p>
+            <a:pPr marL="514350" indent="-514350"/>
+            <a:r>
+              <a:rPr lang="de-DE" dirty="0" smtClean="0"/>
+              <a:t>Vorgaben </a:t>
+            </a:r>
+          </a:p>
+          <a:p>
+            <a:pPr marL="914400" lvl="1" indent="-514350"/>
+            <a:r>
+              <a:rPr lang="de-DE" dirty="0" err="1" smtClean="0"/>
+              <a:t>Bramble</a:t>
+            </a:r>
+            <a:r>
+              <a:rPr lang="de-DE" dirty="0" smtClean="0"/>
+              <a:t>-Systemarchitektur (NFS, AUFS, IP/SSH)</a:t>
+            </a:r>
+          </a:p>
+          <a:p>
+            <a:pPr marL="914400" lvl="1" indent="-514350"/>
+            <a:r>
+              <a:rPr lang="de-DE" dirty="0" smtClean="0"/>
+              <a:t>Datenbank-Schema (MySQL)</a:t>
+            </a:r>
+          </a:p>
+          <a:p>
+            <a:pPr marL="914400" lvl="1" indent="-514350"/>
+            <a:r>
+              <a:rPr lang="de-DE" dirty="0" smtClean="0"/>
+              <a:t>Benchmark-Programme und Bibliotheken (HPL, STREAM, </a:t>
+            </a:r>
+            <a:r>
+              <a:rPr lang="de-DE" dirty="0" err="1" smtClean="0"/>
+              <a:t>Whetstone</a:t>
+            </a:r>
+            <a:r>
+              <a:rPr lang="de-DE" dirty="0" smtClean="0"/>
+              <a:t>, BLAS)</a:t>
+            </a:r>
+          </a:p>
+          <a:p>
+            <a:pPr marL="914400" lvl="1" indent="-514350"/>
+            <a:r>
+              <a:rPr lang="de-DE" dirty="0" smtClean="0"/>
+              <a:t>MPI (MPICH 3.0.4)</a:t>
+            </a:r>
+          </a:p>
+          <a:p>
+            <a:pPr marL="914400" lvl="1" indent="-514350"/>
+            <a:r>
+              <a:rPr lang="de-DE" dirty="0" smtClean="0"/>
+              <a:t>Strommessung: Messgerät, virtuelle Windows-Maschine</a:t>
+            </a:r>
+          </a:p>
+          <a:p>
+            <a:pPr marL="514350" indent="-514350"/>
+            <a:r>
+              <a:rPr lang="de-DE" dirty="0" smtClean="0"/>
+              <a:t>Zielsetzung</a:t>
+            </a:r>
+          </a:p>
+          <a:p>
+            <a:pPr marL="914400" lvl="1" indent="-514350"/>
+            <a:r>
+              <a:rPr lang="de-DE" dirty="0" smtClean="0"/>
+              <a:t>Parallele Ausführung von HPC-Benchmarks </a:t>
+            </a:r>
+          </a:p>
+          <a:p>
+            <a:pPr marL="914400" lvl="1" indent="-514350"/>
+            <a:r>
+              <a:rPr lang="de-DE" dirty="0" smtClean="0"/>
+              <a:t>Sinnvolle Umsetzung der Vorgaben</a:t>
+            </a:r>
+          </a:p>
+          <a:p>
+            <a:pPr marL="914400" lvl="1" indent="-514350"/>
+            <a:r>
+              <a:rPr lang="de-DE" dirty="0" smtClean="0"/>
+              <a:t>Einarbeitung und Fehlerbehebung in </a:t>
+            </a:r>
+            <a:r>
+              <a:rPr lang="de-DE" dirty="0" err="1" smtClean="0"/>
+              <a:t>Bramble</a:t>
+            </a:r>
+            <a:r>
+              <a:rPr lang="de-DE" dirty="0" smtClean="0"/>
+              <a:t>-Systemarchitektur</a:t>
+            </a:r>
+          </a:p>
+          <a:p>
+            <a:pPr marL="914400" lvl="1" indent="-514350"/>
+            <a:r>
+              <a:rPr lang="de-DE" dirty="0" smtClean="0"/>
+              <a:t>Messparameter: </a:t>
+            </a:r>
+            <a:r>
+              <a:rPr lang="de-DE" dirty="0" smtClean="0"/>
+              <a:t>Performance und Stromverbrauch </a:t>
+            </a:r>
+          </a:p>
+          <a:p>
+            <a:pPr marL="914400" lvl="1" indent="-514350"/>
+            <a:r>
+              <a:rPr lang="de-DE" dirty="0" smtClean="0"/>
+              <a:t>Fokus auf Skalierungsverhalten des </a:t>
+            </a:r>
+            <a:r>
+              <a:rPr lang="de-DE" dirty="0" err="1" smtClean="0"/>
+              <a:t>Bramble</a:t>
+            </a:r>
+            <a:endParaRPr lang="de-DE" dirty="0" smtClean="0"/>
+          </a:p>
+          <a:p>
+            <a:pPr marL="514350" indent="-514350"/>
+            <a:r>
+              <a:rPr lang="de-DE" dirty="0" smtClean="0"/>
+              <a:t>Fragestellung</a:t>
+            </a:r>
+          </a:p>
+          <a:p>
+            <a:pPr marL="400050" lvl="1" indent="0">
+              <a:buNone/>
+            </a:pPr>
+            <a:endParaRPr lang="de-DE" dirty="0" smtClean="0"/>
+          </a:p>
+        </p:txBody>
+      </p:sp>
+      <p:sp>
+        <p:nvSpPr>
+          <p:cNvPr id="4" name="Foliennummernplatzhalter 3"/>
+          <p:cNvSpPr>
+            <a:spLocks noGrp="1"/>
+          </p:cNvSpPr>
+          <p:nvPr>
+            <p:ph type="sldNum" sz="quarter" idx="4"/>
+          </p:nvPr>
+        </p:nvSpPr>
+        <p:spPr/>
+        <p:txBody>
+          <a:bodyPr/>
+          <a:lstStyle/>
+          <a:p>
+            <a:pPr>
+              <a:defRPr/>
+            </a:pPr>
+            <a:fld id="{70BFFA52-4234-45F6-B1A6-074E24FF43A2}" type="slidenum">
+              <a:rPr lang="de-DE" smtClean="0"/>
+              <a:pPr>
+                <a:defRPr/>
+              </a:pPr>
+              <a:t>8</a:t>
+            </a:fld>
+            <a:endParaRPr lang="de-DE" dirty="0"/>
+          </a:p>
+        </p:txBody>
+      </p:sp>
+      <p:sp>
+        <p:nvSpPr>
+          <p:cNvPr id="5" name="Fußzeilenplatzhalter 4"/>
+          <p:cNvSpPr>
+            <a:spLocks noGrp="1"/>
+          </p:cNvSpPr>
+          <p:nvPr>
+            <p:ph type="ftr" sz="quarter" idx="3"/>
+          </p:nvPr>
+        </p:nvSpPr>
+        <p:spPr/>
+        <p:txBody>
+          <a:bodyPr/>
+          <a:lstStyle/>
+          <a:p>
+            <a:r>
+              <a:rPr lang="de-DE" dirty="0" smtClean="0"/>
+              <a:t>Skalierungsverhalten eines </a:t>
+            </a:r>
+            <a:r>
+              <a:rPr lang="de-DE" dirty="0" err="1" smtClean="0"/>
+              <a:t>Raspberry</a:t>
+            </a:r>
+            <a:r>
+              <a:rPr lang="de-DE" dirty="0" smtClean="0"/>
+              <a:t> Pi-Clusters mit HPC-Benchmarks</a:t>
+            </a:r>
+            <a:endParaRPr lang="de-DE" dirty="0"/>
+          </a:p>
+        </p:txBody>
+      </p:sp>
+    </p:spTree>
+    <p:extLst>
+      <p:ext uri="{BB962C8B-B14F-4D97-AF65-F5344CB8AC3E}">
+        <p14:creationId xmlns:p14="http://schemas.microsoft.com/office/powerpoint/2010/main" val="4058443134"/>
+      </p:ext>
+    </p:extLst>
+  </p:cSld>
+  <p:clrMapOvr>
+    <a:masterClrMapping/>
+  </p:clrMapOvr>
+  <p:transition xmlns:p14="http://schemas.microsoft.com/office/powerpoint/2010/main" spd="med"/>
+</p:sld>
+</file>
+
+<file path=ppt/slides/slide9.xml><?xml version="1.0" encoding="utf-8"?>
+<p:sld xmlns:a="http://schemas.openxmlformats.org/drawingml/2006/main" xmlns:r="http://schemas.openxmlformats.org/officeDocument/2006/relationships" xmlns:p="http://schemas.openxmlformats.org/presentationml/2006/main">
+  <p:cSld>
+    <p:spTree>
+      <p:nvGrpSpPr>
+        <p:cNvPr id="1" name=""/>
+        <p:cNvGrpSpPr/>
+        <p:nvPr/>
+      </p:nvGrpSpPr>
+      <p:grpSpPr>
+        <a:xfrm>
+          <a:off x="0" y="0"/>
+          <a:ext cx="0" cy="0"/>
+          <a:chOff x="0" y="0"/>
+          <a:chExt cx="0" cy="0"/>
+        </a:xfrm>
+      </p:grpSpPr>
+      <p:sp>
+        <p:nvSpPr>
+          <p:cNvPr id="2" name="Titel 1"/>
+          <p:cNvSpPr>
+            <a:spLocks noGrp="1"/>
+          </p:cNvSpPr>
+          <p:nvPr>
+            <p:ph type="title"/>
+          </p:nvPr>
+        </p:nvSpPr>
+        <p:spPr/>
+        <p:txBody>
+          <a:bodyPr/>
+          <a:lstStyle/>
+          <a:p>
+            <a:r>
+              <a:rPr lang="de-DE" sz="1800" dirty="0" smtClean="0"/>
+              <a:t>Definitionen und Messparameter</a:t>
+            </a:r>
+            <a:endParaRPr lang="de-DE" sz="1800" dirty="0"/>
+          </a:p>
+        </p:txBody>
+      </p:sp>
+      <p:sp>
+        <p:nvSpPr>
+          <p:cNvPr id="3" name="Inhaltsplatzhalter 2"/>
+          <p:cNvSpPr>
+            <a:spLocks noGrp="1"/>
+          </p:cNvSpPr>
+          <p:nvPr>
+            <p:ph idx="1"/>
+          </p:nvPr>
+        </p:nvSpPr>
+        <p:spPr/>
+        <p:txBody>
+          <a:bodyPr/>
+          <a:lstStyle/>
+          <a:p>
+            <a:pPr marL="514350" indent="-514350">
+              <a:buFont typeface="+mj-lt"/>
+              <a:buAutoNum type="arabicPeriod"/>
+            </a:pPr>
+            <a:r>
+              <a:rPr lang="de-DE" dirty="0" smtClean="0"/>
+              <a:t>Definitionen und Messparameter</a:t>
+            </a:r>
+          </a:p>
+          <a:p>
+            <a:r>
+              <a:rPr lang="de-DE" dirty="0" smtClean="0"/>
+              <a:t>Was wird gemessen? </a:t>
+            </a:r>
+          </a:p>
+          <a:p>
+            <a:pPr marL="800100" lvl="1" indent="-342900">
+              <a:buFont typeface="+mj-lt"/>
+              <a:buAutoNum type="arabicPeriod"/>
+            </a:pPr>
+            <a:r>
+              <a:rPr lang="de-DE" b="1" dirty="0" smtClean="0"/>
+              <a:t>Benchmarking:</a:t>
+            </a:r>
+            <a:r>
+              <a:rPr lang="de-DE" dirty="0" smtClean="0"/>
+              <a:t> </a:t>
+            </a:r>
+            <a:r>
+              <a:rPr lang="de-DE" i="1" dirty="0" smtClean="0"/>
+              <a:t>Standardisieren von Arbeit </a:t>
+            </a:r>
+            <a:r>
+              <a:rPr lang="de-DE" dirty="0" smtClean="0"/>
+              <a:t>	</a:t>
+            </a:r>
+          </a:p>
+          <a:p>
+            <a:pPr marL="800100" lvl="1" indent="-342900">
+              <a:buFont typeface="+mj-lt"/>
+              <a:buAutoNum type="arabicPeriod"/>
+            </a:pPr>
+            <a:r>
+              <a:rPr lang="de-DE" b="1" dirty="0" smtClean="0"/>
+              <a:t>Performance</a:t>
+            </a:r>
+            <a:r>
+              <a:rPr lang="de-DE" dirty="0" smtClean="0"/>
+              <a:t>: </a:t>
+            </a:r>
+            <a:r>
+              <a:rPr lang="de-DE" i="1" dirty="0" smtClean="0"/>
+              <a:t>Rechenleistung eines Systems an Hand von  Ausführungsrate + Ausführungsdauer</a:t>
+            </a:r>
+            <a:endParaRPr lang="de-DE" b="1" i="1" dirty="0" smtClean="0"/>
+          </a:p>
+          <a:p>
+            <a:pPr marL="800100" lvl="1" indent="-342900">
+              <a:buFont typeface="+mj-lt"/>
+              <a:buAutoNum type="arabicPeriod"/>
+            </a:pPr>
+            <a:r>
+              <a:rPr lang="de-DE" b="1" dirty="0" smtClean="0"/>
+              <a:t>Stromverbrauch:</a:t>
+            </a:r>
+            <a:r>
+              <a:rPr lang="de-DE" dirty="0" smtClean="0"/>
+              <a:t> </a:t>
+            </a:r>
+            <a:r>
+              <a:rPr lang="de-DE" i="1" dirty="0" smtClean="0"/>
+              <a:t>Menge der genutzten elektrischen Energie</a:t>
+            </a:r>
+          </a:p>
+          <a:p>
+            <a:r>
+              <a:rPr lang="de-DE" dirty="0" smtClean="0"/>
+              <a:t>Wie wird gemessen? </a:t>
+            </a:r>
+            <a:endParaRPr lang="de-DE" b="1" dirty="0" smtClean="0"/>
+          </a:p>
+          <a:p>
+            <a:pPr marL="800100" lvl="1" indent="-342900">
+              <a:buFont typeface="+mj-lt"/>
+              <a:buAutoNum type="arabicPeriod"/>
+            </a:pPr>
+            <a:r>
+              <a:rPr lang="de-DE" b="1" dirty="0" smtClean="0"/>
+              <a:t>CPU-Performance:</a:t>
+            </a:r>
+            <a:r>
+              <a:rPr lang="de-DE" dirty="0" smtClean="0"/>
+              <a:t> HPL (Ausführungsrate in GFLOPs, Ausführungsdauer in s)</a:t>
+            </a:r>
+          </a:p>
+          <a:p>
+            <a:pPr marL="800100" lvl="1" indent="-342900">
+              <a:buFont typeface="+mj-lt"/>
+              <a:buAutoNum type="arabicPeriod"/>
+            </a:pPr>
+            <a:r>
+              <a:rPr lang="de-DE" b="1" dirty="0" smtClean="0"/>
+              <a:t>Durchsatz Hauptspeicherzugriffe:</a:t>
+            </a:r>
+            <a:r>
+              <a:rPr lang="de-DE" dirty="0" smtClean="0"/>
+              <a:t> STREAM (Ausführungsrate in MB/s, Ausführungsdauer in s)</a:t>
+            </a:r>
+          </a:p>
+          <a:p>
+            <a:pPr marL="800100" lvl="1" indent="-342900">
+              <a:buFont typeface="+mj-lt"/>
+              <a:buAutoNum type="arabicPeriod"/>
+            </a:pPr>
+            <a:r>
+              <a:rPr lang="de-DE" b="1" dirty="0" smtClean="0"/>
+              <a:t>Stromverbrauch:</a:t>
+            </a:r>
+            <a:r>
+              <a:rPr lang="de-DE" dirty="0" smtClean="0"/>
+              <a:t> Strommessgerät</a:t>
+            </a:r>
+          </a:p>
+          <a:p>
+            <a:pPr marL="400050" lvl="1" indent="0">
+              <a:buNone/>
+            </a:pPr>
+            <a:endParaRPr lang="de-DE" dirty="0" smtClean="0"/>
+          </a:p>
+        </p:txBody>
+      </p:sp>
+      <p:sp>
+        <p:nvSpPr>
+          <p:cNvPr id="4" name="Foliennummernplatzhalter 3"/>
+          <p:cNvSpPr>
+            <a:spLocks noGrp="1"/>
+          </p:cNvSpPr>
+          <p:nvPr>
+            <p:ph type="sldNum" sz="quarter" idx="4"/>
+          </p:nvPr>
+        </p:nvSpPr>
+        <p:spPr/>
+        <p:txBody>
+          <a:bodyPr/>
+          <a:lstStyle/>
+          <a:p>
+            <a:pPr>
+              <a:defRPr/>
+            </a:pPr>
+            <a:fld id="{70BFFA52-4234-45F6-B1A6-074E24FF43A2}" type="slidenum">
+              <a:rPr lang="de-DE" smtClean="0"/>
+              <a:pPr>
+                <a:defRPr/>
+              </a:pPr>
+              <a:t>9</a:t>
+            </a:fld>
+            <a:endParaRPr lang="de-DE" dirty="0"/>
+          </a:p>
+        </p:txBody>
+      </p:sp>
+      <p:sp>
+        <p:nvSpPr>
+          <p:cNvPr id="5" name="Fußzeilenplatzhalter 4"/>
+          <p:cNvSpPr>
+            <a:spLocks noGrp="1"/>
+          </p:cNvSpPr>
+          <p:nvPr>
+            <p:ph type="ftr" sz="quarter" idx="3"/>
+          </p:nvPr>
+        </p:nvSpPr>
+        <p:spPr/>
+        <p:txBody>
+          <a:bodyPr/>
+          <a:lstStyle/>
+          <a:p>
+            <a:r>
+              <a:rPr lang="de-DE" dirty="0" smtClean="0"/>
+              <a:t>Skalierungsverhalten eines </a:t>
+            </a:r>
+            <a:r>
+              <a:rPr lang="de-DE" dirty="0" err="1" smtClean="0"/>
+              <a:t>Raspberry</a:t>
+            </a:r>
+            <a:r>
+              <a:rPr lang="de-DE" dirty="0" smtClean="0"/>
+              <a:t> Pi-Clusters mit HPC-Benchmarks</a:t>
+            </a:r>
+            <a:endParaRPr lang="de-DE" dirty="0"/>
+          </a:p>
+        </p:txBody>
+      </p:sp>
+    </p:spTree>
+    <p:extLst>
+      <p:ext uri="{BB962C8B-B14F-4D97-AF65-F5344CB8AC3E}">
+        <p14:creationId xmlns:p14="http://schemas.microsoft.com/office/powerpoint/2010/main" val="2189604745"/>
       </p:ext>
     </p:extLst>
   </p:cSld>

</xml_diff>

<commit_message>
Update power point presentation (description of benchmarks, presentation notes)
</commit_message>
<xml_diff>
--- a/Disputation/grei14.pptx
+++ b/Disputation/grei14.pptx
@@ -309,7 +309,7 @@
           <a:p>
             <a:fld id="{4C476B9A-09E8-F547-B409-8F77FB8D3140}" type="datetime1">
               <a:rPr lang="de-DE" smtClean="0"/>
-              <a:t>21.06.14</a:t>
+              <a:t>22.06.14</a:t>
             </a:fld>
             <a:endParaRPr lang="de-DE"/>
           </a:p>
@@ -3101,38 +3101,58 @@
               <a:rPr lang="de-DE" b="1" dirty="0" smtClean="0"/>
               <a:t>HPL </a:t>
             </a:r>
+            <a:endParaRPr lang="de-DE" b="1" dirty="0" smtClean="0"/>
           </a:p>
           <a:p>
             <a:pPr marL="685800" lvl="1"/>
             <a:r>
-              <a:rPr lang="de-DE" dirty="0" smtClean="0"/>
-              <a:t>Frei verfügbare Implementierung von </a:t>
+              <a:rPr lang="de-DE" b="1" dirty="0" smtClean="0"/>
+              <a:t>Was wird gemessen? CPU-Performance</a:t>
+            </a:r>
+          </a:p>
+          <a:p>
+            <a:pPr marL="685800" lvl="1"/>
+            <a:r>
+              <a:rPr lang="de-DE" b="1" dirty="0" smtClean="0"/>
+              <a:t>Prinzip</a:t>
+            </a:r>
+            <a:r>
+              <a:rPr lang="de-DE" b="1" dirty="0"/>
+              <a:t>:</a:t>
+            </a:r>
+            <a:r>
+              <a:rPr lang="de-DE" dirty="0"/>
+              <a:t> Fließpunktoperationen auf dicht besetzter Matrix (Matrixmultiplikation)</a:t>
+            </a:r>
+          </a:p>
+          <a:p>
+            <a:pPr marL="685800" lvl="1"/>
+            <a:r>
+              <a:rPr lang="de-DE" dirty="0" smtClean="0"/>
+              <a:t>Frei </a:t>
+            </a:r>
+            <a:r>
+              <a:rPr lang="de-DE" dirty="0" smtClean="0"/>
+              <a:t>verfügbare Implementierung von </a:t>
             </a:r>
             <a:r>
               <a:rPr lang="de-DE" dirty="0" err="1" smtClean="0"/>
               <a:t>HPLinpack</a:t>
             </a:r>
             <a:r>
-              <a:rPr lang="de-DE" smtClean="0"/>
-              <a:t> (Ermittlung der Top500</a:t>
-            </a:r>
-            <a:r>
-              <a:rPr lang="de-DE" dirty="0" smtClean="0"/>
-              <a:t>-Rangliste)</a:t>
+              <a:rPr lang="de-DE" dirty="0" smtClean="0"/>
+              <a:t> (Ermittlung der Top500-Rangliste)</a:t>
             </a:r>
           </a:p>
           <a:p>
             <a:pPr marL="685800" lvl="1"/>
             <a:r>
               <a:rPr lang="de-DE" dirty="0" smtClean="0"/>
-              <a:t>Prinzip: Fließpunktoperationen auf dicht besetzter Matrix (Matrixmultiplikation)</a:t>
-            </a:r>
-          </a:p>
-          <a:p>
-            <a:pPr marL="685800" lvl="1"/>
-            <a:r>
-              <a:rPr lang="de-DE" dirty="0" smtClean="0"/>
-              <a:t>Anpassung an </a:t>
+              <a:t>Anpassung </a:t>
+            </a:r>
+            <a:r>
+              <a:rPr lang="de-DE" dirty="0" smtClean="0"/>
+              <a:t>an </a:t>
             </a:r>
             <a:r>
               <a:rPr lang="de-DE" dirty="0" err="1" smtClean="0"/>
@@ -3150,17 +3170,64 @@
               <a:rPr lang="de-DE" dirty="0" smtClean="0"/>
               <a:t>)</a:t>
             </a:r>
-          </a:p>
-          <a:p>
-            <a:pPr marL="857250" lvl="1" indent="-457200">
+            <a:r>
+              <a:rPr lang="de-DE" dirty="0" smtClean="0"/>
+              <a:t> </a:t>
+            </a:r>
+            <a:endParaRPr lang="de-DE" dirty="0" smtClean="0"/>
+          </a:p>
+          <a:p>
+            <a:pPr lvl="1" indent="-342900">
               <a:buFont typeface="+mj-lt"/>
-              <a:buAutoNum type="arabicPeriod"/>
+              <a:buAutoNum type="arabicPeriod" startAt="2"/>
             </a:pPr>
             <a:r>
               <a:rPr lang="de-DE" b="1" dirty="0" smtClean="0"/>
               <a:t>STREAM</a:t>
             </a:r>
-            <a:endParaRPr lang="de-DE" b="1" dirty="0" smtClean="0"/>
+            <a:endParaRPr lang="de-DE" dirty="0" smtClean="0"/>
+          </a:p>
+          <a:p>
+            <a:pPr marL="685800" lvl="1"/>
+            <a:r>
+              <a:rPr lang="de-DE" b="1" dirty="0" smtClean="0"/>
+              <a:t>Was </a:t>
+            </a:r>
+            <a:r>
+              <a:rPr lang="de-DE" b="1" dirty="0"/>
+              <a:t>wird gemessen? </a:t>
+            </a:r>
+            <a:r>
+              <a:rPr lang="de-DE" b="1" dirty="0" smtClean="0"/>
+              <a:t>Durchsatz Hauptspeicherzugriffe</a:t>
+            </a:r>
+            <a:endParaRPr lang="de-DE" dirty="0" smtClean="0"/>
+          </a:p>
+          <a:p>
+            <a:pPr marL="685800" lvl="1"/>
+            <a:r>
+              <a:rPr lang="de-DE" b="1" dirty="0" smtClean="0"/>
+              <a:t>Prinzip</a:t>
+            </a:r>
+            <a:r>
+              <a:rPr lang="de-DE" b="1" dirty="0"/>
+              <a:t>: </a:t>
+            </a:r>
+            <a:r>
+              <a:rPr lang="de-DE" dirty="0"/>
+              <a:t>Fließpunktoperationen auf langen </a:t>
+            </a:r>
+            <a:r>
+              <a:rPr lang="de-DE" dirty="0" smtClean="0"/>
+              <a:t>Vektoren, die aus HS geladen werden </a:t>
+            </a:r>
+          </a:p>
+          <a:p>
+            <a:pPr marL="685800" lvl="1"/>
+            <a:r>
+              <a:rPr lang="de-DE" dirty="0" smtClean="0"/>
+              <a:t>Bestandteil der HPC-Challenge-Suite</a:t>
+            </a:r>
           </a:p>
         </p:txBody>
       </p:sp>
@@ -3321,54 +3388,18 @@
           <a:p>
             <a:pPr marL="514350" indent="-514350">
               <a:buFont typeface="+mj-lt"/>
-              <a:buAutoNum type="arabicPeriod" startAt="2"/>
+              <a:buAutoNum type="arabicPeriod" startAt="3"/>
             </a:pPr>
             <a:r>
-              <a:rPr lang="de-DE" dirty="0"/>
-              <a:t>Versuchsaufbau </a:t>
-            </a:r>
-            <a:endParaRPr lang="de-DE" dirty="0" smtClean="0"/>
+              <a:rPr lang="de-DE" dirty="0" smtClean="0"/>
+              <a:t>Umsetzung</a:t>
+            </a:r>
           </a:p>
           <a:p>
             <a:pPr marL="914400" lvl="1" indent="-514350">
               <a:buFont typeface="+mj-lt"/>
-              <a:buAutoNum type="arabicPeriod"/>
+              <a:buAutoNum type="arabicPeriod" startAt="3"/>
             </a:pPr>
-            <a:r>
-              <a:rPr lang="de-DE" dirty="0" smtClean="0"/>
-              <a:t>Vorarbeiten </a:t>
-            </a:r>
-          </a:p>
-          <a:p>
-            <a:pPr marL="914400" lvl="1" indent="-514350">
-              <a:buFont typeface="+mj-lt"/>
-              <a:buAutoNum type="arabicPeriod"/>
-            </a:pPr>
-            <a:r>
-              <a:rPr lang="de-DE" dirty="0" smtClean="0"/>
-              <a:t>Schritte </a:t>
-            </a:r>
-            <a:endParaRPr lang="de-DE" dirty="0"/>
-          </a:p>
-          <a:p>
-            <a:pPr marL="514350" indent="-514350">
-              <a:buFont typeface="+mj-lt"/>
-              <a:buAutoNum type="arabicPeriod" startAt="2"/>
-            </a:pPr>
-            <a:r>
-              <a:rPr lang="de-DE" dirty="0" smtClean="0"/>
-              <a:t>Versuchsdurchführung</a:t>
-            </a:r>
-          </a:p>
-          <a:p>
-            <a:pPr marL="914400" lvl="1" indent="-514350">
-              <a:buFont typeface="+mj-lt"/>
-              <a:buAutoNum type="arabicPeriod"/>
-            </a:pPr>
-            <a:r>
-              <a:rPr lang="de-DE" dirty="0" smtClean="0"/>
-              <a:t>Umsetzung</a:t>
-            </a:r>
             <a:endParaRPr lang="de-DE" dirty="0"/>
           </a:p>
         </p:txBody>
@@ -3585,9 +3616,8 @@
             </a:pPr>
             <a:r>
               <a:rPr lang="de-DE" dirty="0" smtClean="0"/>
-              <a:t>Versuchsaufbau </a:t>
-            </a:r>
-            <a:endParaRPr lang="de-DE" dirty="0" smtClean="0"/>
+              <a:t>Beschreibung der Benchmarks</a:t>
+            </a:r>
           </a:p>
           <a:p>
             <a:pPr marL="914400" lvl="1" indent="-514350">
@@ -3596,8 +3626,9 @@
             </a:pPr>
             <a:r>
               <a:rPr lang="de-DE" dirty="0" smtClean="0"/>
-              <a:t>Versuchsdurchführung </a:t>
-            </a:r>
+              <a:t>Umsetzung</a:t>
+            </a:r>
+            <a:endParaRPr lang="de-DE" dirty="0" smtClean="0"/>
           </a:p>
           <a:p>
             <a:pPr marL="514350" indent="-514350">
@@ -3795,11 +3826,7 @@
             </a:r>
             <a:r>
               <a:rPr lang="de-DE" dirty="0" smtClean="0"/>
-              <a:t> </a:t>
-            </a:r>
-            <a:r>
-              <a:rPr lang="de-DE" dirty="0" smtClean="0"/>
-              <a:t>Pi</a:t>
+              <a:t> Pi</a:t>
             </a:r>
           </a:p>
           <a:p>
@@ -3807,7 +3834,6 @@
               <a:rPr lang="de-DE" dirty="0" smtClean="0"/>
               <a:t>Allgemeines</a:t>
             </a:r>
-            <a:endParaRPr lang="de-DE" dirty="0" smtClean="0"/>
           </a:p>
           <a:p>
             <a:pPr lvl="1"/>
@@ -3840,11 +3866,7 @@
             <a:pPr lvl="1"/>
             <a:r>
               <a:rPr lang="de-DE" dirty="0" smtClean="0"/>
-              <a:t>Aktuell: Modell B, im Juni 2014 über 3 Mio. Mal </a:t>
-            </a:r>
-            <a:r>
-              <a:rPr lang="de-DE" dirty="0" smtClean="0"/>
-              <a:t>verkauft</a:t>
+              <a:t>Aktuell: Modell B, im Juni 2014 über 3 Mio. Mal verkauft</a:t>
             </a:r>
           </a:p>
           <a:p>
@@ -3860,7 +3882,6 @@
               <a:rPr lang="de-DE" dirty="0" smtClean="0"/>
               <a:t>Spezifikation</a:t>
             </a:r>
-            <a:endParaRPr lang="de-DE" dirty="0" smtClean="0"/>
           </a:p>
           <a:p>
             <a:pPr lvl="1"/>
@@ -4437,19 +4458,24 @@
             <a:pPr lvl="1"/>
             <a:r>
               <a:rPr lang="de-DE" dirty="0" smtClean="0"/>
-              <a:t>Verbindung über Ethernet-Kabel und </a:t>
-            </a:r>
-            <a:r>
-              <a:rPr lang="de-DE" dirty="0" smtClean="0"/>
-              <a:t>24 Port Gigabit-Switch (2, 3)</a:t>
+              <a:t>Verbindung über Ethernet-Kabel und 24 Port Gigabit-Switch (2, 3)</a:t>
             </a:r>
           </a:p>
           <a:p>
             <a:pPr lvl="1"/>
             <a:r>
               <a:rPr lang="de-DE" dirty="0" smtClean="0"/>
-              <a:t>Server: Mini-ITX-Mainboard (4), Festplatten mit RAID Level 5-System (5)</a:t>
-            </a:r>
+              <a:t>Server (x86-Architektur): Mini</a:t>
+            </a:r>
+            <a:r>
+              <a:rPr lang="de-DE" dirty="0" smtClean="0"/>
+              <a:t>-ITX-Mainboard (4), </a:t>
+            </a:r>
+            <a:r>
+              <a:rPr lang="de-DE" dirty="0" smtClean="0"/>
+              <a:t>Festplatten (5)</a:t>
+            </a:r>
+            <a:endParaRPr lang="de-DE" dirty="0" smtClean="0"/>
           </a:p>
           <a:p>
             <a:pPr lvl="1"/>
@@ -5004,11 +5030,7 @@
             <a:pPr marL="914400" lvl="1" indent="-514350"/>
             <a:r>
               <a:rPr lang="de-DE" dirty="0" smtClean="0"/>
-              <a:t>Messparameter: </a:t>
-            </a:r>
-            <a:r>
-              <a:rPr lang="de-DE" dirty="0" smtClean="0"/>
-              <a:t>Performance und Stromverbrauch </a:t>
+              <a:t>Messparameter: Performance und Stromverbrauch </a:t>
             </a:r>
           </a:p>
           <a:p>

</xml_diff>

<commit_message>
Update ppt presentation (results, explanations, graphics)
</commit_message>
<xml_diff>
--- a/Disputation/grei14.pptx
+++ b/Disputation/grei14.pptx
@@ -5,10 +5,10 @@
     <p:sldMasterId id="2147483652" r:id="rId1"/>
   </p:sldMasterIdLst>
   <p:notesMasterIdLst>
-    <p:notesMasterId r:id="rId13"/>
+    <p:notesMasterId r:id="rId27"/>
   </p:notesMasterIdLst>
   <p:handoutMasterIdLst>
-    <p:handoutMasterId r:id="rId14"/>
+    <p:handoutMasterId r:id="rId28"/>
   </p:handoutMasterIdLst>
   <p:sldIdLst>
     <p:sldId id="836" r:id="rId2"/>
@@ -22,6 +22,20 @@
     <p:sldId id="844" r:id="rId10"/>
     <p:sldId id="846" r:id="rId11"/>
     <p:sldId id="845" r:id="rId12"/>
+    <p:sldId id="850" r:id="rId13"/>
+    <p:sldId id="848" r:id="rId14"/>
+    <p:sldId id="849" r:id="rId15"/>
+    <p:sldId id="851" r:id="rId16"/>
+    <p:sldId id="853" r:id="rId17"/>
+    <p:sldId id="854" r:id="rId18"/>
+    <p:sldId id="852" r:id="rId19"/>
+    <p:sldId id="855" r:id="rId20"/>
+    <p:sldId id="856" r:id="rId21"/>
+    <p:sldId id="860" r:id="rId22"/>
+    <p:sldId id="857" r:id="rId23"/>
+    <p:sldId id="858" r:id="rId24"/>
+    <p:sldId id="859" r:id="rId25"/>
+    <p:sldId id="861" r:id="rId26"/>
   </p:sldIdLst>
   <p:sldSz cx="9144000" cy="6858000" type="screen4x3"/>
   <p:notesSz cx="6781800" cy="9855200"/>
@@ -820,6 +834,771 @@
 </p:notes>
 </file>
 
+<file path=ppt/notesSlides/notesSlide11.xml><?xml version="1.0" encoding="utf-8"?>
+<p:notes xmlns:a="http://schemas.openxmlformats.org/drawingml/2006/main" xmlns:r="http://schemas.openxmlformats.org/officeDocument/2006/relationships" xmlns:p="http://schemas.openxmlformats.org/presentationml/2006/main">
+  <p:cSld>
+    <p:spTree>
+      <p:nvGrpSpPr>
+        <p:cNvPr id="1" name=""/>
+        <p:cNvGrpSpPr/>
+        <p:nvPr/>
+      </p:nvGrpSpPr>
+      <p:grpSpPr>
+        <a:xfrm>
+          <a:off x="0" y="0"/>
+          <a:ext cx="0" cy="0"/>
+          <a:chOff x="0" y="0"/>
+          <a:chExt cx="0" cy="0"/>
+        </a:xfrm>
+      </p:grpSpPr>
+      <p:sp>
+        <p:nvSpPr>
+          <p:cNvPr id="2" name="Folienbildplatzhalter 1"/>
+          <p:cNvSpPr>
+            <a:spLocks noGrp="1" noRot="1" noChangeAspect="1"/>
+          </p:cNvSpPr>
+          <p:nvPr>
+            <p:ph type="sldImg"/>
+          </p:nvPr>
+        </p:nvSpPr>
+        <p:spPr/>
+      </p:sp>
+      <p:sp>
+        <p:nvSpPr>
+          <p:cNvPr id="3" name="Notizenplatzhalter 2"/>
+          <p:cNvSpPr>
+            <a:spLocks noGrp="1"/>
+          </p:cNvSpPr>
+          <p:nvPr>
+            <p:ph type="body" idx="1"/>
+          </p:nvPr>
+        </p:nvSpPr>
+        <p:spPr/>
+        <p:txBody>
+          <a:bodyPr/>
+          <a:lstStyle/>
+          <a:p>
+            <a:endParaRPr lang="de-DE"/>
+          </a:p>
+        </p:txBody>
+      </p:sp>
+      <p:sp>
+        <p:nvSpPr>
+          <p:cNvPr id="4" name="Foliennummernplatzhalter 3"/>
+          <p:cNvSpPr>
+            <a:spLocks noGrp="1"/>
+          </p:cNvSpPr>
+          <p:nvPr>
+            <p:ph type="sldNum" sz="quarter" idx="10"/>
+          </p:nvPr>
+        </p:nvSpPr>
+        <p:spPr/>
+        <p:txBody>
+          <a:bodyPr/>
+          <a:lstStyle/>
+          <a:p>
+            <a:fld id="{87E9C61A-9B5E-4580-98DD-1AC874081FFB}" type="slidenum">
+              <a:rPr lang="de-DE" smtClean="0"/>
+              <a:pPr/>
+              <a:t>12</a:t>
+            </a:fld>
+            <a:endParaRPr lang="de-DE"/>
+          </a:p>
+        </p:txBody>
+      </p:sp>
+    </p:spTree>
+    <p:extLst>
+      <p:ext uri="{BB962C8B-B14F-4D97-AF65-F5344CB8AC3E}">
+        <p14:creationId xmlns:p14="http://schemas.microsoft.com/office/powerpoint/2010/main" val="1952917371"/>
+      </p:ext>
+    </p:extLst>
+  </p:cSld>
+  <p:clrMapOvr>
+    <a:masterClrMapping/>
+  </p:clrMapOvr>
+</p:notes>
+</file>
+
+<file path=ppt/notesSlides/notesSlide12.xml><?xml version="1.0" encoding="utf-8"?>
+<p:notes xmlns:a="http://schemas.openxmlformats.org/drawingml/2006/main" xmlns:r="http://schemas.openxmlformats.org/officeDocument/2006/relationships" xmlns:p="http://schemas.openxmlformats.org/presentationml/2006/main">
+  <p:cSld>
+    <p:spTree>
+      <p:nvGrpSpPr>
+        <p:cNvPr id="1" name=""/>
+        <p:cNvGrpSpPr/>
+        <p:nvPr/>
+      </p:nvGrpSpPr>
+      <p:grpSpPr>
+        <a:xfrm>
+          <a:off x="0" y="0"/>
+          <a:ext cx="0" cy="0"/>
+          <a:chOff x="0" y="0"/>
+          <a:chExt cx="0" cy="0"/>
+        </a:xfrm>
+      </p:grpSpPr>
+      <p:sp>
+        <p:nvSpPr>
+          <p:cNvPr id="2" name="Folienbildplatzhalter 1"/>
+          <p:cNvSpPr>
+            <a:spLocks noGrp="1" noRot="1" noChangeAspect="1"/>
+          </p:cNvSpPr>
+          <p:nvPr>
+            <p:ph type="sldImg"/>
+          </p:nvPr>
+        </p:nvSpPr>
+        <p:spPr/>
+      </p:sp>
+      <p:sp>
+        <p:nvSpPr>
+          <p:cNvPr id="3" name="Notizenplatzhalter 2"/>
+          <p:cNvSpPr>
+            <a:spLocks noGrp="1"/>
+          </p:cNvSpPr>
+          <p:nvPr>
+            <p:ph type="body" idx="1"/>
+          </p:nvPr>
+        </p:nvSpPr>
+        <p:spPr/>
+        <p:txBody>
+          <a:bodyPr/>
+          <a:lstStyle/>
+          <a:p>
+            <a:endParaRPr lang="de-DE" dirty="0"/>
+          </a:p>
+        </p:txBody>
+      </p:sp>
+      <p:sp>
+        <p:nvSpPr>
+          <p:cNvPr id="4" name="Foliennummernplatzhalter 3"/>
+          <p:cNvSpPr>
+            <a:spLocks noGrp="1"/>
+          </p:cNvSpPr>
+          <p:nvPr>
+            <p:ph type="sldNum" sz="quarter" idx="10"/>
+          </p:nvPr>
+        </p:nvSpPr>
+        <p:spPr/>
+        <p:txBody>
+          <a:bodyPr/>
+          <a:lstStyle/>
+          <a:p>
+            <a:fld id="{87E9C61A-9B5E-4580-98DD-1AC874081FFB}" type="slidenum">
+              <a:rPr lang="de-DE" smtClean="0"/>
+              <a:pPr/>
+              <a:t>13</a:t>
+            </a:fld>
+            <a:endParaRPr lang="de-DE"/>
+          </a:p>
+        </p:txBody>
+      </p:sp>
+    </p:spTree>
+    <p:extLst>
+      <p:ext uri="{BB962C8B-B14F-4D97-AF65-F5344CB8AC3E}">
+        <p14:creationId xmlns:p14="http://schemas.microsoft.com/office/powerpoint/2010/main" val="1952917371"/>
+      </p:ext>
+    </p:extLst>
+  </p:cSld>
+  <p:clrMapOvr>
+    <a:masterClrMapping/>
+  </p:clrMapOvr>
+</p:notes>
+</file>
+
+<file path=ppt/notesSlides/notesSlide13.xml><?xml version="1.0" encoding="utf-8"?>
+<p:notes xmlns:a="http://schemas.openxmlformats.org/drawingml/2006/main" xmlns:r="http://schemas.openxmlformats.org/officeDocument/2006/relationships" xmlns:p="http://schemas.openxmlformats.org/presentationml/2006/main">
+  <p:cSld>
+    <p:spTree>
+      <p:nvGrpSpPr>
+        <p:cNvPr id="1" name=""/>
+        <p:cNvGrpSpPr/>
+        <p:nvPr/>
+      </p:nvGrpSpPr>
+      <p:grpSpPr>
+        <a:xfrm>
+          <a:off x="0" y="0"/>
+          <a:ext cx="0" cy="0"/>
+          <a:chOff x="0" y="0"/>
+          <a:chExt cx="0" cy="0"/>
+        </a:xfrm>
+      </p:grpSpPr>
+      <p:sp>
+        <p:nvSpPr>
+          <p:cNvPr id="2" name="Folienbildplatzhalter 1"/>
+          <p:cNvSpPr>
+            <a:spLocks noGrp="1" noRot="1" noChangeAspect="1"/>
+          </p:cNvSpPr>
+          <p:nvPr>
+            <p:ph type="sldImg"/>
+          </p:nvPr>
+        </p:nvSpPr>
+        <p:spPr/>
+      </p:sp>
+      <p:sp>
+        <p:nvSpPr>
+          <p:cNvPr id="3" name="Notizenplatzhalter 2"/>
+          <p:cNvSpPr>
+            <a:spLocks noGrp="1"/>
+          </p:cNvSpPr>
+          <p:nvPr>
+            <p:ph type="body" idx="1"/>
+          </p:nvPr>
+        </p:nvSpPr>
+        <p:spPr/>
+        <p:txBody>
+          <a:bodyPr/>
+          <a:lstStyle/>
+          <a:p>
+            <a:endParaRPr lang="de-DE"/>
+          </a:p>
+        </p:txBody>
+      </p:sp>
+      <p:sp>
+        <p:nvSpPr>
+          <p:cNvPr id="4" name="Foliennummernplatzhalter 3"/>
+          <p:cNvSpPr>
+            <a:spLocks noGrp="1"/>
+          </p:cNvSpPr>
+          <p:nvPr>
+            <p:ph type="sldNum" sz="quarter" idx="10"/>
+          </p:nvPr>
+        </p:nvSpPr>
+        <p:spPr/>
+        <p:txBody>
+          <a:bodyPr/>
+          <a:lstStyle/>
+          <a:p>
+            <a:fld id="{87E9C61A-9B5E-4580-98DD-1AC874081FFB}" type="slidenum">
+              <a:rPr lang="de-DE" smtClean="0"/>
+              <a:pPr/>
+              <a:t>14</a:t>
+            </a:fld>
+            <a:endParaRPr lang="de-DE"/>
+          </a:p>
+        </p:txBody>
+      </p:sp>
+    </p:spTree>
+    <p:extLst>
+      <p:ext uri="{BB962C8B-B14F-4D97-AF65-F5344CB8AC3E}">
+        <p14:creationId xmlns:p14="http://schemas.microsoft.com/office/powerpoint/2010/main" val="1952917371"/>
+      </p:ext>
+    </p:extLst>
+  </p:cSld>
+  <p:clrMapOvr>
+    <a:masterClrMapping/>
+  </p:clrMapOvr>
+</p:notes>
+</file>
+
+<file path=ppt/notesSlides/notesSlide14.xml><?xml version="1.0" encoding="utf-8"?>
+<p:notes xmlns:a="http://schemas.openxmlformats.org/drawingml/2006/main" xmlns:r="http://schemas.openxmlformats.org/officeDocument/2006/relationships" xmlns:p="http://schemas.openxmlformats.org/presentationml/2006/main">
+  <p:cSld>
+    <p:spTree>
+      <p:nvGrpSpPr>
+        <p:cNvPr id="1" name=""/>
+        <p:cNvGrpSpPr/>
+        <p:nvPr/>
+      </p:nvGrpSpPr>
+      <p:grpSpPr>
+        <a:xfrm>
+          <a:off x="0" y="0"/>
+          <a:ext cx="0" cy="0"/>
+          <a:chOff x="0" y="0"/>
+          <a:chExt cx="0" cy="0"/>
+        </a:xfrm>
+      </p:grpSpPr>
+      <p:sp>
+        <p:nvSpPr>
+          <p:cNvPr id="2" name="Folienbildplatzhalter 1"/>
+          <p:cNvSpPr>
+            <a:spLocks noGrp="1" noRot="1" noChangeAspect="1"/>
+          </p:cNvSpPr>
+          <p:nvPr>
+            <p:ph type="sldImg"/>
+          </p:nvPr>
+        </p:nvSpPr>
+        <p:spPr/>
+      </p:sp>
+      <p:sp>
+        <p:nvSpPr>
+          <p:cNvPr id="3" name="Notizenplatzhalter 2"/>
+          <p:cNvSpPr>
+            <a:spLocks noGrp="1"/>
+          </p:cNvSpPr>
+          <p:nvPr>
+            <p:ph type="body" idx="1"/>
+          </p:nvPr>
+        </p:nvSpPr>
+        <p:spPr/>
+        <p:txBody>
+          <a:bodyPr/>
+          <a:lstStyle/>
+          <a:p>
+            <a:endParaRPr lang="de-DE"/>
+          </a:p>
+        </p:txBody>
+      </p:sp>
+      <p:sp>
+        <p:nvSpPr>
+          <p:cNvPr id="4" name="Foliennummernplatzhalter 3"/>
+          <p:cNvSpPr>
+            <a:spLocks noGrp="1"/>
+          </p:cNvSpPr>
+          <p:nvPr>
+            <p:ph type="sldNum" sz="quarter" idx="10"/>
+          </p:nvPr>
+        </p:nvSpPr>
+        <p:spPr/>
+        <p:txBody>
+          <a:bodyPr/>
+          <a:lstStyle/>
+          <a:p>
+            <a:fld id="{87E9C61A-9B5E-4580-98DD-1AC874081FFB}" type="slidenum">
+              <a:rPr lang="de-DE" smtClean="0"/>
+              <a:pPr/>
+              <a:t>15</a:t>
+            </a:fld>
+            <a:endParaRPr lang="de-DE"/>
+          </a:p>
+        </p:txBody>
+      </p:sp>
+    </p:spTree>
+    <p:extLst>
+      <p:ext uri="{BB962C8B-B14F-4D97-AF65-F5344CB8AC3E}">
+        <p14:creationId xmlns:p14="http://schemas.microsoft.com/office/powerpoint/2010/main" val="1952917371"/>
+      </p:ext>
+    </p:extLst>
+  </p:cSld>
+  <p:clrMapOvr>
+    <a:masterClrMapping/>
+  </p:clrMapOvr>
+</p:notes>
+</file>
+
+<file path=ppt/notesSlides/notesSlide15.xml><?xml version="1.0" encoding="utf-8"?>
+<p:notes xmlns:a="http://schemas.openxmlformats.org/drawingml/2006/main" xmlns:r="http://schemas.openxmlformats.org/officeDocument/2006/relationships" xmlns:p="http://schemas.openxmlformats.org/presentationml/2006/main">
+  <p:cSld>
+    <p:spTree>
+      <p:nvGrpSpPr>
+        <p:cNvPr id="1" name=""/>
+        <p:cNvGrpSpPr/>
+        <p:nvPr/>
+      </p:nvGrpSpPr>
+      <p:grpSpPr>
+        <a:xfrm>
+          <a:off x="0" y="0"/>
+          <a:ext cx="0" cy="0"/>
+          <a:chOff x="0" y="0"/>
+          <a:chExt cx="0" cy="0"/>
+        </a:xfrm>
+      </p:grpSpPr>
+      <p:sp>
+        <p:nvSpPr>
+          <p:cNvPr id="2" name="Folienbildplatzhalter 1"/>
+          <p:cNvSpPr>
+            <a:spLocks noGrp="1" noRot="1" noChangeAspect="1"/>
+          </p:cNvSpPr>
+          <p:nvPr>
+            <p:ph type="sldImg"/>
+          </p:nvPr>
+        </p:nvSpPr>
+        <p:spPr/>
+      </p:sp>
+      <p:sp>
+        <p:nvSpPr>
+          <p:cNvPr id="3" name="Notizenplatzhalter 2"/>
+          <p:cNvSpPr>
+            <a:spLocks noGrp="1"/>
+          </p:cNvSpPr>
+          <p:nvPr>
+            <p:ph type="body" idx="1"/>
+          </p:nvPr>
+        </p:nvSpPr>
+        <p:spPr/>
+        <p:txBody>
+          <a:bodyPr/>
+          <a:lstStyle/>
+          <a:p>
+            <a:endParaRPr lang="de-DE"/>
+          </a:p>
+        </p:txBody>
+      </p:sp>
+      <p:sp>
+        <p:nvSpPr>
+          <p:cNvPr id="4" name="Foliennummernplatzhalter 3"/>
+          <p:cNvSpPr>
+            <a:spLocks noGrp="1"/>
+          </p:cNvSpPr>
+          <p:nvPr>
+            <p:ph type="sldNum" sz="quarter" idx="10"/>
+          </p:nvPr>
+        </p:nvSpPr>
+        <p:spPr/>
+        <p:txBody>
+          <a:bodyPr/>
+          <a:lstStyle/>
+          <a:p>
+            <a:fld id="{87E9C61A-9B5E-4580-98DD-1AC874081FFB}" type="slidenum">
+              <a:rPr lang="de-DE" smtClean="0"/>
+              <a:pPr/>
+              <a:t>16</a:t>
+            </a:fld>
+            <a:endParaRPr lang="de-DE"/>
+          </a:p>
+        </p:txBody>
+      </p:sp>
+    </p:spTree>
+    <p:extLst>
+      <p:ext uri="{BB962C8B-B14F-4D97-AF65-F5344CB8AC3E}">
+        <p14:creationId xmlns:p14="http://schemas.microsoft.com/office/powerpoint/2010/main" val="1952917371"/>
+      </p:ext>
+    </p:extLst>
+  </p:cSld>
+  <p:clrMapOvr>
+    <a:masterClrMapping/>
+  </p:clrMapOvr>
+</p:notes>
+</file>
+
+<file path=ppt/notesSlides/notesSlide16.xml><?xml version="1.0" encoding="utf-8"?>
+<p:notes xmlns:a="http://schemas.openxmlformats.org/drawingml/2006/main" xmlns:r="http://schemas.openxmlformats.org/officeDocument/2006/relationships" xmlns:p="http://schemas.openxmlformats.org/presentationml/2006/main">
+  <p:cSld>
+    <p:spTree>
+      <p:nvGrpSpPr>
+        <p:cNvPr id="1" name=""/>
+        <p:cNvGrpSpPr/>
+        <p:nvPr/>
+      </p:nvGrpSpPr>
+      <p:grpSpPr>
+        <a:xfrm>
+          <a:off x="0" y="0"/>
+          <a:ext cx="0" cy="0"/>
+          <a:chOff x="0" y="0"/>
+          <a:chExt cx="0" cy="0"/>
+        </a:xfrm>
+      </p:grpSpPr>
+      <p:sp>
+        <p:nvSpPr>
+          <p:cNvPr id="2" name="Folienbildplatzhalter 1"/>
+          <p:cNvSpPr>
+            <a:spLocks noGrp="1" noRot="1" noChangeAspect="1"/>
+          </p:cNvSpPr>
+          <p:nvPr>
+            <p:ph type="sldImg"/>
+          </p:nvPr>
+        </p:nvSpPr>
+        <p:spPr/>
+      </p:sp>
+      <p:sp>
+        <p:nvSpPr>
+          <p:cNvPr id="3" name="Notizenplatzhalter 2"/>
+          <p:cNvSpPr>
+            <a:spLocks noGrp="1"/>
+          </p:cNvSpPr>
+          <p:nvPr>
+            <p:ph type="body" idx="1"/>
+          </p:nvPr>
+        </p:nvSpPr>
+        <p:spPr/>
+        <p:txBody>
+          <a:bodyPr/>
+          <a:lstStyle/>
+          <a:p>
+            <a:endParaRPr lang="de-DE"/>
+          </a:p>
+        </p:txBody>
+      </p:sp>
+      <p:sp>
+        <p:nvSpPr>
+          <p:cNvPr id="4" name="Foliennummernplatzhalter 3"/>
+          <p:cNvSpPr>
+            <a:spLocks noGrp="1"/>
+          </p:cNvSpPr>
+          <p:nvPr>
+            <p:ph type="sldNum" sz="quarter" idx="10"/>
+          </p:nvPr>
+        </p:nvSpPr>
+        <p:spPr/>
+        <p:txBody>
+          <a:bodyPr/>
+          <a:lstStyle/>
+          <a:p>
+            <a:fld id="{87E9C61A-9B5E-4580-98DD-1AC874081FFB}" type="slidenum">
+              <a:rPr lang="de-DE" smtClean="0"/>
+              <a:pPr/>
+              <a:t>17</a:t>
+            </a:fld>
+            <a:endParaRPr lang="de-DE"/>
+          </a:p>
+        </p:txBody>
+      </p:sp>
+    </p:spTree>
+    <p:extLst>
+      <p:ext uri="{BB962C8B-B14F-4D97-AF65-F5344CB8AC3E}">
+        <p14:creationId xmlns:p14="http://schemas.microsoft.com/office/powerpoint/2010/main" val="1952917371"/>
+      </p:ext>
+    </p:extLst>
+  </p:cSld>
+  <p:clrMapOvr>
+    <a:masterClrMapping/>
+  </p:clrMapOvr>
+</p:notes>
+</file>
+
+<file path=ppt/notesSlides/notesSlide17.xml><?xml version="1.0" encoding="utf-8"?>
+<p:notes xmlns:a="http://schemas.openxmlformats.org/drawingml/2006/main" xmlns:r="http://schemas.openxmlformats.org/officeDocument/2006/relationships" xmlns:p="http://schemas.openxmlformats.org/presentationml/2006/main">
+  <p:cSld>
+    <p:spTree>
+      <p:nvGrpSpPr>
+        <p:cNvPr id="1" name=""/>
+        <p:cNvGrpSpPr/>
+        <p:nvPr/>
+      </p:nvGrpSpPr>
+      <p:grpSpPr>
+        <a:xfrm>
+          <a:off x="0" y="0"/>
+          <a:ext cx="0" cy="0"/>
+          <a:chOff x="0" y="0"/>
+          <a:chExt cx="0" cy="0"/>
+        </a:xfrm>
+      </p:grpSpPr>
+      <p:sp>
+        <p:nvSpPr>
+          <p:cNvPr id="2" name="Folienbildplatzhalter 1"/>
+          <p:cNvSpPr>
+            <a:spLocks noGrp="1" noRot="1" noChangeAspect="1"/>
+          </p:cNvSpPr>
+          <p:nvPr>
+            <p:ph type="sldImg"/>
+          </p:nvPr>
+        </p:nvSpPr>
+        <p:spPr/>
+      </p:sp>
+      <p:sp>
+        <p:nvSpPr>
+          <p:cNvPr id="3" name="Notizenplatzhalter 2"/>
+          <p:cNvSpPr>
+            <a:spLocks noGrp="1"/>
+          </p:cNvSpPr>
+          <p:nvPr>
+            <p:ph type="body" idx="1"/>
+          </p:nvPr>
+        </p:nvSpPr>
+        <p:spPr/>
+        <p:txBody>
+          <a:bodyPr/>
+          <a:lstStyle/>
+          <a:p>
+            <a:endParaRPr lang="de-DE"/>
+          </a:p>
+        </p:txBody>
+      </p:sp>
+      <p:sp>
+        <p:nvSpPr>
+          <p:cNvPr id="4" name="Foliennummernplatzhalter 3"/>
+          <p:cNvSpPr>
+            <a:spLocks noGrp="1"/>
+          </p:cNvSpPr>
+          <p:nvPr>
+            <p:ph type="sldNum" sz="quarter" idx="10"/>
+          </p:nvPr>
+        </p:nvSpPr>
+        <p:spPr/>
+        <p:txBody>
+          <a:bodyPr/>
+          <a:lstStyle/>
+          <a:p>
+            <a:fld id="{87E9C61A-9B5E-4580-98DD-1AC874081FFB}" type="slidenum">
+              <a:rPr lang="de-DE" smtClean="0"/>
+              <a:pPr/>
+              <a:t>18</a:t>
+            </a:fld>
+            <a:endParaRPr lang="de-DE"/>
+          </a:p>
+        </p:txBody>
+      </p:sp>
+    </p:spTree>
+    <p:extLst>
+      <p:ext uri="{BB962C8B-B14F-4D97-AF65-F5344CB8AC3E}">
+        <p14:creationId xmlns:p14="http://schemas.microsoft.com/office/powerpoint/2010/main" val="1952917371"/>
+      </p:ext>
+    </p:extLst>
+  </p:cSld>
+  <p:clrMapOvr>
+    <a:masterClrMapping/>
+  </p:clrMapOvr>
+</p:notes>
+</file>
+
+<file path=ppt/notesSlides/notesSlide18.xml><?xml version="1.0" encoding="utf-8"?>
+<p:notes xmlns:a="http://schemas.openxmlformats.org/drawingml/2006/main" xmlns:r="http://schemas.openxmlformats.org/officeDocument/2006/relationships" xmlns:p="http://schemas.openxmlformats.org/presentationml/2006/main">
+  <p:cSld>
+    <p:spTree>
+      <p:nvGrpSpPr>
+        <p:cNvPr id="1" name=""/>
+        <p:cNvGrpSpPr/>
+        <p:nvPr/>
+      </p:nvGrpSpPr>
+      <p:grpSpPr>
+        <a:xfrm>
+          <a:off x="0" y="0"/>
+          <a:ext cx="0" cy="0"/>
+          <a:chOff x="0" y="0"/>
+          <a:chExt cx="0" cy="0"/>
+        </a:xfrm>
+      </p:grpSpPr>
+      <p:sp>
+        <p:nvSpPr>
+          <p:cNvPr id="2" name="Folienbildplatzhalter 1"/>
+          <p:cNvSpPr>
+            <a:spLocks noGrp="1" noRot="1" noChangeAspect="1"/>
+          </p:cNvSpPr>
+          <p:nvPr>
+            <p:ph type="sldImg"/>
+          </p:nvPr>
+        </p:nvSpPr>
+        <p:spPr/>
+      </p:sp>
+      <p:sp>
+        <p:nvSpPr>
+          <p:cNvPr id="3" name="Notizenplatzhalter 2"/>
+          <p:cNvSpPr>
+            <a:spLocks noGrp="1"/>
+          </p:cNvSpPr>
+          <p:nvPr>
+            <p:ph type="body" idx="1"/>
+          </p:nvPr>
+        </p:nvSpPr>
+        <p:spPr/>
+        <p:txBody>
+          <a:bodyPr/>
+          <a:lstStyle/>
+          <a:p>
+            <a:endParaRPr lang="de-DE"/>
+          </a:p>
+        </p:txBody>
+      </p:sp>
+      <p:sp>
+        <p:nvSpPr>
+          <p:cNvPr id="4" name="Foliennummernplatzhalter 3"/>
+          <p:cNvSpPr>
+            <a:spLocks noGrp="1"/>
+          </p:cNvSpPr>
+          <p:nvPr>
+            <p:ph type="sldNum" sz="quarter" idx="10"/>
+          </p:nvPr>
+        </p:nvSpPr>
+        <p:spPr/>
+        <p:txBody>
+          <a:bodyPr/>
+          <a:lstStyle/>
+          <a:p>
+            <a:fld id="{87E9C61A-9B5E-4580-98DD-1AC874081FFB}" type="slidenum">
+              <a:rPr lang="de-DE" smtClean="0"/>
+              <a:pPr/>
+              <a:t>19</a:t>
+            </a:fld>
+            <a:endParaRPr lang="de-DE"/>
+          </a:p>
+        </p:txBody>
+      </p:sp>
+    </p:spTree>
+    <p:extLst>
+      <p:ext uri="{BB962C8B-B14F-4D97-AF65-F5344CB8AC3E}">
+        <p14:creationId xmlns:p14="http://schemas.microsoft.com/office/powerpoint/2010/main" val="1952917371"/>
+      </p:ext>
+    </p:extLst>
+  </p:cSld>
+  <p:clrMapOvr>
+    <a:masterClrMapping/>
+  </p:clrMapOvr>
+</p:notes>
+</file>
+
+<file path=ppt/notesSlides/notesSlide19.xml><?xml version="1.0" encoding="utf-8"?>
+<p:notes xmlns:a="http://schemas.openxmlformats.org/drawingml/2006/main" xmlns:r="http://schemas.openxmlformats.org/officeDocument/2006/relationships" xmlns:p="http://schemas.openxmlformats.org/presentationml/2006/main">
+  <p:cSld>
+    <p:spTree>
+      <p:nvGrpSpPr>
+        <p:cNvPr id="1" name=""/>
+        <p:cNvGrpSpPr/>
+        <p:nvPr/>
+      </p:nvGrpSpPr>
+      <p:grpSpPr>
+        <a:xfrm>
+          <a:off x="0" y="0"/>
+          <a:ext cx="0" cy="0"/>
+          <a:chOff x="0" y="0"/>
+          <a:chExt cx="0" cy="0"/>
+        </a:xfrm>
+      </p:grpSpPr>
+      <p:sp>
+        <p:nvSpPr>
+          <p:cNvPr id="2" name="Folienbildplatzhalter 1"/>
+          <p:cNvSpPr>
+            <a:spLocks noGrp="1" noRot="1" noChangeAspect="1"/>
+          </p:cNvSpPr>
+          <p:nvPr>
+            <p:ph type="sldImg"/>
+          </p:nvPr>
+        </p:nvSpPr>
+        <p:spPr/>
+      </p:sp>
+      <p:sp>
+        <p:nvSpPr>
+          <p:cNvPr id="3" name="Notizenplatzhalter 2"/>
+          <p:cNvSpPr>
+            <a:spLocks noGrp="1"/>
+          </p:cNvSpPr>
+          <p:nvPr>
+            <p:ph type="body" idx="1"/>
+          </p:nvPr>
+        </p:nvSpPr>
+        <p:spPr/>
+        <p:txBody>
+          <a:bodyPr/>
+          <a:lstStyle/>
+          <a:p>
+            <a:endParaRPr lang="de-DE"/>
+          </a:p>
+        </p:txBody>
+      </p:sp>
+      <p:sp>
+        <p:nvSpPr>
+          <p:cNvPr id="4" name="Foliennummernplatzhalter 3"/>
+          <p:cNvSpPr>
+            <a:spLocks noGrp="1"/>
+          </p:cNvSpPr>
+          <p:nvPr>
+            <p:ph type="sldNum" sz="quarter" idx="10"/>
+          </p:nvPr>
+        </p:nvSpPr>
+        <p:spPr/>
+        <p:txBody>
+          <a:bodyPr/>
+          <a:lstStyle/>
+          <a:p>
+            <a:fld id="{87E9C61A-9B5E-4580-98DD-1AC874081FFB}" type="slidenum">
+              <a:rPr lang="de-DE" smtClean="0"/>
+              <a:pPr/>
+              <a:t>20</a:t>
+            </a:fld>
+            <a:endParaRPr lang="de-DE"/>
+          </a:p>
+        </p:txBody>
+      </p:sp>
+    </p:spTree>
+    <p:extLst>
+      <p:ext uri="{BB962C8B-B14F-4D97-AF65-F5344CB8AC3E}">
+        <p14:creationId xmlns:p14="http://schemas.microsoft.com/office/powerpoint/2010/main" val="1952917371"/>
+      </p:ext>
+    </p:extLst>
+  </p:cSld>
+  <p:clrMapOvr>
+    <a:masterClrMapping/>
+  </p:clrMapOvr>
+</p:notes>
+</file>
+
 <file path=ppt/notesSlides/notesSlide2.xml><?xml version="1.0" encoding="utf-8"?>
 <p:notes xmlns:a="http://schemas.openxmlformats.org/drawingml/2006/main" xmlns:r="http://schemas.openxmlformats.org/officeDocument/2006/relationships" xmlns:p="http://schemas.openxmlformats.org/presentationml/2006/main">
   <p:cSld>
@@ -887,6 +1666,431 @@
               <a:rPr lang="de-DE" smtClean="0"/>
               <a:pPr/>
               <a:t>3</a:t>
+            </a:fld>
+            <a:endParaRPr lang="de-DE"/>
+          </a:p>
+        </p:txBody>
+      </p:sp>
+    </p:spTree>
+    <p:extLst>
+      <p:ext uri="{BB962C8B-B14F-4D97-AF65-F5344CB8AC3E}">
+        <p14:creationId xmlns:p14="http://schemas.microsoft.com/office/powerpoint/2010/main" val="1952917371"/>
+      </p:ext>
+    </p:extLst>
+  </p:cSld>
+  <p:clrMapOvr>
+    <a:masterClrMapping/>
+  </p:clrMapOvr>
+</p:notes>
+</file>
+
+<file path=ppt/notesSlides/notesSlide20.xml><?xml version="1.0" encoding="utf-8"?>
+<p:notes xmlns:a="http://schemas.openxmlformats.org/drawingml/2006/main" xmlns:r="http://schemas.openxmlformats.org/officeDocument/2006/relationships" xmlns:p="http://schemas.openxmlformats.org/presentationml/2006/main">
+  <p:cSld>
+    <p:spTree>
+      <p:nvGrpSpPr>
+        <p:cNvPr id="1" name=""/>
+        <p:cNvGrpSpPr/>
+        <p:nvPr/>
+      </p:nvGrpSpPr>
+      <p:grpSpPr>
+        <a:xfrm>
+          <a:off x="0" y="0"/>
+          <a:ext cx="0" cy="0"/>
+          <a:chOff x="0" y="0"/>
+          <a:chExt cx="0" cy="0"/>
+        </a:xfrm>
+      </p:grpSpPr>
+      <p:sp>
+        <p:nvSpPr>
+          <p:cNvPr id="2" name="Folienbildplatzhalter 1"/>
+          <p:cNvSpPr>
+            <a:spLocks noGrp="1" noRot="1" noChangeAspect="1"/>
+          </p:cNvSpPr>
+          <p:nvPr>
+            <p:ph type="sldImg"/>
+          </p:nvPr>
+        </p:nvSpPr>
+        <p:spPr/>
+      </p:sp>
+      <p:sp>
+        <p:nvSpPr>
+          <p:cNvPr id="3" name="Notizenplatzhalter 2"/>
+          <p:cNvSpPr>
+            <a:spLocks noGrp="1"/>
+          </p:cNvSpPr>
+          <p:nvPr>
+            <p:ph type="body" idx="1"/>
+          </p:nvPr>
+        </p:nvSpPr>
+        <p:spPr/>
+        <p:txBody>
+          <a:bodyPr/>
+          <a:lstStyle/>
+          <a:p>
+            <a:endParaRPr lang="de-DE"/>
+          </a:p>
+        </p:txBody>
+      </p:sp>
+      <p:sp>
+        <p:nvSpPr>
+          <p:cNvPr id="4" name="Foliennummernplatzhalter 3"/>
+          <p:cNvSpPr>
+            <a:spLocks noGrp="1"/>
+          </p:cNvSpPr>
+          <p:nvPr>
+            <p:ph type="sldNum" sz="quarter" idx="10"/>
+          </p:nvPr>
+        </p:nvSpPr>
+        <p:spPr/>
+        <p:txBody>
+          <a:bodyPr/>
+          <a:lstStyle/>
+          <a:p>
+            <a:fld id="{87E9C61A-9B5E-4580-98DD-1AC874081FFB}" type="slidenum">
+              <a:rPr lang="de-DE" smtClean="0"/>
+              <a:pPr/>
+              <a:t>21</a:t>
+            </a:fld>
+            <a:endParaRPr lang="de-DE"/>
+          </a:p>
+        </p:txBody>
+      </p:sp>
+    </p:spTree>
+    <p:extLst>
+      <p:ext uri="{BB962C8B-B14F-4D97-AF65-F5344CB8AC3E}">
+        <p14:creationId xmlns:p14="http://schemas.microsoft.com/office/powerpoint/2010/main" val="1952917371"/>
+      </p:ext>
+    </p:extLst>
+  </p:cSld>
+  <p:clrMapOvr>
+    <a:masterClrMapping/>
+  </p:clrMapOvr>
+</p:notes>
+</file>
+
+<file path=ppt/notesSlides/notesSlide21.xml><?xml version="1.0" encoding="utf-8"?>
+<p:notes xmlns:a="http://schemas.openxmlformats.org/drawingml/2006/main" xmlns:r="http://schemas.openxmlformats.org/officeDocument/2006/relationships" xmlns:p="http://schemas.openxmlformats.org/presentationml/2006/main">
+  <p:cSld>
+    <p:spTree>
+      <p:nvGrpSpPr>
+        <p:cNvPr id="1" name=""/>
+        <p:cNvGrpSpPr/>
+        <p:nvPr/>
+      </p:nvGrpSpPr>
+      <p:grpSpPr>
+        <a:xfrm>
+          <a:off x="0" y="0"/>
+          <a:ext cx="0" cy="0"/>
+          <a:chOff x="0" y="0"/>
+          <a:chExt cx="0" cy="0"/>
+        </a:xfrm>
+      </p:grpSpPr>
+      <p:sp>
+        <p:nvSpPr>
+          <p:cNvPr id="2" name="Folienbildplatzhalter 1"/>
+          <p:cNvSpPr>
+            <a:spLocks noGrp="1" noRot="1" noChangeAspect="1"/>
+          </p:cNvSpPr>
+          <p:nvPr>
+            <p:ph type="sldImg"/>
+          </p:nvPr>
+        </p:nvSpPr>
+        <p:spPr/>
+      </p:sp>
+      <p:sp>
+        <p:nvSpPr>
+          <p:cNvPr id="3" name="Notizenplatzhalter 2"/>
+          <p:cNvSpPr>
+            <a:spLocks noGrp="1"/>
+          </p:cNvSpPr>
+          <p:nvPr>
+            <p:ph type="body" idx="1"/>
+          </p:nvPr>
+        </p:nvSpPr>
+        <p:spPr/>
+        <p:txBody>
+          <a:bodyPr/>
+          <a:lstStyle/>
+          <a:p>
+            <a:endParaRPr lang="de-DE"/>
+          </a:p>
+        </p:txBody>
+      </p:sp>
+      <p:sp>
+        <p:nvSpPr>
+          <p:cNvPr id="4" name="Foliennummernplatzhalter 3"/>
+          <p:cNvSpPr>
+            <a:spLocks noGrp="1"/>
+          </p:cNvSpPr>
+          <p:nvPr>
+            <p:ph type="sldNum" sz="quarter" idx="10"/>
+          </p:nvPr>
+        </p:nvSpPr>
+        <p:spPr/>
+        <p:txBody>
+          <a:bodyPr/>
+          <a:lstStyle/>
+          <a:p>
+            <a:fld id="{87E9C61A-9B5E-4580-98DD-1AC874081FFB}" type="slidenum">
+              <a:rPr lang="de-DE" smtClean="0"/>
+              <a:pPr/>
+              <a:t>22</a:t>
+            </a:fld>
+            <a:endParaRPr lang="de-DE"/>
+          </a:p>
+        </p:txBody>
+      </p:sp>
+    </p:spTree>
+    <p:extLst>
+      <p:ext uri="{BB962C8B-B14F-4D97-AF65-F5344CB8AC3E}">
+        <p14:creationId xmlns:p14="http://schemas.microsoft.com/office/powerpoint/2010/main" val="1952917371"/>
+      </p:ext>
+    </p:extLst>
+  </p:cSld>
+  <p:clrMapOvr>
+    <a:masterClrMapping/>
+  </p:clrMapOvr>
+</p:notes>
+</file>
+
+<file path=ppt/notesSlides/notesSlide22.xml><?xml version="1.0" encoding="utf-8"?>
+<p:notes xmlns:a="http://schemas.openxmlformats.org/drawingml/2006/main" xmlns:r="http://schemas.openxmlformats.org/officeDocument/2006/relationships" xmlns:p="http://schemas.openxmlformats.org/presentationml/2006/main">
+  <p:cSld>
+    <p:spTree>
+      <p:nvGrpSpPr>
+        <p:cNvPr id="1" name=""/>
+        <p:cNvGrpSpPr/>
+        <p:nvPr/>
+      </p:nvGrpSpPr>
+      <p:grpSpPr>
+        <a:xfrm>
+          <a:off x="0" y="0"/>
+          <a:ext cx="0" cy="0"/>
+          <a:chOff x="0" y="0"/>
+          <a:chExt cx="0" cy="0"/>
+        </a:xfrm>
+      </p:grpSpPr>
+      <p:sp>
+        <p:nvSpPr>
+          <p:cNvPr id="2" name="Folienbildplatzhalter 1"/>
+          <p:cNvSpPr>
+            <a:spLocks noGrp="1" noRot="1" noChangeAspect="1"/>
+          </p:cNvSpPr>
+          <p:nvPr>
+            <p:ph type="sldImg"/>
+          </p:nvPr>
+        </p:nvSpPr>
+        <p:spPr/>
+      </p:sp>
+      <p:sp>
+        <p:nvSpPr>
+          <p:cNvPr id="3" name="Notizenplatzhalter 2"/>
+          <p:cNvSpPr>
+            <a:spLocks noGrp="1"/>
+          </p:cNvSpPr>
+          <p:nvPr>
+            <p:ph type="body" idx="1"/>
+          </p:nvPr>
+        </p:nvSpPr>
+        <p:spPr/>
+        <p:txBody>
+          <a:bodyPr/>
+          <a:lstStyle/>
+          <a:p>
+            <a:endParaRPr lang="de-DE"/>
+          </a:p>
+        </p:txBody>
+      </p:sp>
+      <p:sp>
+        <p:nvSpPr>
+          <p:cNvPr id="4" name="Foliennummernplatzhalter 3"/>
+          <p:cNvSpPr>
+            <a:spLocks noGrp="1"/>
+          </p:cNvSpPr>
+          <p:nvPr>
+            <p:ph type="sldNum" sz="quarter" idx="10"/>
+          </p:nvPr>
+        </p:nvSpPr>
+        <p:spPr/>
+        <p:txBody>
+          <a:bodyPr/>
+          <a:lstStyle/>
+          <a:p>
+            <a:fld id="{87E9C61A-9B5E-4580-98DD-1AC874081FFB}" type="slidenum">
+              <a:rPr lang="de-DE" smtClean="0"/>
+              <a:pPr/>
+              <a:t>23</a:t>
+            </a:fld>
+            <a:endParaRPr lang="de-DE"/>
+          </a:p>
+        </p:txBody>
+      </p:sp>
+    </p:spTree>
+    <p:extLst>
+      <p:ext uri="{BB962C8B-B14F-4D97-AF65-F5344CB8AC3E}">
+        <p14:creationId xmlns:p14="http://schemas.microsoft.com/office/powerpoint/2010/main" val="1952917371"/>
+      </p:ext>
+    </p:extLst>
+  </p:cSld>
+  <p:clrMapOvr>
+    <a:masterClrMapping/>
+  </p:clrMapOvr>
+</p:notes>
+</file>
+
+<file path=ppt/notesSlides/notesSlide23.xml><?xml version="1.0" encoding="utf-8"?>
+<p:notes xmlns:a="http://schemas.openxmlformats.org/drawingml/2006/main" xmlns:r="http://schemas.openxmlformats.org/officeDocument/2006/relationships" xmlns:p="http://schemas.openxmlformats.org/presentationml/2006/main">
+  <p:cSld>
+    <p:spTree>
+      <p:nvGrpSpPr>
+        <p:cNvPr id="1" name=""/>
+        <p:cNvGrpSpPr/>
+        <p:nvPr/>
+      </p:nvGrpSpPr>
+      <p:grpSpPr>
+        <a:xfrm>
+          <a:off x="0" y="0"/>
+          <a:ext cx="0" cy="0"/>
+          <a:chOff x="0" y="0"/>
+          <a:chExt cx="0" cy="0"/>
+        </a:xfrm>
+      </p:grpSpPr>
+      <p:sp>
+        <p:nvSpPr>
+          <p:cNvPr id="2" name="Folienbildplatzhalter 1"/>
+          <p:cNvSpPr>
+            <a:spLocks noGrp="1" noRot="1" noChangeAspect="1"/>
+          </p:cNvSpPr>
+          <p:nvPr>
+            <p:ph type="sldImg"/>
+          </p:nvPr>
+        </p:nvSpPr>
+        <p:spPr/>
+      </p:sp>
+      <p:sp>
+        <p:nvSpPr>
+          <p:cNvPr id="3" name="Notizenplatzhalter 2"/>
+          <p:cNvSpPr>
+            <a:spLocks noGrp="1"/>
+          </p:cNvSpPr>
+          <p:nvPr>
+            <p:ph type="body" idx="1"/>
+          </p:nvPr>
+        </p:nvSpPr>
+        <p:spPr/>
+        <p:txBody>
+          <a:bodyPr/>
+          <a:lstStyle/>
+          <a:p>
+            <a:endParaRPr lang="de-DE"/>
+          </a:p>
+        </p:txBody>
+      </p:sp>
+      <p:sp>
+        <p:nvSpPr>
+          <p:cNvPr id="4" name="Foliennummernplatzhalter 3"/>
+          <p:cNvSpPr>
+            <a:spLocks noGrp="1"/>
+          </p:cNvSpPr>
+          <p:nvPr>
+            <p:ph type="sldNum" sz="quarter" idx="10"/>
+          </p:nvPr>
+        </p:nvSpPr>
+        <p:spPr/>
+        <p:txBody>
+          <a:bodyPr/>
+          <a:lstStyle/>
+          <a:p>
+            <a:fld id="{87E9C61A-9B5E-4580-98DD-1AC874081FFB}" type="slidenum">
+              <a:rPr lang="de-DE" smtClean="0"/>
+              <a:pPr/>
+              <a:t>24</a:t>
+            </a:fld>
+            <a:endParaRPr lang="de-DE"/>
+          </a:p>
+        </p:txBody>
+      </p:sp>
+    </p:spTree>
+    <p:extLst>
+      <p:ext uri="{BB962C8B-B14F-4D97-AF65-F5344CB8AC3E}">
+        <p14:creationId xmlns:p14="http://schemas.microsoft.com/office/powerpoint/2010/main" val="1952917371"/>
+      </p:ext>
+    </p:extLst>
+  </p:cSld>
+  <p:clrMapOvr>
+    <a:masterClrMapping/>
+  </p:clrMapOvr>
+</p:notes>
+</file>
+
+<file path=ppt/notesSlides/notesSlide24.xml><?xml version="1.0" encoding="utf-8"?>
+<p:notes xmlns:a="http://schemas.openxmlformats.org/drawingml/2006/main" xmlns:r="http://schemas.openxmlformats.org/officeDocument/2006/relationships" xmlns:p="http://schemas.openxmlformats.org/presentationml/2006/main">
+  <p:cSld>
+    <p:spTree>
+      <p:nvGrpSpPr>
+        <p:cNvPr id="1" name=""/>
+        <p:cNvGrpSpPr/>
+        <p:nvPr/>
+      </p:nvGrpSpPr>
+      <p:grpSpPr>
+        <a:xfrm>
+          <a:off x="0" y="0"/>
+          <a:ext cx="0" cy="0"/>
+          <a:chOff x="0" y="0"/>
+          <a:chExt cx="0" cy="0"/>
+        </a:xfrm>
+      </p:grpSpPr>
+      <p:sp>
+        <p:nvSpPr>
+          <p:cNvPr id="2" name="Folienbildplatzhalter 1"/>
+          <p:cNvSpPr>
+            <a:spLocks noGrp="1" noRot="1" noChangeAspect="1"/>
+          </p:cNvSpPr>
+          <p:nvPr>
+            <p:ph type="sldImg"/>
+          </p:nvPr>
+        </p:nvSpPr>
+        <p:spPr/>
+      </p:sp>
+      <p:sp>
+        <p:nvSpPr>
+          <p:cNvPr id="3" name="Notizenplatzhalter 2"/>
+          <p:cNvSpPr>
+            <a:spLocks noGrp="1"/>
+          </p:cNvSpPr>
+          <p:nvPr>
+            <p:ph type="body" idx="1"/>
+          </p:nvPr>
+        </p:nvSpPr>
+        <p:spPr/>
+        <p:txBody>
+          <a:bodyPr/>
+          <a:lstStyle/>
+          <a:p>
+            <a:endParaRPr lang="de-DE"/>
+          </a:p>
+        </p:txBody>
+      </p:sp>
+      <p:sp>
+        <p:nvSpPr>
+          <p:cNvPr id="4" name="Foliennummernplatzhalter 3"/>
+          <p:cNvSpPr>
+            <a:spLocks noGrp="1"/>
+          </p:cNvSpPr>
+          <p:nvPr>
+            <p:ph type="sldNum" sz="quarter" idx="10"/>
+          </p:nvPr>
+        </p:nvSpPr>
+        <p:spPr/>
+        <p:txBody>
+          <a:bodyPr/>
+          <a:lstStyle/>
+          <a:p>
+            <a:fld id="{87E9C61A-9B5E-4580-98DD-1AC874081FFB}" type="slidenum">
+              <a:rPr lang="de-DE" smtClean="0"/>
+              <a:pPr/>
+              <a:t>25</a:t>
             </a:fld>
             <a:endParaRPr lang="de-DE"/>
           </a:p>
@@ -3061,7 +4265,11 @@
           <a:p>
             <a:r>
               <a:rPr lang="de-DE" sz="1800" dirty="0" smtClean="0"/>
-              <a:t>Beschreibung der Benchmarks</a:t>
+              <a:t>Verwendete </a:t>
+            </a:r>
+            <a:r>
+              <a:rPr lang="de-DE" sz="1800" dirty="0" smtClean="0"/>
+              <a:t>Benchmarks</a:t>
             </a:r>
             <a:endParaRPr lang="de-DE" sz="1800" dirty="0"/>
           </a:p>
@@ -3087,10 +4295,13 @@
               <a:buAutoNum type="arabicPeriod" startAt="2"/>
             </a:pPr>
             <a:r>
-              <a:rPr lang="de-DE" dirty="0" smtClean="0"/>
-              <a:t>Beschreibung der Benchmarks</a:t>
-            </a:r>
-            <a:endParaRPr lang="de-DE" b="1" dirty="0" smtClean="0"/>
+              <a:rPr lang="de-DE" b="1" dirty="0" smtClean="0"/>
+              <a:t>Verwendete </a:t>
+            </a:r>
+            <a:r>
+              <a:rPr lang="de-DE" b="1" dirty="0" smtClean="0"/>
+              <a:t>Benchmarks</a:t>
+            </a:r>
           </a:p>
           <a:p>
             <a:pPr marL="857250" lvl="1" indent="-457200">
@@ -3122,7 +4333,15 @@
             </a:r>
             <a:r>
               <a:rPr lang="de-DE" dirty="0"/>
-              <a:t> Fließpunktoperationen auf dicht besetzter Matrix (Matrixmultiplikation)</a:t>
+              <a:t> Fließpunktoperationen auf dicht besetzter Matrix </a:t>
+            </a:r>
+            <a:r>
+              <a:rPr lang="de-DE" dirty="0" smtClean="0"/>
+              <a:t>(Lösung eines linearen Gleichungssystems, Matrixmultiplikation</a:t>
+            </a:r>
+            <a:r>
+              <a:rPr lang="de-DE" dirty="0"/>
+              <a:t>)</a:t>
             </a:r>
           </a:p>
           <a:p>
@@ -3141,7 +4360,11 @@
             </a:r>
             <a:r>
               <a:rPr lang="de-DE" dirty="0" smtClean="0"/>
-              <a:t> (Ermittlung der Top500-Rangliste)</a:t>
+              <a:t> (</a:t>
+            </a:r>
+            <a:r>
+              <a:rPr lang="de-DE" dirty="0" smtClean="0"/>
+              <a:t>Ermittlung der Top500-Rangliste)</a:t>
             </a:r>
           </a:p>
           <a:p>
@@ -3220,6 +4443,37 @@
             <a:r>
               <a:rPr lang="de-DE" dirty="0" smtClean="0"/>
               <a:t>Vektoren, die aus HS geladen werden </a:t>
+            </a:r>
+          </a:p>
+          <a:p>
+            <a:pPr marL="685800" lvl="1"/>
+            <a:r>
+              <a:rPr lang="de-DE" dirty="0" smtClean="0"/>
+              <a:t>4 Module: </a:t>
+            </a:r>
+            <a:r>
+              <a:rPr lang="de-DE" dirty="0" err="1" smtClean="0"/>
+              <a:t>Copy</a:t>
+            </a:r>
+            <a:r>
+              <a:rPr lang="de-DE" dirty="0" smtClean="0"/>
+              <a:t>, </a:t>
+            </a:r>
+            <a:r>
+              <a:rPr lang="de-DE" dirty="0" err="1" smtClean="0"/>
+              <a:t>Scale</a:t>
+            </a:r>
+            <a:r>
+              <a:rPr lang="de-DE" dirty="0" smtClean="0"/>
+              <a:t>, Add, </a:t>
+            </a:r>
+            <a:r>
+              <a:rPr lang="de-DE" dirty="0" err="1" smtClean="0"/>
+              <a:t>Triad</a:t>
+            </a:r>
+            <a:r>
+              <a:rPr lang="de-DE" dirty="0" smtClean="0"/>
+              <a:t> mit Abhängigkeiten untereinander</a:t>
             </a:r>
           </a:p>
           <a:p>
@@ -3365,7 +4619,7 @@
           <a:p>
             <a:r>
               <a:rPr lang="de-DE" sz="1800" dirty="0" smtClean="0"/>
-              <a:t>Versuchsaufbau</a:t>
+              <a:t>Versuchsdurchführung</a:t>
             </a:r>
             <a:endParaRPr lang="de-DE" sz="1800" dirty="0"/>
           </a:p>
@@ -3391,16 +4645,166 @@
               <a:buAutoNum type="arabicPeriod" startAt="3"/>
             </a:pPr>
             <a:r>
-              <a:rPr lang="de-DE" dirty="0" smtClean="0"/>
-              <a:t>Umsetzung</a:t>
-            </a:r>
-          </a:p>
-          <a:p>
-            <a:pPr marL="914400" lvl="1" indent="-514350">
+              <a:rPr lang="de-DE" b="1" dirty="0" smtClean="0"/>
+              <a:t>Versuchsdurchführung</a:t>
+            </a:r>
+          </a:p>
+          <a:p>
+            <a:pPr marL="400050" lvl="1" indent="0">
+              <a:buNone/>
+            </a:pPr>
+            <a:r>
+              <a:rPr lang="de-DE" b="1" dirty="0"/>
+              <a:t>3.1 </a:t>
+            </a:r>
+            <a:r>
+              <a:rPr lang="de-DE" b="1" dirty="0" smtClean="0"/>
+              <a:t>Vorarbeiten/Fehlerbehebung </a:t>
+            </a:r>
+          </a:p>
+          <a:p>
+            <a:pPr lvl="2" indent="-342900">
               <a:buFont typeface="+mj-lt"/>
-              <a:buAutoNum type="arabicPeriod" startAt="3"/>
+              <a:buAutoNum type="arabicPeriod"/>
             </a:pPr>
-            <a:endParaRPr lang="de-DE" dirty="0"/>
+            <a:r>
+              <a:rPr lang="de-DE" dirty="0" smtClean="0"/>
+              <a:t>Defekte Hardware</a:t>
+            </a:r>
+          </a:p>
+          <a:p>
+            <a:pPr lvl="2" indent="-342900">
+              <a:buFont typeface="+mj-lt"/>
+              <a:buAutoNum type="arabicPeriod"/>
+            </a:pPr>
+            <a:r>
+              <a:rPr lang="de-DE" dirty="0" smtClean="0"/>
+              <a:t>Rechenknoten nicht erreichbar (ping/</a:t>
+            </a:r>
+            <a:r>
+              <a:rPr lang="de-DE" dirty="0" err="1" smtClean="0"/>
+              <a:t>ssh</a:t>
+            </a:r>
+            <a:r>
+              <a:rPr lang="de-DE" dirty="0" smtClean="0"/>
+              <a:t>)</a:t>
+            </a:r>
+          </a:p>
+          <a:p>
+            <a:pPr lvl="2" indent="-342900">
+              <a:buFont typeface="+mj-lt"/>
+              <a:buAutoNum type="arabicPeriod"/>
+            </a:pPr>
+            <a:r>
+              <a:rPr lang="de-DE" dirty="0" smtClean="0"/>
+              <a:t>Geteiltes Verzeichnis nicht eingehängt</a:t>
+            </a:r>
+          </a:p>
+          <a:p>
+            <a:pPr lvl="2" indent="-342900">
+              <a:buFont typeface="+mj-lt"/>
+              <a:buAutoNum type="arabicPeriod"/>
+            </a:pPr>
+            <a:r>
+              <a:rPr lang="de-DE" dirty="0" err="1" smtClean="0"/>
+              <a:t>Bash</a:t>
+            </a:r>
+            <a:r>
+              <a:rPr lang="de-DE" dirty="0" smtClean="0"/>
+              <a:t>-Befehle werden nicht erkannt</a:t>
+            </a:r>
+          </a:p>
+          <a:p>
+            <a:pPr marL="400050" lvl="1" indent="0">
+              <a:buNone/>
+            </a:pPr>
+            <a:r>
+              <a:rPr lang="de-DE" b="1" dirty="0" smtClean="0"/>
+              <a:t>3.2 Ziele </a:t>
+            </a:r>
+            <a:r>
+              <a:rPr lang="de-DE" b="1" dirty="0"/>
+              <a:t>Versuchsaufbau </a:t>
+            </a:r>
+            <a:endParaRPr lang="de-DE" b="1" dirty="0" smtClean="0"/>
+          </a:p>
+          <a:p>
+            <a:pPr lvl="2" indent="-342900">
+              <a:buFont typeface="+mj-lt"/>
+              <a:buAutoNum type="arabicPeriod"/>
+            </a:pPr>
+            <a:r>
+              <a:rPr lang="de-DE" dirty="0" smtClean="0"/>
+              <a:t>Parallele Ausführung der Benchmark-Programme auf </a:t>
+            </a:r>
+            <a:r>
+              <a:rPr lang="de-DE" dirty="0" err="1" smtClean="0"/>
+              <a:t>n</a:t>
+            </a:r>
+            <a:r>
+              <a:rPr lang="de-DE" dirty="0" smtClean="0"/>
+              <a:t> – 4 Rechenknoten (maximal 19 Rechenknoten, da: pi03 als Berechnungsknoten definiert/minimal 4 Rechenknoten, da: HPL benötigt mindestens 4)</a:t>
+            </a:r>
+          </a:p>
+          <a:p>
+            <a:pPr lvl="2" indent="-342900">
+              <a:buFont typeface="+mj-lt"/>
+              <a:buAutoNum type="arabicPeriod"/>
+            </a:pPr>
+            <a:r>
+              <a:rPr lang="de-DE" dirty="0" smtClean="0"/>
+              <a:t>Zwei Messreihen pro Benchmark: Messreihe 1 (alle </a:t>
+            </a:r>
+            <a:r>
+              <a:rPr lang="de-DE" dirty="0" err="1" smtClean="0"/>
+              <a:t>Raspberry</a:t>
+            </a:r>
+            <a:r>
+              <a:rPr lang="de-DE" dirty="0" smtClean="0"/>
+              <a:t> Pis angeschaltet)/Messreihe 2 (nicht aktive </a:t>
+            </a:r>
+            <a:r>
+              <a:rPr lang="de-DE" dirty="0" err="1" smtClean="0"/>
+              <a:t>Raspberry</a:t>
+            </a:r>
+            <a:r>
+              <a:rPr lang="de-DE" dirty="0"/>
+              <a:t> </a:t>
+            </a:r>
+            <a:r>
+              <a:rPr lang="de-DE" dirty="0" smtClean="0"/>
+              <a:t>Pis werden heruntergefahren und von Stromversorgung getrennt) </a:t>
+            </a:r>
+          </a:p>
+          <a:p>
+            <a:pPr lvl="2" indent="-342900">
+              <a:buFont typeface="+mj-lt"/>
+              <a:buAutoNum type="arabicPeriod"/>
+            </a:pPr>
+            <a:r>
+              <a:rPr lang="de-DE" dirty="0" smtClean="0"/>
+              <a:t>Auswertung Strommessgerät</a:t>
+            </a:r>
+          </a:p>
+          <a:p>
+            <a:pPr lvl="2" indent="-342900">
+              <a:buFont typeface="+mj-lt"/>
+              <a:buAutoNum type="arabicPeriod"/>
+            </a:pPr>
+            <a:r>
+              <a:rPr lang="de-DE" dirty="0" smtClean="0"/>
+              <a:t>Automatisierte Durchführung der Messungen</a:t>
+            </a:r>
+          </a:p>
+          <a:p>
+            <a:pPr lvl="2" indent="-342900">
+              <a:buFont typeface="+mj-lt"/>
+              <a:buAutoNum type="arabicPeriod"/>
+            </a:pPr>
+            <a:r>
+              <a:rPr lang="de-DE" dirty="0" smtClean="0"/>
+              <a:t>Protokollierung und grafische Aufbereitung der Messwerte</a:t>
+            </a:r>
           </a:p>
         </p:txBody>
       </p:sp>
@@ -3468,6 +4872,1521 @@
     <p:extLst>
       <p:ext uri="{BB962C8B-B14F-4D97-AF65-F5344CB8AC3E}">
         <p14:creationId xmlns:p14="http://schemas.microsoft.com/office/powerpoint/2010/main" val="557452951"/>
+      </p:ext>
+    </p:extLst>
+  </p:cSld>
+  <p:clrMapOvr>
+    <a:masterClrMapping/>
+  </p:clrMapOvr>
+  <p:transition xmlns:p14="http://schemas.microsoft.com/office/powerpoint/2010/main" spd="med"/>
+</p:sld>
+</file>
+
+<file path=ppt/slides/slide12.xml><?xml version="1.0" encoding="utf-8"?>
+<p:sld xmlns:a="http://schemas.openxmlformats.org/drawingml/2006/main" xmlns:r="http://schemas.openxmlformats.org/officeDocument/2006/relationships" xmlns:p="http://schemas.openxmlformats.org/presentationml/2006/main">
+  <p:cSld>
+    <p:spTree>
+      <p:nvGrpSpPr>
+        <p:cNvPr id="1" name=""/>
+        <p:cNvGrpSpPr/>
+        <p:nvPr/>
+      </p:nvGrpSpPr>
+      <p:grpSpPr>
+        <a:xfrm>
+          <a:off x="0" y="0"/>
+          <a:ext cx="0" cy="0"/>
+          <a:chOff x="0" y="0"/>
+          <a:chExt cx="0" cy="0"/>
+        </a:xfrm>
+      </p:grpSpPr>
+      <p:sp>
+        <p:nvSpPr>
+          <p:cNvPr id="2" name="Titel 1"/>
+          <p:cNvSpPr>
+            <a:spLocks noGrp="1"/>
+          </p:cNvSpPr>
+          <p:nvPr>
+            <p:ph type="title"/>
+          </p:nvPr>
+        </p:nvSpPr>
+        <p:spPr/>
+        <p:txBody>
+          <a:bodyPr/>
+          <a:lstStyle/>
+          <a:p>
+            <a:r>
+              <a:rPr lang="de-DE" sz="1800" dirty="0" smtClean="0"/>
+              <a:t>Versuchsdurchführung	</a:t>
+            </a:r>
+            <a:endParaRPr lang="de-DE" sz="1800" dirty="0"/>
+          </a:p>
+        </p:txBody>
+      </p:sp>
+      <p:sp>
+        <p:nvSpPr>
+          <p:cNvPr id="3" name="Inhaltsplatzhalter 2"/>
+          <p:cNvSpPr>
+            <a:spLocks noGrp="1"/>
+          </p:cNvSpPr>
+          <p:nvPr>
+            <p:ph idx="1"/>
+          </p:nvPr>
+        </p:nvSpPr>
+        <p:spPr/>
+        <p:txBody>
+          <a:bodyPr/>
+          <a:lstStyle/>
+          <a:p>
+            <a:pPr marL="400050" lvl="1" indent="0">
+              <a:buNone/>
+            </a:pPr>
+            <a:r>
+              <a:rPr lang="de-DE" b="1" dirty="0" smtClean="0"/>
+              <a:t>3.3 Umsetzung der Ziele</a:t>
+            </a:r>
+          </a:p>
+          <a:p>
+            <a:pPr lvl="2" indent="-342900">
+              <a:buFont typeface="+mj-lt"/>
+              <a:buAutoNum type="arabicPeriod"/>
+            </a:pPr>
+            <a:r>
+              <a:rPr lang="de-DE" b="1" dirty="0" smtClean="0"/>
+              <a:t>Parallele Ausführung der Benchmark-Programme</a:t>
+            </a:r>
+            <a:endParaRPr lang="de-DE" dirty="0" smtClean="0"/>
+          </a:p>
+          <a:p>
+            <a:pPr marL="800100" lvl="2" indent="0">
+              <a:buNone/>
+            </a:pPr>
+            <a:r>
+              <a:rPr lang="de-DE" dirty="0"/>
+              <a:t>	</a:t>
+            </a:r>
+            <a:r>
+              <a:rPr lang="de-DE" dirty="0" smtClean="0"/>
+              <a:t>MPICH mit </a:t>
+            </a:r>
+            <a:r>
+              <a:rPr lang="de-DE" dirty="0" err="1" smtClean="0"/>
+              <a:t>mpiexec</a:t>
+            </a:r>
+            <a:r>
+              <a:rPr lang="de-DE" dirty="0" smtClean="0"/>
+              <a:t> und </a:t>
+            </a:r>
+            <a:r>
+              <a:rPr lang="de-DE" dirty="0" err="1" smtClean="0"/>
+              <a:t>Machinefile</a:t>
+            </a:r>
+            <a:endParaRPr lang="de-DE" dirty="0"/>
+          </a:p>
+          <a:p>
+            <a:pPr lvl="2" indent="-342900">
+              <a:buFont typeface="+mj-lt"/>
+              <a:buAutoNum type="arabicPeriod" startAt="2"/>
+            </a:pPr>
+            <a:r>
+              <a:rPr lang="de-DE" b="1" dirty="0"/>
+              <a:t>Zwei Messreihen pro </a:t>
+            </a:r>
+            <a:r>
+              <a:rPr lang="de-DE" b="1" dirty="0" smtClean="0"/>
+              <a:t>Benchmark</a:t>
+            </a:r>
+            <a:endParaRPr lang="de-DE" dirty="0" smtClean="0"/>
+          </a:p>
+          <a:p>
+            <a:pPr marL="800100" lvl="2" indent="0">
+              <a:buNone/>
+            </a:pPr>
+            <a:r>
+              <a:rPr lang="de-DE" dirty="0"/>
+              <a:t>	</a:t>
+            </a:r>
+            <a:r>
+              <a:rPr lang="de-DE" dirty="0" smtClean="0"/>
+              <a:t>Realisierung durch </a:t>
+            </a:r>
+            <a:r>
+              <a:rPr lang="de-DE" dirty="0" err="1" smtClean="0"/>
+              <a:t>Shellskripte</a:t>
+            </a:r>
+            <a:endParaRPr lang="de-DE" dirty="0"/>
+          </a:p>
+          <a:p>
+            <a:pPr lvl="2" indent="-342900">
+              <a:buFont typeface="+mj-lt"/>
+              <a:buAutoNum type="arabicPeriod" startAt="3"/>
+            </a:pPr>
+            <a:r>
+              <a:rPr lang="de-DE" b="1" dirty="0"/>
+              <a:t>Auswertung </a:t>
+            </a:r>
+            <a:r>
+              <a:rPr lang="de-DE" b="1" dirty="0" smtClean="0"/>
+              <a:t>Strommessgerät</a:t>
+            </a:r>
+          </a:p>
+          <a:p>
+            <a:pPr marL="800100" lvl="2" indent="0">
+              <a:buNone/>
+            </a:pPr>
+            <a:r>
+              <a:rPr lang="de-DE" b="1" dirty="0"/>
+              <a:t>	</a:t>
+            </a:r>
+            <a:r>
+              <a:rPr lang="de-DE" dirty="0" smtClean="0"/>
+              <a:t>Realisierung durch Auswertung der </a:t>
+            </a:r>
+            <a:r>
+              <a:rPr lang="de-DE" dirty="0" err="1" smtClean="0"/>
+              <a:t>SQLite</a:t>
+            </a:r>
+            <a:r>
+              <a:rPr lang="de-DE" dirty="0" smtClean="0"/>
+              <a:t>-Datenbank auf Windows-VM </a:t>
+            </a:r>
+            <a:endParaRPr lang="de-DE" b="1" dirty="0"/>
+          </a:p>
+          <a:p>
+            <a:pPr lvl="2" indent="-342900">
+              <a:buFont typeface="+mj-lt"/>
+              <a:buAutoNum type="arabicPeriod" startAt="4"/>
+            </a:pPr>
+            <a:r>
+              <a:rPr lang="de-DE" b="1" dirty="0"/>
+              <a:t>Automatisierte Durchführung der </a:t>
+            </a:r>
+            <a:r>
+              <a:rPr lang="de-DE" b="1" dirty="0" smtClean="0"/>
+              <a:t>Messungen</a:t>
+            </a:r>
+            <a:endParaRPr lang="de-DE" dirty="0" smtClean="0"/>
+          </a:p>
+          <a:p>
+            <a:pPr marL="800100" lvl="2" indent="0">
+              <a:buNone/>
+            </a:pPr>
+            <a:r>
+              <a:rPr lang="de-DE" dirty="0"/>
+              <a:t>	</a:t>
+            </a:r>
+            <a:r>
+              <a:rPr lang="de-DE" dirty="0" smtClean="0"/>
+              <a:t>Realisierung durch </a:t>
+            </a:r>
+            <a:r>
+              <a:rPr lang="de-DE" dirty="0" err="1" smtClean="0"/>
+              <a:t>Shellskripte</a:t>
+            </a:r>
+            <a:r>
+              <a:rPr lang="de-DE" dirty="0" smtClean="0"/>
+              <a:t> (Schwerpunkt HERE-Files zur Navigation zwischen 	Server und Rechenknoten mit verschiedenen Benutzern)</a:t>
+            </a:r>
+            <a:endParaRPr lang="de-DE" dirty="0"/>
+          </a:p>
+          <a:p>
+            <a:pPr lvl="2" indent="-342900">
+              <a:buFont typeface="+mj-lt"/>
+              <a:buAutoNum type="arabicPeriod" startAt="4"/>
+            </a:pPr>
+            <a:r>
+              <a:rPr lang="de-DE" b="1" dirty="0"/>
+              <a:t>Protokollierung und grafische Aufbereitung der </a:t>
+            </a:r>
+            <a:r>
+              <a:rPr lang="de-DE" b="1" dirty="0" smtClean="0"/>
+              <a:t>Messwerte</a:t>
+            </a:r>
+            <a:endParaRPr lang="de-DE" dirty="0"/>
+          </a:p>
+          <a:p>
+            <a:pPr marL="800100" lvl="2" indent="0">
+              <a:buNone/>
+            </a:pPr>
+            <a:r>
+              <a:rPr lang="de-DE" dirty="0" smtClean="0"/>
+              <a:t>	Realisierung durch </a:t>
+            </a:r>
+            <a:r>
+              <a:rPr lang="de-DE" dirty="0" err="1" smtClean="0"/>
+              <a:t>Shellskripte</a:t>
+            </a:r>
+            <a:r>
+              <a:rPr lang="de-DE" dirty="0" smtClean="0"/>
+              <a:t> (Schwerpunkt Kommandozeilen-MySQL); 	Anpassung des gegebenen DB-Schemas an reale Gegebenheiten (</a:t>
+            </a:r>
+            <a:r>
+              <a:rPr lang="de-DE" dirty="0" err="1" smtClean="0"/>
+              <a:t>Proof</a:t>
+            </a:r>
+            <a:r>
+              <a:rPr lang="de-DE" dirty="0" smtClean="0"/>
+              <a:t> </a:t>
+            </a:r>
+            <a:r>
+              <a:rPr lang="de-DE" dirty="0" err="1" smtClean="0"/>
+              <a:t>of</a:t>
+            </a:r>
+            <a:r>
+              <a:rPr lang="de-DE" dirty="0" smtClean="0"/>
+              <a:t> 	</a:t>
+            </a:r>
+            <a:r>
+              <a:rPr lang="de-DE" dirty="0" err="1" smtClean="0"/>
+              <a:t>Concept</a:t>
+            </a:r>
+            <a:r>
+              <a:rPr lang="de-DE" dirty="0" smtClean="0"/>
+              <a:t>); </a:t>
+            </a:r>
+            <a:r>
+              <a:rPr lang="de-DE" dirty="0" err="1" smtClean="0"/>
+              <a:t>Gnuplot</a:t>
+            </a:r>
+            <a:endParaRPr lang="de-DE" b="1" dirty="0" smtClean="0"/>
+          </a:p>
+          <a:p>
+            <a:pPr lvl="2" indent="-342900">
+              <a:buFont typeface="+mj-lt"/>
+              <a:buAutoNum type="arabicPeriod" startAt="4"/>
+            </a:pPr>
+            <a:r>
+              <a:rPr lang="de-DE" b="1" dirty="0" smtClean="0"/>
+              <a:t>Integration der Fehlerbehebung in Versuchsdurchführung </a:t>
+            </a:r>
+          </a:p>
+          <a:p>
+            <a:pPr marL="800100" lvl="2" indent="0">
+              <a:buNone/>
+            </a:pPr>
+            <a:r>
+              <a:rPr lang="de-DE" dirty="0" smtClean="0"/>
+              <a:t>	Realisierung durch </a:t>
+            </a:r>
+            <a:r>
+              <a:rPr lang="de-DE" dirty="0" err="1" smtClean="0"/>
+              <a:t>Shellskripte</a:t>
+            </a:r>
+            <a:r>
+              <a:rPr lang="de-DE" dirty="0" smtClean="0"/>
+              <a:t>; Aufsichtsperson</a:t>
+            </a:r>
+            <a:r>
+              <a:rPr lang="de-DE" b="1" dirty="0" smtClean="0"/>
+              <a:t> </a:t>
+            </a:r>
+            <a:endParaRPr lang="de-DE" b="1" dirty="0"/>
+          </a:p>
+          <a:p>
+            <a:pPr marL="400050" lvl="1" indent="0">
+              <a:buNone/>
+            </a:pPr>
+            <a:endParaRPr lang="de-DE" dirty="0" smtClean="0"/>
+          </a:p>
+        </p:txBody>
+      </p:sp>
+      <p:sp>
+        <p:nvSpPr>
+          <p:cNvPr id="4" name="Foliennummernplatzhalter 3"/>
+          <p:cNvSpPr>
+            <a:spLocks noGrp="1"/>
+          </p:cNvSpPr>
+          <p:nvPr>
+            <p:ph type="sldNum" sz="quarter" idx="4"/>
+          </p:nvPr>
+        </p:nvSpPr>
+        <p:spPr/>
+        <p:txBody>
+          <a:bodyPr/>
+          <a:lstStyle/>
+          <a:p>
+            <a:pPr>
+              <a:defRPr/>
+            </a:pPr>
+            <a:fld id="{70BFFA52-4234-45F6-B1A6-074E24FF43A2}" type="slidenum">
+              <a:rPr lang="de-DE" smtClean="0"/>
+              <a:pPr>
+                <a:defRPr/>
+              </a:pPr>
+              <a:t>12</a:t>
+            </a:fld>
+            <a:endParaRPr lang="de-DE" dirty="0"/>
+          </a:p>
+        </p:txBody>
+      </p:sp>
+      <p:sp>
+        <p:nvSpPr>
+          <p:cNvPr id="5" name="Fußzeilenplatzhalter 4"/>
+          <p:cNvSpPr>
+            <a:spLocks noGrp="1"/>
+          </p:cNvSpPr>
+          <p:nvPr>
+            <p:ph type="ftr" sz="quarter" idx="3"/>
+          </p:nvPr>
+        </p:nvSpPr>
+        <p:spPr/>
+        <p:txBody>
+          <a:bodyPr/>
+          <a:lstStyle/>
+          <a:p>
+            <a:r>
+              <a:rPr lang="de-DE" dirty="0" smtClean="0"/>
+              <a:t>Skalierungsverhalten eines </a:t>
+            </a:r>
+            <a:r>
+              <a:rPr lang="de-DE" dirty="0" err="1" smtClean="0"/>
+              <a:t>Raspberry</a:t>
+            </a:r>
+            <a:r>
+              <a:rPr lang="de-DE" dirty="0" smtClean="0"/>
+              <a:t> Pi-Clusters mit HPC-Benchmarks</a:t>
+            </a:r>
+            <a:endParaRPr lang="de-DE" dirty="0"/>
+          </a:p>
+        </p:txBody>
+      </p:sp>
+    </p:spTree>
+    <p:extLst>
+      <p:ext uri="{BB962C8B-B14F-4D97-AF65-F5344CB8AC3E}">
+        <p14:creationId xmlns:p14="http://schemas.microsoft.com/office/powerpoint/2010/main" val="573136144"/>
+      </p:ext>
+    </p:extLst>
+  </p:cSld>
+  <p:clrMapOvr>
+    <a:masterClrMapping/>
+  </p:clrMapOvr>
+  <p:transition xmlns:p14="http://schemas.microsoft.com/office/powerpoint/2010/main" spd="med"/>
+</p:sld>
+</file>
+
+<file path=ppt/slides/slide13.xml><?xml version="1.0" encoding="utf-8"?>
+<p:sld xmlns:a="http://schemas.openxmlformats.org/drawingml/2006/main" xmlns:r="http://schemas.openxmlformats.org/officeDocument/2006/relationships" xmlns:p="http://schemas.openxmlformats.org/presentationml/2006/main">
+  <p:cSld>
+    <p:spTree>
+      <p:nvGrpSpPr>
+        <p:cNvPr id="1" name=""/>
+        <p:cNvGrpSpPr/>
+        <p:nvPr/>
+      </p:nvGrpSpPr>
+      <p:grpSpPr>
+        <a:xfrm>
+          <a:off x="0" y="0"/>
+          <a:ext cx="0" cy="0"/>
+          <a:chOff x="0" y="0"/>
+          <a:chExt cx="0" cy="0"/>
+        </a:xfrm>
+      </p:grpSpPr>
+      <p:sp>
+        <p:nvSpPr>
+          <p:cNvPr id="2" name="Titel 1"/>
+          <p:cNvSpPr>
+            <a:spLocks noGrp="1"/>
+          </p:cNvSpPr>
+          <p:nvPr>
+            <p:ph type="title"/>
+          </p:nvPr>
+        </p:nvSpPr>
+        <p:spPr/>
+        <p:txBody>
+          <a:bodyPr/>
+          <a:lstStyle/>
+          <a:p>
+            <a:r>
+              <a:rPr lang="de-DE" sz="1800" dirty="0" smtClean="0"/>
+              <a:t>Versuchsdurchführung: Aktivitätsdiagramm einer </a:t>
+            </a:r>
+            <a:r>
+              <a:rPr lang="de-DE" sz="1800" dirty="0" err="1" smtClean="0"/>
+              <a:t>ExperimentSuite</a:t>
+            </a:r>
+            <a:r>
+              <a:rPr lang="de-DE" sz="1800" dirty="0" smtClean="0"/>
+              <a:t>	</a:t>
+            </a:r>
+            <a:endParaRPr lang="de-DE" sz="1800" dirty="0"/>
+          </a:p>
+        </p:txBody>
+      </p:sp>
+      <p:pic>
+        <p:nvPicPr>
+          <p:cNvPr id="6" name="Inhaltsplatzhalter 5" descr="aktivitaetsdiagramm1.pdf"/>
+          <p:cNvPicPr>
+            <a:picLocks noGrp="1" noChangeAspect="1"/>
+          </p:cNvPicPr>
+          <p:nvPr>
+            <p:ph idx="1"/>
+          </p:nvPr>
+        </p:nvPicPr>
+        <p:blipFill>
+          <a:blip r:embed="rId3">
+            <a:extLst>
+              <a:ext uri="{28A0092B-C50C-407E-A947-70E740481C1C}">
+                <a14:useLocalDpi xmlns:a14="http://schemas.microsoft.com/office/drawing/2010/main" val="0"/>
+              </a:ext>
+            </a:extLst>
+          </a:blip>
+          <a:srcRect l="-16314" r="-16314"/>
+          <a:stretch>
+            <a:fillRect/>
+          </a:stretch>
+        </p:blipFill>
+        <p:spPr>
+          <a:xfrm>
+            <a:off x="287524" y="1340768"/>
+            <a:ext cx="8666222" cy="4900641"/>
+          </a:xfrm>
+        </p:spPr>
+      </p:pic>
+      <p:sp>
+        <p:nvSpPr>
+          <p:cNvPr id="4" name="Foliennummernplatzhalter 3"/>
+          <p:cNvSpPr>
+            <a:spLocks noGrp="1"/>
+          </p:cNvSpPr>
+          <p:nvPr>
+            <p:ph type="sldNum" sz="quarter" idx="4"/>
+          </p:nvPr>
+        </p:nvSpPr>
+        <p:spPr/>
+        <p:txBody>
+          <a:bodyPr/>
+          <a:lstStyle/>
+          <a:p>
+            <a:pPr>
+              <a:defRPr/>
+            </a:pPr>
+            <a:fld id="{70BFFA52-4234-45F6-B1A6-074E24FF43A2}" type="slidenum">
+              <a:rPr lang="de-DE" smtClean="0"/>
+              <a:pPr>
+                <a:defRPr/>
+              </a:pPr>
+              <a:t>13</a:t>
+            </a:fld>
+            <a:endParaRPr lang="de-DE" dirty="0"/>
+          </a:p>
+        </p:txBody>
+      </p:sp>
+      <p:sp>
+        <p:nvSpPr>
+          <p:cNvPr id="5" name="Fußzeilenplatzhalter 4"/>
+          <p:cNvSpPr>
+            <a:spLocks noGrp="1"/>
+          </p:cNvSpPr>
+          <p:nvPr>
+            <p:ph type="ftr" sz="quarter" idx="3"/>
+          </p:nvPr>
+        </p:nvSpPr>
+        <p:spPr/>
+        <p:txBody>
+          <a:bodyPr/>
+          <a:lstStyle/>
+          <a:p>
+            <a:r>
+              <a:rPr lang="de-DE" dirty="0" smtClean="0"/>
+              <a:t>Skalierungsverhalten eines </a:t>
+            </a:r>
+            <a:r>
+              <a:rPr lang="de-DE" dirty="0" err="1" smtClean="0"/>
+              <a:t>Raspberry</a:t>
+            </a:r>
+            <a:r>
+              <a:rPr lang="de-DE" dirty="0" smtClean="0"/>
+              <a:t> Pi-Clusters mit HPC-Benchmarks</a:t>
+            </a:r>
+            <a:endParaRPr lang="de-DE" dirty="0"/>
+          </a:p>
+        </p:txBody>
+      </p:sp>
+    </p:spTree>
+    <p:extLst>
+      <p:ext uri="{BB962C8B-B14F-4D97-AF65-F5344CB8AC3E}">
+        <p14:creationId xmlns:p14="http://schemas.microsoft.com/office/powerpoint/2010/main" val="4032125368"/>
+      </p:ext>
+    </p:extLst>
+  </p:cSld>
+  <p:clrMapOvr>
+    <a:masterClrMapping/>
+  </p:clrMapOvr>
+  <p:transition xmlns:p14="http://schemas.microsoft.com/office/powerpoint/2010/main" spd="med"/>
+</p:sld>
+</file>
+
+<file path=ppt/slides/slide14.xml><?xml version="1.0" encoding="utf-8"?>
+<p:sld xmlns:a="http://schemas.openxmlformats.org/drawingml/2006/main" xmlns:r="http://schemas.openxmlformats.org/officeDocument/2006/relationships" xmlns:p="http://schemas.openxmlformats.org/presentationml/2006/main">
+  <p:cSld>
+    <p:spTree>
+      <p:nvGrpSpPr>
+        <p:cNvPr id="1" name=""/>
+        <p:cNvGrpSpPr/>
+        <p:nvPr/>
+      </p:nvGrpSpPr>
+      <p:grpSpPr>
+        <a:xfrm>
+          <a:off x="0" y="0"/>
+          <a:ext cx="0" cy="0"/>
+          <a:chOff x="0" y="0"/>
+          <a:chExt cx="0" cy="0"/>
+        </a:xfrm>
+      </p:grpSpPr>
+      <p:sp>
+        <p:nvSpPr>
+          <p:cNvPr id="2" name="Titel 1"/>
+          <p:cNvSpPr>
+            <a:spLocks noGrp="1"/>
+          </p:cNvSpPr>
+          <p:nvPr>
+            <p:ph type="title"/>
+          </p:nvPr>
+        </p:nvSpPr>
+        <p:spPr/>
+        <p:txBody>
+          <a:bodyPr/>
+          <a:lstStyle/>
+          <a:p>
+            <a:r>
+              <a:rPr lang="de-DE" sz="1800" dirty="0" smtClean="0"/>
+              <a:t>Versuchsdurchführung: Aktivitätsdiagramm einer Strommessung</a:t>
+            </a:r>
+            <a:endParaRPr lang="de-DE" sz="1800" dirty="0"/>
+          </a:p>
+        </p:txBody>
+      </p:sp>
+      <p:pic>
+        <p:nvPicPr>
+          <p:cNvPr id="6" name="Inhaltsplatzhalter 5"/>
+          <p:cNvPicPr>
+            <a:picLocks noGrp="1" noChangeAspect="1"/>
+          </p:cNvPicPr>
+          <p:nvPr>
+            <p:ph idx="1"/>
+          </p:nvPr>
+        </p:nvPicPr>
+        <p:blipFill rotWithShape="1">
+          <a:blip r:embed="rId3">
+            <a:extLst>
+              <a:ext uri="{28A0092B-C50C-407E-A947-70E740481C1C}">
+                <a14:useLocalDpi xmlns:a14="http://schemas.microsoft.com/office/drawing/2010/main" val="0"/>
+              </a:ext>
+            </a:extLst>
+          </a:blip>
+          <a:srcRect l="-7175" t="-3002" r="-6803" b="-3023"/>
+          <a:stretch/>
+        </p:blipFill>
+        <p:spPr>
+          <a:xfrm>
+            <a:off x="836083" y="1333501"/>
+            <a:ext cx="7447492" cy="5195888"/>
+          </a:xfrm>
+        </p:spPr>
+      </p:pic>
+      <p:sp>
+        <p:nvSpPr>
+          <p:cNvPr id="4" name="Foliennummernplatzhalter 3"/>
+          <p:cNvSpPr>
+            <a:spLocks noGrp="1"/>
+          </p:cNvSpPr>
+          <p:nvPr>
+            <p:ph type="sldNum" sz="quarter" idx="4"/>
+          </p:nvPr>
+        </p:nvSpPr>
+        <p:spPr/>
+        <p:txBody>
+          <a:bodyPr/>
+          <a:lstStyle/>
+          <a:p>
+            <a:pPr>
+              <a:defRPr/>
+            </a:pPr>
+            <a:fld id="{70BFFA52-4234-45F6-B1A6-074E24FF43A2}" type="slidenum">
+              <a:rPr lang="de-DE" smtClean="0"/>
+              <a:pPr>
+                <a:defRPr/>
+              </a:pPr>
+              <a:t>14</a:t>
+            </a:fld>
+            <a:endParaRPr lang="de-DE" dirty="0"/>
+          </a:p>
+        </p:txBody>
+      </p:sp>
+      <p:sp>
+        <p:nvSpPr>
+          <p:cNvPr id="5" name="Fußzeilenplatzhalter 4"/>
+          <p:cNvSpPr>
+            <a:spLocks noGrp="1"/>
+          </p:cNvSpPr>
+          <p:nvPr>
+            <p:ph type="ftr" sz="quarter" idx="3"/>
+          </p:nvPr>
+        </p:nvSpPr>
+        <p:spPr/>
+        <p:txBody>
+          <a:bodyPr/>
+          <a:lstStyle/>
+          <a:p>
+            <a:r>
+              <a:rPr lang="de-DE" dirty="0" smtClean="0"/>
+              <a:t>Skalierungsverhalten eines </a:t>
+            </a:r>
+            <a:r>
+              <a:rPr lang="de-DE" dirty="0" err="1" smtClean="0"/>
+              <a:t>Raspberry</a:t>
+            </a:r>
+            <a:r>
+              <a:rPr lang="de-DE" dirty="0" smtClean="0"/>
+              <a:t> Pi-Clusters mit HPC-Benchmarks</a:t>
+            </a:r>
+            <a:endParaRPr lang="de-DE" dirty="0"/>
+          </a:p>
+        </p:txBody>
+      </p:sp>
+    </p:spTree>
+    <p:extLst>
+      <p:ext uri="{BB962C8B-B14F-4D97-AF65-F5344CB8AC3E}">
+        <p14:creationId xmlns:p14="http://schemas.microsoft.com/office/powerpoint/2010/main" val="1019741702"/>
+      </p:ext>
+    </p:extLst>
+  </p:cSld>
+  <p:clrMapOvr>
+    <a:masterClrMapping/>
+  </p:clrMapOvr>
+  <p:transition xmlns:p14="http://schemas.microsoft.com/office/powerpoint/2010/main" spd="med"/>
+</p:sld>
+</file>
+
+<file path=ppt/slides/slide15.xml><?xml version="1.0" encoding="utf-8"?>
+<p:sld xmlns:a="http://schemas.openxmlformats.org/drawingml/2006/main" xmlns:r="http://schemas.openxmlformats.org/officeDocument/2006/relationships" xmlns:p="http://schemas.openxmlformats.org/presentationml/2006/main">
+  <p:cSld>
+    <p:spTree>
+      <p:nvGrpSpPr>
+        <p:cNvPr id="1" name=""/>
+        <p:cNvGrpSpPr/>
+        <p:nvPr/>
+      </p:nvGrpSpPr>
+      <p:grpSpPr>
+        <a:xfrm>
+          <a:off x="0" y="0"/>
+          <a:ext cx="0" cy="0"/>
+          <a:chOff x="0" y="0"/>
+          <a:chExt cx="0" cy="0"/>
+        </a:xfrm>
+      </p:grpSpPr>
+      <p:sp>
+        <p:nvSpPr>
+          <p:cNvPr id="2" name="Titel 1"/>
+          <p:cNvSpPr>
+            <a:spLocks noGrp="1"/>
+          </p:cNvSpPr>
+          <p:nvPr>
+            <p:ph type="title"/>
+          </p:nvPr>
+        </p:nvSpPr>
+        <p:spPr/>
+        <p:txBody>
+          <a:bodyPr/>
+          <a:lstStyle/>
+          <a:p>
+            <a:r>
+              <a:rPr lang="de-DE" sz="1800" dirty="0" smtClean="0"/>
+              <a:t>Ergebnisse: </a:t>
+            </a:r>
+            <a:r>
+              <a:rPr lang="de-DE" sz="1800" dirty="0" smtClean="0"/>
+              <a:t>Strommessung	</a:t>
+            </a:r>
+            <a:endParaRPr lang="de-DE" sz="1800" dirty="0"/>
+          </a:p>
+        </p:txBody>
+      </p:sp>
+      <p:sp>
+        <p:nvSpPr>
+          <p:cNvPr id="3" name="Inhaltsplatzhalter 2"/>
+          <p:cNvSpPr>
+            <a:spLocks noGrp="1"/>
+          </p:cNvSpPr>
+          <p:nvPr>
+            <p:ph idx="1"/>
+          </p:nvPr>
+        </p:nvSpPr>
+        <p:spPr/>
+        <p:txBody>
+          <a:bodyPr/>
+          <a:lstStyle/>
+          <a:p>
+            <a:pPr marL="457200" indent="-457200">
+              <a:buAutoNum type="arabicPeriod"/>
+            </a:pPr>
+            <a:r>
+              <a:rPr lang="de-DE" b="1" dirty="0" smtClean="0"/>
+              <a:t>Strommessung</a:t>
+            </a:r>
+          </a:p>
+          <a:p>
+            <a:pPr marL="400050" lvl="1" indent="0">
+              <a:buNone/>
+            </a:pPr>
+            <a:r>
+              <a:rPr lang="de-DE" b="1" dirty="0" smtClean="0"/>
+              <a:t>1.1 Erwartete Ergebnisse </a:t>
+            </a:r>
+          </a:p>
+          <a:p>
+            <a:pPr marL="685800" lvl="1"/>
+            <a:r>
+              <a:rPr lang="de-DE" dirty="0" smtClean="0"/>
+              <a:t>Gleichbleibender Stromverbrauch in Messreihe 1 (alle Rechenknoten angeschaltet)</a:t>
+            </a:r>
+          </a:p>
+          <a:p>
+            <a:pPr marL="685800" lvl="1"/>
+            <a:r>
+              <a:rPr lang="de-DE" dirty="0" smtClean="0"/>
+              <a:t>Linear abnehmender Stromverbrauch in Messreihe 2 (nicht aktive Rechenknoten werden heruntergefahren und von Stromversorgung getrennt)</a:t>
+            </a:r>
+            <a:endParaRPr lang="de-DE" b="1" dirty="0" smtClean="0"/>
+          </a:p>
+          <a:p>
+            <a:pPr marL="400050" lvl="1" indent="0">
+              <a:buNone/>
+            </a:pPr>
+            <a:r>
+              <a:rPr lang="de-DE" b="1" dirty="0" smtClean="0"/>
+              <a:t>1.2 Erzielte Ergebnisse</a:t>
+            </a:r>
+            <a:endParaRPr lang="de-DE" dirty="0" smtClean="0"/>
+          </a:p>
+          <a:p>
+            <a:pPr marL="685800" lvl="1"/>
+            <a:r>
+              <a:rPr lang="de-DE" dirty="0" smtClean="0"/>
+              <a:t>Erwartungsgemäßes Skalierungsverhalten des </a:t>
+            </a:r>
+            <a:r>
+              <a:rPr lang="de-DE" dirty="0" err="1" smtClean="0"/>
+              <a:t>Bramble</a:t>
+            </a:r>
+            <a:r>
+              <a:rPr lang="de-DE" dirty="0" smtClean="0"/>
+              <a:t> bzgl. Stromverbrauchs bei paralleler Ausführung von HPL und STREAM</a:t>
+            </a:r>
+          </a:p>
+        </p:txBody>
+      </p:sp>
+      <p:sp>
+        <p:nvSpPr>
+          <p:cNvPr id="4" name="Foliennummernplatzhalter 3"/>
+          <p:cNvSpPr>
+            <a:spLocks noGrp="1"/>
+          </p:cNvSpPr>
+          <p:nvPr>
+            <p:ph type="sldNum" sz="quarter" idx="4"/>
+          </p:nvPr>
+        </p:nvSpPr>
+        <p:spPr/>
+        <p:txBody>
+          <a:bodyPr/>
+          <a:lstStyle/>
+          <a:p>
+            <a:pPr>
+              <a:defRPr/>
+            </a:pPr>
+            <a:fld id="{70BFFA52-4234-45F6-B1A6-074E24FF43A2}" type="slidenum">
+              <a:rPr lang="de-DE" smtClean="0"/>
+              <a:pPr>
+                <a:defRPr/>
+              </a:pPr>
+              <a:t>15</a:t>
+            </a:fld>
+            <a:endParaRPr lang="de-DE" dirty="0"/>
+          </a:p>
+        </p:txBody>
+      </p:sp>
+      <p:sp>
+        <p:nvSpPr>
+          <p:cNvPr id="5" name="Fußzeilenplatzhalter 4"/>
+          <p:cNvSpPr>
+            <a:spLocks noGrp="1"/>
+          </p:cNvSpPr>
+          <p:nvPr>
+            <p:ph type="ftr" sz="quarter" idx="3"/>
+          </p:nvPr>
+        </p:nvSpPr>
+        <p:spPr/>
+        <p:txBody>
+          <a:bodyPr/>
+          <a:lstStyle/>
+          <a:p>
+            <a:r>
+              <a:rPr lang="de-DE" dirty="0" smtClean="0"/>
+              <a:t>Skalierungsverhalten eines </a:t>
+            </a:r>
+            <a:r>
+              <a:rPr lang="de-DE" dirty="0" err="1" smtClean="0"/>
+              <a:t>Raspberry</a:t>
+            </a:r>
+            <a:r>
+              <a:rPr lang="de-DE" dirty="0" smtClean="0"/>
+              <a:t> Pi-Clusters mit HPC-Benchmarks</a:t>
+            </a:r>
+            <a:endParaRPr lang="de-DE" dirty="0"/>
+          </a:p>
+        </p:txBody>
+      </p:sp>
+    </p:spTree>
+    <p:extLst>
+      <p:ext uri="{BB962C8B-B14F-4D97-AF65-F5344CB8AC3E}">
+        <p14:creationId xmlns:p14="http://schemas.microsoft.com/office/powerpoint/2010/main" val="2160297191"/>
+      </p:ext>
+    </p:extLst>
+  </p:cSld>
+  <p:clrMapOvr>
+    <a:masterClrMapping/>
+  </p:clrMapOvr>
+  <p:transition xmlns:p14="http://schemas.microsoft.com/office/powerpoint/2010/main" spd="med"/>
+</p:sld>
+</file>
+
+<file path=ppt/slides/slide16.xml><?xml version="1.0" encoding="utf-8"?>
+<p:sld xmlns:a="http://schemas.openxmlformats.org/drawingml/2006/main" xmlns:r="http://schemas.openxmlformats.org/officeDocument/2006/relationships" xmlns:p="http://schemas.openxmlformats.org/presentationml/2006/main">
+  <p:cSld>
+    <p:spTree>
+      <p:nvGrpSpPr>
+        <p:cNvPr id="1" name=""/>
+        <p:cNvGrpSpPr/>
+        <p:nvPr/>
+      </p:nvGrpSpPr>
+      <p:grpSpPr>
+        <a:xfrm>
+          <a:off x="0" y="0"/>
+          <a:ext cx="0" cy="0"/>
+          <a:chOff x="0" y="0"/>
+          <a:chExt cx="0" cy="0"/>
+        </a:xfrm>
+      </p:grpSpPr>
+      <p:sp>
+        <p:nvSpPr>
+          <p:cNvPr id="2" name="Titel 1"/>
+          <p:cNvSpPr>
+            <a:spLocks noGrp="1"/>
+          </p:cNvSpPr>
+          <p:nvPr>
+            <p:ph type="title"/>
+          </p:nvPr>
+        </p:nvSpPr>
+        <p:spPr/>
+        <p:txBody>
+          <a:bodyPr/>
+          <a:lstStyle/>
+          <a:p>
+            <a:r>
+              <a:rPr lang="de-DE" sz="1800" dirty="0" smtClean="0"/>
+              <a:t>Ergebnisse Strommessung (HPL)	</a:t>
+            </a:r>
+            <a:endParaRPr lang="de-DE" sz="1800" dirty="0"/>
+          </a:p>
+        </p:txBody>
+      </p:sp>
+      <p:pic>
+        <p:nvPicPr>
+          <p:cNvPr id="6" name="Inhaltsplatzhalter 5" descr="strom6.pdf"/>
+          <p:cNvPicPr>
+            <a:picLocks noGrp="1" noChangeAspect="1"/>
+          </p:cNvPicPr>
+          <p:nvPr>
+            <p:ph idx="1"/>
+          </p:nvPr>
+        </p:nvPicPr>
+        <p:blipFill>
+          <a:blip r:embed="rId3">
+            <a:extLst>
+              <a:ext uri="{28A0092B-C50C-407E-A947-70E740481C1C}">
+                <a14:useLocalDpi xmlns:a14="http://schemas.microsoft.com/office/drawing/2010/main" val="0"/>
+              </a:ext>
+            </a:extLst>
+          </a:blip>
+          <a:srcRect l="-11893" r="-11893"/>
+          <a:stretch>
+            <a:fillRect/>
+          </a:stretch>
+        </p:blipFill>
+        <p:spPr/>
+      </p:pic>
+      <p:sp>
+        <p:nvSpPr>
+          <p:cNvPr id="4" name="Foliennummernplatzhalter 3"/>
+          <p:cNvSpPr>
+            <a:spLocks noGrp="1"/>
+          </p:cNvSpPr>
+          <p:nvPr>
+            <p:ph type="sldNum" sz="quarter" idx="4"/>
+          </p:nvPr>
+        </p:nvSpPr>
+        <p:spPr/>
+        <p:txBody>
+          <a:bodyPr/>
+          <a:lstStyle/>
+          <a:p>
+            <a:pPr>
+              <a:defRPr/>
+            </a:pPr>
+            <a:fld id="{70BFFA52-4234-45F6-B1A6-074E24FF43A2}" type="slidenum">
+              <a:rPr lang="de-DE" smtClean="0"/>
+              <a:pPr>
+                <a:defRPr/>
+              </a:pPr>
+              <a:t>16</a:t>
+            </a:fld>
+            <a:endParaRPr lang="de-DE" dirty="0"/>
+          </a:p>
+        </p:txBody>
+      </p:sp>
+      <p:sp>
+        <p:nvSpPr>
+          <p:cNvPr id="5" name="Fußzeilenplatzhalter 4"/>
+          <p:cNvSpPr>
+            <a:spLocks noGrp="1"/>
+          </p:cNvSpPr>
+          <p:nvPr>
+            <p:ph type="ftr" sz="quarter" idx="3"/>
+          </p:nvPr>
+        </p:nvSpPr>
+        <p:spPr/>
+        <p:txBody>
+          <a:bodyPr/>
+          <a:lstStyle/>
+          <a:p>
+            <a:r>
+              <a:rPr lang="de-DE" dirty="0" smtClean="0"/>
+              <a:t>Skalierungsverhalten eines </a:t>
+            </a:r>
+            <a:r>
+              <a:rPr lang="de-DE" dirty="0" err="1" smtClean="0"/>
+              <a:t>Raspberry</a:t>
+            </a:r>
+            <a:r>
+              <a:rPr lang="de-DE" dirty="0" smtClean="0"/>
+              <a:t> Pi-Clusters mit HPC-Benchmarks</a:t>
+            </a:r>
+            <a:endParaRPr lang="de-DE" dirty="0"/>
+          </a:p>
+        </p:txBody>
+      </p:sp>
+    </p:spTree>
+    <p:extLst>
+      <p:ext uri="{BB962C8B-B14F-4D97-AF65-F5344CB8AC3E}">
+        <p14:creationId xmlns:p14="http://schemas.microsoft.com/office/powerpoint/2010/main" val="2983223396"/>
+      </p:ext>
+    </p:extLst>
+  </p:cSld>
+  <p:clrMapOvr>
+    <a:masterClrMapping/>
+  </p:clrMapOvr>
+  <p:transition xmlns:p14="http://schemas.microsoft.com/office/powerpoint/2010/main" spd="med"/>
+</p:sld>
+</file>
+
+<file path=ppt/slides/slide17.xml><?xml version="1.0" encoding="utf-8"?>
+<p:sld xmlns:a="http://schemas.openxmlformats.org/drawingml/2006/main" xmlns:r="http://schemas.openxmlformats.org/officeDocument/2006/relationships" xmlns:p="http://schemas.openxmlformats.org/presentationml/2006/main">
+  <p:cSld>
+    <p:spTree>
+      <p:nvGrpSpPr>
+        <p:cNvPr id="1" name=""/>
+        <p:cNvGrpSpPr/>
+        <p:nvPr/>
+      </p:nvGrpSpPr>
+      <p:grpSpPr>
+        <a:xfrm>
+          <a:off x="0" y="0"/>
+          <a:ext cx="0" cy="0"/>
+          <a:chOff x="0" y="0"/>
+          <a:chExt cx="0" cy="0"/>
+        </a:xfrm>
+      </p:grpSpPr>
+      <p:sp>
+        <p:nvSpPr>
+          <p:cNvPr id="2" name="Titel 1"/>
+          <p:cNvSpPr>
+            <a:spLocks noGrp="1"/>
+          </p:cNvSpPr>
+          <p:nvPr>
+            <p:ph type="title"/>
+          </p:nvPr>
+        </p:nvSpPr>
+        <p:spPr/>
+        <p:txBody>
+          <a:bodyPr/>
+          <a:lstStyle/>
+          <a:p>
+            <a:r>
+              <a:rPr lang="de-DE" sz="1800" dirty="0" smtClean="0"/>
+              <a:t>Ergebnisse Strommessung (STREAM)	</a:t>
+            </a:r>
+            <a:endParaRPr lang="de-DE" sz="1800" dirty="0"/>
+          </a:p>
+        </p:txBody>
+      </p:sp>
+      <p:sp>
+        <p:nvSpPr>
+          <p:cNvPr id="4" name="Foliennummernplatzhalter 3"/>
+          <p:cNvSpPr>
+            <a:spLocks noGrp="1"/>
+          </p:cNvSpPr>
+          <p:nvPr>
+            <p:ph type="sldNum" sz="quarter" idx="4"/>
+          </p:nvPr>
+        </p:nvSpPr>
+        <p:spPr/>
+        <p:txBody>
+          <a:bodyPr/>
+          <a:lstStyle/>
+          <a:p>
+            <a:pPr>
+              <a:defRPr/>
+            </a:pPr>
+            <a:fld id="{70BFFA52-4234-45F6-B1A6-074E24FF43A2}" type="slidenum">
+              <a:rPr lang="de-DE" smtClean="0"/>
+              <a:pPr>
+                <a:defRPr/>
+              </a:pPr>
+              <a:t>17</a:t>
+            </a:fld>
+            <a:endParaRPr lang="de-DE" dirty="0"/>
+          </a:p>
+        </p:txBody>
+      </p:sp>
+      <p:sp>
+        <p:nvSpPr>
+          <p:cNvPr id="5" name="Fußzeilenplatzhalter 4"/>
+          <p:cNvSpPr>
+            <a:spLocks noGrp="1"/>
+          </p:cNvSpPr>
+          <p:nvPr>
+            <p:ph type="ftr" sz="quarter" idx="3"/>
+          </p:nvPr>
+        </p:nvSpPr>
+        <p:spPr/>
+        <p:txBody>
+          <a:bodyPr/>
+          <a:lstStyle/>
+          <a:p>
+            <a:r>
+              <a:rPr lang="de-DE" dirty="0" smtClean="0"/>
+              <a:t>Skalierungsverhalten eines </a:t>
+            </a:r>
+            <a:r>
+              <a:rPr lang="de-DE" dirty="0" err="1" smtClean="0"/>
+              <a:t>Raspberry</a:t>
+            </a:r>
+            <a:r>
+              <a:rPr lang="de-DE" dirty="0" smtClean="0"/>
+              <a:t> Pi-Clusters mit HPC-Benchmarks</a:t>
+            </a:r>
+            <a:endParaRPr lang="de-DE" dirty="0"/>
+          </a:p>
+        </p:txBody>
+      </p:sp>
+      <p:pic>
+        <p:nvPicPr>
+          <p:cNvPr id="7" name="Inhaltsplatzhalter 6" descr="strom5.pdf"/>
+          <p:cNvPicPr>
+            <a:picLocks noGrp="1" noChangeAspect="1"/>
+          </p:cNvPicPr>
+          <p:nvPr>
+            <p:ph idx="1"/>
+          </p:nvPr>
+        </p:nvPicPr>
+        <p:blipFill>
+          <a:blip r:embed="rId3">
+            <a:extLst>
+              <a:ext uri="{28A0092B-C50C-407E-A947-70E740481C1C}">
+                <a14:useLocalDpi xmlns:a14="http://schemas.microsoft.com/office/drawing/2010/main" val="0"/>
+              </a:ext>
+            </a:extLst>
+          </a:blip>
+          <a:srcRect l="-11893" r="-11893"/>
+          <a:stretch>
+            <a:fillRect/>
+          </a:stretch>
+        </p:blipFill>
+        <p:spPr/>
+      </p:pic>
+    </p:spTree>
+    <p:extLst>
+      <p:ext uri="{BB962C8B-B14F-4D97-AF65-F5344CB8AC3E}">
+        <p14:creationId xmlns:p14="http://schemas.microsoft.com/office/powerpoint/2010/main" val="1812769818"/>
+      </p:ext>
+    </p:extLst>
+  </p:cSld>
+  <p:clrMapOvr>
+    <a:masterClrMapping/>
+  </p:clrMapOvr>
+  <p:transition xmlns:p14="http://schemas.microsoft.com/office/powerpoint/2010/main" spd="med"/>
+</p:sld>
+</file>
+
+<file path=ppt/slides/slide18.xml><?xml version="1.0" encoding="utf-8"?>
+<p:sld xmlns:a="http://schemas.openxmlformats.org/drawingml/2006/main" xmlns:r="http://schemas.openxmlformats.org/officeDocument/2006/relationships" xmlns:p="http://schemas.openxmlformats.org/presentationml/2006/main">
+  <p:cSld>
+    <p:spTree>
+      <p:nvGrpSpPr>
+        <p:cNvPr id="1" name=""/>
+        <p:cNvGrpSpPr/>
+        <p:nvPr/>
+      </p:nvGrpSpPr>
+      <p:grpSpPr>
+        <a:xfrm>
+          <a:off x="0" y="0"/>
+          <a:ext cx="0" cy="0"/>
+          <a:chOff x="0" y="0"/>
+          <a:chExt cx="0" cy="0"/>
+        </a:xfrm>
+      </p:grpSpPr>
+      <p:sp>
+        <p:nvSpPr>
+          <p:cNvPr id="2" name="Titel 1"/>
+          <p:cNvSpPr>
+            <a:spLocks noGrp="1"/>
+          </p:cNvSpPr>
+          <p:nvPr>
+            <p:ph type="title"/>
+          </p:nvPr>
+        </p:nvSpPr>
+        <p:spPr/>
+        <p:txBody>
+          <a:bodyPr/>
+          <a:lstStyle/>
+          <a:p>
+            <a:r>
+              <a:rPr lang="de-DE" sz="1800" dirty="0" smtClean="0"/>
+              <a:t>Ergebnisse: HPL	</a:t>
+            </a:r>
+            <a:endParaRPr lang="de-DE" sz="1800" dirty="0"/>
+          </a:p>
+        </p:txBody>
+      </p:sp>
+      <p:sp>
+        <p:nvSpPr>
+          <p:cNvPr id="3" name="Inhaltsplatzhalter 2"/>
+          <p:cNvSpPr>
+            <a:spLocks noGrp="1"/>
+          </p:cNvSpPr>
+          <p:nvPr>
+            <p:ph idx="1"/>
+          </p:nvPr>
+        </p:nvSpPr>
+        <p:spPr/>
+        <p:txBody>
+          <a:bodyPr/>
+          <a:lstStyle/>
+          <a:p>
+            <a:pPr marL="457200" indent="-457200">
+              <a:buFont typeface="+mj-lt"/>
+              <a:buAutoNum type="arabicPeriod" startAt="2"/>
+            </a:pPr>
+            <a:r>
+              <a:rPr lang="de-DE" b="1" dirty="0" smtClean="0"/>
+              <a:t>HPL</a:t>
+            </a:r>
+          </a:p>
+          <a:p>
+            <a:pPr marL="400050" lvl="1" indent="0">
+              <a:buNone/>
+            </a:pPr>
+            <a:r>
+              <a:rPr lang="de-DE" b="1" dirty="0" smtClean="0"/>
+              <a:t>2.1 Erwartete Ergebnisse </a:t>
+            </a:r>
+          </a:p>
+          <a:p>
+            <a:pPr marL="685800" lvl="1"/>
+            <a:r>
+              <a:rPr lang="de-DE" dirty="0" smtClean="0"/>
+              <a:t>Lineares Skalierungsverhalten des </a:t>
+            </a:r>
+            <a:r>
+              <a:rPr lang="de-DE" dirty="0" err="1" smtClean="0"/>
+              <a:t>Bramble</a:t>
+            </a:r>
+            <a:r>
+              <a:rPr lang="de-DE" dirty="0" smtClean="0"/>
+              <a:t> bei Hinzunahme von Ressourcen bzgl. Ausführungsrate</a:t>
+            </a:r>
+          </a:p>
+          <a:p>
+            <a:pPr marL="685800" lvl="1"/>
+            <a:r>
+              <a:rPr lang="de-DE" dirty="0"/>
+              <a:t>Lineares Skalierungsverhalten des </a:t>
+            </a:r>
+            <a:r>
+              <a:rPr lang="de-DE" dirty="0" err="1"/>
+              <a:t>Bramble</a:t>
+            </a:r>
+            <a:r>
+              <a:rPr lang="de-DE" dirty="0"/>
+              <a:t> bei Hinzunahme von Ressourcen bzgl. </a:t>
+            </a:r>
+            <a:r>
+              <a:rPr lang="de-DE" dirty="0" smtClean="0"/>
+              <a:t>Ausführungsdauer</a:t>
+            </a:r>
+          </a:p>
+          <a:p>
+            <a:pPr marL="685800" lvl="1"/>
+            <a:r>
+              <a:rPr lang="de-DE" dirty="0" smtClean="0"/>
+              <a:t>Gleichartiges </a:t>
+            </a:r>
+            <a:r>
+              <a:rPr lang="de-DE" dirty="0"/>
+              <a:t>Skalierungsverhalten </a:t>
+            </a:r>
+            <a:r>
+              <a:rPr lang="de-DE" dirty="0" smtClean="0"/>
+              <a:t>in Messreihe 1 und Messreihe 2</a:t>
+            </a:r>
+            <a:endParaRPr lang="de-DE" b="1" dirty="0" smtClean="0"/>
+          </a:p>
+          <a:p>
+            <a:pPr marL="400050" lvl="1" indent="0">
+              <a:buNone/>
+            </a:pPr>
+            <a:r>
+              <a:rPr lang="de-DE" b="1" dirty="0" smtClean="0"/>
+              <a:t>2.2 Erzielte Ergebnisse</a:t>
+            </a:r>
+            <a:endParaRPr lang="de-DE" dirty="0" smtClean="0"/>
+          </a:p>
+          <a:p>
+            <a:pPr marL="685800" lvl="1"/>
+            <a:r>
+              <a:rPr lang="de-DE" dirty="0" smtClean="0"/>
+              <a:t>Erwartungsgemäßes Skalierungsverhalten des </a:t>
+            </a:r>
+            <a:r>
+              <a:rPr lang="de-DE" dirty="0" err="1" smtClean="0"/>
+              <a:t>Bramble</a:t>
+            </a:r>
+            <a:r>
+              <a:rPr lang="de-DE" dirty="0" smtClean="0"/>
+              <a:t> bzgl. CPU-Performance bei paralleler Ausführung von HPL (Ausführungsrate + Ausführungsdauer)</a:t>
+            </a:r>
+          </a:p>
+          <a:p>
+            <a:pPr marL="685800" lvl="1"/>
+            <a:r>
+              <a:rPr lang="de-DE" dirty="0" smtClean="0"/>
+              <a:t>Gleichartiges Skalierungsverhalten in Messreihe 1 und Messreihe 2 bzgl. CPU-Performance</a:t>
+            </a:r>
+          </a:p>
+        </p:txBody>
+      </p:sp>
+      <p:sp>
+        <p:nvSpPr>
+          <p:cNvPr id="4" name="Foliennummernplatzhalter 3"/>
+          <p:cNvSpPr>
+            <a:spLocks noGrp="1"/>
+          </p:cNvSpPr>
+          <p:nvPr>
+            <p:ph type="sldNum" sz="quarter" idx="4"/>
+          </p:nvPr>
+        </p:nvSpPr>
+        <p:spPr/>
+        <p:txBody>
+          <a:bodyPr/>
+          <a:lstStyle/>
+          <a:p>
+            <a:pPr>
+              <a:defRPr/>
+            </a:pPr>
+            <a:fld id="{70BFFA52-4234-45F6-B1A6-074E24FF43A2}" type="slidenum">
+              <a:rPr lang="de-DE" smtClean="0"/>
+              <a:pPr>
+                <a:defRPr/>
+              </a:pPr>
+              <a:t>18</a:t>
+            </a:fld>
+            <a:endParaRPr lang="de-DE" dirty="0"/>
+          </a:p>
+        </p:txBody>
+      </p:sp>
+      <p:sp>
+        <p:nvSpPr>
+          <p:cNvPr id="5" name="Fußzeilenplatzhalter 4"/>
+          <p:cNvSpPr>
+            <a:spLocks noGrp="1"/>
+          </p:cNvSpPr>
+          <p:nvPr>
+            <p:ph type="ftr" sz="quarter" idx="3"/>
+          </p:nvPr>
+        </p:nvSpPr>
+        <p:spPr/>
+        <p:txBody>
+          <a:bodyPr/>
+          <a:lstStyle/>
+          <a:p>
+            <a:r>
+              <a:rPr lang="de-DE" dirty="0" smtClean="0"/>
+              <a:t>Skalierungsverhalten eines </a:t>
+            </a:r>
+            <a:r>
+              <a:rPr lang="de-DE" dirty="0" err="1" smtClean="0"/>
+              <a:t>Raspberry</a:t>
+            </a:r>
+            <a:r>
+              <a:rPr lang="de-DE" dirty="0" smtClean="0"/>
+              <a:t> Pi-Clusters mit HPC-Benchmarks</a:t>
+            </a:r>
+            <a:endParaRPr lang="de-DE" dirty="0"/>
+          </a:p>
+        </p:txBody>
+      </p:sp>
+    </p:spTree>
+    <p:extLst>
+      <p:ext uri="{BB962C8B-B14F-4D97-AF65-F5344CB8AC3E}">
+        <p14:creationId xmlns:p14="http://schemas.microsoft.com/office/powerpoint/2010/main" val="3034494494"/>
+      </p:ext>
+    </p:extLst>
+  </p:cSld>
+  <p:clrMapOvr>
+    <a:masterClrMapping/>
+  </p:clrMapOvr>
+  <p:transition xmlns:p14="http://schemas.microsoft.com/office/powerpoint/2010/main" spd="med"/>
+</p:sld>
+</file>
+
+<file path=ppt/slides/slide19.xml><?xml version="1.0" encoding="utf-8"?>
+<p:sld xmlns:a="http://schemas.openxmlformats.org/drawingml/2006/main" xmlns:r="http://schemas.openxmlformats.org/officeDocument/2006/relationships" xmlns:p="http://schemas.openxmlformats.org/presentationml/2006/main">
+  <p:cSld>
+    <p:spTree>
+      <p:nvGrpSpPr>
+        <p:cNvPr id="1" name=""/>
+        <p:cNvGrpSpPr/>
+        <p:nvPr/>
+      </p:nvGrpSpPr>
+      <p:grpSpPr>
+        <a:xfrm>
+          <a:off x="0" y="0"/>
+          <a:ext cx="0" cy="0"/>
+          <a:chOff x="0" y="0"/>
+          <a:chExt cx="0" cy="0"/>
+        </a:xfrm>
+      </p:grpSpPr>
+      <p:sp>
+        <p:nvSpPr>
+          <p:cNvPr id="2" name="Titel 1"/>
+          <p:cNvSpPr>
+            <a:spLocks noGrp="1"/>
+          </p:cNvSpPr>
+          <p:nvPr>
+            <p:ph type="title"/>
+          </p:nvPr>
+        </p:nvSpPr>
+        <p:spPr/>
+        <p:txBody>
+          <a:bodyPr/>
+          <a:lstStyle/>
+          <a:p>
+            <a:r>
+              <a:rPr lang="de-DE" sz="1800" dirty="0" smtClean="0"/>
+              <a:t>HPL: Ausführungsrate	</a:t>
+            </a:r>
+            <a:endParaRPr lang="de-DE" sz="1800" dirty="0"/>
+          </a:p>
+        </p:txBody>
+      </p:sp>
+      <p:pic>
+        <p:nvPicPr>
+          <p:cNvPr id="6" name="Inhaltsplatzhalter 5" descr="hpl5.pdf"/>
+          <p:cNvPicPr>
+            <a:picLocks noGrp="1" noChangeAspect="1"/>
+          </p:cNvPicPr>
+          <p:nvPr>
+            <p:ph idx="1"/>
+          </p:nvPr>
+        </p:nvPicPr>
+        <p:blipFill>
+          <a:blip r:embed="rId3">
+            <a:extLst>
+              <a:ext uri="{28A0092B-C50C-407E-A947-70E740481C1C}">
+                <a14:useLocalDpi xmlns:a14="http://schemas.microsoft.com/office/drawing/2010/main" val="0"/>
+              </a:ext>
+            </a:extLst>
+          </a:blip>
+          <a:srcRect l="-11893" r="-11893"/>
+          <a:stretch>
+            <a:fillRect/>
+          </a:stretch>
+        </p:blipFill>
+        <p:spPr/>
+      </p:pic>
+      <p:sp>
+        <p:nvSpPr>
+          <p:cNvPr id="4" name="Foliennummernplatzhalter 3"/>
+          <p:cNvSpPr>
+            <a:spLocks noGrp="1"/>
+          </p:cNvSpPr>
+          <p:nvPr>
+            <p:ph type="sldNum" sz="quarter" idx="4"/>
+          </p:nvPr>
+        </p:nvSpPr>
+        <p:spPr/>
+        <p:txBody>
+          <a:bodyPr/>
+          <a:lstStyle/>
+          <a:p>
+            <a:pPr>
+              <a:defRPr/>
+            </a:pPr>
+            <a:fld id="{70BFFA52-4234-45F6-B1A6-074E24FF43A2}" type="slidenum">
+              <a:rPr lang="de-DE" smtClean="0"/>
+              <a:pPr>
+                <a:defRPr/>
+              </a:pPr>
+              <a:t>19</a:t>
+            </a:fld>
+            <a:endParaRPr lang="de-DE" dirty="0"/>
+          </a:p>
+        </p:txBody>
+      </p:sp>
+      <p:sp>
+        <p:nvSpPr>
+          <p:cNvPr id="5" name="Fußzeilenplatzhalter 4"/>
+          <p:cNvSpPr>
+            <a:spLocks noGrp="1"/>
+          </p:cNvSpPr>
+          <p:nvPr>
+            <p:ph type="ftr" sz="quarter" idx="3"/>
+          </p:nvPr>
+        </p:nvSpPr>
+        <p:spPr/>
+        <p:txBody>
+          <a:bodyPr/>
+          <a:lstStyle/>
+          <a:p>
+            <a:r>
+              <a:rPr lang="de-DE" dirty="0" smtClean="0"/>
+              <a:t>Skalierungsverhalten eines </a:t>
+            </a:r>
+            <a:r>
+              <a:rPr lang="de-DE" dirty="0" err="1" smtClean="0"/>
+              <a:t>Raspberry</a:t>
+            </a:r>
+            <a:r>
+              <a:rPr lang="de-DE" dirty="0" smtClean="0"/>
+              <a:t> Pi-Clusters mit HPC-Benchmarks</a:t>
+            </a:r>
+            <a:endParaRPr lang="de-DE" dirty="0"/>
+          </a:p>
+        </p:txBody>
+      </p:sp>
+    </p:spTree>
+    <p:extLst>
+      <p:ext uri="{BB962C8B-B14F-4D97-AF65-F5344CB8AC3E}">
+        <p14:creationId xmlns:p14="http://schemas.microsoft.com/office/powerpoint/2010/main" val="3524707835"/>
       </p:ext>
     </p:extLst>
   </p:cSld>
@@ -3538,7 +6457,7 @@
               <a:buAutoNum type="romanUcPeriod"/>
             </a:pPr>
             <a:r>
-              <a:rPr lang="de-DE" dirty="0" smtClean="0"/>
+              <a:rPr lang="de-DE" b="1" dirty="0" smtClean="0"/>
               <a:t>Einführung und Aufgabenstellung</a:t>
             </a:r>
           </a:p>
@@ -3548,15 +6467,15 @@
               <a:buAutoNum type="arabicPeriod"/>
             </a:pPr>
             <a:r>
-              <a:rPr lang="de-DE" dirty="0" err="1" smtClean="0"/>
+              <a:rPr lang="de-DE" b="1" dirty="0" err="1" smtClean="0"/>
               <a:t>Raspberry</a:t>
             </a:r>
             <a:r>
-              <a:rPr lang="de-DE" dirty="0"/>
+              <a:rPr lang="de-DE" b="1" dirty="0"/>
               <a:t> </a:t>
             </a:r>
             <a:r>
-              <a:rPr lang="de-DE" dirty="0" smtClean="0"/>
+              <a:rPr lang="de-DE" b="1" dirty="0" smtClean="0"/>
               <a:t>Pi</a:t>
             </a:r>
           </a:p>
@@ -3566,11 +6485,11 @@
               <a:buAutoNum type="arabicPeriod"/>
             </a:pPr>
             <a:r>
-              <a:rPr lang="de-DE" dirty="0" err="1" smtClean="0"/>
+              <a:rPr lang="de-DE" b="1" dirty="0" err="1" smtClean="0"/>
               <a:t>Bramble</a:t>
             </a:r>
             <a:r>
-              <a:rPr lang="de-DE" dirty="0" smtClean="0"/>
+              <a:rPr lang="de-DE" b="1" dirty="0" smtClean="0"/>
               <a:t> </a:t>
             </a:r>
           </a:p>
@@ -3580,7 +6499,7 @@
               <a:buAutoNum type="arabicPeriod"/>
             </a:pPr>
             <a:r>
-              <a:rPr lang="de-DE" dirty="0" smtClean="0"/>
+              <a:rPr lang="de-DE" b="1" dirty="0" smtClean="0"/>
               <a:t>Aufgabenstellung </a:t>
             </a:r>
           </a:p>
@@ -3590,14 +6509,14 @@
               <a:buAutoNum type="romanUcPeriod"/>
             </a:pPr>
             <a:r>
-              <a:rPr lang="de-DE" dirty="0" smtClean="0"/>
+              <a:rPr lang="de-DE" b="1" dirty="0" smtClean="0"/>
               <a:t>Versuchsaufbau und –</a:t>
             </a:r>
             <a:r>
-              <a:rPr lang="de-DE" dirty="0" err="1" smtClean="0"/>
+              <a:rPr lang="de-DE" b="1" dirty="0" err="1" smtClean="0"/>
               <a:t>ablauf</a:t>
             </a:r>
-            <a:endParaRPr lang="de-DE" dirty="0" smtClean="0"/>
+            <a:endParaRPr lang="de-DE" b="1" dirty="0" smtClean="0"/>
           </a:p>
           <a:p>
             <a:pPr marL="914400" lvl="1" indent="-514350">
@@ -3605,7 +6524,7 @@
               <a:buAutoNum type="arabicPeriod"/>
             </a:pPr>
             <a:r>
-              <a:rPr lang="de-DE" dirty="0" smtClean="0"/>
+              <a:rPr lang="de-DE" b="1" dirty="0" smtClean="0"/>
               <a:t>Definitionen und Messparameter </a:t>
             </a:r>
           </a:p>
@@ -3615,8 +6534,8 @@
               <a:buAutoNum type="arabicPeriod"/>
             </a:pPr>
             <a:r>
-              <a:rPr lang="de-DE" dirty="0" smtClean="0"/>
-              <a:t>Beschreibung der Benchmarks</a:t>
+              <a:rPr lang="de-DE" b="1" dirty="0" smtClean="0"/>
+              <a:t>Verwendete Benchmarks</a:t>
             </a:r>
           </a:p>
           <a:p>
@@ -3625,10 +6544,10 @@
               <a:buAutoNum type="arabicPeriod"/>
             </a:pPr>
             <a:r>
-              <a:rPr lang="de-DE" dirty="0" smtClean="0"/>
+              <a:rPr lang="de-DE" b="1" dirty="0" smtClean="0"/>
               <a:t>Umsetzung</a:t>
             </a:r>
-            <a:endParaRPr lang="de-DE" dirty="0" smtClean="0"/>
+            <a:endParaRPr lang="de-DE" b="1" dirty="0" smtClean="0"/>
           </a:p>
           <a:p>
             <a:pPr marL="514350" indent="-514350">
@@ -3636,9 +6555,10 @@
               <a:buAutoNum type="romanUcPeriod"/>
             </a:pPr>
             <a:r>
-              <a:rPr lang="de-DE" dirty="0" smtClean="0"/>
+              <a:rPr lang="de-DE" b="1" dirty="0" smtClean="0"/>
               <a:t>Ergebnisse </a:t>
             </a:r>
+            <a:endParaRPr lang="de-DE" b="1" dirty="0" smtClean="0"/>
           </a:p>
           <a:p>
             <a:pPr marL="914400" lvl="1" indent="-514350">
@@ -3646,9 +6566,10 @@
               <a:buAutoNum type="arabicPeriod"/>
             </a:pPr>
             <a:r>
-              <a:rPr lang="de-DE" dirty="0" smtClean="0"/>
+              <a:rPr lang="de-DE" b="1" dirty="0" smtClean="0"/>
               <a:t>Strommessung </a:t>
             </a:r>
+            <a:endParaRPr lang="de-DE" b="1" dirty="0" smtClean="0"/>
           </a:p>
           <a:p>
             <a:pPr marL="914400" lvl="1" indent="-514350">
@@ -3656,7 +6577,7 @@
               <a:buAutoNum type="arabicPeriod"/>
             </a:pPr>
             <a:r>
-              <a:rPr lang="de-DE" dirty="0" smtClean="0"/>
+              <a:rPr lang="de-DE" b="1" dirty="0" smtClean="0"/>
               <a:t>HPL </a:t>
             </a:r>
           </a:p>
@@ -3666,7 +6587,7 @@
               <a:buAutoNum type="arabicPeriod"/>
             </a:pPr>
             <a:r>
-              <a:rPr lang="de-DE" dirty="0" smtClean="0"/>
+              <a:rPr lang="de-DE" b="1" dirty="0" smtClean="0"/>
               <a:t>STREAM </a:t>
             </a:r>
           </a:p>
@@ -3676,10 +6597,10 @@
               <a:buAutoNum type="romanUcPeriod"/>
             </a:pPr>
             <a:r>
-              <a:rPr lang="de-DE" dirty="0" smtClean="0"/>
+              <a:rPr lang="de-DE" b="1" dirty="0" smtClean="0"/>
               <a:t>Zusammenfassung und Ausblick</a:t>
             </a:r>
-            <a:endParaRPr lang="de-DE" dirty="0"/>
+            <a:endParaRPr lang="de-DE" b="1" dirty="0"/>
           </a:p>
         </p:txBody>
       </p:sp>
@@ -3747,6 +6668,1220 @@
     <p:extLst>
       <p:ext uri="{BB962C8B-B14F-4D97-AF65-F5344CB8AC3E}">
         <p14:creationId xmlns:p14="http://schemas.microsoft.com/office/powerpoint/2010/main" val="3273344848"/>
+      </p:ext>
+    </p:extLst>
+  </p:cSld>
+  <p:clrMapOvr>
+    <a:masterClrMapping/>
+  </p:clrMapOvr>
+  <p:transition xmlns:p14="http://schemas.microsoft.com/office/powerpoint/2010/main" spd="med"/>
+</p:sld>
+</file>
+
+<file path=ppt/slides/slide20.xml><?xml version="1.0" encoding="utf-8"?>
+<p:sld xmlns:a="http://schemas.openxmlformats.org/drawingml/2006/main" xmlns:r="http://schemas.openxmlformats.org/officeDocument/2006/relationships" xmlns:p="http://schemas.openxmlformats.org/presentationml/2006/main">
+  <p:cSld>
+    <p:spTree>
+      <p:nvGrpSpPr>
+        <p:cNvPr id="1" name=""/>
+        <p:cNvGrpSpPr/>
+        <p:nvPr/>
+      </p:nvGrpSpPr>
+      <p:grpSpPr>
+        <a:xfrm>
+          <a:off x="0" y="0"/>
+          <a:ext cx="0" cy="0"/>
+          <a:chOff x="0" y="0"/>
+          <a:chExt cx="0" cy="0"/>
+        </a:xfrm>
+      </p:grpSpPr>
+      <p:sp>
+        <p:nvSpPr>
+          <p:cNvPr id="2" name="Titel 1"/>
+          <p:cNvSpPr>
+            <a:spLocks noGrp="1"/>
+          </p:cNvSpPr>
+          <p:nvPr>
+            <p:ph type="title"/>
+          </p:nvPr>
+        </p:nvSpPr>
+        <p:spPr/>
+        <p:txBody>
+          <a:bodyPr/>
+          <a:lstStyle/>
+          <a:p>
+            <a:r>
+              <a:rPr lang="de-DE" sz="1800" dirty="0" smtClean="0"/>
+              <a:t>HPL: Ausführungsdauer	</a:t>
+            </a:r>
+            <a:endParaRPr lang="de-DE" sz="1800" dirty="0"/>
+          </a:p>
+        </p:txBody>
+      </p:sp>
+      <p:sp>
+        <p:nvSpPr>
+          <p:cNvPr id="4" name="Foliennummernplatzhalter 3"/>
+          <p:cNvSpPr>
+            <a:spLocks noGrp="1"/>
+          </p:cNvSpPr>
+          <p:nvPr>
+            <p:ph type="sldNum" sz="quarter" idx="4"/>
+          </p:nvPr>
+        </p:nvSpPr>
+        <p:spPr/>
+        <p:txBody>
+          <a:bodyPr/>
+          <a:lstStyle/>
+          <a:p>
+            <a:pPr>
+              <a:defRPr/>
+            </a:pPr>
+            <a:fld id="{70BFFA52-4234-45F6-B1A6-074E24FF43A2}" type="slidenum">
+              <a:rPr lang="de-DE" smtClean="0"/>
+              <a:pPr>
+                <a:defRPr/>
+              </a:pPr>
+              <a:t>20</a:t>
+            </a:fld>
+            <a:endParaRPr lang="de-DE" dirty="0"/>
+          </a:p>
+        </p:txBody>
+      </p:sp>
+      <p:sp>
+        <p:nvSpPr>
+          <p:cNvPr id="5" name="Fußzeilenplatzhalter 4"/>
+          <p:cNvSpPr>
+            <a:spLocks noGrp="1"/>
+          </p:cNvSpPr>
+          <p:nvPr>
+            <p:ph type="ftr" sz="quarter" idx="3"/>
+          </p:nvPr>
+        </p:nvSpPr>
+        <p:spPr/>
+        <p:txBody>
+          <a:bodyPr/>
+          <a:lstStyle/>
+          <a:p>
+            <a:r>
+              <a:rPr lang="de-DE" dirty="0" smtClean="0"/>
+              <a:t>Skalierungsverhalten eines </a:t>
+            </a:r>
+            <a:r>
+              <a:rPr lang="de-DE" dirty="0" err="1" smtClean="0"/>
+              <a:t>Raspberry</a:t>
+            </a:r>
+            <a:r>
+              <a:rPr lang="de-DE" dirty="0" smtClean="0"/>
+              <a:t> Pi-Clusters mit HPC-Benchmarks</a:t>
+            </a:r>
+            <a:endParaRPr lang="de-DE" dirty="0"/>
+          </a:p>
+        </p:txBody>
+      </p:sp>
+      <p:pic>
+        <p:nvPicPr>
+          <p:cNvPr id="7" name="Inhaltsplatzhalter 6" descr="hpl6.pdf"/>
+          <p:cNvPicPr>
+            <a:picLocks noGrp="1" noChangeAspect="1"/>
+          </p:cNvPicPr>
+          <p:nvPr>
+            <p:ph idx="1"/>
+          </p:nvPr>
+        </p:nvPicPr>
+        <p:blipFill>
+          <a:blip r:embed="rId3">
+            <a:extLst>
+              <a:ext uri="{28A0092B-C50C-407E-A947-70E740481C1C}">
+                <a14:useLocalDpi xmlns:a14="http://schemas.microsoft.com/office/drawing/2010/main" val="0"/>
+              </a:ext>
+            </a:extLst>
+          </a:blip>
+          <a:srcRect l="-11893" r="-11893"/>
+          <a:stretch>
+            <a:fillRect/>
+          </a:stretch>
+        </p:blipFill>
+        <p:spPr/>
+      </p:pic>
+    </p:spTree>
+    <p:extLst>
+      <p:ext uri="{BB962C8B-B14F-4D97-AF65-F5344CB8AC3E}">
+        <p14:creationId xmlns:p14="http://schemas.microsoft.com/office/powerpoint/2010/main" val="2852590459"/>
+      </p:ext>
+    </p:extLst>
+  </p:cSld>
+  <p:clrMapOvr>
+    <a:masterClrMapping/>
+  </p:clrMapOvr>
+  <p:transition xmlns:p14="http://schemas.microsoft.com/office/powerpoint/2010/main" spd="med"/>
+</p:sld>
+</file>
+
+<file path=ppt/slides/slide21.xml><?xml version="1.0" encoding="utf-8"?>
+<p:sld xmlns:a="http://schemas.openxmlformats.org/drawingml/2006/main" xmlns:r="http://schemas.openxmlformats.org/officeDocument/2006/relationships" xmlns:p="http://schemas.openxmlformats.org/presentationml/2006/main">
+  <p:cSld>
+    <p:spTree>
+      <p:nvGrpSpPr>
+        <p:cNvPr id="1" name=""/>
+        <p:cNvGrpSpPr/>
+        <p:nvPr/>
+      </p:nvGrpSpPr>
+      <p:grpSpPr>
+        <a:xfrm>
+          <a:off x="0" y="0"/>
+          <a:ext cx="0" cy="0"/>
+          <a:chOff x="0" y="0"/>
+          <a:chExt cx="0" cy="0"/>
+        </a:xfrm>
+      </p:grpSpPr>
+      <p:sp>
+        <p:nvSpPr>
+          <p:cNvPr id="2" name="Titel 1"/>
+          <p:cNvSpPr>
+            <a:spLocks noGrp="1"/>
+          </p:cNvSpPr>
+          <p:nvPr>
+            <p:ph type="title"/>
+          </p:nvPr>
+        </p:nvSpPr>
+        <p:spPr/>
+        <p:txBody>
+          <a:bodyPr/>
+          <a:lstStyle/>
+          <a:p>
+            <a:r>
+              <a:rPr lang="de-DE" sz="1800" dirty="0" smtClean="0"/>
+              <a:t>Ergebnisse: STREAM 	</a:t>
+            </a:r>
+            <a:endParaRPr lang="de-DE" sz="1800" dirty="0"/>
+          </a:p>
+        </p:txBody>
+      </p:sp>
+      <p:sp>
+        <p:nvSpPr>
+          <p:cNvPr id="3" name="Inhaltsplatzhalter 2"/>
+          <p:cNvSpPr>
+            <a:spLocks noGrp="1"/>
+          </p:cNvSpPr>
+          <p:nvPr>
+            <p:ph idx="1"/>
+          </p:nvPr>
+        </p:nvSpPr>
+        <p:spPr/>
+        <p:txBody>
+          <a:bodyPr/>
+          <a:lstStyle/>
+          <a:p>
+            <a:pPr marL="457200" indent="-457200">
+              <a:buFont typeface="+mj-lt"/>
+              <a:buAutoNum type="arabicPeriod" startAt="3"/>
+            </a:pPr>
+            <a:r>
+              <a:rPr lang="de-DE" b="1" dirty="0" smtClean="0"/>
+              <a:t>STREAM</a:t>
+            </a:r>
+          </a:p>
+          <a:p>
+            <a:pPr marL="400050" lvl="1" indent="0">
+              <a:buNone/>
+            </a:pPr>
+            <a:r>
+              <a:rPr lang="de-DE" b="1" dirty="0" smtClean="0"/>
+              <a:t>2.1 Erwartete Ergebnisse </a:t>
+            </a:r>
+          </a:p>
+          <a:p>
+            <a:pPr marL="685800" lvl="1"/>
+            <a:r>
+              <a:rPr lang="de-DE" dirty="0" smtClean="0"/>
+              <a:t>Lineares Skalierungsverhalten des </a:t>
+            </a:r>
+            <a:r>
+              <a:rPr lang="de-DE" dirty="0" err="1" smtClean="0"/>
+              <a:t>Bramble</a:t>
+            </a:r>
+            <a:r>
+              <a:rPr lang="de-DE" dirty="0" smtClean="0"/>
+              <a:t> bei Hinzunahme von Ressourcen bzgl. Ausführungsrate</a:t>
+            </a:r>
+          </a:p>
+          <a:p>
+            <a:pPr marL="685800" lvl="1"/>
+            <a:r>
+              <a:rPr lang="de-DE" dirty="0" smtClean="0"/>
+              <a:t>Konstantes </a:t>
+            </a:r>
+            <a:r>
+              <a:rPr lang="de-DE" dirty="0"/>
+              <a:t>Skalierungsverhalten des </a:t>
+            </a:r>
+            <a:r>
+              <a:rPr lang="de-DE" dirty="0" err="1"/>
+              <a:t>Bramble</a:t>
+            </a:r>
+            <a:r>
+              <a:rPr lang="de-DE" dirty="0"/>
+              <a:t> bei Hinzunahme von Ressourcen bzgl. </a:t>
+            </a:r>
+            <a:r>
+              <a:rPr lang="de-DE" dirty="0" smtClean="0"/>
+              <a:t>Ausführungsdauer</a:t>
+            </a:r>
+          </a:p>
+          <a:p>
+            <a:pPr marL="685800" lvl="1"/>
+            <a:r>
+              <a:rPr lang="de-DE" dirty="0" smtClean="0"/>
+              <a:t>Gleichartiges </a:t>
+            </a:r>
+            <a:r>
+              <a:rPr lang="de-DE" dirty="0"/>
+              <a:t>Skalierungsverhalten </a:t>
+            </a:r>
+            <a:r>
+              <a:rPr lang="de-DE" dirty="0" smtClean="0"/>
+              <a:t>in Messreihe 1 und Messreihe 2</a:t>
+            </a:r>
+            <a:endParaRPr lang="de-DE" b="1" dirty="0" smtClean="0"/>
+          </a:p>
+          <a:p>
+            <a:pPr marL="400050" lvl="1" indent="0">
+              <a:buNone/>
+            </a:pPr>
+            <a:r>
+              <a:rPr lang="de-DE" b="1" dirty="0" smtClean="0"/>
+              <a:t>2.2 Erzielte Ergebnisse</a:t>
+            </a:r>
+            <a:endParaRPr lang="de-DE" dirty="0" smtClean="0"/>
+          </a:p>
+          <a:p>
+            <a:pPr marL="685800" lvl="1"/>
+            <a:r>
+              <a:rPr lang="de-DE" dirty="0" smtClean="0"/>
+              <a:t>Erwartungsgemäßes Skalierungsverhalten des </a:t>
+            </a:r>
+            <a:r>
+              <a:rPr lang="de-DE" dirty="0" err="1" smtClean="0"/>
+              <a:t>Bramble</a:t>
+            </a:r>
+            <a:r>
+              <a:rPr lang="de-DE" dirty="0" smtClean="0"/>
+              <a:t> bzgl. Hauptspeicherzugriffe bei paralleler Ausführung von STREAM (Ausführungsrate + Ausführungsdauer) für </a:t>
+            </a:r>
+            <a:r>
+              <a:rPr lang="de-DE" dirty="0" err="1" smtClean="0"/>
+              <a:t>n</a:t>
+            </a:r>
+            <a:r>
+              <a:rPr lang="de-DE" dirty="0" smtClean="0"/>
+              <a:t> ≤ 18 Rechenknoten </a:t>
+            </a:r>
+          </a:p>
+          <a:p>
+            <a:pPr marL="685800" lvl="1"/>
+            <a:r>
+              <a:rPr lang="de-DE" dirty="0" smtClean="0"/>
+              <a:t>Gleichartiges Skalierungsverhalten in Messreihe 1 und Messreihe 2 bzgl. Durchsatz Hauptspeicher-Zugriffe</a:t>
+            </a:r>
+          </a:p>
+        </p:txBody>
+      </p:sp>
+      <p:sp>
+        <p:nvSpPr>
+          <p:cNvPr id="4" name="Foliennummernplatzhalter 3"/>
+          <p:cNvSpPr>
+            <a:spLocks noGrp="1"/>
+          </p:cNvSpPr>
+          <p:nvPr>
+            <p:ph type="sldNum" sz="quarter" idx="4"/>
+          </p:nvPr>
+        </p:nvSpPr>
+        <p:spPr/>
+        <p:txBody>
+          <a:bodyPr/>
+          <a:lstStyle/>
+          <a:p>
+            <a:pPr>
+              <a:defRPr/>
+            </a:pPr>
+            <a:fld id="{70BFFA52-4234-45F6-B1A6-074E24FF43A2}" type="slidenum">
+              <a:rPr lang="de-DE" smtClean="0"/>
+              <a:pPr>
+                <a:defRPr/>
+              </a:pPr>
+              <a:t>21</a:t>
+            </a:fld>
+            <a:endParaRPr lang="de-DE" dirty="0"/>
+          </a:p>
+        </p:txBody>
+      </p:sp>
+      <p:sp>
+        <p:nvSpPr>
+          <p:cNvPr id="5" name="Fußzeilenplatzhalter 4"/>
+          <p:cNvSpPr>
+            <a:spLocks noGrp="1"/>
+          </p:cNvSpPr>
+          <p:nvPr>
+            <p:ph type="ftr" sz="quarter" idx="3"/>
+          </p:nvPr>
+        </p:nvSpPr>
+        <p:spPr/>
+        <p:txBody>
+          <a:bodyPr/>
+          <a:lstStyle/>
+          <a:p>
+            <a:r>
+              <a:rPr lang="de-DE" dirty="0" smtClean="0"/>
+              <a:t>Skalierungsverhalten eines </a:t>
+            </a:r>
+            <a:r>
+              <a:rPr lang="de-DE" dirty="0" err="1" smtClean="0"/>
+              <a:t>Raspberry</a:t>
+            </a:r>
+            <a:r>
+              <a:rPr lang="de-DE" dirty="0" smtClean="0"/>
+              <a:t> Pi-Clusters mit HPC-Benchmarks</a:t>
+            </a:r>
+            <a:endParaRPr lang="de-DE" dirty="0"/>
+          </a:p>
+        </p:txBody>
+      </p:sp>
+    </p:spTree>
+    <p:extLst>
+      <p:ext uri="{BB962C8B-B14F-4D97-AF65-F5344CB8AC3E}">
+        <p14:creationId xmlns:p14="http://schemas.microsoft.com/office/powerpoint/2010/main" val="346354108"/>
+      </p:ext>
+    </p:extLst>
+  </p:cSld>
+  <p:clrMapOvr>
+    <a:masterClrMapping/>
+  </p:clrMapOvr>
+  <p:transition xmlns:p14="http://schemas.microsoft.com/office/powerpoint/2010/main" spd="med"/>
+</p:sld>
+</file>
+
+<file path=ppt/slides/slide22.xml><?xml version="1.0" encoding="utf-8"?>
+<p:sld xmlns:a="http://schemas.openxmlformats.org/drawingml/2006/main" xmlns:r="http://schemas.openxmlformats.org/officeDocument/2006/relationships" xmlns:p="http://schemas.openxmlformats.org/presentationml/2006/main">
+  <p:cSld>
+    <p:spTree>
+      <p:nvGrpSpPr>
+        <p:cNvPr id="1" name=""/>
+        <p:cNvGrpSpPr/>
+        <p:nvPr/>
+      </p:nvGrpSpPr>
+      <p:grpSpPr>
+        <a:xfrm>
+          <a:off x="0" y="0"/>
+          <a:ext cx="0" cy="0"/>
+          <a:chOff x="0" y="0"/>
+          <a:chExt cx="0" cy="0"/>
+        </a:xfrm>
+      </p:grpSpPr>
+      <p:sp>
+        <p:nvSpPr>
+          <p:cNvPr id="2" name="Titel 1"/>
+          <p:cNvSpPr>
+            <a:spLocks noGrp="1"/>
+          </p:cNvSpPr>
+          <p:nvPr>
+            <p:ph type="title"/>
+          </p:nvPr>
+        </p:nvSpPr>
+        <p:spPr/>
+        <p:txBody>
+          <a:bodyPr/>
+          <a:lstStyle/>
+          <a:p>
+            <a:r>
+              <a:rPr lang="de-DE" sz="1800" dirty="0" smtClean="0"/>
+              <a:t>STREAM: Ausführungsrate	</a:t>
+            </a:r>
+            <a:endParaRPr lang="de-DE" sz="1800" dirty="0"/>
+          </a:p>
+        </p:txBody>
+      </p:sp>
+      <p:sp>
+        <p:nvSpPr>
+          <p:cNvPr id="4" name="Foliennummernplatzhalter 3"/>
+          <p:cNvSpPr>
+            <a:spLocks noGrp="1"/>
+          </p:cNvSpPr>
+          <p:nvPr>
+            <p:ph type="sldNum" sz="quarter" idx="4"/>
+          </p:nvPr>
+        </p:nvSpPr>
+        <p:spPr/>
+        <p:txBody>
+          <a:bodyPr/>
+          <a:lstStyle/>
+          <a:p>
+            <a:pPr>
+              <a:defRPr/>
+            </a:pPr>
+            <a:fld id="{70BFFA52-4234-45F6-B1A6-074E24FF43A2}" type="slidenum">
+              <a:rPr lang="de-DE" smtClean="0"/>
+              <a:pPr>
+                <a:defRPr/>
+              </a:pPr>
+              <a:t>22</a:t>
+            </a:fld>
+            <a:endParaRPr lang="de-DE" dirty="0"/>
+          </a:p>
+        </p:txBody>
+      </p:sp>
+      <p:sp>
+        <p:nvSpPr>
+          <p:cNvPr id="5" name="Fußzeilenplatzhalter 4"/>
+          <p:cNvSpPr>
+            <a:spLocks noGrp="1"/>
+          </p:cNvSpPr>
+          <p:nvPr>
+            <p:ph type="ftr" sz="quarter" idx="3"/>
+          </p:nvPr>
+        </p:nvSpPr>
+        <p:spPr/>
+        <p:txBody>
+          <a:bodyPr/>
+          <a:lstStyle/>
+          <a:p>
+            <a:r>
+              <a:rPr lang="de-DE" dirty="0" smtClean="0"/>
+              <a:t>Skalierungsverhalten eines </a:t>
+            </a:r>
+            <a:r>
+              <a:rPr lang="de-DE" dirty="0" err="1" smtClean="0"/>
+              <a:t>Raspberry</a:t>
+            </a:r>
+            <a:r>
+              <a:rPr lang="de-DE" dirty="0" smtClean="0"/>
+              <a:t> Pi-Clusters mit HPC-Benchmarks</a:t>
+            </a:r>
+            <a:endParaRPr lang="de-DE" dirty="0"/>
+          </a:p>
+        </p:txBody>
+      </p:sp>
+      <p:pic>
+        <p:nvPicPr>
+          <p:cNvPr id="6" name="Inhaltsplatzhalter 5" descr="stream5.pdf"/>
+          <p:cNvPicPr>
+            <a:picLocks noGrp="1" noChangeAspect="1"/>
+          </p:cNvPicPr>
+          <p:nvPr>
+            <p:ph idx="1"/>
+          </p:nvPr>
+        </p:nvPicPr>
+        <p:blipFill>
+          <a:blip r:embed="rId3">
+            <a:extLst>
+              <a:ext uri="{28A0092B-C50C-407E-A947-70E740481C1C}">
+                <a14:useLocalDpi xmlns:a14="http://schemas.microsoft.com/office/drawing/2010/main" val="0"/>
+              </a:ext>
+            </a:extLst>
+          </a:blip>
+          <a:srcRect l="-11893" r="-11893"/>
+          <a:stretch>
+            <a:fillRect/>
+          </a:stretch>
+        </p:blipFill>
+        <p:spPr/>
+      </p:pic>
+    </p:spTree>
+    <p:extLst>
+      <p:ext uri="{BB962C8B-B14F-4D97-AF65-F5344CB8AC3E}">
+        <p14:creationId xmlns:p14="http://schemas.microsoft.com/office/powerpoint/2010/main" val="4095032389"/>
+      </p:ext>
+    </p:extLst>
+  </p:cSld>
+  <p:clrMapOvr>
+    <a:masterClrMapping/>
+  </p:clrMapOvr>
+  <p:transition xmlns:p14="http://schemas.microsoft.com/office/powerpoint/2010/main" spd="med"/>
+</p:sld>
+</file>
+
+<file path=ppt/slides/slide23.xml><?xml version="1.0" encoding="utf-8"?>
+<p:sld xmlns:a="http://schemas.openxmlformats.org/drawingml/2006/main" xmlns:r="http://schemas.openxmlformats.org/officeDocument/2006/relationships" xmlns:p="http://schemas.openxmlformats.org/presentationml/2006/main">
+  <p:cSld>
+    <p:spTree>
+      <p:nvGrpSpPr>
+        <p:cNvPr id="1" name=""/>
+        <p:cNvGrpSpPr/>
+        <p:nvPr/>
+      </p:nvGrpSpPr>
+      <p:grpSpPr>
+        <a:xfrm>
+          <a:off x="0" y="0"/>
+          <a:ext cx="0" cy="0"/>
+          <a:chOff x="0" y="0"/>
+          <a:chExt cx="0" cy="0"/>
+        </a:xfrm>
+      </p:grpSpPr>
+      <p:sp>
+        <p:nvSpPr>
+          <p:cNvPr id="2" name="Titel 1"/>
+          <p:cNvSpPr>
+            <a:spLocks noGrp="1"/>
+          </p:cNvSpPr>
+          <p:nvPr>
+            <p:ph type="title"/>
+          </p:nvPr>
+        </p:nvSpPr>
+        <p:spPr/>
+        <p:txBody>
+          <a:bodyPr/>
+          <a:lstStyle/>
+          <a:p>
+            <a:r>
+              <a:rPr lang="de-DE" sz="1800" dirty="0" smtClean="0"/>
+              <a:t>STREAM: Ausführungsdauer	</a:t>
+            </a:r>
+            <a:endParaRPr lang="de-DE" sz="1800" dirty="0"/>
+          </a:p>
+        </p:txBody>
+      </p:sp>
+      <p:sp>
+        <p:nvSpPr>
+          <p:cNvPr id="4" name="Foliennummernplatzhalter 3"/>
+          <p:cNvSpPr>
+            <a:spLocks noGrp="1"/>
+          </p:cNvSpPr>
+          <p:nvPr>
+            <p:ph type="sldNum" sz="quarter" idx="4"/>
+          </p:nvPr>
+        </p:nvSpPr>
+        <p:spPr/>
+        <p:txBody>
+          <a:bodyPr/>
+          <a:lstStyle/>
+          <a:p>
+            <a:pPr>
+              <a:defRPr/>
+            </a:pPr>
+            <a:fld id="{70BFFA52-4234-45F6-B1A6-074E24FF43A2}" type="slidenum">
+              <a:rPr lang="de-DE" smtClean="0"/>
+              <a:pPr>
+                <a:defRPr/>
+              </a:pPr>
+              <a:t>23</a:t>
+            </a:fld>
+            <a:endParaRPr lang="de-DE" dirty="0"/>
+          </a:p>
+        </p:txBody>
+      </p:sp>
+      <p:sp>
+        <p:nvSpPr>
+          <p:cNvPr id="5" name="Fußzeilenplatzhalter 4"/>
+          <p:cNvSpPr>
+            <a:spLocks noGrp="1"/>
+          </p:cNvSpPr>
+          <p:nvPr>
+            <p:ph type="ftr" sz="quarter" idx="3"/>
+          </p:nvPr>
+        </p:nvSpPr>
+        <p:spPr/>
+        <p:txBody>
+          <a:bodyPr/>
+          <a:lstStyle/>
+          <a:p>
+            <a:r>
+              <a:rPr lang="de-DE" dirty="0" smtClean="0"/>
+              <a:t>Skalierungsverhalten eines </a:t>
+            </a:r>
+            <a:r>
+              <a:rPr lang="de-DE" dirty="0" err="1" smtClean="0"/>
+              <a:t>Raspberry</a:t>
+            </a:r>
+            <a:r>
+              <a:rPr lang="de-DE" dirty="0" smtClean="0"/>
+              <a:t> Pi-Clusters mit HPC-Benchmarks</a:t>
+            </a:r>
+            <a:endParaRPr lang="de-DE" dirty="0"/>
+          </a:p>
+        </p:txBody>
+      </p:sp>
+      <p:pic>
+        <p:nvPicPr>
+          <p:cNvPr id="7" name="Inhaltsplatzhalter 6" descr="stream6.pdf"/>
+          <p:cNvPicPr>
+            <a:picLocks noGrp="1" noChangeAspect="1"/>
+          </p:cNvPicPr>
+          <p:nvPr>
+            <p:ph idx="1"/>
+          </p:nvPr>
+        </p:nvPicPr>
+        <p:blipFill>
+          <a:blip r:embed="rId3">
+            <a:extLst>
+              <a:ext uri="{28A0092B-C50C-407E-A947-70E740481C1C}">
+                <a14:useLocalDpi xmlns:a14="http://schemas.microsoft.com/office/drawing/2010/main" val="0"/>
+              </a:ext>
+            </a:extLst>
+          </a:blip>
+          <a:srcRect l="-11893" r="-11893"/>
+          <a:stretch>
+            <a:fillRect/>
+          </a:stretch>
+        </p:blipFill>
+        <p:spPr/>
+      </p:pic>
+    </p:spTree>
+    <p:extLst>
+      <p:ext uri="{BB962C8B-B14F-4D97-AF65-F5344CB8AC3E}">
+        <p14:creationId xmlns:p14="http://schemas.microsoft.com/office/powerpoint/2010/main" val="3639631481"/>
+      </p:ext>
+    </p:extLst>
+  </p:cSld>
+  <p:clrMapOvr>
+    <a:masterClrMapping/>
+  </p:clrMapOvr>
+  <p:transition xmlns:p14="http://schemas.microsoft.com/office/powerpoint/2010/main" spd="med"/>
+</p:sld>
+</file>
+
+<file path=ppt/slides/slide24.xml><?xml version="1.0" encoding="utf-8"?>
+<p:sld xmlns:a="http://schemas.openxmlformats.org/drawingml/2006/main" xmlns:r="http://schemas.openxmlformats.org/officeDocument/2006/relationships" xmlns:p="http://schemas.openxmlformats.org/presentationml/2006/main">
+  <p:cSld>
+    <p:spTree>
+      <p:nvGrpSpPr>
+        <p:cNvPr id="1" name=""/>
+        <p:cNvGrpSpPr/>
+        <p:nvPr/>
+      </p:nvGrpSpPr>
+      <p:grpSpPr>
+        <a:xfrm>
+          <a:off x="0" y="0"/>
+          <a:ext cx="0" cy="0"/>
+          <a:chOff x="0" y="0"/>
+          <a:chExt cx="0" cy="0"/>
+        </a:xfrm>
+      </p:grpSpPr>
+      <p:sp>
+        <p:nvSpPr>
+          <p:cNvPr id="2" name="Titel 1"/>
+          <p:cNvSpPr>
+            <a:spLocks noGrp="1"/>
+          </p:cNvSpPr>
+          <p:nvPr>
+            <p:ph type="title"/>
+          </p:nvPr>
+        </p:nvSpPr>
+        <p:spPr/>
+        <p:txBody>
+          <a:bodyPr/>
+          <a:lstStyle/>
+          <a:p>
+            <a:r>
+              <a:rPr lang="de-DE" sz="1800" dirty="0" smtClean="0"/>
+              <a:t>Ergebnisse: STREAM 	</a:t>
+            </a:r>
+            <a:endParaRPr lang="de-DE" sz="1800" dirty="0"/>
+          </a:p>
+        </p:txBody>
+      </p:sp>
+      <p:sp>
+        <p:nvSpPr>
+          <p:cNvPr id="3" name="Inhaltsplatzhalter 2"/>
+          <p:cNvSpPr>
+            <a:spLocks noGrp="1"/>
+          </p:cNvSpPr>
+          <p:nvPr>
+            <p:ph idx="1"/>
+          </p:nvPr>
+        </p:nvSpPr>
+        <p:spPr/>
+        <p:txBody>
+          <a:bodyPr/>
+          <a:lstStyle/>
+          <a:p>
+            <a:pPr marL="400050" lvl="1" indent="0">
+              <a:buNone/>
+            </a:pPr>
+            <a:r>
+              <a:rPr lang="de-DE" b="1" dirty="0" smtClean="0"/>
+              <a:t>3.3 Erklärungsansätze</a:t>
+            </a:r>
+          </a:p>
+          <a:p>
+            <a:pPr lvl="1"/>
+            <a:r>
+              <a:rPr lang="de-DE" dirty="0" smtClean="0"/>
+              <a:t>Warum treten für </a:t>
+            </a:r>
+            <a:r>
+              <a:rPr lang="de-DE" dirty="0" err="1"/>
+              <a:t>n</a:t>
+            </a:r>
+            <a:r>
+              <a:rPr lang="de-DE" dirty="0"/>
+              <a:t> &gt; 17 </a:t>
+            </a:r>
+            <a:r>
+              <a:rPr lang="de-DE" dirty="0" err="1"/>
+              <a:t>RPi</a:t>
+            </a:r>
+            <a:r>
+              <a:rPr lang="de-DE" dirty="0"/>
+              <a:t>-Knoten </a:t>
+            </a:r>
+            <a:r>
+              <a:rPr lang="de-DE" dirty="0" smtClean="0"/>
+              <a:t>deutlich </a:t>
+            </a:r>
+            <a:r>
+              <a:rPr lang="de-DE" dirty="0"/>
+              <a:t>schlechtere Performance </a:t>
+            </a:r>
+            <a:r>
+              <a:rPr lang="de-DE" dirty="0" smtClean="0"/>
+              <a:t>und verlängerte Ausführungsdauer auf? </a:t>
+            </a:r>
+            <a:endParaRPr lang="de-DE" b="1" dirty="0" smtClean="0"/>
+          </a:p>
+          <a:p>
+            <a:pPr marL="800100" lvl="1" indent="-342900">
+              <a:buFont typeface="+mj-lt"/>
+              <a:buAutoNum type="arabicPeriod"/>
+            </a:pPr>
+            <a:r>
+              <a:rPr lang="de-DE" b="1" dirty="0" smtClean="0"/>
+              <a:t>Funktionsweise des Benchmarks: </a:t>
+            </a:r>
+            <a:r>
+              <a:rPr lang="de-DE" dirty="0" smtClean="0"/>
+              <a:t>Erwünschter Effekt</a:t>
+            </a:r>
+          </a:p>
+          <a:p>
+            <a:pPr marL="800100" lvl="1" indent="-342900">
+              <a:buFont typeface="+mj-lt"/>
+              <a:buAutoNum type="arabicPeriod"/>
+            </a:pPr>
+            <a:r>
+              <a:rPr lang="de-DE" b="1" dirty="0" err="1" smtClean="0"/>
+              <a:t>Bramble</a:t>
+            </a:r>
+            <a:r>
+              <a:rPr lang="de-DE" b="1" dirty="0" smtClean="0"/>
+              <a:t>-Architektur: </a:t>
+            </a:r>
+            <a:r>
+              <a:rPr lang="de-DE" dirty="0" smtClean="0"/>
+              <a:t>Systemzeit, Netzwerk, Netz-Dateisystem</a:t>
+            </a:r>
+          </a:p>
+          <a:p>
+            <a:pPr marL="800100" lvl="1" indent="-342900">
+              <a:buFont typeface="+mj-lt"/>
+              <a:buAutoNum type="arabicPeriod"/>
+            </a:pPr>
+            <a:r>
+              <a:rPr lang="de-DE" b="1" dirty="0" smtClean="0"/>
+              <a:t>Ausführung des Benchmarks: </a:t>
+            </a:r>
+            <a:r>
+              <a:rPr lang="de-DE" dirty="0" smtClean="0"/>
+              <a:t>Funktionsweise von MPICH</a:t>
+            </a:r>
+            <a:endParaRPr lang="de-DE" dirty="0"/>
+          </a:p>
+          <a:p>
+            <a:pPr lvl="1"/>
+            <a:r>
+              <a:rPr lang="de-DE" dirty="0"/>
+              <a:t>Fazit: Keine letztendliche Klärung möglich!</a:t>
+            </a:r>
+          </a:p>
+          <a:p>
+            <a:pPr marL="800100" lvl="1" indent="-342900">
+              <a:buFont typeface="+mj-lt"/>
+              <a:buAutoNum type="arabicPeriod"/>
+            </a:pPr>
+            <a:endParaRPr lang="de-DE" dirty="0" smtClean="0"/>
+          </a:p>
+          <a:p>
+            <a:pPr marL="800100" lvl="1" indent="-342900">
+              <a:buFont typeface="+mj-lt"/>
+              <a:buAutoNum type="arabicPeriod"/>
+            </a:pPr>
+            <a:endParaRPr lang="de-DE" dirty="0" smtClean="0"/>
+          </a:p>
+          <a:p>
+            <a:pPr>
+              <a:buFont typeface="+mj-lt"/>
+              <a:buAutoNum type="arabicPeriod"/>
+            </a:pPr>
+            <a:endParaRPr lang="de-DE" sz="1600" dirty="0"/>
+          </a:p>
+          <a:p>
+            <a:pPr marL="400050" lvl="1" indent="0">
+              <a:buNone/>
+            </a:pPr>
+            <a:endParaRPr lang="de-DE" b="1" dirty="0" smtClean="0"/>
+          </a:p>
+          <a:p>
+            <a:pPr lvl="1" indent="-342900">
+              <a:buFont typeface="+mj-lt"/>
+              <a:buAutoNum type="arabicPeriod"/>
+            </a:pPr>
+            <a:endParaRPr lang="de-DE" dirty="0" smtClean="0"/>
+          </a:p>
+        </p:txBody>
+      </p:sp>
+      <p:sp>
+        <p:nvSpPr>
+          <p:cNvPr id="4" name="Foliennummernplatzhalter 3"/>
+          <p:cNvSpPr>
+            <a:spLocks noGrp="1"/>
+          </p:cNvSpPr>
+          <p:nvPr>
+            <p:ph type="sldNum" sz="quarter" idx="4"/>
+          </p:nvPr>
+        </p:nvSpPr>
+        <p:spPr/>
+        <p:txBody>
+          <a:bodyPr/>
+          <a:lstStyle/>
+          <a:p>
+            <a:pPr>
+              <a:defRPr/>
+            </a:pPr>
+            <a:fld id="{70BFFA52-4234-45F6-B1A6-074E24FF43A2}" type="slidenum">
+              <a:rPr lang="de-DE" smtClean="0"/>
+              <a:pPr>
+                <a:defRPr/>
+              </a:pPr>
+              <a:t>24</a:t>
+            </a:fld>
+            <a:endParaRPr lang="de-DE" dirty="0"/>
+          </a:p>
+        </p:txBody>
+      </p:sp>
+      <p:sp>
+        <p:nvSpPr>
+          <p:cNvPr id="5" name="Fußzeilenplatzhalter 4"/>
+          <p:cNvSpPr>
+            <a:spLocks noGrp="1"/>
+          </p:cNvSpPr>
+          <p:nvPr>
+            <p:ph type="ftr" sz="quarter" idx="3"/>
+          </p:nvPr>
+        </p:nvSpPr>
+        <p:spPr/>
+        <p:txBody>
+          <a:bodyPr/>
+          <a:lstStyle/>
+          <a:p>
+            <a:r>
+              <a:rPr lang="de-DE" dirty="0" smtClean="0"/>
+              <a:t>Skalierungsverhalten eines </a:t>
+            </a:r>
+            <a:r>
+              <a:rPr lang="de-DE" dirty="0" err="1" smtClean="0"/>
+              <a:t>Raspberry</a:t>
+            </a:r>
+            <a:r>
+              <a:rPr lang="de-DE" dirty="0" smtClean="0"/>
+              <a:t> Pi-Clusters mit HPC-Benchmarks</a:t>
+            </a:r>
+            <a:endParaRPr lang="de-DE" dirty="0"/>
+          </a:p>
+        </p:txBody>
+      </p:sp>
+    </p:spTree>
+    <p:extLst>
+      <p:ext uri="{BB962C8B-B14F-4D97-AF65-F5344CB8AC3E}">
+        <p14:creationId xmlns:p14="http://schemas.microsoft.com/office/powerpoint/2010/main" val="3757617416"/>
+      </p:ext>
+    </p:extLst>
+  </p:cSld>
+  <p:clrMapOvr>
+    <a:masterClrMapping/>
+  </p:clrMapOvr>
+  <p:transition xmlns:p14="http://schemas.microsoft.com/office/powerpoint/2010/main" spd="med"/>
+</p:sld>
+</file>
+
+<file path=ppt/slides/slide25.xml><?xml version="1.0" encoding="utf-8"?>
+<p:sld xmlns:a="http://schemas.openxmlformats.org/drawingml/2006/main" xmlns:r="http://schemas.openxmlformats.org/officeDocument/2006/relationships" xmlns:p="http://schemas.openxmlformats.org/presentationml/2006/main">
+  <p:cSld>
+    <p:spTree>
+      <p:nvGrpSpPr>
+        <p:cNvPr id="1" name=""/>
+        <p:cNvGrpSpPr/>
+        <p:nvPr/>
+      </p:nvGrpSpPr>
+      <p:grpSpPr>
+        <a:xfrm>
+          <a:off x="0" y="0"/>
+          <a:ext cx="0" cy="0"/>
+          <a:chOff x="0" y="0"/>
+          <a:chExt cx="0" cy="0"/>
+        </a:xfrm>
+      </p:grpSpPr>
+      <p:sp>
+        <p:nvSpPr>
+          <p:cNvPr id="2" name="Titel 1"/>
+          <p:cNvSpPr>
+            <a:spLocks noGrp="1"/>
+          </p:cNvSpPr>
+          <p:nvPr>
+            <p:ph type="title"/>
+          </p:nvPr>
+        </p:nvSpPr>
+        <p:spPr/>
+        <p:txBody>
+          <a:bodyPr/>
+          <a:lstStyle/>
+          <a:p>
+            <a:r>
+              <a:rPr lang="de-DE" sz="1800" dirty="0" smtClean="0"/>
+              <a:t>Zusammenfassung und Ausblick 	</a:t>
+            </a:r>
+            <a:endParaRPr lang="de-DE" sz="1800" dirty="0"/>
+          </a:p>
+        </p:txBody>
+      </p:sp>
+      <p:sp>
+        <p:nvSpPr>
+          <p:cNvPr id="3" name="Inhaltsplatzhalter 2"/>
+          <p:cNvSpPr>
+            <a:spLocks noGrp="1"/>
+          </p:cNvSpPr>
+          <p:nvPr>
+            <p:ph idx="1"/>
+          </p:nvPr>
+        </p:nvSpPr>
+        <p:spPr/>
+        <p:txBody>
+          <a:bodyPr/>
+          <a:lstStyle/>
+          <a:p>
+            <a:pPr marL="457200" indent="-457200">
+              <a:buAutoNum type="arabicPeriod"/>
+            </a:pPr>
+            <a:r>
+              <a:rPr lang="de-DE" b="1" dirty="0" smtClean="0"/>
+              <a:t>Zusammenfassung</a:t>
+            </a:r>
+          </a:p>
+          <a:p>
+            <a:pPr lvl="1"/>
+            <a:r>
+              <a:rPr lang="de-DE" b="1" dirty="0" smtClean="0"/>
+              <a:t>Zielsetzung: </a:t>
+            </a:r>
+            <a:r>
+              <a:rPr lang="de-DE" dirty="0" smtClean="0"/>
+              <a:t>Skalierungsverhalten eines </a:t>
+            </a:r>
+            <a:r>
+              <a:rPr lang="de-DE" dirty="0" err="1" smtClean="0"/>
+              <a:t>Bramble</a:t>
+            </a:r>
+            <a:r>
+              <a:rPr lang="de-DE" dirty="0" smtClean="0"/>
+              <a:t> bei der parallelen Ausführung von HPC-Benchmarks</a:t>
+            </a:r>
+          </a:p>
+          <a:p>
+            <a:pPr lvl="1"/>
+            <a:r>
+              <a:rPr lang="de-DE" b="1" dirty="0" smtClean="0"/>
+              <a:t>Ergebnisse:</a:t>
+            </a:r>
+          </a:p>
+          <a:p>
+            <a:pPr marL="1257300" lvl="2" indent="-342900">
+              <a:buFont typeface="+mj-lt"/>
+              <a:buAutoNum type="arabicPeriod"/>
+            </a:pPr>
+            <a:r>
+              <a:rPr lang="de-DE" b="1" dirty="0" smtClean="0"/>
+              <a:t>Stromverbrauch:</a:t>
+            </a:r>
+            <a:r>
+              <a:rPr lang="de-DE" dirty="0" smtClean="0"/>
+              <a:t> Kohärent und erwartungsgemäß</a:t>
+            </a:r>
+          </a:p>
+          <a:p>
+            <a:pPr marL="1257300" lvl="2" indent="-342900">
+              <a:buFont typeface="+mj-lt"/>
+              <a:buAutoNum type="arabicPeriod"/>
+            </a:pPr>
+            <a:r>
+              <a:rPr lang="de-DE" b="1" dirty="0" smtClean="0"/>
+              <a:t>HPL:</a:t>
+            </a:r>
+            <a:r>
+              <a:rPr lang="de-DE" dirty="0" smtClean="0"/>
+              <a:t> Kohärent und erwartungsgemäß (lineare CPU-Performance)</a:t>
+            </a:r>
+          </a:p>
+          <a:p>
+            <a:pPr marL="1257300" lvl="2" indent="-342900">
+              <a:buFont typeface="+mj-lt"/>
+              <a:buAutoNum type="arabicPeriod"/>
+            </a:pPr>
+            <a:r>
+              <a:rPr lang="de-DE" b="1" dirty="0" smtClean="0"/>
+              <a:t>STREAM:</a:t>
+            </a:r>
+            <a:r>
+              <a:rPr lang="de-DE" dirty="0" smtClean="0"/>
+              <a:t> Kohärent und erwartungsgemäß für </a:t>
+            </a:r>
+            <a:r>
+              <a:rPr lang="de-DE" dirty="0" err="1" smtClean="0"/>
+              <a:t>n</a:t>
+            </a:r>
+            <a:r>
+              <a:rPr lang="de-DE" dirty="0" smtClean="0"/>
+              <a:t> ≤ 18 Rechenknoten (Durchsatz Hauptspeicherzugriffe)</a:t>
+            </a:r>
+          </a:p>
+          <a:p>
+            <a:pPr marL="857250" lvl="1" indent="-342900"/>
+            <a:r>
+              <a:rPr lang="de-DE" dirty="0" err="1" smtClean="0"/>
+              <a:t>Proof</a:t>
+            </a:r>
+            <a:r>
+              <a:rPr lang="de-DE" dirty="0" smtClean="0"/>
+              <a:t> </a:t>
+            </a:r>
+            <a:r>
+              <a:rPr lang="de-DE" dirty="0" err="1" smtClean="0"/>
+              <a:t>of</a:t>
+            </a:r>
+            <a:r>
+              <a:rPr lang="de-DE" dirty="0" smtClean="0"/>
+              <a:t> </a:t>
+            </a:r>
+            <a:r>
+              <a:rPr lang="de-DE" dirty="0" err="1" smtClean="0"/>
+              <a:t>Concept</a:t>
+            </a:r>
+            <a:r>
+              <a:rPr lang="de-DE" dirty="0" smtClean="0"/>
+              <a:t> (Vorgaben, Integration)</a:t>
+            </a:r>
+            <a:r>
+              <a:rPr lang="de-DE" smtClean="0"/>
+              <a:t>: Erfolgt </a:t>
+            </a:r>
+            <a:endParaRPr lang="de-DE" dirty="0" smtClean="0"/>
+          </a:p>
+          <a:p>
+            <a:pPr marL="457200" indent="-457200">
+              <a:buAutoNum type="arabicPeriod"/>
+            </a:pPr>
+            <a:r>
+              <a:rPr lang="de-DE" b="1" dirty="0" smtClean="0"/>
+              <a:t>Ausblick </a:t>
+            </a:r>
+            <a:endParaRPr lang="de-DE" dirty="0"/>
+          </a:p>
+          <a:p>
+            <a:pPr marL="800100" lvl="1" indent="-342900">
+              <a:buFont typeface="+mj-lt"/>
+              <a:buAutoNum type="arabicPeriod"/>
+            </a:pPr>
+            <a:endParaRPr lang="de-DE" dirty="0" smtClean="0"/>
+          </a:p>
+          <a:p>
+            <a:pPr marL="800100" lvl="1" indent="-342900">
+              <a:buFont typeface="+mj-lt"/>
+              <a:buAutoNum type="arabicPeriod"/>
+            </a:pPr>
+            <a:endParaRPr lang="de-DE" dirty="0" smtClean="0"/>
+          </a:p>
+          <a:p>
+            <a:pPr>
+              <a:buFont typeface="+mj-lt"/>
+              <a:buAutoNum type="arabicPeriod"/>
+            </a:pPr>
+            <a:endParaRPr lang="de-DE" sz="1600" dirty="0"/>
+          </a:p>
+          <a:p>
+            <a:pPr marL="400050" lvl="1" indent="0">
+              <a:buNone/>
+            </a:pPr>
+            <a:endParaRPr lang="de-DE" b="1" dirty="0" smtClean="0"/>
+          </a:p>
+          <a:p>
+            <a:pPr lvl="1" indent="-342900">
+              <a:buFont typeface="+mj-lt"/>
+              <a:buAutoNum type="arabicPeriod"/>
+            </a:pPr>
+            <a:endParaRPr lang="de-DE" dirty="0" smtClean="0"/>
+          </a:p>
+        </p:txBody>
+      </p:sp>
+      <p:sp>
+        <p:nvSpPr>
+          <p:cNvPr id="4" name="Foliennummernplatzhalter 3"/>
+          <p:cNvSpPr>
+            <a:spLocks noGrp="1"/>
+          </p:cNvSpPr>
+          <p:nvPr>
+            <p:ph type="sldNum" sz="quarter" idx="4"/>
+          </p:nvPr>
+        </p:nvSpPr>
+        <p:spPr/>
+        <p:txBody>
+          <a:bodyPr/>
+          <a:lstStyle/>
+          <a:p>
+            <a:pPr>
+              <a:defRPr/>
+            </a:pPr>
+            <a:fld id="{70BFFA52-4234-45F6-B1A6-074E24FF43A2}" type="slidenum">
+              <a:rPr lang="de-DE" smtClean="0"/>
+              <a:pPr>
+                <a:defRPr/>
+              </a:pPr>
+              <a:t>25</a:t>
+            </a:fld>
+            <a:endParaRPr lang="de-DE" dirty="0"/>
+          </a:p>
+        </p:txBody>
+      </p:sp>
+      <p:sp>
+        <p:nvSpPr>
+          <p:cNvPr id="5" name="Fußzeilenplatzhalter 4"/>
+          <p:cNvSpPr>
+            <a:spLocks noGrp="1"/>
+          </p:cNvSpPr>
+          <p:nvPr>
+            <p:ph type="ftr" sz="quarter" idx="3"/>
+          </p:nvPr>
+        </p:nvSpPr>
+        <p:spPr/>
+        <p:txBody>
+          <a:bodyPr/>
+          <a:lstStyle/>
+          <a:p>
+            <a:r>
+              <a:rPr lang="de-DE" dirty="0" smtClean="0"/>
+              <a:t>Skalierungsverhalten eines </a:t>
+            </a:r>
+            <a:r>
+              <a:rPr lang="de-DE" dirty="0" err="1" smtClean="0"/>
+              <a:t>Raspberry</a:t>
+            </a:r>
+            <a:r>
+              <a:rPr lang="de-DE" dirty="0" smtClean="0"/>
+              <a:t> Pi-Clusters mit HPC-Benchmarks</a:t>
+            </a:r>
+            <a:endParaRPr lang="de-DE" dirty="0"/>
+          </a:p>
+        </p:txBody>
+      </p:sp>
+    </p:spTree>
+    <p:extLst>
+      <p:ext uri="{BB962C8B-B14F-4D97-AF65-F5344CB8AC3E}">
+        <p14:creationId xmlns:p14="http://schemas.microsoft.com/office/powerpoint/2010/main" val="1580187381"/>
       </p:ext>
     </p:extLst>
   </p:cSld>
@@ -3821,11 +7956,11 @@
               <a:buAutoNum type="arabicPeriod"/>
             </a:pPr>
             <a:r>
-              <a:rPr lang="de-DE" dirty="0" err="1" smtClean="0"/>
+              <a:rPr lang="de-DE" b="1" dirty="0" err="1" smtClean="0"/>
               <a:t>Raspberry</a:t>
             </a:r>
             <a:r>
-              <a:rPr lang="de-DE" dirty="0" smtClean="0"/>
+              <a:rPr lang="de-DE" b="1" dirty="0" smtClean="0"/>
               <a:t> Pi</a:t>
             </a:r>
           </a:p>
@@ -4371,10 +8506,10 @@
               <a:buAutoNum type="arabicPeriod" startAt="2"/>
             </a:pPr>
             <a:r>
-              <a:rPr lang="de-DE" dirty="0" err="1" smtClean="0"/>
+              <a:rPr lang="de-DE" b="1" dirty="0" err="1" smtClean="0"/>
               <a:t>Bramble</a:t>
             </a:r>
-            <a:endParaRPr lang="de-DE" dirty="0" smtClean="0"/>
+            <a:endParaRPr lang="de-DE" b="1" dirty="0" smtClean="0"/>
           </a:p>
           <a:p>
             <a:r>
@@ -4932,7 +9067,7 @@
               <a:buAutoNum type="arabicPeriod" startAt="3"/>
             </a:pPr>
             <a:r>
-              <a:rPr lang="de-DE" dirty="0" smtClean="0"/>
+              <a:rPr lang="de-DE" b="1" dirty="0" smtClean="0"/>
               <a:t>Aufgabenstellung</a:t>
             </a:r>
           </a:p>
@@ -5194,14 +9329,18 @@
               <a:buAutoNum type="arabicPeriod"/>
             </a:pPr>
             <a:r>
-              <a:rPr lang="de-DE" dirty="0" smtClean="0"/>
+              <a:rPr lang="de-DE" b="1" dirty="0" smtClean="0"/>
               <a:t>Definitionen und Messparameter</a:t>
             </a:r>
           </a:p>
           <a:p>
             <a:r>
               <a:rPr lang="de-DE" dirty="0" smtClean="0"/>
-              <a:t>Was wird gemessen? </a:t>
+              <a:t>Wie wird </a:t>
+            </a:r>
+            <a:r>
+              <a:rPr lang="de-DE" dirty="0" smtClean="0"/>
+              <a:t>gemessen? </a:t>
             </a:r>
           </a:p>
           <a:p>
@@ -5266,7 +9405,7 @@
           <a:p>
             <a:r>
               <a:rPr lang="de-DE" dirty="0" smtClean="0"/>
-              <a:t>Wie wird gemessen? </a:t>
+              <a:t>Was wird gemessen? </a:t>
             </a:r>
             <a:endParaRPr lang="de-DE" b="1" dirty="0" smtClean="0"/>
           </a:p>

</xml_diff>

<commit_message>
Update ppt presentation (future works, layout)
</commit_message>
<xml_diff>
--- a/Disputation/grei14.pptx
+++ b/Disputation/grei14.pptx
@@ -5,10 +5,10 @@
     <p:sldMasterId id="2147483652" r:id="rId1"/>
   </p:sldMasterIdLst>
   <p:notesMasterIdLst>
-    <p:notesMasterId r:id="rId27"/>
+    <p:notesMasterId r:id="rId28"/>
   </p:notesMasterIdLst>
   <p:handoutMasterIdLst>
-    <p:handoutMasterId r:id="rId28"/>
+    <p:handoutMasterId r:id="rId29"/>
   </p:handoutMasterIdLst>
   <p:sldIdLst>
     <p:sldId id="836" r:id="rId2"/>
@@ -36,6 +36,7 @@
     <p:sldId id="858" r:id="rId24"/>
     <p:sldId id="859" r:id="rId25"/>
     <p:sldId id="861" r:id="rId26"/>
+    <p:sldId id="862" r:id="rId27"/>
   </p:sldIdLst>
   <p:sldSz cx="9144000" cy="6858000" type="screen4x3"/>
   <p:notesSz cx="6781800" cy="9855200"/>
@@ -323,7 +324,7 @@
           <a:p>
             <a:fld id="{4C476B9A-09E8-F547-B409-8F77FB8D3140}" type="datetime1">
               <a:rPr lang="de-DE" smtClean="0"/>
-              <a:t>22.06.14</a:t>
+              <a:t>23.06.14</a:t>
             </a:fld>
             <a:endParaRPr lang="de-DE"/>
           </a:p>
@@ -2109,6 +2110,91 @@
 </p:notes>
 </file>
 
+<file path=ppt/notesSlides/notesSlide25.xml><?xml version="1.0" encoding="utf-8"?>
+<p:notes xmlns:a="http://schemas.openxmlformats.org/drawingml/2006/main" xmlns:r="http://schemas.openxmlformats.org/officeDocument/2006/relationships" xmlns:p="http://schemas.openxmlformats.org/presentationml/2006/main">
+  <p:cSld>
+    <p:spTree>
+      <p:nvGrpSpPr>
+        <p:cNvPr id="1" name=""/>
+        <p:cNvGrpSpPr/>
+        <p:nvPr/>
+      </p:nvGrpSpPr>
+      <p:grpSpPr>
+        <a:xfrm>
+          <a:off x="0" y="0"/>
+          <a:ext cx="0" cy="0"/>
+          <a:chOff x="0" y="0"/>
+          <a:chExt cx="0" cy="0"/>
+        </a:xfrm>
+      </p:grpSpPr>
+      <p:sp>
+        <p:nvSpPr>
+          <p:cNvPr id="2" name="Folienbildplatzhalter 1"/>
+          <p:cNvSpPr>
+            <a:spLocks noGrp="1" noRot="1" noChangeAspect="1"/>
+          </p:cNvSpPr>
+          <p:nvPr>
+            <p:ph type="sldImg"/>
+          </p:nvPr>
+        </p:nvSpPr>
+        <p:spPr/>
+      </p:sp>
+      <p:sp>
+        <p:nvSpPr>
+          <p:cNvPr id="3" name="Notizenplatzhalter 2"/>
+          <p:cNvSpPr>
+            <a:spLocks noGrp="1"/>
+          </p:cNvSpPr>
+          <p:nvPr>
+            <p:ph type="body" idx="1"/>
+          </p:nvPr>
+        </p:nvSpPr>
+        <p:spPr/>
+        <p:txBody>
+          <a:bodyPr/>
+          <a:lstStyle/>
+          <a:p>
+            <a:endParaRPr lang="de-DE"/>
+          </a:p>
+        </p:txBody>
+      </p:sp>
+      <p:sp>
+        <p:nvSpPr>
+          <p:cNvPr id="4" name="Foliennummernplatzhalter 3"/>
+          <p:cNvSpPr>
+            <a:spLocks noGrp="1"/>
+          </p:cNvSpPr>
+          <p:nvPr>
+            <p:ph type="sldNum" sz="quarter" idx="10"/>
+          </p:nvPr>
+        </p:nvSpPr>
+        <p:spPr/>
+        <p:txBody>
+          <a:bodyPr/>
+          <a:lstStyle/>
+          <a:p>
+            <a:fld id="{87E9C61A-9B5E-4580-98DD-1AC874081FFB}" type="slidenum">
+              <a:rPr lang="de-DE" smtClean="0"/>
+              <a:pPr/>
+              <a:t>26</a:t>
+            </a:fld>
+            <a:endParaRPr lang="de-DE"/>
+          </a:p>
+        </p:txBody>
+      </p:sp>
+    </p:spTree>
+    <p:extLst>
+      <p:ext uri="{BB962C8B-B14F-4D97-AF65-F5344CB8AC3E}">
+        <p14:creationId xmlns:p14="http://schemas.microsoft.com/office/powerpoint/2010/main" val="1952917371"/>
+      </p:ext>
+    </p:extLst>
+  </p:cSld>
+  <p:clrMapOvr>
+    <a:masterClrMapping/>
+  </p:clrMapOvr>
+</p:notes>
+</file>
+
 <file path=ppt/notesSlides/notesSlide3.xml><?xml version="1.0" encoding="utf-8"?>
 <p:notes xmlns:a="http://schemas.openxmlformats.org/drawingml/2006/main" xmlns:r="http://schemas.openxmlformats.org/officeDocument/2006/relationships" xmlns:p="http://schemas.openxmlformats.org/presentationml/2006/main">
   <p:cSld>
@@ -2408,7 +2494,7 @@
           <a:bodyPr/>
           <a:lstStyle/>
           <a:p>
-            <a:endParaRPr lang="de-DE"/>
+            <a:endParaRPr lang="de-DE" dirty="0"/>
           </a:p>
         </p:txBody>
       </p:sp>
@@ -4265,11 +4351,7 @@
           <a:p>
             <a:r>
               <a:rPr lang="de-DE" sz="1800" dirty="0" smtClean="0"/>
-              <a:t>Verwendete </a:t>
-            </a:r>
-            <a:r>
-              <a:rPr lang="de-DE" sz="1800" dirty="0" smtClean="0"/>
-              <a:t>Benchmarks</a:t>
+              <a:t>Versuchsaufbau und -ablauf</a:t>
             </a:r>
             <a:endParaRPr lang="de-DE" sz="1800" dirty="0"/>
           </a:p>
@@ -4304,10 +4386,13 @@
             </a:r>
           </a:p>
           <a:p>
-            <a:pPr marL="857250" lvl="1" indent="-457200">
-              <a:buFont typeface="+mj-lt"/>
-              <a:buAutoNum type="arabicPeriod"/>
-            </a:pPr>
+            <a:pPr marL="400050" lvl="1" indent="0">
+              <a:buNone/>
+            </a:pPr>
+            <a:r>
+              <a:rPr lang="de-DE" b="1" dirty="0" smtClean="0"/>
+              <a:t>2.1 </a:t>
+            </a:r>
             <a:r>
               <a:rPr lang="de-DE" b="1" dirty="0" smtClean="0"/>
               <a:t>HPL </a:t>
@@ -4315,14 +4400,20 @@
             <a:endParaRPr lang="de-DE" b="1" dirty="0" smtClean="0"/>
           </a:p>
           <a:p>
-            <a:pPr marL="685800" lvl="1"/>
+            <a:pPr lvl="2" indent="-285750">
+              <a:buFont typeface="Arial"/>
+              <a:buChar char="•"/>
+            </a:pPr>
             <a:r>
               <a:rPr lang="de-DE" b="1" dirty="0" smtClean="0"/>
               <a:t>Was wird gemessen? CPU-Performance</a:t>
             </a:r>
           </a:p>
           <a:p>
-            <a:pPr marL="685800" lvl="1"/>
+            <a:pPr lvl="2" indent="-285750">
+              <a:buFont typeface="Arial"/>
+              <a:buChar char="•"/>
+            </a:pPr>
             <a:r>
               <a:rPr lang="de-DE" b="1" dirty="0" smtClean="0"/>
               <a:t>Prinzip</a:t>
@@ -4345,14 +4436,13 @@
             </a:r>
           </a:p>
           <a:p>
-            <a:pPr marL="685800" lvl="1"/>
-            <a:r>
-              <a:rPr lang="de-DE" dirty="0" smtClean="0"/>
-              <a:t>Frei </a:t>
-            </a:r>
-            <a:r>
-              <a:rPr lang="de-DE" dirty="0" smtClean="0"/>
-              <a:t>verfügbare Implementierung von </a:t>
+            <a:pPr lvl="2" indent="-285750">
+              <a:buFont typeface="Arial"/>
+              <a:buChar char="•"/>
+            </a:pPr>
+            <a:r>
+              <a:rPr lang="de-DE" dirty="0" smtClean="0"/>
+              <a:t>Frei verfügbare Implementierung von </a:t>
             </a:r>
             <a:r>
               <a:rPr lang="de-DE" dirty="0" err="1" smtClean="0"/>
@@ -4360,22 +4450,17 @@
             </a:r>
             <a:r>
               <a:rPr lang="de-DE" dirty="0" smtClean="0"/>
-              <a:t> (</a:t>
-            </a:r>
-            <a:r>
-              <a:rPr lang="de-DE" dirty="0" smtClean="0"/>
-              <a:t>Ermittlung der Top500-Rangliste)</a:t>
-            </a:r>
-          </a:p>
-          <a:p>
-            <a:pPr marL="685800" lvl="1"/>
-            <a:r>
-              <a:rPr lang="de-DE" dirty="0" smtClean="0"/>
-              <a:t>Anpassung </a:t>
-            </a:r>
-            <a:r>
-              <a:rPr lang="de-DE" dirty="0" smtClean="0"/>
-              <a:t>an </a:t>
+              <a:t> (Ermittlung der Top500-Rangliste)</a:t>
+            </a:r>
+          </a:p>
+          <a:p>
+            <a:pPr lvl="2" indent="-285750">
+              <a:buFont typeface="Arial"/>
+              <a:buChar char="•"/>
+            </a:pPr>
+            <a:r>
+              <a:rPr lang="de-DE" dirty="0" smtClean="0"/>
+              <a:t>Anpassung an </a:t>
             </a:r>
             <a:r>
               <a:rPr lang="de-DE" dirty="0" err="1" smtClean="0"/>
@@ -4391,27 +4476,25 @@
             </a:r>
             <a:r>
               <a:rPr lang="de-DE" dirty="0" smtClean="0"/>
-              <a:t>)</a:t>
-            </a:r>
-            <a:r>
-              <a:rPr lang="de-DE" dirty="0" smtClean="0"/>
-              <a:t> </a:t>
+              <a:t>) </a:t>
+            </a:r>
+            <a:endParaRPr lang="de-DE" dirty="0"/>
+          </a:p>
+          <a:p>
+            <a:pPr marL="400050" lvl="1" indent="0">
+              <a:buNone/>
+            </a:pPr>
+            <a:r>
+              <a:rPr lang="de-DE" b="1" dirty="0" smtClean="0"/>
+              <a:t>2.2 STREAM</a:t>
             </a:r>
             <a:endParaRPr lang="de-DE" dirty="0" smtClean="0"/>
           </a:p>
           <a:p>
-            <a:pPr lvl="1" indent="-342900">
-              <a:buFont typeface="+mj-lt"/>
-              <a:buAutoNum type="arabicPeriod" startAt="2"/>
-            </a:pPr>
-            <a:r>
-              <a:rPr lang="de-DE" b="1" dirty="0" smtClean="0"/>
-              <a:t>STREAM</a:t>
-            </a:r>
-            <a:endParaRPr lang="de-DE" dirty="0" smtClean="0"/>
-          </a:p>
-          <a:p>
-            <a:pPr marL="685800" lvl="1"/>
+            <a:pPr lvl="2" indent="-285750">
+              <a:buFont typeface="Arial"/>
+              <a:buChar char="•"/>
+            </a:pPr>
             <a:r>
               <a:rPr lang="de-DE" b="1" dirty="0" smtClean="0"/>
               <a:t>Was </a:t>
@@ -4427,7 +4510,10 @@
             <a:endParaRPr lang="de-DE" dirty="0" smtClean="0"/>
           </a:p>
           <a:p>
-            <a:pPr marL="685800" lvl="1"/>
+            <a:pPr lvl="2" indent="-285750">
+              <a:buFont typeface="Arial"/>
+              <a:buChar char="•"/>
+            </a:pPr>
             <a:r>
               <a:rPr lang="de-DE" b="1" dirty="0" smtClean="0"/>
               <a:t>Prinzip</a:t>
@@ -4446,7 +4532,10 @@
             </a:r>
           </a:p>
           <a:p>
-            <a:pPr marL="685800" lvl="1"/>
+            <a:pPr lvl="2" indent="-285750">
+              <a:buFont typeface="Arial"/>
+              <a:buChar char="•"/>
+            </a:pPr>
             <a:r>
               <a:rPr lang="de-DE" dirty="0" smtClean="0"/>
               <a:t>4 Module: </a:t>
@@ -4477,7 +4566,10 @@
             </a:r>
           </a:p>
           <a:p>
-            <a:pPr marL="685800" lvl="1"/>
+            <a:pPr lvl="2" indent="-285750">
+              <a:buFont typeface="Arial"/>
+              <a:buChar char="•"/>
+            </a:pPr>
             <a:r>
               <a:rPr lang="de-DE" dirty="0" smtClean="0"/>
               <a:t>Bestandteil der HPC-Challenge-Suite</a:t>
@@ -4619,7 +4711,7 @@
           <a:p>
             <a:r>
               <a:rPr lang="de-DE" sz="1800" dirty="0" smtClean="0"/>
-              <a:t>Versuchsdurchführung</a:t>
+              <a:t>Versuchsaufbau und -ablauf</a:t>
             </a:r>
             <a:endParaRPr lang="de-DE" sz="1800" dirty="0"/>
           </a:p>
@@ -4664,145 +4756,158 @@
           </a:p>
           <a:p>
             <a:pPr lvl="2" indent="-342900">
-              <a:buFont typeface="+mj-lt"/>
-              <a:buAutoNum type="arabicPeriod"/>
+              <a:buFont typeface="Arial"/>
+              <a:buChar char="•"/>
             </a:pPr>
             <a:r>
               <a:rPr lang="de-DE" dirty="0" smtClean="0"/>
               <a:t>Defekte Hardware</a:t>
             </a:r>
+          </a:p>
+          <a:p>
+            <a:pPr lvl="2" indent="-342900">
+              <a:buFont typeface="Arial"/>
+              <a:buChar char="•"/>
+            </a:pPr>
+            <a:r>
+              <a:rPr lang="de-DE" dirty="0" smtClean="0"/>
+              <a:t>Rechenknoten nicht erreichbar (ping/</a:t>
+            </a:r>
+            <a:r>
+              <a:rPr lang="de-DE" dirty="0" err="1" smtClean="0"/>
+              <a:t>ssh</a:t>
+            </a:r>
+            <a:r>
+              <a:rPr lang="de-DE" dirty="0" smtClean="0"/>
+              <a:t>)</a:t>
+            </a:r>
+          </a:p>
+          <a:p>
+            <a:pPr lvl="2" indent="-342900">
+              <a:buFont typeface="Arial"/>
+              <a:buChar char="•"/>
+            </a:pPr>
+            <a:r>
+              <a:rPr lang="de-DE" dirty="0" smtClean="0"/>
+              <a:t>Geteiltes Verzeichnis nicht eingehängt</a:t>
+            </a:r>
+          </a:p>
+          <a:p>
+            <a:pPr lvl="2" indent="-342900">
+              <a:buFont typeface="Arial"/>
+              <a:buChar char="•"/>
+            </a:pPr>
+            <a:r>
+              <a:rPr lang="de-DE" dirty="0" err="1" smtClean="0"/>
+              <a:t>Bash</a:t>
+            </a:r>
+            <a:r>
+              <a:rPr lang="de-DE" dirty="0" smtClean="0"/>
+              <a:t>-Befehle werden nicht erkannt</a:t>
+            </a:r>
+          </a:p>
+          <a:p>
+            <a:pPr marL="400050" lvl="1" indent="0">
+              <a:buNone/>
+            </a:pPr>
+            <a:r>
+              <a:rPr lang="de-DE" b="1" dirty="0" smtClean="0"/>
+              <a:t>3.2 </a:t>
+            </a:r>
+            <a:r>
+              <a:rPr lang="de-DE" b="1" dirty="0" smtClean="0"/>
+              <a:t>Ziele</a:t>
+            </a:r>
+            <a:endParaRPr lang="de-DE" b="1" dirty="0" smtClean="0"/>
           </a:p>
           <a:p>
             <a:pPr lvl="2" indent="-342900">
               <a:buFont typeface="+mj-lt"/>
-              <a:buAutoNum type="arabicPeriod"/>
-            </a:pPr>
-            <a:r>
-              <a:rPr lang="de-DE" dirty="0" smtClean="0"/>
-              <a:t>Rechenknoten nicht erreichbar (ping/</a:t>
+              <a:buAutoNum type="alphaLcParenR"/>
+            </a:pPr>
+            <a:r>
+              <a:rPr lang="de-DE" b="1" dirty="0" smtClean="0"/>
+              <a:t>Parallele Ausführung der Benchmark-Programme</a:t>
+            </a:r>
+            <a:r>
+              <a:rPr lang="de-DE" dirty="0" smtClean="0"/>
+              <a:t> auf </a:t>
             </a:r>
             <a:r>
               <a:rPr lang="de-DE" dirty="0" err="1" smtClean="0"/>
-              <a:t>ssh</a:t>
-            </a:r>
-            <a:r>
-              <a:rPr lang="de-DE" dirty="0" smtClean="0"/>
-              <a:t>)</a:t>
-            </a:r>
+              <a:t>n</a:t>
+            </a:r>
+            <a:r>
+              <a:rPr lang="de-DE" dirty="0" smtClean="0"/>
+              <a:t> – 4 Rechenknoten </a:t>
+            </a:r>
+            <a:r>
+              <a:rPr lang="de-DE" dirty="0" smtClean="0"/>
+              <a:t>(Max.19: pi03 ist Berechnungsknoten/Min. 4: Kleinstmögliche Anzahl für HPL)</a:t>
+            </a:r>
+            <a:endParaRPr lang="de-DE" b="1" dirty="0" smtClean="0"/>
           </a:p>
           <a:p>
             <a:pPr lvl="2" indent="-342900">
               <a:buFont typeface="+mj-lt"/>
-              <a:buAutoNum type="arabicPeriod"/>
-            </a:pPr>
-            <a:r>
-              <a:rPr lang="de-DE" dirty="0" smtClean="0"/>
-              <a:t>Geteiltes Verzeichnis nicht eingehängt</a:t>
+              <a:buAutoNum type="alphaLcParenR"/>
+            </a:pPr>
+            <a:r>
+              <a:rPr lang="de-DE" b="1" dirty="0" smtClean="0"/>
+              <a:t>Zwei Messreihen pro Benchmark</a:t>
+            </a:r>
+            <a:r>
+              <a:rPr lang="de-DE" dirty="0" smtClean="0"/>
+              <a:t>: Messreihe 1 (alle </a:t>
+            </a:r>
+            <a:r>
+              <a:rPr lang="de-DE" dirty="0" err="1" smtClean="0"/>
+              <a:t>Raspberry</a:t>
+            </a:r>
+            <a:r>
+              <a:rPr lang="de-DE" dirty="0" smtClean="0"/>
+              <a:t> Pis angeschaltet)/Messreihe 2 (nicht aktive </a:t>
+            </a:r>
+            <a:r>
+              <a:rPr lang="de-DE" dirty="0" err="1" smtClean="0"/>
+              <a:t>Raspberry</a:t>
+            </a:r>
+            <a:r>
+              <a:rPr lang="de-DE" dirty="0"/>
+              <a:t> </a:t>
+            </a:r>
+            <a:r>
+              <a:rPr lang="de-DE" dirty="0" smtClean="0"/>
+              <a:t>Pis werden heruntergefahren und von Stromversorgung getrennt) </a:t>
             </a:r>
           </a:p>
           <a:p>
             <a:pPr lvl="2" indent="-342900">
               <a:buFont typeface="+mj-lt"/>
-              <a:buAutoNum type="arabicPeriod"/>
-            </a:pPr>
-            <a:r>
-              <a:rPr lang="de-DE" dirty="0" err="1" smtClean="0"/>
-              <a:t>Bash</a:t>
-            </a:r>
-            <a:r>
-              <a:rPr lang="de-DE" dirty="0" smtClean="0"/>
-              <a:t>-Befehle werden nicht erkannt</a:t>
-            </a:r>
-          </a:p>
-          <a:p>
-            <a:pPr marL="400050" lvl="1" indent="0">
-              <a:buNone/>
+              <a:buAutoNum type="alphaLcParenR"/>
             </a:pPr>
             <a:r>
               <a:rPr lang="de-DE" b="1" dirty="0" smtClean="0"/>
-              <a:t>3.2 Ziele </a:t>
-            </a:r>
-            <a:r>
-              <a:rPr lang="de-DE" b="1" dirty="0"/>
-              <a:t>Versuchsaufbau </a:t>
-            </a:r>
-            <a:endParaRPr lang="de-DE" b="1" dirty="0" smtClean="0"/>
+              <a:t>Auswertung Strommessgerät</a:t>
+            </a:r>
           </a:p>
           <a:p>
             <a:pPr lvl="2" indent="-342900">
               <a:buFont typeface="+mj-lt"/>
-              <a:buAutoNum type="arabicPeriod"/>
-            </a:pPr>
-            <a:r>
-              <a:rPr lang="de-DE" dirty="0" smtClean="0"/>
-              <a:t>Parallele Ausführung der Benchmark-Programme auf </a:t>
-            </a:r>
-            <a:r>
-              <a:rPr lang="de-DE" dirty="0" err="1" smtClean="0"/>
-              <a:t>n</a:t>
-            </a:r>
-            <a:r>
-              <a:rPr lang="de-DE" dirty="0" smtClean="0"/>
-              <a:t> – 4 Rechenknoten (maximal 19 Rechenknoten, da: pi03 als Berechnungsknoten definiert/minimal 4 Rechenknoten, da: HPL benötigt mindestens 4)</a:t>
+              <a:buAutoNum type="alphaLcParenR"/>
+            </a:pPr>
+            <a:r>
+              <a:rPr lang="de-DE" b="1" dirty="0" smtClean="0"/>
+              <a:t>Automatisierte Durchführung der Messungen</a:t>
             </a:r>
           </a:p>
           <a:p>
             <a:pPr lvl="2" indent="-342900">
               <a:buFont typeface="+mj-lt"/>
-              <a:buAutoNum type="arabicPeriod"/>
-            </a:pPr>
-            <a:r>
-              <a:rPr lang="de-DE" dirty="0" smtClean="0"/>
-              <a:t>Zwei Messreihen pro Benchmark: Messreihe 1 (alle </a:t>
-            </a:r>
-            <a:r>
-              <a:rPr lang="de-DE" dirty="0" err="1" smtClean="0"/>
-              <a:t>Raspberry</a:t>
-            </a:r>
-            <a:r>
-              <a:rPr lang="de-DE" dirty="0" smtClean="0"/>
-              <a:t> Pis angeschaltet)/Messreihe 2 (nicht aktive </a:t>
-            </a:r>
-            <a:r>
-              <a:rPr lang="de-DE" dirty="0" err="1" smtClean="0"/>
-              <a:t>Raspberry</a:t>
-            </a:r>
-            <a:r>
-              <a:rPr lang="de-DE" dirty="0"/>
-              <a:t> </a:t>
-            </a:r>
-            <a:r>
-              <a:rPr lang="de-DE" dirty="0" smtClean="0"/>
-              <a:t>Pis werden heruntergefahren und von Stromversorgung getrennt) </a:t>
-            </a:r>
-          </a:p>
-          <a:p>
-            <a:pPr lvl="2" indent="-342900">
-              <a:buFont typeface="+mj-lt"/>
-              <a:buAutoNum type="arabicPeriod"/>
-            </a:pPr>
-            <a:r>
-              <a:rPr lang="de-DE" dirty="0" smtClean="0"/>
-              <a:t>Auswertung Strommessgerät</a:t>
-            </a:r>
-          </a:p>
-          <a:p>
-            <a:pPr lvl="2" indent="-342900">
-              <a:buFont typeface="+mj-lt"/>
-              <a:buAutoNum type="arabicPeriod"/>
-            </a:pPr>
-            <a:r>
-              <a:rPr lang="de-DE" dirty="0" smtClean="0"/>
-              <a:t>Automatisierte Durchführung der Messungen</a:t>
-            </a:r>
-          </a:p>
-          <a:p>
-            <a:pPr lvl="2" indent="-342900">
-              <a:buFont typeface="+mj-lt"/>
-              <a:buAutoNum type="arabicPeriod"/>
-            </a:pPr>
-            <a:r>
-              <a:rPr lang="de-DE" dirty="0" smtClean="0"/>
+              <a:buAutoNum type="alphaLcParenR"/>
+            </a:pPr>
+            <a:r>
+              <a:rPr lang="de-DE" b="1" dirty="0" smtClean="0"/>
               <a:t>Protokollierung und grafische Aufbereitung der Messwerte</a:t>
             </a:r>
           </a:p>
@@ -4916,7 +5021,11 @@
           <a:p>
             <a:r>
               <a:rPr lang="de-DE" sz="1800" dirty="0" smtClean="0"/>
-              <a:t>Versuchsdurchführung	</a:t>
+              <a:t>Versuchsaufbau und -ablauf</a:t>
+            </a:r>
+            <a:r>
+              <a:rPr lang="de-DE" sz="1800" dirty="0" smtClean="0"/>
+              <a:t>	</a:t>
             </a:r>
             <a:endParaRPr lang="de-DE" sz="1800" dirty="0"/>
           </a:p>
@@ -4942,31 +5051,34 @@
             </a:pPr>
             <a:r>
               <a:rPr lang="de-DE" b="1" dirty="0" smtClean="0"/>
-              <a:t>3.3 Umsetzung der Ziele</a:t>
-            </a:r>
+              <a:t>3.3 </a:t>
+            </a:r>
+            <a:r>
+              <a:rPr lang="de-DE" b="1" dirty="0" smtClean="0"/>
+              <a:t>Umsetzung</a:t>
+            </a:r>
+            <a:endParaRPr lang="de-DE" b="1" dirty="0" smtClean="0"/>
           </a:p>
           <a:p>
             <a:pPr lvl="2" indent="-342900">
               <a:buFont typeface="+mj-lt"/>
-              <a:buAutoNum type="arabicPeriod"/>
+              <a:buAutoNum type="alphaLcParenR"/>
             </a:pPr>
             <a:r>
               <a:rPr lang="de-DE" b="1" dirty="0" smtClean="0"/>
-              <a:t>Parallele Ausführung der Benchmark-Programme</a:t>
-            </a:r>
-            <a:endParaRPr lang="de-DE" dirty="0" smtClean="0"/>
-          </a:p>
-          <a:p>
-            <a:pPr marL="800100" lvl="2" indent="0">
-              <a:buNone/>
-            </a:pPr>
-            <a:r>
-              <a:rPr lang="de-DE" dirty="0"/>
-              <a:t>	</a:t>
-            </a:r>
-            <a:r>
-              <a:rPr lang="de-DE" dirty="0" smtClean="0"/>
-              <a:t>MPICH mit </a:t>
+              <a:t>Parallele </a:t>
+            </a:r>
+            <a:r>
+              <a:rPr lang="de-DE" b="1" dirty="0" smtClean="0"/>
+              <a:t>Ausführung: </a:t>
+            </a:r>
+            <a:r>
+              <a:rPr lang="de-DE" dirty="0" smtClean="0"/>
+              <a:t>MPICH </a:t>
+            </a:r>
+            <a:r>
+              <a:rPr lang="de-DE" dirty="0" smtClean="0"/>
+              <a:t>mit </a:t>
             </a:r>
             <a:r>
               <a:rPr lang="de-DE" dirty="0" err="1" smtClean="0"/>
@@ -4985,29 +5097,31 @@
           <a:p>
             <a:pPr lvl="2" indent="-342900">
               <a:buFont typeface="+mj-lt"/>
-              <a:buAutoNum type="arabicPeriod" startAt="2"/>
-            </a:pPr>
+              <a:buAutoNum type="alphaLcParenR"/>
+            </a:pPr>
+            <a:r>
+              <a:rPr lang="de-DE" b="1" dirty="0" smtClean="0"/>
+              <a:t>Zwei </a:t>
+            </a:r>
             <a:r>
               <a:rPr lang="de-DE" b="1" dirty="0"/>
-              <a:t>Zwei Messreihen pro </a:t>
+              <a:t>Messreihen pro </a:t>
             </a:r>
             <a:r>
               <a:rPr lang="de-DE" b="1" dirty="0" smtClean="0"/>
-              <a:t>Benchmark</a:t>
-            </a:r>
-            <a:endParaRPr lang="de-DE" dirty="0" smtClean="0"/>
-          </a:p>
-          <a:p>
-            <a:pPr marL="800100" lvl="2" indent="0">
-              <a:buNone/>
-            </a:pPr>
+              <a:t>Benchmark:</a:t>
+            </a:r>
             <a:r>
               <a:rPr lang="de-DE" dirty="0"/>
-              <a:t>	</a:t>
-            </a:r>
-            <a:r>
-              <a:rPr lang="de-DE" dirty="0" smtClean="0"/>
-              <a:t>Realisierung durch </a:t>
+              <a:t> </a:t>
+            </a:r>
+            <a:r>
+              <a:rPr lang="de-DE" dirty="0" smtClean="0"/>
+              <a:t>Realisierung </a:t>
+            </a:r>
+            <a:r>
+              <a:rPr lang="de-DE" dirty="0" smtClean="0"/>
+              <a:t>durch </a:t>
             </a:r>
             <a:r>
               <a:rPr lang="de-DE" dirty="0" err="1" smtClean="0"/>
@@ -5018,28 +5132,23 @@
           <a:p>
             <a:pPr lvl="2" indent="-342900">
               <a:buFont typeface="+mj-lt"/>
-              <a:buAutoNum type="arabicPeriod" startAt="3"/>
-            </a:pPr>
+              <a:buAutoNum type="alphaLcParenR"/>
+            </a:pPr>
+            <a:r>
+              <a:rPr lang="de-DE" b="1" dirty="0" smtClean="0"/>
+              <a:t>Auswertung Strommessgerät:</a:t>
+            </a:r>
             <a:r>
               <a:rPr lang="de-DE" b="1" dirty="0"/>
+              <a:t> </a:t>
+            </a:r>
+            <a:r>
+              <a:rPr lang="de-DE" dirty="0" smtClean="0"/>
               <a:t>Auswertung </a:t>
             </a:r>
             <a:r>
-              <a:rPr lang="de-DE" b="1" dirty="0" smtClean="0"/>
-              <a:t>Strommessgerät</a:t>
-            </a:r>
-          </a:p>
-          <a:p>
-            <a:pPr marL="800100" lvl="2" indent="0">
-              <a:buNone/>
-            </a:pPr>
-            <a:r>
-              <a:rPr lang="de-DE" b="1" dirty="0"/>
-              <a:t>	</a:t>
-            </a:r>
-            <a:r>
-              <a:rPr lang="de-DE" dirty="0" smtClean="0"/>
-              <a:t>Realisierung durch Auswertung der </a:t>
+              <a:rPr lang="de-DE" dirty="0" smtClean="0"/>
+              <a:t>der </a:t>
             </a:r>
             <a:r>
               <a:rPr lang="de-DE" dirty="0" err="1" smtClean="0"/>
@@ -5054,29 +5163,31 @@
           <a:p>
             <a:pPr lvl="2" indent="-342900">
               <a:buFont typeface="+mj-lt"/>
-              <a:buAutoNum type="arabicPeriod" startAt="4"/>
-            </a:pPr>
+              <a:buAutoNum type="alphaLcParenR"/>
+            </a:pPr>
+            <a:r>
+              <a:rPr lang="de-DE" b="1" dirty="0" smtClean="0"/>
+              <a:t>Automatisierte </a:t>
+            </a:r>
             <a:r>
               <a:rPr lang="de-DE" b="1" dirty="0"/>
-              <a:t>Automatisierte Durchführung der </a:t>
+              <a:t>Durchführung der </a:t>
             </a:r>
             <a:r>
               <a:rPr lang="de-DE" b="1" dirty="0" smtClean="0"/>
-              <a:t>Messungen</a:t>
-            </a:r>
-            <a:endParaRPr lang="de-DE" dirty="0" smtClean="0"/>
-          </a:p>
-          <a:p>
-            <a:pPr marL="800100" lvl="2" indent="0">
-              <a:buNone/>
-            </a:pPr>
+              <a:t>Messungen:</a:t>
+            </a:r>
             <a:r>
               <a:rPr lang="de-DE" dirty="0"/>
-              <a:t>	</a:t>
-            </a:r>
-            <a:r>
-              <a:rPr lang="de-DE" dirty="0" smtClean="0"/>
-              <a:t>Realisierung durch </a:t>
+              <a:t> </a:t>
+            </a:r>
+            <a:r>
+              <a:rPr lang="de-DE" dirty="0" smtClean="0"/>
+              <a:t>Realisierung </a:t>
+            </a:r>
+            <a:r>
+              <a:rPr lang="de-DE" dirty="0" smtClean="0"/>
+              <a:t>durch </a:t>
             </a:r>
             <a:r>
               <a:rPr lang="de-DE" dirty="0" err="1" smtClean="0"/>
@@ -5084,32 +5195,46 @@
             </a:r>
             <a:r>
               <a:rPr lang="de-DE" dirty="0" smtClean="0"/>
-              <a:t> (Schwerpunkt HERE-Files zur Navigation zwischen 	Server und Rechenknoten mit verschiedenen Benutzern)</a:t>
+              <a:t> (Schwerpunkt HERE-Files zur Navigation zwischen </a:t>
+            </a:r>
+            <a:r>
+              <a:rPr lang="de-DE" dirty="0" smtClean="0"/>
+              <a:t>Server </a:t>
+            </a:r>
+            <a:r>
+              <a:rPr lang="de-DE" dirty="0" smtClean="0"/>
+              <a:t>und Rechenknoten mit verschiedenen Benutzern</a:t>
+            </a:r>
+            <a:r>
+              <a:rPr lang="de-DE" dirty="0" smtClean="0"/>
+              <a:t>)</a:t>
             </a:r>
             <a:endParaRPr lang="de-DE" dirty="0"/>
           </a:p>
           <a:p>
             <a:pPr lvl="2" indent="-342900">
               <a:buFont typeface="+mj-lt"/>
-              <a:buAutoNum type="arabicPeriod" startAt="4"/>
-            </a:pPr>
+              <a:buAutoNum type="alphaLcParenR"/>
+            </a:pPr>
+            <a:r>
+              <a:rPr lang="de-DE" b="1" dirty="0" smtClean="0"/>
+              <a:t>Protokollierung </a:t>
+            </a:r>
             <a:r>
               <a:rPr lang="de-DE" b="1" dirty="0"/>
-              <a:t>Protokollierung und grafische Aufbereitung der </a:t>
+              <a:t>und grafische Aufbereitung der </a:t>
             </a:r>
             <a:r>
               <a:rPr lang="de-DE" b="1" dirty="0" smtClean="0"/>
-              <a:t>Messwerte</a:t>
-            </a:r>
-            <a:endParaRPr lang="de-DE" dirty="0"/>
-          </a:p>
-          <a:p>
-            <a:pPr marL="800100" lvl="2" indent="0">
-              <a:buNone/>
-            </a:pPr>
-            <a:r>
-              <a:rPr lang="de-DE" dirty="0" smtClean="0"/>
-              <a:t>	Realisierung durch </a:t>
+              <a:t>Messwerte:</a:t>
+            </a:r>
+            <a:r>
+              <a:rPr lang="de-DE" dirty="0" smtClean="0"/>
+              <a:t> Realisierung </a:t>
+            </a:r>
+            <a:r>
+              <a:rPr lang="de-DE" dirty="0" smtClean="0"/>
+              <a:t>durch </a:t>
             </a:r>
             <a:r>
               <a:rPr lang="de-DE" dirty="0" err="1" smtClean="0"/>
@@ -5117,55 +5242,50 @@
             </a:r>
             <a:r>
               <a:rPr lang="de-DE" dirty="0" smtClean="0"/>
-              <a:t> (Schwerpunkt Kommandozeilen-MySQL); 	Anpassung des gegebenen DB-Schemas an reale Gegebenheiten (</a:t>
-            </a:r>
-            <a:r>
-              <a:rPr lang="de-DE" dirty="0" err="1" smtClean="0"/>
-              <a:t>Proof</a:t>
-            </a:r>
-            <a:r>
-              <a:rPr lang="de-DE" dirty="0" smtClean="0"/>
-              <a:t> </a:t>
-            </a:r>
-            <a:r>
-              <a:rPr lang="de-DE" dirty="0" err="1" smtClean="0"/>
-              <a:t>of</a:t>
-            </a:r>
-            <a:r>
-              <a:rPr lang="de-DE" dirty="0" smtClean="0"/>
-              <a:t> 	</a:t>
-            </a:r>
-            <a:r>
-              <a:rPr lang="de-DE" dirty="0" err="1" smtClean="0"/>
-              <a:t>Concept</a:t>
-            </a:r>
-            <a:r>
-              <a:rPr lang="de-DE" dirty="0" smtClean="0"/>
-              <a:t>); </a:t>
+              <a:t> (Schwerpunkt Kommandozeilen-MySQL); </a:t>
+            </a:r>
+            <a:r>
+              <a:rPr lang="de-DE" dirty="0" smtClean="0"/>
+              <a:t>Anpassung </a:t>
+            </a:r>
+            <a:r>
+              <a:rPr lang="de-DE" dirty="0" smtClean="0"/>
+              <a:t>des </a:t>
+            </a:r>
+            <a:r>
+              <a:rPr lang="de-DE" dirty="0" smtClean="0"/>
+              <a:t>Datenbankschemas an tatsächliche Anforderungen; grafische Aufbereitung mit </a:t>
             </a:r>
             <a:r>
               <a:rPr lang="de-DE" dirty="0" err="1" smtClean="0"/>
               <a:t>Gnuplot</a:t>
             </a:r>
-            <a:endParaRPr lang="de-DE" b="1" dirty="0" smtClean="0"/>
+            <a:endParaRPr lang="de-DE" b="1" dirty="0"/>
           </a:p>
           <a:p>
             <a:pPr lvl="2" indent="-342900">
               <a:buFont typeface="+mj-lt"/>
-              <a:buAutoNum type="arabicPeriod" startAt="4"/>
+              <a:buAutoNum type="alphaLcParenR"/>
             </a:pPr>
             <a:r>
               <a:rPr lang="de-DE" b="1" dirty="0" smtClean="0"/>
-              <a:t>Integration der Fehlerbehebung in Versuchsdurchführung </a:t>
-            </a:r>
-          </a:p>
-          <a:p>
-            <a:pPr marL="800100" lvl="2" indent="0">
-              <a:buNone/>
-            </a:pPr>
-            <a:r>
-              <a:rPr lang="de-DE" dirty="0" smtClean="0"/>
-              <a:t>	Realisierung durch </a:t>
+              <a:t>Integration </a:t>
+            </a:r>
+            <a:r>
+              <a:rPr lang="de-DE" b="1" dirty="0" smtClean="0"/>
+              <a:t>der Fehlerbehebung in </a:t>
+            </a:r>
+            <a:r>
+              <a:rPr lang="de-DE" b="1" dirty="0" smtClean="0"/>
+              <a:t>Versuchsdurchführung: </a:t>
+            </a:r>
+            <a:r>
+              <a:rPr lang="de-DE" dirty="0" smtClean="0"/>
+              <a:t>Realisierung </a:t>
+            </a:r>
+            <a:r>
+              <a:rPr lang="de-DE" dirty="0" smtClean="0"/>
+              <a:t>durch </a:t>
             </a:r>
             <a:r>
               <a:rPr lang="de-DE" dirty="0" err="1" smtClean="0"/>
@@ -5297,15 +5417,7 @@
           <a:p>
             <a:r>
               <a:rPr lang="de-DE" sz="1800" dirty="0" smtClean="0"/>
-              <a:t>Versuchsdurchführung: Aktivitätsdiagramm einer </a:t>
-            </a:r>
-            <a:r>
-              <a:rPr lang="de-DE" sz="1800" dirty="0" err="1" smtClean="0"/>
-              <a:t>ExperimentSuite</a:t>
-            </a:r>
-            <a:r>
-              <a:rPr lang="de-DE" sz="1800" dirty="0" smtClean="0"/>
-              <a:t>	</a:t>
+              <a:t>Versuchsaufbau und -ablauf</a:t>
             </a:r>
             <a:endParaRPr lang="de-DE" sz="1800" dirty="0"/>
           </a:p>
@@ -5396,6 +5508,44 @@
             <a:r>
               <a:rPr lang="de-DE" dirty="0" smtClean="0"/>
               <a:t> Pi-Clusters mit HPC-Benchmarks</a:t>
+            </a:r>
+            <a:endParaRPr lang="de-DE" dirty="0"/>
+          </a:p>
+        </p:txBody>
+      </p:sp>
+      <p:sp>
+        <p:nvSpPr>
+          <p:cNvPr id="3" name="Textfeld 2"/>
+          <p:cNvSpPr txBox="1"/>
+          <p:nvPr/>
+        </p:nvSpPr>
+        <p:spPr>
+          <a:xfrm>
+            <a:off x="2555776" y="6129300"/>
+            <a:ext cx="4123144" cy="276999"/>
+          </a:xfrm>
+          <a:prstGeom prst="rect">
+            <a:avLst/>
+          </a:prstGeom>
+          <a:noFill/>
+        </p:spPr>
+        <p:txBody>
+          <a:bodyPr wrap="none" rtlCol="0">
+            <a:spAutoFit/>
+          </a:bodyPr>
+          <a:lstStyle/>
+          <a:p>
+            <a:r>
+              <a:rPr lang="de-DE" dirty="0" smtClean="0"/>
+              <a:t>Aktivitätsdiagramm einer </a:t>
+            </a:r>
+            <a:r>
+              <a:rPr lang="de-DE" dirty="0" err="1" smtClean="0"/>
+              <a:t>ExperimentSuite</a:t>
+            </a:r>
+            <a:r>
+              <a:rPr lang="de-DE" dirty="0" smtClean="0"/>
+              <a:t> (2 Messreihen)</a:t>
             </a:r>
             <a:endParaRPr lang="de-DE" dirty="0"/>
           </a:p>
@@ -5449,7 +5599,7 @@
           <a:p>
             <a:r>
               <a:rPr lang="de-DE" sz="1800" dirty="0" smtClean="0"/>
-              <a:t>Versuchsdurchführung: Aktivitätsdiagramm einer Strommessung</a:t>
+              <a:t>Versuchsaufbau und -ablauf</a:t>
             </a:r>
             <a:endParaRPr lang="de-DE" sz="1800" dirty="0"/>
           </a:p>
@@ -5473,13 +5623,13 @@
               </a:ext>
             </a:extLst>
           </a:blip>
-          <a:srcRect l="-7175" t="-3002" r="-6803" b="-3023"/>
+          <a:srcRect l="-3747" r="-3747"/>
           <a:stretch/>
         </p:blipFill>
         <p:spPr>
           <a:xfrm>
-            <a:off x="836083" y="1333501"/>
-            <a:ext cx="7447492" cy="5195888"/>
+            <a:off x="1079612" y="1232756"/>
+            <a:ext cx="6989690" cy="4876800"/>
           </a:xfrm>
         </p:spPr>
       </p:pic>
@@ -5538,6 +5688,36 @@
             <a:r>
               <a:rPr lang="de-DE" dirty="0" smtClean="0"/>
               <a:t> Pi-Clusters mit HPC-Benchmarks</a:t>
+            </a:r>
+            <a:endParaRPr lang="de-DE" dirty="0"/>
+          </a:p>
+        </p:txBody>
+      </p:sp>
+      <p:sp>
+        <p:nvSpPr>
+          <p:cNvPr id="3" name="Textfeld 2"/>
+          <p:cNvSpPr txBox="1"/>
+          <p:nvPr/>
+        </p:nvSpPr>
+        <p:spPr>
+          <a:xfrm>
+            <a:off x="2987824" y="6129300"/>
+            <a:ext cx="2959890" cy="276999"/>
+          </a:xfrm>
+          <a:prstGeom prst="rect">
+            <a:avLst/>
+          </a:prstGeom>
+          <a:noFill/>
+        </p:spPr>
+        <p:txBody>
+          <a:bodyPr wrap="none" rtlCol="0">
+            <a:spAutoFit/>
+          </a:bodyPr>
+          <a:lstStyle/>
+          <a:p>
+            <a:r>
+              <a:rPr lang="de-DE" dirty="0" smtClean="0"/>
+              <a:t>Aktivitätsdiagramm einer Strommessung</a:t>
             </a:r>
             <a:endParaRPr lang="de-DE" dirty="0"/>
           </a:p>
@@ -5591,11 +5771,11 @@
           <a:p>
             <a:r>
               <a:rPr lang="de-DE" sz="1800" dirty="0" smtClean="0"/>
-              <a:t>Ergebnisse: </a:t>
+              <a:t>Ergebnisse</a:t>
             </a:r>
             <a:r>
               <a:rPr lang="de-DE" sz="1800" dirty="0" smtClean="0"/>
-              <a:t>Strommessung	</a:t>
+              <a:t>	</a:t>
             </a:r>
             <a:endParaRPr lang="de-DE" sz="1800" dirty="0"/>
           </a:p>
@@ -5783,7 +5963,7 @@
           <a:p>
             <a:r>
               <a:rPr lang="de-DE" sz="1800" dirty="0" smtClean="0"/>
-              <a:t>Ergebnisse Strommessung (HPL)	</a:t>
+              <a:t>Ergebnisse</a:t>
             </a:r>
             <a:endParaRPr lang="de-DE" sz="1800" dirty="0"/>
           </a:p>
@@ -5922,7 +6102,7 @@
           <a:p>
             <a:r>
               <a:rPr lang="de-DE" sz="1800" dirty="0" smtClean="0"/>
-              <a:t>Ergebnisse Strommessung (STREAM)	</a:t>
+              <a:t>Ergebnisse 	</a:t>
             </a:r>
             <a:endParaRPr lang="de-DE" sz="1800" dirty="0"/>
           </a:p>
@@ -6061,7 +6241,11 @@
           <a:p>
             <a:r>
               <a:rPr lang="de-DE" sz="1800" dirty="0" smtClean="0"/>
-              <a:t>Ergebnisse: HPL	</a:t>
+              <a:t>Ergebnisse</a:t>
+            </a:r>
+            <a:r>
+              <a:rPr lang="de-DE" sz="1800" dirty="0" smtClean="0"/>
+              <a:t>	</a:t>
             </a:r>
             <a:endParaRPr lang="de-DE" sz="1800" dirty="0"/>
           </a:p>
@@ -6292,7 +6476,11 @@
           <a:p>
             <a:r>
               <a:rPr lang="de-DE" sz="1800" dirty="0" smtClean="0"/>
-              <a:t>HPL: Ausführungsrate	</a:t>
+              <a:t>Ergebnisse</a:t>
+            </a:r>
+            <a:r>
+              <a:rPr lang="de-DE" sz="1800" dirty="0" smtClean="0"/>
+              <a:t>	</a:t>
             </a:r>
             <a:endParaRPr lang="de-DE" sz="1800" dirty="0"/>
           </a:p>
@@ -6467,15 +6655,15 @@
               <a:buAutoNum type="arabicPeriod"/>
             </a:pPr>
             <a:r>
-              <a:rPr lang="de-DE" b="1" dirty="0" err="1" smtClean="0"/>
+              <a:rPr lang="de-DE" dirty="0" err="1" smtClean="0"/>
               <a:t>Raspberry</a:t>
             </a:r>
             <a:r>
-              <a:rPr lang="de-DE" b="1" dirty="0"/>
+              <a:rPr lang="de-DE" dirty="0"/>
               <a:t> </a:t>
             </a:r>
             <a:r>
-              <a:rPr lang="de-DE" b="1" dirty="0" smtClean="0"/>
+              <a:rPr lang="de-DE" dirty="0" smtClean="0"/>
               <a:t>Pi</a:t>
             </a:r>
           </a:p>
@@ -6485,11 +6673,11 @@
               <a:buAutoNum type="arabicPeriod"/>
             </a:pPr>
             <a:r>
-              <a:rPr lang="de-DE" b="1" dirty="0" err="1" smtClean="0"/>
+              <a:rPr lang="de-DE" dirty="0" err="1" smtClean="0"/>
               <a:t>Bramble</a:t>
             </a:r>
             <a:r>
-              <a:rPr lang="de-DE" b="1" dirty="0" smtClean="0"/>
+              <a:rPr lang="de-DE" dirty="0" smtClean="0"/>
               <a:t> </a:t>
             </a:r>
           </a:p>
@@ -6499,7 +6687,7 @@
               <a:buAutoNum type="arabicPeriod"/>
             </a:pPr>
             <a:r>
-              <a:rPr lang="de-DE" b="1" dirty="0" smtClean="0"/>
+              <a:rPr lang="de-DE" dirty="0" smtClean="0"/>
               <a:t>Aufgabenstellung </a:t>
             </a:r>
           </a:p>
@@ -6524,7 +6712,7 @@
               <a:buAutoNum type="arabicPeriod"/>
             </a:pPr>
             <a:r>
-              <a:rPr lang="de-DE" b="1" dirty="0" smtClean="0"/>
+              <a:rPr lang="de-DE" dirty="0" smtClean="0"/>
               <a:t>Definitionen und Messparameter </a:t>
             </a:r>
           </a:p>
@@ -6534,7 +6722,7 @@
               <a:buAutoNum type="arabicPeriod"/>
             </a:pPr>
             <a:r>
-              <a:rPr lang="de-DE" b="1" dirty="0" smtClean="0"/>
+              <a:rPr lang="de-DE" dirty="0" smtClean="0"/>
               <a:t>Verwendete Benchmarks</a:t>
             </a:r>
           </a:p>
@@ -6544,10 +6732,9 @@
               <a:buAutoNum type="arabicPeriod"/>
             </a:pPr>
             <a:r>
-              <a:rPr lang="de-DE" b="1" dirty="0" smtClean="0"/>
+              <a:rPr lang="de-DE" dirty="0" smtClean="0"/>
               <a:t>Umsetzung</a:t>
             </a:r>
-            <a:endParaRPr lang="de-DE" b="1" dirty="0" smtClean="0"/>
           </a:p>
           <a:p>
             <a:pPr marL="514350" indent="-514350">
@@ -6558,7 +6745,6 @@
               <a:rPr lang="de-DE" b="1" dirty="0" smtClean="0"/>
               <a:t>Ergebnisse </a:t>
             </a:r>
-            <a:endParaRPr lang="de-DE" b="1" dirty="0" smtClean="0"/>
           </a:p>
           <a:p>
             <a:pPr marL="914400" lvl="1" indent="-514350">
@@ -6566,10 +6752,9 @@
               <a:buAutoNum type="arabicPeriod"/>
             </a:pPr>
             <a:r>
-              <a:rPr lang="de-DE" b="1" dirty="0" smtClean="0"/>
+              <a:rPr lang="de-DE" dirty="0" smtClean="0"/>
               <a:t>Strommessung </a:t>
             </a:r>
-            <a:endParaRPr lang="de-DE" b="1" dirty="0" smtClean="0"/>
           </a:p>
           <a:p>
             <a:pPr marL="914400" lvl="1" indent="-514350">
@@ -6577,7 +6762,7 @@
               <a:buAutoNum type="arabicPeriod"/>
             </a:pPr>
             <a:r>
-              <a:rPr lang="de-DE" b="1" dirty="0" smtClean="0"/>
+              <a:rPr lang="de-DE" dirty="0" smtClean="0"/>
               <a:t>HPL </a:t>
             </a:r>
           </a:p>
@@ -6587,7 +6772,7 @@
               <a:buAutoNum type="arabicPeriod"/>
             </a:pPr>
             <a:r>
-              <a:rPr lang="de-DE" b="1" dirty="0" smtClean="0"/>
+              <a:rPr lang="de-DE" dirty="0" smtClean="0"/>
               <a:t>STREAM </a:t>
             </a:r>
           </a:p>
@@ -6712,7 +6897,11 @@
           <a:p>
             <a:r>
               <a:rPr lang="de-DE" sz="1800" dirty="0" smtClean="0"/>
-              <a:t>HPL: Ausführungsdauer	</a:t>
+              <a:t>Ergebnisse</a:t>
+            </a:r>
+            <a:r>
+              <a:rPr lang="de-DE" sz="1800" dirty="0" smtClean="0"/>
+              <a:t>	</a:t>
             </a:r>
             <a:endParaRPr lang="de-DE" sz="1800" dirty="0"/>
           </a:p>
@@ -6851,7 +7040,11 @@
           <a:p>
             <a:r>
               <a:rPr lang="de-DE" sz="1800" dirty="0" smtClean="0"/>
-              <a:t>Ergebnisse: STREAM 	</a:t>
+              <a:t>Ergebnisse</a:t>
+            </a:r>
+            <a:r>
+              <a:rPr lang="de-DE" sz="1800" dirty="0" smtClean="0"/>
+              <a:t>	</a:t>
             </a:r>
             <a:endParaRPr lang="de-DE" sz="1800" dirty="0"/>
           </a:p>
@@ -6887,7 +7080,11 @@
             </a:pPr>
             <a:r>
               <a:rPr lang="de-DE" b="1" dirty="0" smtClean="0"/>
-              <a:t>2.1 Erwartete Ergebnisse </a:t>
+              <a:t>3.1 </a:t>
+            </a:r>
+            <a:r>
+              <a:rPr lang="de-DE" b="1" dirty="0" smtClean="0"/>
+              <a:t>Erwartete Ergebnisse </a:t>
             </a:r>
           </a:p>
           <a:p>
@@ -6950,7 +7147,11 @@
             </a:pPr>
             <a:r>
               <a:rPr lang="de-DE" b="1" dirty="0" smtClean="0"/>
-              <a:t>2.2 Erzielte Ergebnisse</a:t>
+              <a:t>3.2 </a:t>
+            </a:r>
+            <a:r>
+              <a:rPr lang="de-DE" b="1" dirty="0" smtClean="0"/>
+              <a:t>Erzielte Ergebnisse</a:t>
             </a:r>
             <a:endParaRPr lang="de-DE" dirty="0" smtClean="0"/>
           </a:p>
@@ -7094,7 +7295,11 @@
           <a:p>
             <a:r>
               <a:rPr lang="de-DE" sz="1800" dirty="0" smtClean="0"/>
-              <a:t>STREAM: Ausführungsrate	</a:t>
+              <a:t>Ergebnisse</a:t>
+            </a:r>
+            <a:r>
+              <a:rPr lang="de-DE" sz="1800" dirty="0" smtClean="0"/>
+              <a:t>	</a:t>
             </a:r>
             <a:endParaRPr lang="de-DE" sz="1800" dirty="0"/>
           </a:p>
@@ -7233,7 +7438,11 @@
           <a:p>
             <a:r>
               <a:rPr lang="de-DE" sz="1800" dirty="0" smtClean="0"/>
-              <a:t>STREAM: Ausführungsdauer	</a:t>
+              <a:t>Ergebnisse</a:t>
+            </a:r>
+            <a:r>
+              <a:rPr lang="de-DE" sz="1800" dirty="0" smtClean="0"/>
+              <a:t>	</a:t>
             </a:r>
             <a:endParaRPr lang="de-DE" sz="1800" dirty="0"/>
           </a:p>
@@ -7372,7 +7581,11 @@
           <a:p>
             <a:r>
               <a:rPr lang="de-DE" sz="1800" dirty="0" smtClean="0"/>
-              <a:t>Ergebnisse: STREAM 	</a:t>
+              <a:t>Ergebnisse</a:t>
+            </a:r>
+            <a:r>
+              <a:rPr lang="de-DE" sz="1800" dirty="0" smtClean="0"/>
+              <a:t>	</a:t>
             </a:r>
             <a:endParaRPr lang="de-DE" sz="1800" dirty="0"/>
           </a:p>
@@ -7402,7 +7615,10 @@
             </a:r>
           </a:p>
           <a:p>
-            <a:pPr lvl="1"/>
+            <a:pPr lvl="2">
+              <a:buFont typeface="Arial"/>
+              <a:buChar char="•"/>
+            </a:pPr>
             <a:r>
               <a:rPr lang="de-DE" dirty="0" smtClean="0"/>
               <a:t>Warum treten für </a:t>
@@ -7438,23 +7654,38 @@
             <a:endParaRPr lang="de-DE" b="1" dirty="0" smtClean="0"/>
           </a:p>
           <a:p>
-            <a:pPr marL="800100" lvl="1" indent="-342900">
+            <a:pPr marL="1200150" lvl="2" indent="-342900">
               <a:buFont typeface="+mj-lt"/>
-              <a:buAutoNum type="arabicPeriod"/>
+              <a:buAutoNum type="alphaLcParenR"/>
             </a:pPr>
             <a:r>
               <a:rPr lang="de-DE" b="1" dirty="0" smtClean="0"/>
-              <a:t>Funktionsweise des Benchmarks: </a:t>
-            </a:r>
-            <a:r>
-              <a:rPr lang="de-DE" dirty="0" smtClean="0"/>
-              <a:t>Erwünschter Effekt</a:t>
-            </a:r>
-          </a:p>
-          <a:p>
-            <a:pPr marL="800100" lvl="1" indent="-342900">
+              <a:t>Funktionsweise des </a:t>
+            </a:r>
+            <a:r>
+              <a:rPr lang="de-DE" b="1" dirty="0" smtClean="0"/>
+              <a:t>Benchmarks: </a:t>
+            </a:r>
+            <a:r>
+              <a:rPr lang="de-DE" dirty="0" smtClean="0"/>
+              <a:t>Erwünschter Effekt? </a:t>
+            </a:r>
+          </a:p>
+          <a:p>
+            <a:pPr lvl="3" indent="-285750">
+              <a:buFont typeface="Wingdings" charset="2"/>
+              <a:buChar char="Ø"/>
+            </a:pPr>
+            <a:r>
+              <a:rPr lang="de-DE" dirty="0" smtClean="0"/>
+              <a:t>kein erwünschter Effekt, lineares Wachstum erwartet</a:t>
+            </a:r>
+            <a:endParaRPr lang="de-DE" dirty="0" smtClean="0"/>
+          </a:p>
+          <a:p>
+            <a:pPr marL="1200150" lvl="2" indent="-342900">
               <a:buFont typeface="+mj-lt"/>
-              <a:buAutoNum type="arabicPeriod"/>
+              <a:buAutoNum type="alphaLcParenR" startAt="2"/>
             </a:pPr>
             <a:r>
               <a:rPr lang="de-DE" b="1" dirty="0" err="1" smtClean="0"/>
@@ -7466,42 +7697,117 @@
             </a:r>
             <a:r>
               <a:rPr lang="de-DE" dirty="0" smtClean="0"/>
-              <a:t>Systemzeit, Netzwerk, Netz-Dateisystem</a:t>
-            </a:r>
-          </a:p>
-          <a:p>
-            <a:pPr marL="800100" lvl="1" indent="-342900">
+              <a:t>Systemzeit, </a:t>
+            </a:r>
+            <a:r>
+              <a:rPr lang="de-DE" dirty="0" smtClean="0"/>
+              <a:t>Netz</a:t>
+            </a:r>
+            <a:r>
+              <a:rPr lang="de-DE" dirty="0" smtClean="0"/>
+              <a:t>-</a:t>
+            </a:r>
+            <a:r>
+              <a:rPr lang="de-DE" dirty="0" smtClean="0"/>
+              <a:t>Dateisystem?</a:t>
+            </a:r>
+          </a:p>
+          <a:p>
+            <a:pPr marL="1619250" lvl="3" indent="-342900">
+              <a:buFont typeface="Wingdings" charset="2"/>
+              <a:buChar char="Ø"/>
+            </a:pPr>
+            <a:r>
+              <a:rPr lang="de-DE" dirty="0" smtClean="0"/>
+              <a:t>Zeitdrift nicht wahrscheinlicher bei </a:t>
+            </a:r>
+            <a:r>
+              <a:rPr lang="de-DE" dirty="0" err="1" smtClean="0"/>
+              <a:t>n</a:t>
+            </a:r>
+            <a:r>
+              <a:rPr lang="de-DE" dirty="0" smtClean="0"/>
+              <a:t> &gt; 17 Rechenknoten, gleiche Rechenlast auf beteiligten Rechenknoten</a:t>
+            </a:r>
+          </a:p>
+          <a:p>
+            <a:pPr marL="1619250" lvl="3" indent="-342900">
+              <a:buFont typeface="Wingdings" charset="2"/>
+              <a:buChar char="Ø"/>
+            </a:pPr>
+            <a:r>
+              <a:rPr lang="de-DE" dirty="0" smtClean="0"/>
+              <a:t>Kopieren von </a:t>
+            </a:r>
+            <a:r>
+              <a:rPr lang="de-DE" dirty="0" err="1" smtClean="0"/>
+              <a:t>Binaries</a:t>
+            </a:r>
+            <a:r>
+              <a:rPr lang="de-DE" dirty="0" smtClean="0"/>
+              <a:t> und Libraries auf lokale Partition liefert noch schlechtere Ergebnisse</a:t>
+            </a:r>
+            <a:endParaRPr lang="de-DE" dirty="0" smtClean="0"/>
+          </a:p>
+          <a:p>
+            <a:pPr marL="1200150" lvl="2" indent="-342900">
               <a:buFont typeface="+mj-lt"/>
-              <a:buAutoNum type="arabicPeriod"/>
+              <a:buAutoNum type="alphaLcParenR" startAt="3"/>
             </a:pPr>
             <a:r>
               <a:rPr lang="de-DE" b="1" dirty="0" smtClean="0"/>
-              <a:t>Ausführung des Benchmarks: </a:t>
-            </a:r>
-            <a:r>
-              <a:rPr lang="de-DE" dirty="0" smtClean="0"/>
-              <a:t>Funktionsweise von MPICH</a:t>
+              <a:t>Ausführung </a:t>
+            </a:r>
+            <a:r>
+              <a:rPr lang="de-DE" b="1" dirty="0" smtClean="0"/>
+              <a:t>des Benchmarks: </a:t>
+            </a:r>
+            <a:r>
+              <a:rPr lang="de-DE" dirty="0" smtClean="0"/>
+              <a:t>Funktionsweise von </a:t>
+            </a:r>
+            <a:r>
+              <a:rPr lang="de-DE" dirty="0" smtClean="0"/>
+              <a:t>MPICH?</a:t>
+            </a:r>
+          </a:p>
+          <a:p>
+            <a:pPr marL="1619250" lvl="3" indent="-342900">
+              <a:buFont typeface="Wingdings" charset="2"/>
+              <a:buChar char="Ø"/>
+            </a:pPr>
+            <a:r>
+              <a:rPr lang="de-DE" dirty="0" smtClean="0"/>
+              <a:t>Manipulation des Benchmark-Quellcodes für längere Ausführungsdauer, um Verwaltungs-Overhead zu reduzieren liefert keine verbesserten Ergebnisse</a:t>
             </a:r>
             <a:endParaRPr lang="de-DE" dirty="0"/>
           </a:p>
           <a:p>
-            <a:pPr lvl="1"/>
-            <a:r>
-              <a:rPr lang="de-DE" dirty="0"/>
-              <a:t>Fazit: Keine letztendliche Klärung möglich!</a:t>
-            </a:r>
-          </a:p>
-          <a:p>
-            <a:pPr marL="800100" lvl="1" indent="-342900">
-              <a:buFont typeface="+mj-lt"/>
-              <a:buAutoNum type="arabicPeriod"/>
-            </a:pPr>
-            <a:endParaRPr lang="de-DE" dirty="0" smtClean="0"/>
-          </a:p>
-          <a:p>
-            <a:pPr marL="800100" lvl="1" indent="-342900">
-              <a:buFont typeface="+mj-lt"/>
-              <a:buAutoNum type="arabicPeriod"/>
+            <a:pPr lvl="2">
+              <a:buFont typeface="Arial"/>
+              <a:buChar char="•"/>
+            </a:pPr>
+            <a:r>
+              <a:rPr lang="de-DE" b="1" dirty="0" smtClean="0"/>
+              <a:t>Fazit: </a:t>
+            </a:r>
+            <a:r>
+              <a:rPr lang="de-DE" dirty="0" smtClean="0"/>
+              <a:t>Lineares Wachstum der Bandbreiten der HS-Zugriffe (erwartungsgemäß), Ausführungsdauer steigt jedoch deutlich an; </a:t>
+            </a:r>
+            <a:r>
+              <a:rPr lang="de-DE" dirty="0" smtClean="0"/>
+              <a:t>nicht </a:t>
+            </a:r>
+            <a:r>
+              <a:rPr lang="de-DE" dirty="0" smtClean="0"/>
+              <a:t>abschließend zu klären!</a:t>
+            </a:r>
+            <a:endParaRPr lang="de-DE" dirty="0"/>
+          </a:p>
+          <a:p>
+            <a:pPr marL="457200" lvl="1" indent="0">
+              <a:buNone/>
             </a:pPr>
             <a:endParaRPr lang="de-DE" dirty="0" smtClean="0"/>
           </a:p>
@@ -7635,7 +7941,15 @@
           <a:p>
             <a:r>
               <a:rPr lang="de-DE" sz="1800" dirty="0" smtClean="0"/>
-              <a:t>Zusammenfassung und Ausblick 	</a:t>
+              <a:t>Zusammenfassung </a:t>
+            </a:r>
+            <a:r>
+              <a:rPr lang="de-DE" sz="1800" dirty="0" smtClean="0"/>
+              <a:t>und Ausblick </a:t>
+            </a:r>
+            <a:r>
+              <a:rPr lang="de-DE" sz="1800" dirty="0" smtClean="0"/>
+              <a:t>	</a:t>
             </a:r>
             <a:endParaRPr lang="de-DE" sz="1800" dirty="0"/>
           </a:p>
@@ -7680,8 +7994,13 @@
             </a:r>
             <a:r>
               <a:rPr lang="de-DE" dirty="0" smtClean="0"/>
-              <a:t> bei der parallelen Ausführung von HPC-Benchmarks</a:t>
-            </a:r>
+              <a:t> bei der parallelen Ausführung von HPC-</a:t>
+            </a:r>
+            <a:r>
+              <a:rPr lang="de-DE" dirty="0" smtClean="0"/>
+              <a:t>Benchmarks</a:t>
+            </a:r>
+            <a:endParaRPr lang="de-DE" dirty="0" smtClean="0"/>
           </a:p>
           <a:p>
             <a:pPr lvl="1"/>
@@ -7701,8 +8020,22 @@
             </a:r>
             <a:r>
               <a:rPr lang="de-DE" dirty="0" smtClean="0"/>
-              <a:t> Kohärent und erwartungsgemäß</a:t>
-            </a:r>
+              <a:t> </a:t>
+            </a:r>
+            <a:r>
+              <a:rPr lang="de-DE" dirty="0" smtClean="0"/>
+              <a:t>Lineares Skalierungsverhalten </a:t>
+            </a:r>
+            <a:r>
+              <a:rPr lang="de-DE" dirty="0" smtClean="0">
+                <a:latin typeface="Zapf Dingbats"/>
+                <a:ea typeface="Zapf Dingbats"/>
+                <a:cs typeface="Zapf Dingbats"/>
+                <a:sym typeface="Zapf Dingbats"/>
+              </a:rPr>
+              <a:t>✓</a:t>
+            </a:r>
+            <a:endParaRPr lang="de-DE" dirty="0" smtClean="0"/>
           </a:p>
           <a:p>
             <a:pPr marL="1257300" lvl="2" indent="-342900">
@@ -7711,12 +8044,22 @@
             </a:pPr>
             <a:r>
               <a:rPr lang="de-DE" b="1" dirty="0" smtClean="0"/>
-              <a:t>HPL:</a:t>
-            </a:r>
-            <a:r>
-              <a:rPr lang="de-DE" dirty="0" smtClean="0"/>
-              <a:t> Kohärent und erwartungsgemäß (lineare CPU-Performance)</a:t>
-            </a:r>
+              <a:t>CPU-Performance (HPL):</a:t>
+            </a:r>
+            <a:r>
+              <a:rPr lang="de-DE" dirty="0" smtClean="0"/>
+              <a:t> Lineares Skalierungsverhalten (Ausführungsrate + Ausführungsdauer) </a:t>
+            </a:r>
+            <a:r>
+              <a:rPr lang="de-DE" dirty="0">
+                <a:latin typeface="Zapf Dingbats"/>
+                <a:ea typeface="Zapf Dingbats"/>
+                <a:cs typeface="Zapf Dingbats"/>
+                <a:sym typeface="Zapf Dingbats"/>
+              </a:rPr>
+              <a:t>✓</a:t>
+            </a:r>
+            <a:endParaRPr lang="de-DE" dirty="0" smtClean="0"/>
           </a:p>
           <a:p>
             <a:pPr marL="1257300" lvl="2" indent="-342900">
@@ -7725,11 +8068,15 @@
             </a:pPr>
             <a:r>
               <a:rPr lang="de-DE" b="1" dirty="0" smtClean="0"/>
-              <a:t>STREAM:</a:t>
-            </a:r>
-            <a:r>
-              <a:rPr lang="de-DE" dirty="0" smtClean="0"/>
-              <a:t> Kohärent und erwartungsgemäß für </a:t>
+              <a:t>Durchsatz HS-Zugriffe (STREAM):</a:t>
+            </a:r>
+            <a:r>
+              <a:rPr lang="de-DE" dirty="0" smtClean="0"/>
+              <a:t> Lineares Skalierungsverhalten (Ausführungsrate) </a:t>
+            </a:r>
+            <a:r>
+              <a:rPr lang="de-DE" dirty="0" smtClean="0"/>
+              <a:t>für </a:t>
             </a:r>
             <a:r>
               <a:rPr lang="de-DE" dirty="0" err="1" smtClean="0"/>
@@ -7737,50 +8084,87 @@
             </a:r>
             <a:r>
               <a:rPr lang="de-DE" dirty="0" smtClean="0"/>
-              <a:t> ≤ 18 Rechenknoten (Durchsatz Hauptspeicherzugriffe)</a:t>
-            </a:r>
+              <a:t> </a:t>
+            </a:r>
+            <a:r>
+              <a:rPr lang="de-DE" dirty="0" smtClean="0"/>
+              <a:t>≤ 17 Rechenknoten, konstantes Skalierungsverhalten (Ausführungsdauer) für </a:t>
+            </a:r>
+            <a:r>
+              <a:rPr lang="de-DE" dirty="0" err="1" smtClean="0"/>
+              <a:t>n</a:t>
+            </a:r>
+            <a:r>
+              <a:rPr lang="de-DE" dirty="0"/>
+              <a:t> ≤ 17 </a:t>
+            </a:r>
+            <a:r>
+              <a:rPr lang="de-DE" dirty="0" smtClean="0"/>
+              <a:t>Rechenknoten </a:t>
+            </a:r>
+            <a:r>
+              <a:rPr lang="de-DE" dirty="0">
+                <a:latin typeface="Zapf Dingbats"/>
+                <a:ea typeface="Zapf Dingbats"/>
+                <a:cs typeface="Zapf Dingbats"/>
+                <a:sym typeface="Zapf Dingbats"/>
+              </a:rPr>
+              <a:t>✓</a:t>
+            </a:r>
+            <a:endParaRPr lang="de-DE" dirty="0" smtClean="0"/>
           </a:p>
           <a:p>
             <a:pPr marL="857250" lvl="1" indent="-342900"/>
             <a:r>
-              <a:rPr lang="de-DE" dirty="0" err="1" smtClean="0"/>
+              <a:rPr lang="de-DE" b="1" dirty="0" err="1" smtClean="0"/>
               <a:t>Proof</a:t>
             </a:r>
             <a:r>
-              <a:rPr lang="de-DE" dirty="0" smtClean="0"/>
+              <a:rPr lang="de-DE" b="1" dirty="0" smtClean="0"/>
               <a:t> </a:t>
             </a:r>
             <a:r>
-              <a:rPr lang="de-DE" dirty="0" err="1" smtClean="0"/>
+              <a:rPr lang="de-DE" b="1" dirty="0" err="1" smtClean="0"/>
               <a:t>of</a:t>
             </a:r>
             <a:r>
-              <a:rPr lang="de-DE" dirty="0" smtClean="0"/>
+              <a:rPr lang="de-DE" b="1" dirty="0" smtClean="0"/>
               <a:t> </a:t>
             </a:r>
             <a:r>
-              <a:rPr lang="de-DE" dirty="0" err="1" smtClean="0"/>
+              <a:rPr lang="de-DE" b="1" dirty="0" err="1" smtClean="0"/>
               <a:t>Concept</a:t>
             </a:r>
             <a:r>
-              <a:rPr lang="de-DE" dirty="0" smtClean="0"/>
-              <a:t> (Vorgaben, Integration)</a:t>
-            </a:r>
-            <a:r>
-              <a:rPr lang="de-DE" smtClean="0"/>
-              <a:t>: Erfolgt </a:t>
+              <a:rPr lang="de-DE" b="1" dirty="0" smtClean="0"/>
+              <a:t> </a:t>
+            </a:r>
+            <a:r>
+              <a:rPr lang="de-DE" b="1" dirty="0" smtClean="0"/>
+              <a:t>(Vorgaben, Integration)</a:t>
+            </a:r>
+            <a:r>
+              <a:rPr lang="de-DE" b="1" dirty="0" smtClean="0"/>
+              <a:t>:</a:t>
+            </a:r>
+            <a:r>
+              <a:rPr lang="de-DE" dirty="0" smtClean="0"/>
+              <a:t> </a:t>
+            </a:r>
+            <a:r>
+              <a:rPr lang="de-DE" dirty="0" smtClean="0"/>
+              <a:t>Erfolgt </a:t>
+            </a:r>
+            <a:r>
+              <a:rPr lang="de-DE" dirty="0" smtClean="0">
+                <a:latin typeface="Zapf Dingbats"/>
+                <a:ea typeface="Zapf Dingbats"/>
+                <a:cs typeface="Zapf Dingbats"/>
+                <a:sym typeface="Zapf Dingbats"/>
+              </a:rPr>
+              <a:t>✓</a:t>
             </a:r>
             <a:endParaRPr lang="de-DE" dirty="0" smtClean="0"/>
-          </a:p>
-          <a:p>
-            <a:pPr marL="457200" indent="-457200">
-              <a:buAutoNum type="arabicPeriod"/>
-            </a:pPr>
-            <a:r>
-              <a:rPr lang="de-DE" b="1" dirty="0" smtClean="0"/>
-              <a:t>Ausblick </a:t>
-            </a:r>
-            <a:endParaRPr lang="de-DE" dirty="0"/>
           </a:p>
           <a:p>
             <a:pPr marL="800100" lvl="1" indent="-342900">
@@ -7882,6 +8266,329 @@
     <p:extLst>
       <p:ext uri="{BB962C8B-B14F-4D97-AF65-F5344CB8AC3E}">
         <p14:creationId xmlns:p14="http://schemas.microsoft.com/office/powerpoint/2010/main" val="1580187381"/>
+      </p:ext>
+    </p:extLst>
+  </p:cSld>
+  <p:clrMapOvr>
+    <a:masterClrMapping/>
+  </p:clrMapOvr>
+  <p:transition xmlns:p14="http://schemas.microsoft.com/office/powerpoint/2010/main" spd="med"/>
+</p:sld>
+</file>
+
+<file path=ppt/slides/slide26.xml><?xml version="1.0" encoding="utf-8"?>
+<p:sld xmlns:a="http://schemas.openxmlformats.org/drawingml/2006/main" xmlns:r="http://schemas.openxmlformats.org/officeDocument/2006/relationships" xmlns:p="http://schemas.openxmlformats.org/presentationml/2006/main">
+  <p:cSld>
+    <p:spTree>
+      <p:nvGrpSpPr>
+        <p:cNvPr id="1" name=""/>
+        <p:cNvGrpSpPr/>
+        <p:nvPr/>
+      </p:nvGrpSpPr>
+      <p:grpSpPr>
+        <a:xfrm>
+          <a:off x="0" y="0"/>
+          <a:ext cx="0" cy="0"/>
+          <a:chOff x="0" y="0"/>
+          <a:chExt cx="0" cy="0"/>
+        </a:xfrm>
+      </p:grpSpPr>
+      <p:sp>
+        <p:nvSpPr>
+          <p:cNvPr id="2" name="Titel 1"/>
+          <p:cNvSpPr>
+            <a:spLocks noGrp="1"/>
+          </p:cNvSpPr>
+          <p:nvPr>
+            <p:ph type="title"/>
+          </p:nvPr>
+        </p:nvSpPr>
+        <p:spPr/>
+        <p:txBody>
+          <a:bodyPr/>
+          <a:lstStyle/>
+          <a:p>
+            <a:r>
+              <a:rPr lang="de-DE" sz="1800" smtClean="0"/>
+              <a:t>Zusammenfassung und Ausblick </a:t>
+            </a:r>
+            <a:r>
+              <a:rPr lang="de-DE" sz="1800" dirty="0" smtClean="0"/>
+              <a:t>	</a:t>
+            </a:r>
+            <a:endParaRPr lang="de-DE" sz="1800" dirty="0"/>
+          </a:p>
+        </p:txBody>
+      </p:sp>
+      <p:sp>
+        <p:nvSpPr>
+          <p:cNvPr id="3" name="Inhaltsplatzhalter 2"/>
+          <p:cNvSpPr>
+            <a:spLocks noGrp="1"/>
+          </p:cNvSpPr>
+          <p:nvPr>
+            <p:ph idx="1"/>
+          </p:nvPr>
+        </p:nvSpPr>
+        <p:spPr/>
+        <p:txBody>
+          <a:bodyPr/>
+          <a:lstStyle/>
+          <a:p>
+            <a:pPr marL="457200" indent="-457200">
+              <a:buFont typeface="+mj-lt"/>
+              <a:buAutoNum type="arabicPeriod" startAt="2"/>
+            </a:pPr>
+            <a:r>
+              <a:rPr lang="de-DE" b="1" dirty="0"/>
+              <a:t>Ausblick </a:t>
+            </a:r>
+          </a:p>
+          <a:p>
+            <a:pPr marL="800100" lvl="1" indent="-342900">
+              <a:buFont typeface="+mj-lt"/>
+              <a:buAutoNum type="arabicPeriod"/>
+            </a:pPr>
+            <a:r>
+              <a:rPr lang="de-DE" b="1" dirty="0" smtClean="0"/>
+              <a:t>Optimierung </a:t>
+            </a:r>
+            <a:r>
+              <a:rPr lang="de-DE" b="1" dirty="0" err="1" smtClean="0"/>
+              <a:t>Bramble</a:t>
+            </a:r>
+            <a:r>
+              <a:rPr lang="de-DE" b="1" dirty="0" smtClean="0"/>
+              <a:t>-Architektur</a:t>
+            </a:r>
+            <a:endParaRPr lang="de-DE" dirty="0" smtClean="0"/>
+          </a:p>
+          <a:p>
+            <a:pPr lvl="1"/>
+            <a:r>
+              <a:rPr lang="de-DE" dirty="0" smtClean="0"/>
+              <a:t>Kritische Punkte (</a:t>
+            </a:r>
+            <a:r>
+              <a:rPr lang="de-DE" dirty="0" err="1" smtClean="0"/>
+              <a:t>Raspberry</a:t>
+            </a:r>
+            <a:r>
+              <a:rPr lang="de-DE" dirty="0" smtClean="0"/>
+              <a:t> Pi): Lebensdauer SD-Karten, kein </a:t>
+            </a:r>
+            <a:r>
+              <a:rPr lang="de-DE" dirty="0" err="1" smtClean="0"/>
+              <a:t>Reset</a:t>
+            </a:r>
+            <a:endParaRPr lang="de-DE" dirty="0" smtClean="0"/>
+          </a:p>
+          <a:p>
+            <a:pPr lvl="1"/>
+            <a:r>
+              <a:rPr lang="de-DE" dirty="0"/>
+              <a:t>Kritische Punkte </a:t>
+            </a:r>
+            <a:r>
+              <a:rPr lang="de-DE" dirty="0" smtClean="0"/>
+              <a:t>(</a:t>
+            </a:r>
+            <a:r>
+              <a:rPr lang="de-DE" dirty="0" err="1" smtClean="0"/>
+              <a:t>Bramble</a:t>
+            </a:r>
+            <a:r>
+              <a:rPr lang="de-DE" dirty="0" smtClean="0"/>
+              <a:t>)</a:t>
+            </a:r>
+            <a:r>
+              <a:rPr lang="de-DE" dirty="0"/>
+              <a:t>: Anschlüsse, Stromversorgung, </a:t>
+            </a:r>
+            <a:r>
+              <a:rPr lang="de-DE" dirty="0" smtClean="0"/>
+              <a:t>beengter Aufbau </a:t>
+            </a:r>
+          </a:p>
+          <a:p>
+            <a:pPr marL="800100" lvl="1" indent="-342900">
+              <a:buFont typeface="+mj-lt"/>
+              <a:buAutoNum type="arabicPeriod" startAt="2"/>
+            </a:pPr>
+            <a:r>
+              <a:rPr lang="de-DE" b="1" dirty="0" smtClean="0"/>
+              <a:t>Erweiterung des Versuchsaufbau mit HPC-Benchmarks</a:t>
+            </a:r>
+            <a:endParaRPr lang="de-DE" dirty="0" smtClean="0"/>
+          </a:p>
+          <a:p>
+            <a:pPr lvl="1"/>
+            <a:r>
+              <a:rPr lang="de-DE" dirty="0" err="1" smtClean="0"/>
+              <a:t>Whetstone</a:t>
+            </a:r>
+            <a:r>
+              <a:rPr lang="de-DE" dirty="0" smtClean="0"/>
+              <a:t> für MPICH </a:t>
+            </a:r>
+          </a:p>
+          <a:p>
+            <a:pPr lvl="1"/>
+            <a:r>
+              <a:rPr lang="de-DE" dirty="0" smtClean="0"/>
+              <a:t>STREAM auf </a:t>
+            </a:r>
+            <a:r>
+              <a:rPr lang="de-DE" dirty="0" err="1" smtClean="0"/>
+              <a:t>n</a:t>
+            </a:r>
+            <a:r>
+              <a:rPr lang="de-DE" dirty="0" smtClean="0"/>
+              <a:t> &gt; 17 Rechenknoten </a:t>
+            </a:r>
+          </a:p>
+          <a:p>
+            <a:pPr lvl="1"/>
+            <a:r>
+              <a:rPr lang="de-DE" dirty="0" smtClean="0"/>
+              <a:t>Weitere HPC-Benchmarks </a:t>
+            </a:r>
+          </a:p>
+          <a:p>
+            <a:pPr lvl="1"/>
+            <a:r>
+              <a:rPr lang="de-DE" dirty="0" smtClean="0"/>
+              <a:t>Unter- und Übertakten der CPUs </a:t>
+            </a:r>
+          </a:p>
+          <a:p>
+            <a:pPr lvl="1"/>
+            <a:r>
+              <a:rPr lang="de-DE" dirty="0" err="1" smtClean="0"/>
+              <a:t>Anprogrammierung</a:t>
+            </a:r>
+            <a:r>
+              <a:rPr lang="de-DE" dirty="0" smtClean="0"/>
+              <a:t> der GPU (Spezifikation vor Kurzem veröffentlicht, Wettbewerb der </a:t>
+            </a:r>
+            <a:r>
+              <a:rPr lang="de-DE" dirty="0" err="1" smtClean="0"/>
+              <a:t>Raspberry</a:t>
+            </a:r>
+            <a:r>
+              <a:rPr lang="de-DE" dirty="0" smtClean="0"/>
+              <a:t> Pi </a:t>
+            </a:r>
+            <a:r>
+              <a:rPr lang="de-DE" dirty="0" err="1" smtClean="0"/>
+              <a:t>Foundation</a:t>
+            </a:r>
+            <a:r>
+              <a:rPr lang="de-DE" dirty="0" smtClean="0"/>
+              <a:t> für quelloffenen Treiber)</a:t>
+            </a:r>
+            <a:endParaRPr lang="de-DE" dirty="0"/>
+          </a:p>
+          <a:p>
+            <a:pPr marL="800100" lvl="1" indent="-342900">
+              <a:buFont typeface="+mj-lt"/>
+              <a:buAutoNum type="arabicPeriod"/>
+            </a:pPr>
+            <a:endParaRPr lang="de-DE" dirty="0" smtClean="0"/>
+          </a:p>
+          <a:p>
+            <a:pPr marL="800100" lvl="1" indent="-342900">
+              <a:buFont typeface="+mj-lt"/>
+              <a:buAutoNum type="arabicPeriod"/>
+            </a:pPr>
+            <a:endParaRPr lang="de-DE" dirty="0" smtClean="0"/>
+          </a:p>
+          <a:p>
+            <a:pPr>
+              <a:buFont typeface="+mj-lt"/>
+              <a:buAutoNum type="arabicPeriod" startAt="2"/>
+            </a:pPr>
+            <a:endParaRPr lang="de-DE" sz="1600" dirty="0"/>
+          </a:p>
+          <a:p>
+            <a:pPr marL="400050" lvl="1" indent="0">
+              <a:buNone/>
+            </a:pPr>
+            <a:endParaRPr lang="de-DE" b="1" dirty="0" smtClean="0"/>
+          </a:p>
+          <a:p>
+            <a:pPr lvl="1" indent="-342900">
+              <a:buFont typeface="+mj-lt"/>
+              <a:buAutoNum type="arabicPeriod"/>
+            </a:pPr>
+            <a:endParaRPr lang="de-DE" dirty="0" smtClean="0"/>
+          </a:p>
+        </p:txBody>
+      </p:sp>
+      <p:sp>
+        <p:nvSpPr>
+          <p:cNvPr id="4" name="Foliennummernplatzhalter 3"/>
+          <p:cNvSpPr>
+            <a:spLocks noGrp="1"/>
+          </p:cNvSpPr>
+          <p:nvPr>
+            <p:ph type="sldNum" sz="quarter" idx="4"/>
+          </p:nvPr>
+        </p:nvSpPr>
+        <p:spPr/>
+        <p:txBody>
+          <a:bodyPr/>
+          <a:lstStyle/>
+          <a:p>
+            <a:pPr>
+              <a:defRPr/>
+            </a:pPr>
+            <a:fld id="{70BFFA52-4234-45F6-B1A6-074E24FF43A2}" type="slidenum">
+              <a:rPr lang="de-DE" smtClean="0"/>
+              <a:pPr>
+                <a:defRPr/>
+              </a:pPr>
+              <a:t>26</a:t>
+            </a:fld>
+            <a:endParaRPr lang="de-DE" dirty="0"/>
+          </a:p>
+        </p:txBody>
+      </p:sp>
+      <p:sp>
+        <p:nvSpPr>
+          <p:cNvPr id="5" name="Fußzeilenplatzhalter 4"/>
+          <p:cNvSpPr>
+            <a:spLocks noGrp="1"/>
+          </p:cNvSpPr>
+          <p:nvPr>
+            <p:ph type="ftr" sz="quarter" idx="3"/>
+          </p:nvPr>
+        </p:nvSpPr>
+        <p:spPr/>
+        <p:txBody>
+          <a:bodyPr/>
+          <a:lstStyle/>
+          <a:p>
+            <a:r>
+              <a:rPr lang="de-DE" dirty="0" smtClean="0"/>
+              <a:t>Skalierungsverhalten eines </a:t>
+            </a:r>
+            <a:r>
+              <a:rPr lang="de-DE" dirty="0" err="1" smtClean="0"/>
+              <a:t>Raspberry</a:t>
+            </a:r>
+            <a:r>
+              <a:rPr lang="de-DE" dirty="0" smtClean="0"/>
+              <a:t> Pi-Clusters mit HPC-Benchmarks</a:t>
+            </a:r>
+            <a:endParaRPr lang="de-DE" dirty="0"/>
+          </a:p>
+        </p:txBody>
+      </p:sp>
+    </p:spTree>
+    <p:extLst>
+      <p:ext uri="{BB962C8B-B14F-4D97-AF65-F5344CB8AC3E}">
+        <p14:creationId xmlns:p14="http://schemas.microsoft.com/office/powerpoint/2010/main" val="4176846124"/>
       </p:ext>
     </p:extLst>
   </p:cSld>
@@ -7925,12 +8632,8 @@
           <a:lstStyle/>
           <a:p>
             <a:r>
-              <a:rPr lang="de-DE" sz="1800" dirty="0" err="1" smtClean="0"/>
-              <a:t>Raspberry</a:t>
-            </a:r>
-            <a:r>
               <a:rPr lang="de-DE" sz="1800" dirty="0" smtClean="0"/>
-              <a:t> Pi</a:t>
+              <a:t>Einführung und Aufgabenstellung</a:t>
             </a:r>
             <a:endParaRPr lang="de-DE" sz="1800" dirty="0"/>
           </a:p>
@@ -7965,20 +8668,30 @@
             </a:r>
           </a:p>
           <a:p>
-            <a:r>
-              <a:rPr lang="de-DE" dirty="0" smtClean="0"/>
-              <a:t>Allgemeines</a:t>
-            </a:r>
-          </a:p>
-          <a:p>
-            <a:pPr lvl="1"/>
+            <a:pPr marL="457200" lvl="1" indent="0">
+              <a:buNone/>
+            </a:pPr>
+            <a:r>
+              <a:rPr lang="de-DE" b="1" dirty="0" smtClean="0"/>
+              <a:t>1.1 Allgemeines</a:t>
+            </a:r>
+            <a:endParaRPr lang="de-DE" b="1" dirty="0" smtClean="0"/>
+          </a:p>
+          <a:p>
+            <a:pPr lvl="2">
+              <a:buFont typeface="Arial"/>
+              <a:buChar char="•"/>
+            </a:pPr>
             <a:r>
               <a:rPr lang="de-DE" dirty="0" smtClean="0"/>
               <a:t>Mini-Computer (Kreditkartengröße)</a:t>
             </a:r>
           </a:p>
           <a:p>
-            <a:pPr lvl="1"/>
+            <a:pPr lvl="2">
+              <a:buFont typeface="Arial"/>
+              <a:buChar char="•"/>
+            </a:pPr>
             <a:r>
               <a:rPr lang="de-DE" dirty="0" smtClean="0"/>
               <a:t>Entwicklung seit 2009 durch die </a:t>
@@ -7998,14 +8711,20 @@
             <a:endParaRPr lang="de-DE" dirty="0" smtClean="0"/>
           </a:p>
           <a:p>
-            <a:pPr lvl="1"/>
+            <a:pPr lvl="2">
+              <a:buFont typeface="Arial"/>
+              <a:buChar char="•"/>
+            </a:pPr>
             <a:r>
               <a:rPr lang="de-DE" dirty="0" smtClean="0"/>
               <a:t>Aktuell: Modell B, im Juni 2014 über 3 Mio. Mal verkauft</a:t>
             </a:r>
           </a:p>
           <a:p>
-            <a:pPr lvl="1"/>
+            <a:pPr lvl="2">
+              <a:buFont typeface="Arial"/>
+              <a:buChar char="•"/>
+            </a:pPr>
             <a:r>
               <a:rPr lang="de-DE" dirty="0" smtClean="0"/>
               <a:t>Kosten insgesamt: ca. 50 Euro </a:t>
@@ -8013,20 +8732,30 @@
             <a:endParaRPr lang="de-DE" dirty="0"/>
           </a:p>
           <a:p>
-            <a:r>
-              <a:rPr lang="de-DE" dirty="0" smtClean="0"/>
-              <a:t>Spezifikation</a:t>
-            </a:r>
-          </a:p>
-          <a:p>
-            <a:pPr lvl="1"/>
+            <a:pPr marL="457200" lvl="1" indent="0">
+              <a:buNone/>
+            </a:pPr>
+            <a:r>
+              <a:rPr lang="de-DE" b="1" dirty="0" smtClean="0"/>
+              <a:t>1.2 Spezifikation</a:t>
+            </a:r>
+            <a:endParaRPr lang="de-DE" b="1" dirty="0" smtClean="0"/>
+          </a:p>
+          <a:p>
+            <a:pPr lvl="2">
+              <a:buFont typeface="Arial"/>
+              <a:buChar char="•"/>
+            </a:pPr>
             <a:r>
               <a:rPr lang="de-DE" dirty="0"/>
               <a:t>CPU: ARM116JZF-S (Taktfrequenz 700 MHz)</a:t>
             </a:r>
           </a:p>
           <a:p>
-            <a:pPr lvl="1"/>
+            <a:pPr lvl="2">
+              <a:buFont typeface="Arial"/>
+              <a:buChar char="•"/>
+            </a:pPr>
             <a:r>
               <a:rPr lang="de-DE" dirty="0"/>
               <a:t>GPU: </a:t>
@@ -8049,14 +8778,20 @@
             </a:r>
           </a:p>
           <a:p>
-            <a:pPr lvl="1"/>
+            <a:pPr lvl="2">
+              <a:buFont typeface="Arial"/>
+              <a:buChar char="•"/>
+            </a:pPr>
             <a:r>
               <a:rPr lang="de-DE" dirty="0" smtClean="0"/>
               <a:t>Arbeitsspeicher: 512 MB SDRAM </a:t>
             </a:r>
           </a:p>
           <a:p>
-            <a:pPr lvl="1"/>
+            <a:pPr lvl="2">
+              <a:buFont typeface="Arial"/>
+              <a:buChar char="•"/>
+            </a:pPr>
             <a:r>
               <a:rPr lang="de-DE" dirty="0" smtClean="0"/>
               <a:t>„</a:t>
@@ -8072,7 +8807,10 @@
             <a:endParaRPr lang="de-DE" dirty="0"/>
           </a:p>
           <a:p>
-            <a:pPr lvl="1"/>
+            <a:pPr lvl="2">
+              <a:buFont typeface="Arial"/>
+              <a:buChar char="•"/>
+            </a:pPr>
             <a:r>
               <a:rPr lang="de-DE" dirty="0"/>
               <a:t>Stromversorgung: Mikro-USB (5 </a:t>
@@ -8084,14 +8822,20 @@
             <a:endParaRPr lang="de-DE" dirty="0"/>
           </a:p>
           <a:p>
-            <a:pPr lvl="1"/>
+            <a:pPr lvl="2">
+              <a:buFont typeface="Arial"/>
+              <a:buChar char="•"/>
+            </a:pPr>
             <a:r>
               <a:rPr lang="de-DE" dirty="0"/>
               <a:t>Weitere Schnittstellen: Ethernet, HDMI, GPIO, 2 x USB 2.0</a:t>
             </a:r>
           </a:p>
           <a:p>
-            <a:pPr lvl="1"/>
+            <a:pPr lvl="2">
+              <a:buFont typeface="Arial"/>
+              <a:buChar char="•"/>
+            </a:pPr>
             <a:r>
               <a:rPr lang="de-DE" dirty="0"/>
               <a:t>Betriebssysteme: hauptsächlich </a:t>
@@ -8294,12 +9038,8 @@
           <a:lstStyle/>
           <a:p>
             <a:r>
-              <a:rPr lang="de-DE" sz="1800" dirty="0" err="1" smtClean="0"/>
-              <a:t>Raspberry</a:t>
-            </a:r>
-            <a:r>
               <a:rPr lang="de-DE" sz="1800" dirty="0" smtClean="0"/>
-              <a:t> Pi: Aufbau</a:t>
+              <a:t>Einführung und Aufgabenstellung</a:t>
             </a:r>
             <a:endParaRPr lang="de-DE" sz="1800" dirty="0"/>
           </a:p>
@@ -8479,8 +9219,8 @@
           <a:lstStyle/>
           <a:p>
             <a:r>
-              <a:rPr lang="de-DE" sz="1800" dirty="0" err="1" smtClean="0"/>
-              <a:t>Bramble</a:t>
+              <a:rPr lang="de-DE" sz="1800" dirty="0" smtClean="0"/>
+              <a:t>Einführung und Aufgabenstellung</a:t>
             </a:r>
             <a:endParaRPr lang="de-DE" sz="1800" dirty="0"/>
           </a:p>
@@ -8512,41 +9252,68 @@
             <a:endParaRPr lang="de-DE" b="1" dirty="0" smtClean="0"/>
           </a:p>
           <a:p>
-            <a:r>
-              <a:rPr lang="de-DE" dirty="0" smtClean="0"/>
-              <a:t>Definition Beowulf-Cluster: </a:t>
-            </a:r>
-          </a:p>
-          <a:p>
-            <a:pPr lvl="1"/>
+            <a:pPr marL="457200" lvl="1" indent="0">
+              <a:buNone/>
+            </a:pPr>
+            <a:r>
+              <a:rPr lang="de-DE" b="1" dirty="0" smtClean="0"/>
+              <a:t>2.1 Definition </a:t>
+            </a:r>
+            <a:r>
+              <a:rPr lang="de-DE" b="1" dirty="0" smtClean="0"/>
+              <a:t>Beowulf-</a:t>
+            </a:r>
+            <a:r>
+              <a:rPr lang="de-DE" b="1" dirty="0" smtClean="0"/>
+              <a:t>Cluster</a:t>
+            </a:r>
+            <a:endParaRPr lang="de-DE" b="1" dirty="0" smtClean="0"/>
+          </a:p>
+          <a:p>
+            <a:pPr lvl="2">
+              <a:buFont typeface="Arial"/>
+              <a:buChar char="•"/>
+            </a:pPr>
             <a:r>
               <a:rPr lang="de-DE" dirty="0" smtClean="0"/>
               <a:t>Lose gekoppeltes System kostengünstiger Rechner</a:t>
             </a:r>
           </a:p>
           <a:p>
-            <a:pPr lvl="1"/>
+            <a:pPr lvl="2">
+              <a:buFont typeface="Arial"/>
+              <a:buChar char="•"/>
+            </a:pPr>
             <a:r>
               <a:rPr lang="de-DE" dirty="0" smtClean="0"/>
               <a:t>Betriebssystem: Linux/BSD</a:t>
             </a:r>
           </a:p>
           <a:p>
-            <a:pPr lvl="1"/>
+            <a:pPr lvl="2">
+              <a:buFont typeface="Arial"/>
+              <a:buChar char="•"/>
+            </a:pPr>
             <a:r>
               <a:rPr lang="de-DE" dirty="0" smtClean="0"/>
               <a:t>Kommunikation über IP </a:t>
             </a:r>
           </a:p>
           <a:p>
-            <a:pPr lvl="1"/>
+            <a:pPr lvl="2">
+              <a:buFont typeface="Arial"/>
+              <a:buChar char="•"/>
+            </a:pPr>
             <a:r>
               <a:rPr lang="de-DE" dirty="0" smtClean="0"/>
               <a:t>Kein gemeinsamer Speicher, keine Cache-Kohärenz</a:t>
             </a:r>
           </a:p>
           <a:p>
-            <a:pPr lvl="1"/>
+            <a:pPr lvl="2">
+              <a:buFont typeface="Arial"/>
+              <a:buChar char="•"/>
+            </a:pPr>
             <a:r>
               <a:rPr lang="de-DE" dirty="0" smtClean="0"/>
               <a:t>Definition </a:t>
@@ -8569,13 +9336,24 @@
             </a:r>
           </a:p>
           <a:p>
-            <a:r>
-              <a:rPr lang="de-DE" dirty="0" smtClean="0"/>
-              <a:t>Spezifikation: </a:t>
-            </a:r>
-          </a:p>
-          <a:p>
-            <a:pPr lvl="1"/>
+            <a:pPr marL="457200" lvl="1" indent="0">
+              <a:buNone/>
+            </a:pPr>
+            <a:r>
+              <a:rPr lang="de-DE" b="1" dirty="0" smtClean="0"/>
+              <a:t>2.2 Spezifikation</a:t>
+            </a:r>
+            <a:r>
+              <a:rPr lang="de-DE" dirty="0" smtClean="0"/>
+              <a:t> </a:t>
+            </a:r>
+            <a:endParaRPr lang="de-DE" dirty="0" smtClean="0"/>
+          </a:p>
+          <a:p>
+            <a:pPr lvl="2">
+              <a:buFont typeface="Arial"/>
+              <a:buChar char="•"/>
+            </a:pPr>
             <a:r>
               <a:rPr lang="de-DE" dirty="0" smtClean="0"/>
               <a:t>20 </a:t>
@@ -8590,44 +9368,50 @@
             </a:r>
           </a:p>
           <a:p>
-            <a:pPr lvl="1"/>
+            <a:pPr lvl="2">
+              <a:buFont typeface="Arial"/>
+              <a:buChar char="•"/>
+            </a:pPr>
             <a:r>
               <a:rPr lang="de-DE" dirty="0" smtClean="0"/>
               <a:t>Verbindung über Ethernet-Kabel und 24 Port Gigabit-Switch (2, 3)</a:t>
             </a:r>
           </a:p>
           <a:p>
-            <a:pPr lvl="1"/>
-            <a:r>
-              <a:rPr lang="de-DE" dirty="0" smtClean="0"/>
-              <a:t>Server (x86-Architektur): Mini</a:t>
-            </a:r>
-            <a:r>
-              <a:rPr lang="de-DE" dirty="0" smtClean="0"/>
-              <a:t>-ITX-Mainboard (4), </a:t>
-            </a:r>
-            <a:r>
-              <a:rPr lang="de-DE" dirty="0" smtClean="0"/>
-              <a:t>Festplatten (5)</a:t>
-            </a:r>
-            <a:endParaRPr lang="de-DE" dirty="0" smtClean="0"/>
-          </a:p>
-          <a:p>
-            <a:pPr lvl="1"/>
+            <a:pPr lvl="2">
+              <a:buFont typeface="Arial"/>
+              <a:buChar char="•"/>
+            </a:pPr>
+            <a:r>
+              <a:rPr lang="de-DE" dirty="0" smtClean="0"/>
+              <a:t>Server (x86-Architektur): Mini-ITX-Mainboard (4), Festplatten (5)</a:t>
+            </a:r>
+          </a:p>
+          <a:p>
+            <a:pPr lvl="2">
+              <a:buFont typeface="Arial"/>
+              <a:buChar char="•"/>
+            </a:pPr>
             <a:r>
               <a:rPr lang="de-DE" dirty="0" smtClean="0"/>
               <a:t>Stromversorgung: zentrales Netzteil (6), 2 Verteiler (7), 20 Mikro-USB-Kabel (8)</a:t>
             </a:r>
           </a:p>
           <a:p>
-            <a:pPr lvl="1"/>
+            <a:pPr lvl="2">
+              <a:buFont typeface="Arial"/>
+              <a:buChar char="•"/>
+            </a:pPr>
             <a:r>
               <a:rPr lang="de-DE" dirty="0" smtClean="0"/>
               <a:t>Kühlung: 4 Kühlgebläse (9)</a:t>
             </a:r>
           </a:p>
           <a:p>
-            <a:pPr lvl="1"/>
+            <a:pPr lvl="2">
+              <a:buFont typeface="Arial"/>
+              <a:buChar char="•"/>
+            </a:pPr>
             <a:r>
               <a:rPr lang="de-DE" dirty="0" smtClean="0"/>
               <a:t>Betriebssystem: Debian (Server), </a:t>
@@ -8642,7 +9426,10 @@
             </a:r>
           </a:p>
           <a:p>
-            <a:pPr lvl="1"/>
+            <a:pPr lvl="2">
+              <a:buFont typeface="Arial"/>
+              <a:buChar char="•"/>
+            </a:pPr>
             <a:endParaRPr lang="de-DE" dirty="0" smtClean="0"/>
           </a:p>
         </p:txBody>
@@ -8754,12 +9541,12 @@
           <a:lstStyle/>
           <a:p>
             <a:r>
-              <a:rPr lang="de-DE" sz="1800" dirty="0" err="1" smtClean="0"/>
-              <a:t>Bramble</a:t>
-            </a:r>
-            <a:r>
               <a:rPr lang="de-DE" sz="1800" dirty="0" smtClean="0"/>
-              <a:t>: Aufbau</a:t>
+              <a:t>Einf</a:t>
+            </a:r>
+            <a:r>
+              <a:rPr lang="de-DE" sz="1800" dirty="0" smtClean="0"/>
+              <a:t>ührung und Aufgabenstellung </a:t>
             </a:r>
             <a:endParaRPr lang="de-DE" sz="1800" dirty="0"/>
           </a:p>
@@ -8783,12 +9570,17 @@
               </a:ext>
             </a:extLst>
           </a:blip>
-          <a:srcRect l="-5262" r="-5262"/>
+          <a:srcRect l="-13845" r="-13845"/>
           <a:stretch>
             <a:fillRect/>
           </a:stretch>
         </p:blipFill>
-        <p:spPr/>
+        <p:spPr>
+          <a:xfrm>
+            <a:off x="142875" y="1268413"/>
+            <a:ext cx="8666163" cy="4241800"/>
+          </a:xfrm>
+        </p:spPr>
       </p:pic>
       <p:sp>
         <p:nvSpPr>
@@ -8845,6 +9637,40 @@
             <a:r>
               <a:rPr lang="de-DE" dirty="0" smtClean="0"/>
               <a:t> Pi-Clusters mit HPC-Benchmarks</a:t>
+            </a:r>
+            <a:endParaRPr lang="de-DE" dirty="0"/>
+          </a:p>
+        </p:txBody>
+      </p:sp>
+      <p:sp>
+        <p:nvSpPr>
+          <p:cNvPr id="3" name="Textfeld 2"/>
+          <p:cNvSpPr txBox="1"/>
+          <p:nvPr/>
+        </p:nvSpPr>
+        <p:spPr>
+          <a:xfrm>
+            <a:off x="3275856" y="5769260"/>
+            <a:ext cx="2382984" cy="276999"/>
+          </a:xfrm>
+          <a:prstGeom prst="rect">
+            <a:avLst/>
+          </a:prstGeom>
+          <a:noFill/>
+        </p:spPr>
+        <p:txBody>
+          <a:bodyPr wrap="none" rtlCol="0">
+            <a:spAutoFit/>
+          </a:bodyPr>
+          <a:lstStyle/>
+          <a:p>
+            <a:r>
+              <a:rPr lang="de-DE" dirty="0" err="1" smtClean="0"/>
+              <a:t>Bramble</a:t>
+            </a:r>
+            <a:r>
+              <a:rPr lang="de-DE" dirty="0" smtClean="0"/>
+              <a:t>: Schematischer Aufbau </a:t>
             </a:r>
             <a:endParaRPr lang="de-DE" dirty="0"/>
           </a:p>
@@ -8897,12 +9723,8 @@
           <a:lstStyle/>
           <a:p>
             <a:r>
-              <a:rPr lang="de-DE" sz="1800" dirty="0" err="1" smtClean="0"/>
-              <a:t>Bramble</a:t>
-            </a:r>
-            <a:r>
               <a:rPr lang="de-DE" sz="1800" dirty="0" smtClean="0"/>
-              <a:t>: Aufbau</a:t>
+              <a:t>Einführung und Aufgabenstellung</a:t>
             </a:r>
             <a:endParaRPr lang="de-DE" sz="1800" dirty="0"/>
           </a:p>
@@ -8991,8 +9813,47 @@
             <a:fillRect/>
           </a:stretch>
         </p:blipFill>
-        <p:spPr/>
+        <p:spPr>
+          <a:xfrm>
+            <a:off x="227013" y="1347788"/>
+            <a:ext cx="8666162" cy="4900612"/>
+          </a:xfrm>
+        </p:spPr>
       </p:pic>
+      <p:sp>
+        <p:nvSpPr>
+          <p:cNvPr id="3" name="Textfeld 2"/>
+          <p:cNvSpPr txBox="1"/>
+          <p:nvPr/>
+        </p:nvSpPr>
+        <p:spPr>
+          <a:xfrm>
+            <a:off x="3491880" y="6201308"/>
+            <a:ext cx="2117812" cy="276999"/>
+          </a:xfrm>
+          <a:prstGeom prst="rect">
+            <a:avLst/>
+          </a:prstGeom>
+          <a:noFill/>
+        </p:spPr>
+        <p:txBody>
+          <a:bodyPr wrap="none" rtlCol="0">
+            <a:spAutoFit/>
+          </a:bodyPr>
+          <a:lstStyle/>
+          <a:p>
+            <a:r>
+              <a:rPr lang="de-DE" dirty="0" err="1" smtClean="0"/>
+              <a:t>Bramble</a:t>
+            </a:r>
+            <a:r>
+              <a:rPr lang="de-DE" dirty="0" smtClean="0"/>
+              <a:t>: Physischer Aufbau </a:t>
+            </a:r>
+            <a:endParaRPr lang="de-DE" dirty="0"/>
+          </a:p>
+        </p:txBody>
+      </p:sp>
     </p:spTree>
     <p:extLst>
       <p:ext uri="{BB962C8B-B14F-4D97-AF65-F5344CB8AC3E}">
@@ -9041,7 +9902,7 @@
           <a:p>
             <a:r>
               <a:rPr lang="de-DE" sz="1800" dirty="0" smtClean="0"/>
-              <a:t>Aufgabenstellung</a:t>
+              <a:t>Einführung und Aufgabenstellung</a:t>
             </a:r>
             <a:endParaRPr lang="de-DE" sz="1800" dirty="0"/>
           </a:p>
@@ -9072,35 +9933,71 @@
             </a:r>
           </a:p>
           <a:p>
-            <a:pPr marL="514350" indent="-514350"/>
-            <a:r>
-              <a:rPr lang="de-DE" dirty="0" smtClean="0"/>
-              <a:t>Vorgaben </a:t>
-            </a:r>
-          </a:p>
-          <a:p>
-            <a:pPr marL="914400" lvl="1" indent="-514350"/>
+            <a:pPr marL="400050" lvl="1" indent="0">
+              <a:buNone/>
+            </a:pPr>
+            <a:r>
+              <a:rPr lang="de-DE" b="1" dirty="0" smtClean="0"/>
+              <a:t>3.1 Vorgaben</a:t>
+            </a:r>
+            <a:r>
+              <a:rPr lang="de-DE" dirty="0" smtClean="0"/>
+              <a:t>  </a:t>
+            </a:r>
+            <a:endParaRPr lang="de-DE" dirty="0"/>
+          </a:p>
+          <a:p>
+            <a:pPr lvl="2" indent="-285750">
+              <a:buFont typeface="Arial"/>
+              <a:buChar char="•"/>
+            </a:pPr>
             <a:r>
               <a:rPr lang="de-DE" dirty="0" err="1" smtClean="0"/>
               <a:t>Bramble</a:t>
             </a:r>
             <a:r>
               <a:rPr lang="de-DE" dirty="0" smtClean="0"/>
-              <a:t>-Systemarchitektur (NFS, AUFS, IP/SSH)</a:t>
-            </a:r>
-          </a:p>
-          <a:p>
-            <a:pPr marL="914400" lvl="1" indent="-514350"/>
-            <a:r>
-              <a:rPr lang="de-DE" dirty="0" smtClean="0"/>
-              <a:t>Datenbank-Schema (MySQL)</a:t>
-            </a:r>
-          </a:p>
-          <a:p>
-            <a:pPr marL="914400" lvl="1" indent="-514350"/>
-            <a:r>
-              <a:rPr lang="de-DE" dirty="0" smtClean="0"/>
-              <a:t>Benchmark-Programme und Bibliotheken (HPL, STREAM, </a:t>
+              <a:t>-Systemarchitektur (NFS, AUFS, IP/</a:t>
+            </a:r>
+            <a:r>
+              <a:rPr lang="de-DE" dirty="0" smtClean="0"/>
+              <a:t>SSH</a:t>
+            </a:r>
+            <a:r>
+              <a:rPr lang="de-DE" dirty="0" smtClean="0"/>
+              <a:t>)</a:t>
+            </a:r>
+          </a:p>
+          <a:p>
+            <a:pPr lvl="2" indent="-285750">
+              <a:buFont typeface="Arial"/>
+              <a:buChar char="•"/>
+            </a:pPr>
+            <a:r>
+              <a:rPr lang="de-DE" dirty="0" smtClean="0"/>
+              <a:t>Datenbank</a:t>
+            </a:r>
+            <a:r>
+              <a:rPr lang="de-DE" dirty="0" smtClean="0"/>
+              <a:t>-Schema (</a:t>
+            </a:r>
+            <a:r>
+              <a:rPr lang="de-DE" dirty="0" smtClean="0"/>
+              <a:t>MySQL)</a:t>
+            </a:r>
+          </a:p>
+          <a:p>
+            <a:pPr lvl="2" indent="-285750">
+              <a:buFont typeface="Arial"/>
+              <a:buChar char="•"/>
+            </a:pPr>
+            <a:r>
+              <a:rPr lang="de-DE" dirty="0" smtClean="0"/>
+              <a:t>Benchmark</a:t>
+            </a:r>
+            <a:r>
+              <a:rPr lang="de-DE" dirty="0" smtClean="0"/>
+              <a:t>-Programme und Bibliotheken (HPL, STREAM, </a:t>
             </a:r>
             <a:r>
               <a:rPr lang="de-DE" dirty="0" err="1" smtClean="0"/>
@@ -9108,46 +10005,88 @@
             </a:r>
             <a:r>
               <a:rPr lang="de-DE" dirty="0" smtClean="0"/>
-              <a:t>, BLAS)</a:t>
-            </a:r>
-          </a:p>
-          <a:p>
-            <a:pPr marL="914400" lvl="1" indent="-514350"/>
-            <a:r>
-              <a:rPr lang="de-DE" dirty="0" smtClean="0"/>
-              <a:t>MPI (MPICH 3.0.4)</a:t>
-            </a:r>
-          </a:p>
-          <a:p>
-            <a:pPr marL="914400" lvl="1" indent="-514350"/>
-            <a:r>
-              <a:rPr lang="de-DE" dirty="0" smtClean="0"/>
-              <a:t>Strommessung: Messgerät, virtuelle Windows-Maschine</a:t>
-            </a:r>
-          </a:p>
-          <a:p>
-            <a:pPr marL="514350" indent="-514350"/>
-            <a:r>
-              <a:rPr lang="de-DE" dirty="0" smtClean="0"/>
-              <a:t>Zielsetzung</a:t>
-            </a:r>
-          </a:p>
-          <a:p>
-            <a:pPr marL="914400" lvl="1" indent="-514350"/>
+              <a:t>, BLAS</a:t>
+            </a:r>
+            <a:r>
+              <a:rPr lang="de-DE" dirty="0" smtClean="0"/>
+              <a:t>)</a:t>
+            </a:r>
+          </a:p>
+          <a:p>
+            <a:pPr lvl="2" indent="-285750">
+              <a:buFont typeface="Arial"/>
+              <a:buChar char="•"/>
+            </a:pPr>
+            <a:r>
+              <a:rPr lang="de-DE" dirty="0" smtClean="0"/>
+              <a:t>MPI </a:t>
+            </a:r>
+            <a:r>
+              <a:rPr lang="de-DE" dirty="0" smtClean="0"/>
+              <a:t>(MPICH 3.0.4</a:t>
+            </a:r>
+            <a:r>
+              <a:rPr lang="de-DE" dirty="0" smtClean="0"/>
+              <a:t>)</a:t>
+            </a:r>
+          </a:p>
+          <a:p>
+            <a:pPr lvl="2" indent="-285750">
+              <a:buFont typeface="Arial"/>
+              <a:buChar char="•"/>
+            </a:pPr>
+            <a:r>
+              <a:rPr lang="de-DE" dirty="0" smtClean="0"/>
+              <a:t>Strommessung</a:t>
+            </a:r>
+            <a:r>
+              <a:rPr lang="de-DE" dirty="0" smtClean="0"/>
+              <a:t>: </a:t>
+            </a:r>
+            <a:r>
+              <a:rPr lang="de-DE" dirty="0" smtClean="0"/>
+              <a:t>Strommessgerät, </a:t>
+            </a:r>
+            <a:r>
+              <a:rPr lang="de-DE" dirty="0" smtClean="0"/>
+              <a:t>virtuelle Windows-Maschine</a:t>
+            </a:r>
+          </a:p>
+          <a:p>
+            <a:pPr marL="400050" lvl="1" indent="0">
+              <a:buNone/>
+            </a:pPr>
+            <a:r>
+              <a:rPr lang="de-DE" b="1" dirty="0" smtClean="0"/>
+              <a:t>3.2 Zielsetzung</a:t>
+            </a:r>
+            <a:endParaRPr lang="de-DE" b="1" dirty="0" smtClean="0"/>
+          </a:p>
+          <a:p>
+            <a:pPr marL="1085850" lvl="2" indent="-285750">
+              <a:buFont typeface="Arial"/>
+              <a:buChar char="•"/>
+            </a:pPr>
             <a:r>
               <a:rPr lang="de-DE" dirty="0" smtClean="0"/>
               <a:t>Parallele Ausführung von HPC-Benchmarks </a:t>
             </a:r>
           </a:p>
           <a:p>
-            <a:pPr marL="914400" lvl="1" indent="-514350"/>
+            <a:pPr marL="1085850" lvl="2" indent="-285750">
+              <a:buFont typeface="Arial"/>
+              <a:buChar char="•"/>
+            </a:pPr>
             <a:r>
               <a:rPr lang="de-DE" dirty="0" smtClean="0"/>
               <a:t>Sinnvolle Umsetzung der Vorgaben</a:t>
             </a:r>
           </a:p>
           <a:p>
-            <a:pPr marL="914400" lvl="1" indent="-514350"/>
+            <a:pPr marL="1085850" lvl="2" indent="-285750">
+              <a:buFont typeface="Arial"/>
+              <a:buChar char="•"/>
+            </a:pPr>
             <a:r>
               <a:rPr lang="de-DE" dirty="0" smtClean="0"/>
               <a:t>Einarbeitung und Fehlerbehebung in </a:t>
@@ -9162,14 +10101,20 @@
             </a:r>
           </a:p>
           <a:p>
-            <a:pPr marL="914400" lvl="1" indent="-514350"/>
+            <a:pPr marL="1085850" lvl="2" indent="-285750">
+              <a:buFont typeface="Arial"/>
+              <a:buChar char="•"/>
+            </a:pPr>
             <a:r>
               <a:rPr lang="de-DE" dirty="0" smtClean="0"/>
               <a:t>Messparameter: Performance und Stromverbrauch </a:t>
             </a:r>
           </a:p>
           <a:p>
-            <a:pPr marL="914400" lvl="1" indent="-514350"/>
+            <a:pPr marL="1085850" lvl="2" indent="-285750">
+              <a:buFont typeface="Arial"/>
+              <a:buChar char="•"/>
+            </a:pPr>
             <a:r>
               <a:rPr lang="de-DE" dirty="0" smtClean="0"/>
               <a:t>Fokus auf Skalierungsverhalten des </a:t>
@@ -9181,11 +10126,14 @@
             <a:endParaRPr lang="de-DE" dirty="0" smtClean="0"/>
           </a:p>
           <a:p>
-            <a:pPr marL="514350" indent="-514350"/>
-            <a:r>
-              <a:rPr lang="de-DE" dirty="0" smtClean="0"/>
-              <a:t>Fragestellung</a:t>
-            </a:r>
+            <a:pPr marL="400050" lvl="1" indent="0">
+              <a:buNone/>
+            </a:pPr>
+            <a:r>
+              <a:rPr lang="de-DE" b="1" dirty="0" smtClean="0"/>
+              <a:t>3.3 Fragestellung</a:t>
+            </a:r>
+            <a:endParaRPr lang="de-DE" b="1" dirty="0" smtClean="0"/>
           </a:p>
           <a:p>
             <a:pPr marL="400050" lvl="1" indent="0">
@@ -9303,7 +10251,11 @@
           <a:p>
             <a:r>
               <a:rPr lang="de-DE" sz="1800" dirty="0" smtClean="0"/>
-              <a:t>Definitionen und Messparameter</a:t>
+              <a:t>Versuchsauf</a:t>
+            </a:r>
+            <a:r>
+              <a:rPr lang="de-DE" sz="1800" dirty="0" smtClean="0"/>
+              <a:t>bau und -ablauf</a:t>
             </a:r>
             <a:endParaRPr lang="de-DE" sz="1800" dirty="0"/>
           </a:p>
@@ -9334,19 +10286,19 @@
             </a:r>
           </a:p>
           <a:p>
-            <a:r>
-              <a:rPr lang="de-DE" dirty="0" smtClean="0"/>
-              <a:t>Wie wird </a:t>
-            </a:r>
-            <a:r>
-              <a:rPr lang="de-DE" dirty="0" smtClean="0"/>
-              <a:t>gemessen? </a:t>
-            </a:r>
-          </a:p>
-          <a:p>
-            <a:pPr marL="800100" lvl="1" indent="-342900">
-              <a:buFont typeface="+mj-lt"/>
-              <a:buAutoNum type="arabicPeriod"/>
+            <a:pPr marL="400050" lvl="1" indent="0">
+              <a:buNone/>
+            </a:pPr>
+            <a:r>
+              <a:rPr lang="de-DE" b="1" dirty="0" smtClean="0"/>
+              <a:t>1.1 Wie wird gemessen?</a:t>
+            </a:r>
+            <a:endParaRPr lang="de-DE" b="1" dirty="0" smtClean="0"/>
+          </a:p>
+          <a:p>
+            <a:pPr lvl="2">
+              <a:buFont typeface="Arial"/>
+              <a:buChar char="•"/>
             </a:pPr>
             <a:r>
               <a:rPr lang="de-DE" b="1" dirty="0" smtClean="0"/>
@@ -9364,11 +10316,26 @@
               <a:rPr lang="de-DE" dirty="0" smtClean="0"/>
               <a:t>	</a:t>
             </a:r>
-          </a:p>
-          <a:p>
-            <a:pPr marL="800100" lvl="1" indent="-342900">
-              <a:buFont typeface="+mj-lt"/>
-              <a:buAutoNum type="arabicPeriod"/>
+            <a:endParaRPr lang="de-DE" dirty="0" smtClean="0"/>
+          </a:p>
+          <a:p>
+            <a:pPr marL="457200" lvl="1" indent="0">
+              <a:buNone/>
+            </a:pPr>
+            <a:r>
+              <a:rPr lang="de-DE" b="1" dirty="0" smtClean="0"/>
+              <a:t>1.2 Was wird gemessen?</a:t>
+            </a:r>
+            <a:r>
+              <a:rPr lang="de-DE" dirty="0" smtClean="0"/>
+              <a:t> </a:t>
+            </a:r>
+            <a:endParaRPr lang="de-DE" dirty="0" smtClean="0"/>
+          </a:p>
+          <a:p>
+            <a:pPr lvl="2">
+              <a:buFont typeface="Arial"/>
+              <a:buChar char="•"/>
             </a:pPr>
             <a:r>
               <a:rPr lang="de-DE" b="1" dirty="0" smtClean="0"/>
@@ -9385,9 +10352,9 @@
             <a:endParaRPr lang="de-DE" b="1" i="1" dirty="0" smtClean="0"/>
           </a:p>
           <a:p>
-            <a:pPr marL="800100" lvl="1" indent="-342900">
-              <a:buFont typeface="+mj-lt"/>
-              <a:buAutoNum type="arabicPeriod"/>
+            <a:pPr lvl="2">
+              <a:buFont typeface="Arial"/>
+              <a:buChar char="•"/>
             </a:pPr>
             <a:r>
               <a:rPr lang="de-DE" b="1" dirty="0" smtClean="0"/>
@@ -9403,16 +10370,19 @@
             </a:r>
           </a:p>
           <a:p>
-            <a:r>
-              <a:rPr lang="de-DE" dirty="0" smtClean="0"/>
-              <a:t>Was wird gemessen? </a:t>
+            <a:pPr marL="457200" lvl="1" indent="0">
+              <a:buNone/>
+            </a:pPr>
+            <a:r>
+              <a:rPr lang="de-DE" b="1" dirty="0" smtClean="0"/>
+              <a:t>1.3 Wer misst? </a:t>
             </a:r>
             <a:endParaRPr lang="de-DE" b="1" dirty="0" smtClean="0"/>
           </a:p>
           <a:p>
-            <a:pPr marL="800100" lvl="1" indent="-342900">
-              <a:buFont typeface="+mj-lt"/>
-              <a:buAutoNum type="arabicPeriod"/>
+            <a:pPr lvl="2">
+              <a:buFont typeface="Arial"/>
+              <a:buChar char="•"/>
             </a:pPr>
             <a:r>
               <a:rPr lang="de-DE" b="1" dirty="0" smtClean="0"/>
@@ -9424,9 +10394,9 @@
             </a:r>
           </a:p>
           <a:p>
-            <a:pPr marL="800100" lvl="1" indent="-342900">
-              <a:buFont typeface="+mj-lt"/>
-              <a:buAutoNum type="arabicPeriod"/>
+            <a:pPr lvl="2">
+              <a:buFont typeface="Arial"/>
+              <a:buChar char="•"/>
             </a:pPr>
             <a:r>
               <a:rPr lang="de-DE" b="1" dirty="0" smtClean="0"/>
@@ -9438,9 +10408,9 @@
             </a:r>
           </a:p>
           <a:p>
-            <a:pPr marL="800100" lvl="1" indent="-342900">
-              <a:buFont typeface="+mj-lt"/>
-              <a:buAutoNum type="arabicPeriod"/>
+            <a:pPr lvl="2">
+              <a:buFont typeface="Arial"/>
+              <a:buChar char="•"/>
             </a:pPr>
             <a:r>
               <a:rPr lang="de-DE" b="1" dirty="0" smtClean="0"/>
@@ -9448,8 +10418,13 @@
             </a:r>
             <a:r>
               <a:rPr lang="de-DE" dirty="0" smtClean="0"/>
-              <a:t> Strommessgerät</a:t>
-            </a:r>
+              <a:t> </a:t>
+            </a:r>
+            <a:r>
+              <a:rPr lang="de-DE" dirty="0" smtClean="0"/>
+              <a:t>Strommessgerät</a:t>
+            </a:r>
+            <a:endParaRPr lang="de-DE" dirty="0" smtClean="0"/>
           </a:p>
           <a:p>
             <a:pPr marL="400050" lvl="1" indent="0">

</xml_diff>

<commit_message>
Update ppt presentation (conclusions, diagrams, notes)
</commit_message>
<xml_diff>
--- a/Disputation/grei14.pptx
+++ b/Disputation/grei14.pptx
@@ -324,7 +324,7 @@
           <a:p>
             <a:fld id="{4C476B9A-09E8-F547-B409-8F77FB8D3140}" type="datetime1">
               <a:rPr lang="de-DE" smtClean="0"/>
-              <a:t>23.06.14</a:t>
+              <a:t>24.06.14</a:t>
             </a:fld>
             <a:endParaRPr lang="de-DE"/>
           </a:p>
@@ -4378,11 +4378,7 @@
             </a:pPr>
             <a:r>
               <a:rPr lang="de-DE" b="1" dirty="0" smtClean="0"/>
-              <a:t>Verwendete </a:t>
-            </a:r>
-            <a:r>
-              <a:rPr lang="de-DE" b="1" dirty="0" smtClean="0"/>
-              <a:t>Benchmarks</a:t>
+              <a:t>Verwendete Benchmarks</a:t>
             </a:r>
           </a:p>
           <a:p>
@@ -4391,13 +4387,8 @@
             </a:pPr>
             <a:r>
               <a:rPr lang="de-DE" b="1" dirty="0" smtClean="0"/>
-              <a:t>2.1 </a:t>
-            </a:r>
-            <a:r>
-              <a:rPr lang="de-DE" b="1" dirty="0" smtClean="0"/>
-              <a:t>HPL </a:t>
-            </a:r>
-            <a:endParaRPr lang="de-DE" b="1" dirty="0" smtClean="0"/>
+              <a:t>2.1 HPL </a:t>
+            </a:r>
           </a:p>
           <a:p>
             <a:pPr lvl="2" indent="-285750">
@@ -4460,15 +4451,31 @@
             </a:pPr>
             <a:r>
               <a:rPr lang="de-DE" dirty="0" smtClean="0"/>
-              <a:t>Anpassung an </a:t>
-            </a:r>
-            <a:r>
-              <a:rPr lang="de-DE" dirty="0" err="1" smtClean="0"/>
-              <a:t>Testsytem</a:t>
-            </a:r>
-            <a:r>
-              <a:rPr lang="de-DE" dirty="0" smtClean="0"/>
-              <a:t> erforderlich (v.a. Problemgröße, Blockgröße, Prozessnetz, Panel- und Subpanel-</a:t>
+              <a:t>Anpassung </a:t>
+            </a:r>
+            <a:r>
+              <a:rPr lang="de-DE" dirty="0" smtClean="0"/>
+              <a:t>der Eingabeparameter an Testsystem </a:t>
+            </a:r>
+            <a:r>
+              <a:rPr lang="de-DE" dirty="0" smtClean="0"/>
+              <a:t>erforderlich </a:t>
+            </a:r>
+            <a:r>
+              <a:rPr lang="de-DE" dirty="0" smtClean="0"/>
+              <a:t>(u.a. Problemgröße</a:t>
+            </a:r>
+            <a:r>
+              <a:rPr lang="de-DE" dirty="0" smtClean="0"/>
+              <a:t>, Blockgröße, Prozessnetz, Panel- und </a:t>
+            </a:r>
+            <a:r>
+              <a:rPr lang="de-DE" dirty="0" smtClean="0"/>
+              <a:t>Teilpanel</a:t>
+            </a:r>
+            <a:r>
+              <a:rPr lang="de-DE" dirty="0" smtClean="0"/>
+              <a:t>-</a:t>
             </a:r>
             <a:r>
               <a:rPr lang="de-DE" dirty="0" err="1" smtClean="0"/>
@@ -4812,13 +4819,8 @@
             </a:pPr>
             <a:r>
               <a:rPr lang="de-DE" b="1" dirty="0" smtClean="0"/>
-              <a:t>3.2 </a:t>
-            </a:r>
-            <a:r>
-              <a:rPr lang="de-DE" b="1" dirty="0" smtClean="0"/>
-              <a:t>Ziele</a:t>
-            </a:r>
-            <a:endParaRPr lang="de-DE" b="1" dirty="0" smtClean="0"/>
+              <a:t>3.2 Ziele</a:t>
+            </a:r>
           </a:p>
           <a:p>
             <a:pPr lvl="2" indent="-342900">
@@ -4843,7 +4845,31 @@
             </a:r>
             <a:r>
               <a:rPr lang="de-DE" dirty="0" smtClean="0"/>
-              <a:t>(Max.19: pi03 ist Berechnungsknoten/Min. 4: Kleinstmögliche Anzahl für HPL)</a:t>
+              <a:t>(max</a:t>
+            </a:r>
+            <a:r>
+              <a:rPr lang="de-DE" dirty="0" smtClean="0"/>
+              <a:t>. 19 Rechenknoten, da: </a:t>
+            </a:r>
+            <a:r>
+              <a:rPr lang="de-DE" dirty="0" smtClean="0"/>
+              <a:t>pi03 </a:t>
+            </a:r>
+            <a:r>
+              <a:rPr lang="de-DE" dirty="0" smtClean="0"/>
+              <a:t>ist Berechnungsknoten</a:t>
+            </a:r>
+            <a:r>
+              <a:rPr lang="de-DE" dirty="0" smtClean="0"/>
+              <a:t>/mind. 4 </a:t>
+            </a:r>
+            <a:r>
+              <a:rPr lang="de-DE" dirty="0" smtClean="0"/>
+              <a:t>Rechenknoten, da: Minimum für HPL</a:t>
+            </a:r>
+            <a:r>
+              <a:rPr lang="de-DE" dirty="0" smtClean="0"/>
+              <a:t>)</a:t>
             </a:r>
             <a:endParaRPr lang="de-DE" b="1" dirty="0" smtClean="0"/>
           </a:p>
@@ -4854,11 +4880,15 @@
             </a:pPr>
             <a:r>
               <a:rPr lang="de-DE" b="1" dirty="0" smtClean="0"/>
-              <a:t>Zwei Messreihen pro Benchmark</a:t>
-            </a:r>
-            <a:r>
-              <a:rPr lang="de-DE" dirty="0" smtClean="0"/>
-              <a:t>: Messreihe 1 (alle </a:t>
+              <a:t>Zwei Messreihen pro </a:t>
+            </a:r>
+            <a:r>
+              <a:rPr lang="de-DE" b="1" dirty="0" smtClean="0"/>
+              <a:t>Benchmark</a:t>
+            </a:r>
+            <a:r>
+              <a:rPr lang="de-DE" dirty="0" smtClean="0"/>
+              <a:t> (Messreihe 1: alle </a:t>
             </a:r>
             <a:r>
               <a:rPr lang="de-DE" dirty="0" err="1" smtClean="0"/>
@@ -4866,7 +4896,27 @@
             </a:r>
             <a:r>
               <a:rPr lang="de-DE" dirty="0" smtClean="0"/>
-              <a:t> Pis angeschaltet)/Messreihe 2 (nicht aktive </a:t>
+              <a:t> </a:t>
+            </a:r>
+            <a:r>
+              <a:rPr lang="de-DE" dirty="0" smtClean="0"/>
+              <a:t>Pis </a:t>
+            </a:r>
+            <a:r>
+              <a:rPr lang="de-DE" dirty="0" smtClean="0"/>
+              <a:t>angeschaltet/</a:t>
+            </a:r>
+            <a:r>
+              <a:rPr lang="de-DE" dirty="0" smtClean="0"/>
+              <a:t>Messreihe </a:t>
+            </a:r>
+            <a:r>
+              <a:rPr lang="de-DE" dirty="0" smtClean="0"/>
+              <a:t>2: nicht </a:t>
+            </a:r>
+            <a:r>
+              <a:rPr lang="de-DE" dirty="0" smtClean="0"/>
+              <a:t>aktive </a:t>
             </a:r>
             <a:r>
               <a:rPr lang="de-DE" dirty="0" err="1" smtClean="0"/>
@@ -4888,8 +4938,13 @@
             </a:pPr>
             <a:r>
               <a:rPr lang="de-DE" b="1" dirty="0" smtClean="0"/>
-              <a:t>Auswertung Strommessgerät</a:t>
-            </a:r>
+              <a:t>Auswertung </a:t>
+            </a:r>
+            <a:r>
+              <a:rPr lang="de-DE" b="1" dirty="0" smtClean="0"/>
+              <a:t>Strommessgerät</a:t>
+            </a:r>
+            <a:endParaRPr lang="de-DE" b="1" dirty="0" smtClean="0"/>
           </a:p>
           <a:p>
             <a:pPr lvl="2" indent="-342900">
@@ -4898,8 +4953,13 @@
             </a:pPr>
             <a:r>
               <a:rPr lang="de-DE" b="1" dirty="0" smtClean="0"/>
-              <a:t>Automatisierte Durchführung der Messungen</a:t>
-            </a:r>
+              <a:t>Automatisierte </a:t>
+            </a:r>
+            <a:r>
+              <a:rPr lang="de-DE" b="1" dirty="0" smtClean="0"/>
+              <a:t>Durchführung der Messungen</a:t>
+            </a:r>
+            <a:endParaRPr lang="de-DE" b="1" dirty="0" smtClean="0"/>
           </a:p>
           <a:p>
             <a:pPr lvl="2" indent="-342900">
@@ -4908,8 +4968,13 @@
             </a:pPr>
             <a:r>
               <a:rPr lang="de-DE" b="1" dirty="0" smtClean="0"/>
-              <a:t>Protokollierung und grafische Aufbereitung der Messwerte</a:t>
-            </a:r>
+              <a:t>Protokollierung und grafische </a:t>
+            </a:r>
+            <a:r>
+              <a:rPr lang="de-DE" b="1" dirty="0" smtClean="0"/>
+              <a:t>Aufbereitung der Messergebnisse</a:t>
+            </a:r>
+            <a:endParaRPr lang="de-DE" b="1" dirty="0" smtClean="0"/>
           </a:p>
         </p:txBody>
       </p:sp>
@@ -5021,11 +5086,7 @@
           <a:p>
             <a:r>
               <a:rPr lang="de-DE" sz="1800" dirty="0" smtClean="0"/>
-              <a:t>Versuchsaufbau und -ablauf</a:t>
-            </a:r>
-            <a:r>
-              <a:rPr lang="de-DE" sz="1800" dirty="0" smtClean="0"/>
-              <a:t>	</a:t>
+              <a:t>Versuchsaufbau und -ablauf	</a:t>
             </a:r>
             <a:endParaRPr lang="de-DE" sz="1800" dirty="0"/>
           </a:p>
@@ -5051,13 +5112,8 @@
             </a:pPr>
             <a:r>
               <a:rPr lang="de-DE" b="1" dirty="0" smtClean="0"/>
-              <a:t>3.3 </a:t>
-            </a:r>
-            <a:r>
-              <a:rPr lang="de-DE" b="1" dirty="0" smtClean="0"/>
-              <a:t>Umsetzung</a:t>
-            </a:r>
-            <a:endParaRPr lang="de-DE" b="1" dirty="0" smtClean="0"/>
+              <a:t>3.3 Umsetzung</a:t>
+            </a:r>
           </a:p>
           <a:p>
             <a:pPr lvl="2" indent="-342900">
@@ -5066,19 +5122,11 @@
             </a:pPr>
             <a:r>
               <a:rPr lang="de-DE" b="1" dirty="0" smtClean="0"/>
-              <a:t>Parallele </a:t>
-            </a:r>
-            <a:r>
-              <a:rPr lang="de-DE" b="1" dirty="0" smtClean="0"/>
-              <a:t>Ausführung: </a:t>
-            </a:r>
-            <a:r>
-              <a:rPr lang="de-DE" dirty="0" smtClean="0"/>
-              <a:t>MPICH </a:t>
-            </a:r>
-            <a:r>
-              <a:rPr lang="de-DE" dirty="0" smtClean="0"/>
-              <a:t>mit </a:t>
+              <a:t>Parallele Ausführung: </a:t>
+            </a:r>
+            <a:r>
+              <a:rPr lang="de-DE" dirty="0" smtClean="0"/>
+              <a:t>MPICH mit </a:t>
             </a:r>
             <a:r>
               <a:rPr lang="de-DE" dirty="0" err="1" smtClean="0"/>
@@ -5117,11 +5165,7 @@
             </a:r>
             <a:r>
               <a:rPr lang="de-DE" dirty="0" smtClean="0"/>
-              <a:t>Realisierung </a:t>
-            </a:r>
-            <a:r>
-              <a:rPr lang="de-DE" dirty="0" smtClean="0"/>
-              <a:t>durch </a:t>
+              <a:t>Realisierung durch </a:t>
             </a:r>
             <a:r>
               <a:rPr lang="de-DE" dirty="0" err="1" smtClean="0"/>
@@ -5144,11 +5188,7 @@
             </a:r>
             <a:r>
               <a:rPr lang="de-DE" dirty="0" smtClean="0"/>
-              <a:t>Auswertung </a:t>
-            </a:r>
-            <a:r>
-              <a:rPr lang="de-DE" dirty="0" smtClean="0"/>
-              <a:t>der </a:t>
+              <a:t>Auswertung der </a:t>
             </a:r>
             <a:r>
               <a:rPr lang="de-DE" dirty="0" err="1" smtClean="0"/>
@@ -5183,11 +5223,7 @@
             </a:r>
             <a:r>
               <a:rPr lang="de-DE" dirty="0" smtClean="0"/>
-              <a:t>Realisierung </a:t>
-            </a:r>
-            <a:r>
-              <a:rPr lang="de-DE" dirty="0" smtClean="0"/>
-              <a:t>durch </a:t>
+              <a:t>Realisierung durch </a:t>
             </a:r>
             <a:r>
               <a:rPr lang="de-DE" dirty="0" err="1" smtClean="0"/>
@@ -5195,19 +5231,7 @@
             </a:r>
             <a:r>
               <a:rPr lang="de-DE" dirty="0" smtClean="0"/>
-              <a:t> (Schwerpunkt HERE-Files zur Navigation zwischen </a:t>
-            </a:r>
-            <a:r>
-              <a:rPr lang="de-DE" dirty="0" smtClean="0"/>
-              <a:t>Server </a:t>
-            </a:r>
-            <a:r>
-              <a:rPr lang="de-DE" dirty="0" smtClean="0"/>
-              <a:t>und Rechenknoten mit verschiedenen Benutzern</a:t>
-            </a:r>
-            <a:r>
-              <a:rPr lang="de-DE" dirty="0" smtClean="0"/>
-              <a:t>)</a:t>
+              <a:t> (Schwerpunkt HERE-Files zur Navigation zwischen Server und Rechenknoten mit verschiedenen Benutzern)</a:t>
             </a:r>
             <a:endParaRPr lang="de-DE" dirty="0"/>
           </a:p>
@@ -5230,11 +5254,7 @@
             </a:r>
             <a:r>
               <a:rPr lang="de-DE" dirty="0" smtClean="0"/>
-              <a:t> Realisierung </a:t>
-            </a:r>
-            <a:r>
-              <a:rPr lang="de-DE" dirty="0" smtClean="0"/>
-              <a:t>durch </a:t>
+              <a:t> Realisierung durch </a:t>
             </a:r>
             <a:r>
               <a:rPr lang="de-DE" dirty="0" err="1" smtClean="0"/>
@@ -5242,19 +5262,7 @@
             </a:r>
             <a:r>
               <a:rPr lang="de-DE" dirty="0" smtClean="0"/>
-              <a:t> (Schwerpunkt Kommandozeilen-MySQL); </a:t>
-            </a:r>
-            <a:r>
-              <a:rPr lang="de-DE" dirty="0" smtClean="0"/>
-              <a:t>Anpassung </a:t>
-            </a:r>
-            <a:r>
-              <a:rPr lang="de-DE" dirty="0" smtClean="0"/>
-              <a:t>des </a:t>
-            </a:r>
-            <a:r>
-              <a:rPr lang="de-DE" dirty="0" smtClean="0"/>
-              <a:t>Datenbankschemas an tatsächliche Anforderungen; grafische Aufbereitung mit </a:t>
+              <a:t> (Schwerpunkt Kommandozeilen-MySQL); Anpassung des Datenbankschemas an tatsächliche Anforderungen; grafische Aufbereitung mit </a:t>
             </a:r>
             <a:r>
               <a:rPr lang="de-DE" dirty="0" err="1" smtClean="0"/>
@@ -5269,23 +5277,11 @@
             </a:pPr>
             <a:r>
               <a:rPr lang="de-DE" b="1" dirty="0" smtClean="0"/>
-              <a:t>Integration </a:t>
-            </a:r>
-            <a:r>
-              <a:rPr lang="de-DE" b="1" dirty="0" smtClean="0"/>
-              <a:t>der Fehlerbehebung in </a:t>
-            </a:r>
-            <a:r>
-              <a:rPr lang="de-DE" b="1" dirty="0" smtClean="0"/>
-              <a:t>Versuchsdurchführung: </a:t>
-            </a:r>
-            <a:r>
-              <a:rPr lang="de-DE" dirty="0" smtClean="0"/>
-              <a:t>Realisierung </a:t>
-            </a:r>
-            <a:r>
-              <a:rPr lang="de-DE" dirty="0" smtClean="0"/>
-              <a:t>durch </a:t>
+              <a:t>Integration der Fehlerbehebung in Versuchsdurchführung: </a:t>
+            </a:r>
+            <a:r>
+              <a:rPr lang="de-DE" dirty="0" smtClean="0"/>
+              <a:t>Realisierung durch </a:t>
             </a:r>
             <a:r>
               <a:rPr lang="de-DE" dirty="0" err="1" smtClean="0"/>
@@ -5425,7 +5421,7 @@
       </p:sp>
       <p:pic>
         <p:nvPicPr>
-          <p:cNvPr id="6" name="Inhaltsplatzhalter 5" descr="aktivitaetsdiagramm1.pdf"/>
+          <p:cNvPr id="6" name="Inhaltsplatzhalter 5"/>
           <p:cNvPicPr>
             <a:picLocks noGrp="1" noChangeAspect="1"/>
           </p:cNvPicPr>
@@ -5441,15 +5437,14 @@
               </a:ext>
             </a:extLst>
           </a:blip>
-          <a:srcRect l="-16314" r="-16314"/>
           <a:stretch>
             <a:fillRect/>
           </a:stretch>
         </p:blipFill>
         <p:spPr>
           <a:xfrm>
-            <a:off x="287524" y="1340768"/>
-            <a:ext cx="8666222" cy="4900641"/>
+            <a:off x="1353541" y="1340768"/>
+            <a:ext cx="6534188" cy="4900641"/>
           </a:xfrm>
         </p:spPr>
       </p:pic>
@@ -5522,7 +5517,7 @@
         <p:spPr>
           <a:xfrm>
             <a:off x="2555776" y="6129300"/>
-            <a:ext cx="4123144" cy="276999"/>
+            <a:ext cx="4687827" cy="276999"/>
           </a:xfrm>
           <a:prstGeom prst="rect">
             <a:avLst/>
@@ -5540,12 +5535,12 @@
               <a:t>Aktivitätsdiagramm einer </a:t>
             </a:r>
             <a:r>
-              <a:rPr lang="de-DE" dirty="0" err="1" smtClean="0"/>
-              <a:t>ExperimentSuite</a:t>
-            </a:r>
-            <a:r>
-              <a:rPr lang="de-DE" dirty="0" smtClean="0"/>
-              <a:t> (2 Messreihen)</a:t>
+              <a:rPr lang="de-DE" dirty="0" smtClean="0"/>
+              <a:t>Versuchsdurchführung mit </a:t>
+            </a:r>
+            <a:r>
+              <a:rPr lang="de-DE" dirty="0" smtClean="0"/>
+              <a:t>2 Messreihen</a:t>
             </a:r>
             <a:endParaRPr lang="de-DE" dirty="0"/>
           </a:p>
@@ -5615,7 +5610,7 @@
             <p:ph idx="1"/>
           </p:nvPr>
         </p:nvPicPr>
-        <p:blipFill rotWithShape="1">
+        <p:blipFill>
           <a:blip r:embed="rId3">
             <a:extLst>
               <a:ext uri="{28A0092B-C50C-407E-A947-70E740481C1C}">
@@ -5623,13 +5618,15 @@
               </a:ext>
             </a:extLst>
           </a:blip>
-          <a:srcRect l="-3747" r="-3747"/>
-          <a:stretch/>
+          <a:srcRect/>
+          <a:stretch>
+            <a:fillRect/>
+          </a:stretch>
         </p:blipFill>
         <p:spPr>
           <a:xfrm>
-            <a:off x="1079612" y="1232756"/>
-            <a:ext cx="6989690" cy="4876800"/>
+            <a:off x="1323257" y="1232756"/>
+            <a:ext cx="6502400" cy="4876800"/>
           </a:xfrm>
         </p:spPr>
       </p:pic>
@@ -5771,11 +5768,7 @@
           <a:p>
             <a:r>
               <a:rPr lang="de-DE" sz="1800" dirty="0" smtClean="0"/>
-              <a:t>Ergebnisse</a:t>
-            </a:r>
-            <a:r>
-              <a:rPr lang="de-DE" sz="1800" dirty="0" smtClean="0"/>
-              <a:t>	</a:t>
+              <a:t>Ergebnisse	</a:t>
             </a:r>
             <a:endParaRPr lang="de-DE" sz="1800" dirty="0"/>
           </a:p>
@@ -6241,11 +6234,7 @@
           <a:p>
             <a:r>
               <a:rPr lang="de-DE" sz="1800" dirty="0" smtClean="0"/>
-              <a:t>Ergebnisse</a:t>
-            </a:r>
-            <a:r>
-              <a:rPr lang="de-DE" sz="1800" dirty="0" smtClean="0"/>
-              <a:t>	</a:t>
+              <a:t>Ergebnisse	</a:t>
             </a:r>
             <a:endParaRPr lang="de-DE" sz="1800" dirty="0"/>
           </a:p>
@@ -6476,11 +6465,7 @@
           <a:p>
             <a:r>
               <a:rPr lang="de-DE" sz="1800" dirty="0" smtClean="0"/>
-              <a:t>Ergebnisse</a:t>
-            </a:r>
-            <a:r>
-              <a:rPr lang="de-DE" sz="1800" dirty="0" smtClean="0"/>
-              <a:t>	</a:t>
+              <a:t>Ergebnisse	</a:t>
             </a:r>
             <a:endParaRPr lang="de-DE" sz="1800" dirty="0"/>
           </a:p>
@@ -6897,11 +6882,7 @@
           <a:p>
             <a:r>
               <a:rPr lang="de-DE" sz="1800" dirty="0" smtClean="0"/>
-              <a:t>Ergebnisse</a:t>
-            </a:r>
-            <a:r>
-              <a:rPr lang="de-DE" sz="1800" dirty="0" smtClean="0"/>
-              <a:t>	</a:t>
+              <a:t>Ergebnisse	</a:t>
             </a:r>
             <a:endParaRPr lang="de-DE" sz="1800" dirty="0"/>
           </a:p>
@@ -7040,11 +7021,7 @@
           <a:p>
             <a:r>
               <a:rPr lang="de-DE" sz="1800" dirty="0" smtClean="0"/>
-              <a:t>Ergebnisse</a:t>
-            </a:r>
-            <a:r>
-              <a:rPr lang="de-DE" sz="1800" dirty="0" smtClean="0"/>
-              <a:t>	</a:t>
+              <a:t>Ergebnisse	</a:t>
             </a:r>
             <a:endParaRPr lang="de-DE" sz="1800" dirty="0"/>
           </a:p>
@@ -7080,11 +7057,7 @@
             </a:pPr>
             <a:r>
               <a:rPr lang="de-DE" b="1" dirty="0" smtClean="0"/>
-              <a:t>3.1 </a:t>
-            </a:r>
-            <a:r>
-              <a:rPr lang="de-DE" b="1" dirty="0" smtClean="0"/>
-              <a:t>Erwartete Ergebnisse </a:t>
+              <a:t>3.1 Erwartete Ergebnisse </a:t>
             </a:r>
           </a:p>
           <a:p>
@@ -7147,11 +7120,7 @@
             </a:pPr>
             <a:r>
               <a:rPr lang="de-DE" b="1" dirty="0" smtClean="0"/>
-              <a:t>3.2 </a:t>
-            </a:r>
-            <a:r>
-              <a:rPr lang="de-DE" b="1" dirty="0" smtClean="0"/>
-              <a:t>Erzielte Ergebnisse</a:t>
+              <a:t>3.2 Erzielte Ergebnisse</a:t>
             </a:r>
             <a:endParaRPr lang="de-DE" dirty="0" smtClean="0"/>
           </a:p>
@@ -7295,11 +7264,7 @@
           <a:p>
             <a:r>
               <a:rPr lang="de-DE" sz="1800" dirty="0" smtClean="0"/>
-              <a:t>Ergebnisse</a:t>
-            </a:r>
-            <a:r>
-              <a:rPr lang="de-DE" sz="1800" dirty="0" smtClean="0"/>
-              <a:t>	</a:t>
+              <a:t>Ergebnisse	</a:t>
             </a:r>
             <a:endParaRPr lang="de-DE" sz="1800" dirty="0"/>
           </a:p>
@@ -7438,11 +7403,7 @@
           <a:p>
             <a:r>
               <a:rPr lang="de-DE" sz="1800" dirty="0" smtClean="0"/>
-              <a:t>Ergebnisse</a:t>
-            </a:r>
-            <a:r>
-              <a:rPr lang="de-DE" sz="1800" dirty="0" smtClean="0"/>
-              <a:t>	</a:t>
+              <a:t>Ergebnisse	</a:t>
             </a:r>
             <a:endParaRPr lang="de-DE" sz="1800" dirty="0"/>
           </a:p>
@@ -7581,11 +7542,7 @@
           <a:p>
             <a:r>
               <a:rPr lang="de-DE" sz="1800" dirty="0" smtClean="0"/>
-              <a:t>Ergebnisse</a:t>
-            </a:r>
-            <a:r>
-              <a:rPr lang="de-DE" sz="1800" dirty="0" smtClean="0"/>
-              <a:t>	</a:t>
+              <a:t>Ergebnisse	</a:t>
             </a:r>
             <a:endParaRPr lang="de-DE" sz="1800" dirty="0"/>
           </a:p>
@@ -7660,11 +7617,7 @@
             </a:pPr>
             <a:r>
               <a:rPr lang="de-DE" b="1" dirty="0" smtClean="0"/>
-              <a:t>Funktionsweise des </a:t>
-            </a:r>
-            <a:r>
-              <a:rPr lang="de-DE" b="1" dirty="0" smtClean="0"/>
-              <a:t>Benchmarks: </a:t>
+              <a:t>Funktionsweise des Benchmarks: </a:t>
             </a:r>
             <a:r>
               <a:rPr lang="de-DE" dirty="0" smtClean="0"/>
@@ -7680,7 +7633,6 @@
               <a:rPr lang="de-DE" dirty="0" smtClean="0"/>
               <a:t>kein erwünschter Effekt, lineares Wachstum erwartet</a:t>
             </a:r>
-            <a:endParaRPr lang="de-DE" dirty="0" smtClean="0"/>
           </a:p>
           <a:p>
             <a:pPr marL="1200150" lvl="2" indent="-342900">
@@ -7697,19 +7649,7 @@
             </a:r>
             <a:r>
               <a:rPr lang="de-DE" dirty="0" smtClean="0"/>
-              <a:t>Systemzeit, </a:t>
-            </a:r>
-            <a:r>
-              <a:rPr lang="de-DE" dirty="0" smtClean="0"/>
-              <a:t>Netz</a:t>
-            </a:r>
-            <a:r>
-              <a:rPr lang="de-DE" dirty="0" smtClean="0"/>
-              <a:t>-</a:t>
-            </a:r>
-            <a:r>
-              <a:rPr lang="de-DE" dirty="0" smtClean="0"/>
-              <a:t>Dateisystem?</a:t>
+              <a:t>Systemzeit, Netz-Dateisystem?</a:t>
             </a:r>
           </a:p>
           <a:p>
@@ -7747,7 +7687,6 @@
               <a:rPr lang="de-DE" dirty="0" smtClean="0"/>
               <a:t> und Libraries auf lokale Partition liefert noch schlechtere Ergebnisse</a:t>
             </a:r>
-            <a:endParaRPr lang="de-DE" dirty="0" smtClean="0"/>
           </a:p>
           <a:p>
             <a:pPr marL="1200150" lvl="2" indent="-342900">
@@ -7756,19 +7695,11 @@
             </a:pPr>
             <a:r>
               <a:rPr lang="de-DE" b="1" dirty="0" smtClean="0"/>
-              <a:t>Ausführung </a:t>
-            </a:r>
-            <a:r>
-              <a:rPr lang="de-DE" b="1" dirty="0" smtClean="0"/>
-              <a:t>des Benchmarks: </a:t>
-            </a:r>
-            <a:r>
-              <a:rPr lang="de-DE" dirty="0" smtClean="0"/>
-              <a:t>Funktionsweise von </a:t>
-            </a:r>
-            <a:r>
-              <a:rPr lang="de-DE" dirty="0" smtClean="0"/>
-              <a:t>MPICH?</a:t>
+              <a:t>Ausführung des Benchmarks: </a:t>
+            </a:r>
+            <a:r>
+              <a:rPr lang="de-DE" dirty="0" smtClean="0"/>
+              <a:t>Funktionsweise von MPICH?</a:t>
             </a:r>
           </a:p>
           <a:p>
@@ -7793,15 +7724,7 @@
             </a:r>
             <a:r>
               <a:rPr lang="de-DE" dirty="0" smtClean="0"/>
-              <a:t>Lineares Wachstum der Bandbreiten der HS-Zugriffe (erwartungsgemäß), Ausführungsdauer steigt jedoch deutlich an; </a:t>
-            </a:r>
-            <a:r>
-              <a:rPr lang="de-DE" dirty="0" smtClean="0"/>
-              <a:t>nicht </a:t>
-            </a:r>
-            <a:r>
-              <a:rPr lang="de-DE" dirty="0" smtClean="0"/>
-              <a:t>abschließend zu klären!</a:t>
+              <a:t>Lineares Wachstum der Bandbreiten der HS-Zugriffe (erwartungsgemäß), Ausführungsdauer steigt jedoch deutlich an; nicht abschließend zu klären!</a:t>
             </a:r>
             <a:endParaRPr lang="de-DE" dirty="0"/>
           </a:p>
@@ -7941,15 +7864,7 @@
           <a:p>
             <a:r>
               <a:rPr lang="de-DE" sz="1800" dirty="0" smtClean="0"/>
-              <a:t>Zusammenfassung </a:t>
-            </a:r>
-            <a:r>
-              <a:rPr lang="de-DE" sz="1800" dirty="0" smtClean="0"/>
-              <a:t>und Ausblick </a:t>
-            </a:r>
-            <a:r>
-              <a:rPr lang="de-DE" sz="1800" dirty="0" smtClean="0"/>
-              <a:t>	</a:t>
+              <a:t>Zusammenfassung und Ausblick 	</a:t>
             </a:r>
             <a:endParaRPr lang="de-DE" sz="1800" dirty="0"/>
           </a:p>
@@ -7994,13 +7909,8 @@
             </a:r>
             <a:r>
               <a:rPr lang="de-DE" dirty="0" smtClean="0"/>
-              <a:t> bei der parallelen Ausführung von HPC-</a:t>
-            </a:r>
-            <a:r>
-              <a:rPr lang="de-DE" dirty="0" smtClean="0"/>
-              <a:t>Benchmarks</a:t>
-            </a:r>
-            <a:endParaRPr lang="de-DE" dirty="0" smtClean="0"/>
+              <a:t> bei der parallelen Ausführung von HPC-Benchmarks</a:t>
+            </a:r>
           </a:p>
           <a:p>
             <a:pPr lvl="1"/>
@@ -8020,11 +7930,7 @@
             </a:r>
             <a:r>
               <a:rPr lang="de-DE" dirty="0" smtClean="0"/>
-              <a:t> </a:t>
-            </a:r>
-            <a:r>
-              <a:rPr lang="de-DE" dirty="0" smtClean="0"/>
-              <a:t>Lineares Skalierungsverhalten </a:t>
+              <a:t> Lineares Skalierungsverhalten </a:t>
             </a:r>
             <a:r>
               <a:rPr lang="de-DE" dirty="0" smtClean="0">
@@ -8072,11 +7978,7 @@
             </a:r>
             <a:r>
               <a:rPr lang="de-DE" dirty="0" smtClean="0"/>
-              <a:t> Lineares Skalierungsverhalten (Ausführungsrate) </a:t>
-            </a:r>
-            <a:r>
-              <a:rPr lang="de-DE" dirty="0" smtClean="0"/>
-              <a:t>für </a:t>
+              <a:t> Lineares Skalierungsverhalten (Ausführungsrate) für </a:t>
             </a:r>
             <a:r>
               <a:rPr lang="de-DE" dirty="0" err="1" smtClean="0"/>
@@ -8084,11 +7986,7 @@
             </a:r>
             <a:r>
               <a:rPr lang="de-DE" dirty="0" smtClean="0"/>
-              <a:t> </a:t>
-            </a:r>
-            <a:r>
-              <a:rPr lang="de-DE" dirty="0" smtClean="0"/>
-              <a:t>≤ 17 Rechenknoten, konstantes Skalierungsverhalten (Ausführungsdauer) für </a:t>
+              <a:t> ≤ 17 Rechenknoten, konstantes Skalierungsverhalten (Ausführungsdauer) für </a:t>
             </a:r>
             <a:r>
               <a:rPr lang="de-DE" dirty="0" err="1" smtClean="0"/>
@@ -8137,23 +8035,11 @@
             </a:r>
             <a:r>
               <a:rPr lang="de-DE" b="1" dirty="0" smtClean="0"/>
-              <a:t> </a:t>
-            </a:r>
-            <a:r>
-              <a:rPr lang="de-DE" b="1" dirty="0" smtClean="0"/>
-              <a:t>(Vorgaben, Integration)</a:t>
-            </a:r>
-            <a:r>
-              <a:rPr lang="de-DE" b="1" dirty="0" smtClean="0"/>
-              <a:t>:</a:t>
-            </a:r>
-            <a:r>
-              <a:rPr lang="de-DE" dirty="0" smtClean="0"/>
-              <a:t> </a:t>
-            </a:r>
-            <a:r>
-              <a:rPr lang="de-DE" dirty="0" smtClean="0"/>
-              <a:t>Erfolgt </a:t>
+              <a:t> (Vorgaben, Integration):</a:t>
+            </a:r>
+            <a:r>
+              <a:rPr lang="de-DE" dirty="0" smtClean="0"/>
+              <a:t> Erfolgt </a:t>
             </a:r>
             <a:r>
               <a:rPr lang="de-DE" dirty="0" smtClean="0">
@@ -8345,13 +8231,12 @@
             </a:r>
           </a:p>
           <a:p>
-            <a:pPr marL="800100" lvl="1" indent="-342900">
-              <a:buFont typeface="+mj-lt"/>
-              <a:buAutoNum type="arabicPeriod"/>
+            <a:pPr marL="457200" lvl="1" indent="0">
+              <a:buNone/>
             </a:pPr>
             <a:r>
               <a:rPr lang="de-DE" b="1" dirty="0" smtClean="0"/>
-              <a:t>Optimierung </a:t>
+              <a:t>2.1 Optimierung der </a:t>
             </a:r>
             <a:r>
               <a:rPr lang="de-DE" b="1" dirty="0" err="1" smtClean="0"/>
@@ -8364,7 +8249,10 @@
             <a:endParaRPr lang="de-DE" dirty="0" smtClean="0"/>
           </a:p>
           <a:p>
-            <a:pPr lvl="1"/>
+            <a:pPr lvl="2">
+              <a:buFont typeface="Arial"/>
+              <a:buChar char="•"/>
+            </a:pPr>
             <a:r>
               <a:rPr lang="de-DE" dirty="0" smtClean="0"/>
               <a:t>Kritische Punkte (</a:t>
@@ -8384,7 +8272,10 @@
             <a:endParaRPr lang="de-DE" dirty="0" smtClean="0"/>
           </a:p>
           <a:p>
-            <a:pPr lvl="1"/>
+            <a:pPr lvl="2">
+              <a:buFont typeface="Arial"/>
+              <a:buChar char="•"/>
+            </a:pPr>
             <a:r>
               <a:rPr lang="de-DE" dirty="0"/>
               <a:t>Kritische Punkte </a:t>
@@ -8409,20 +8300,23 @@
               <a:rPr lang="de-DE" dirty="0" smtClean="0"/>
               <a:t>beengter Aufbau </a:t>
             </a:r>
-          </a:p>
-          <a:p>
-            <a:pPr marL="800100" lvl="1" indent="-342900">
-              <a:buFont typeface="+mj-lt"/>
-              <a:buAutoNum type="arabicPeriod" startAt="2"/>
+            <a:endParaRPr lang="de-DE" dirty="0" smtClean="0"/>
+          </a:p>
+          <a:p>
+            <a:pPr marL="514350" lvl="1" indent="0">
+              <a:buNone/>
             </a:pPr>
             <a:r>
               <a:rPr lang="de-DE" b="1" dirty="0" smtClean="0"/>
-              <a:t>Erweiterung des Versuchsaufbau mit HPC-Benchmarks</a:t>
+              <a:t>2.2 Zukünftige Versuche</a:t>
             </a:r>
             <a:endParaRPr lang="de-DE" dirty="0" smtClean="0"/>
           </a:p>
           <a:p>
-            <a:pPr lvl="1"/>
+            <a:pPr lvl="2">
+              <a:buFont typeface="Arial"/>
+              <a:buChar char="•"/>
+            </a:pPr>
             <a:r>
               <a:rPr lang="de-DE" dirty="0" err="1" smtClean="0"/>
               <a:t>Whetstone</a:t>
@@ -8433,7 +8327,10 @@
             </a:r>
           </a:p>
           <a:p>
-            <a:pPr lvl="1"/>
+            <a:pPr lvl="2">
+              <a:buFont typeface="Arial"/>
+              <a:buChar char="•"/>
+            </a:pPr>
             <a:r>
               <a:rPr lang="de-DE" dirty="0" smtClean="0"/>
               <a:t>STREAM auf </a:t>
@@ -8448,28 +8345,58 @@
             </a:r>
           </a:p>
           <a:p>
-            <a:pPr lvl="1"/>
-            <a:r>
-              <a:rPr lang="de-DE" dirty="0" smtClean="0"/>
-              <a:t>Weitere HPC-Benchmarks </a:t>
-            </a:r>
-          </a:p>
-          <a:p>
-            <a:pPr lvl="1"/>
-            <a:r>
-              <a:rPr lang="de-DE" dirty="0" smtClean="0"/>
-              <a:t>Unter- und Übertakten der CPUs </a:t>
-            </a:r>
-          </a:p>
-          <a:p>
-            <a:pPr lvl="1"/>
+            <a:pPr lvl="2">
+              <a:buFont typeface="Arial"/>
+              <a:buChar char="•"/>
+            </a:pPr>
+            <a:r>
+              <a:rPr lang="de-DE" dirty="0" smtClean="0"/>
+              <a:t>Weitere, n</a:t>
+            </a:r>
+            <a:r>
+              <a:rPr lang="de-DE" dirty="0" smtClean="0"/>
+              <a:t>och nicht behandelte</a:t>
+            </a:r>
+            <a:r>
+              <a:rPr lang="de-DE" dirty="0" smtClean="0"/>
+              <a:t> </a:t>
+            </a:r>
+            <a:r>
+              <a:rPr lang="de-DE" dirty="0" smtClean="0"/>
+              <a:t>HPC-Benchmarks </a:t>
+            </a:r>
+          </a:p>
+          <a:p>
+            <a:pPr lvl="2">
+              <a:buFont typeface="Arial"/>
+              <a:buChar char="•"/>
+            </a:pPr>
+            <a:r>
+              <a:rPr lang="de-DE" dirty="0" smtClean="0"/>
+              <a:t>Unter-/Übertakten der CPUs</a:t>
+            </a:r>
+            <a:endParaRPr lang="de-DE" dirty="0" smtClean="0"/>
+          </a:p>
+          <a:p>
+            <a:pPr lvl="2">
+              <a:buFont typeface="Arial"/>
+              <a:buChar char="•"/>
+            </a:pPr>
             <a:r>
               <a:rPr lang="de-DE" dirty="0" err="1" smtClean="0"/>
               <a:t>Anprogrammierung</a:t>
             </a:r>
             <a:r>
               <a:rPr lang="de-DE" dirty="0" smtClean="0"/>
-              <a:t> der GPU (Spezifikation vor Kurzem veröffentlicht, Wettbewerb der </a:t>
+              <a:t> der GPU (Spezifikation vor Kurzem veröffentlicht, </a:t>
+            </a:r>
+            <a:r>
+              <a:rPr lang="de-DE" dirty="0" smtClean="0"/>
+              <a:t>Wettbewerb </a:t>
+            </a:r>
+            <a:r>
+              <a:rPr lang="de-DE" dirty="0" smtClean="0"/>
+              <a:t>der </a:t>
             </a:r>
             <a:r>
               <a:rPr lang="de-DE" dirty="0" err="1" smtClean="0"/>
@@ -8675,7 +8602,6 @@
               <a:rPr lang="de-DE" b="1" dirty="0" smtClean="0"/>
               <a:t>1.1 Allgemeines</a:t>
             </a:r>
-            <a:endParaRPr lang="de-DE" b="1" dirty="0" smtClean="0"/>
           </a:p>
           <a:p>
             <a:pPr lvl="2">
@@ -8727,7 +8653,15 @@
             </a:pPr>
             <a:r>
               <a:rPr lang="de-DE" dirty="0" smtClean="0"/>
-              <a:t>Kosten insgesamt: ca. 50 Euro </a:t>
+              <a:t>Kosten </a:t>
+            </a:r>
+            <a:r>
+              <a:rPr lang="de-DE" dirty="0" smtClean="0"/>
+              <a:t>inklusive Zubehör: </a:t>
+            </a:r>
+            <a:r>
+              <a:rPr lang="de-DE" dirty="0" smtClean="0"/>
+              <a:t>ca. 50 Euro </a:t>
             </a:r>
             <a:endParaRPr lang="de-DE" dirty="0"/>
           </a:p>
@@ -8739,7 +8673,6 @@
               <a:rPr lang="de-DE" b="1" dirty="0" smtClean="0"/>
               <a:t>1.2 Spezifikation</a:t>
             </a:r>
-            <a:endParaRPr lang="de-DE" b="1" dirty="0" smtClean="0"/>
           </a:p>
           <a:p>
             <a:pPr lvl="2">
@@ -8813,7 +8746,15 @@
             </a:pPr>
             <a:r>
               <a:rPr lang="de-DE" dirty="0"/>
-              <a:t>Stromversorgung: Mikro-USB (5 </a:t>
+              <a:t>Stromversorgung: </a:t>
+            </a:r>
+            <a:r>
+              <a:rPr lang="de-DE" dirty="0" err="1" smtClean="0"/>
+              <a:t>Micro</a:t>
+            </a:r>
+            <a:r>
+              <a:rPr lang="de-DE" dirty="0"/>
+              <a:t>-USB (5 </a:t>
             </a:r>
             <a:r>
               <a:rPr lang="de-DE" dirty="0" smtClean="0"/>
@@ -8828,7 +8769,15 @@
             </a:pPr>
             <a:r>
               <a:rPr lang="de-DE" dirty="0"/>
-              <a:t>Weitere Schnittstellen: Ethernet, HDMI, GPIO, 2 x USB 2.0</a:t>
+              <a:t>Weitere </a:t>
+            </a:r>
+            <a:r>
+              <a:rPr lang="de-DE" dirty="0" smtClean="0"/>
+              <a:t>wichtige Schnittstellen</a:t>
+            </a:r>
+            <a:r>
+              <a:rPr lang="de-DE" dirty="0"/>
+              <a:t>: Ethernet, HDMI, GPIO, 2 x USB 2.0</a:t>
             </a:r>
           </a:p>
           <a:p>
@@ -9257,17 +9206,8 @@
             </a:pPr>
             <a:r>
               <a:rPr lang="de-DE" b="1" dirty="0" smtClean="0"/>
-              <a:t>2.1 Definition </a:t>
-            </a:r>
-            <a:r>
-              <a:rPr lang="de-DE" b="1" dirty="0" smtClean="0"/>
-              <a:t>Beowulf-</a:t>
-            </a:r>
-            <a:r>
-              <a:rPr lang="de-DE" b="1" dirty="0" smtClean="0"/>
-              <a:t>Cluster</a:t>
-            </a:r>
-            <a:endParaRPr lang="de-DE" b="1" dirty="0" smtClean="0"/>
+              <a:t>2.1 Definition Beowulf-Cluster</a:t>
+            </a:r>
           </a:p>
           <a:p>
             <a:pPr lvl="2">
@@ -9347,7 +9287,6 @@
               <a:rPr lang="de-DE" dirty="0" smtClean="0"/>
               <a:t> </a:t>
             </a:r>
-            <a:endParaRPr lang="de-DE" dirty="0" smtClean="0"/>
           </a:p>
           <a:p>
             <a:pPr lvl="2">
@@ -9384,7 +9323,27 @@
             </a:pPr>
             <a:r>
               <a:rPr lang="de-DE" dirty="0" smtClean="0"/>
-              <a:t>Server (x86-Architektur): Mini-ITX-Mainboard (4), Festplatten (5)</a:t>
+              <a:t>Server: Mini</a:t>
+            </a:r>
+            <a:r>
+              <a:rPr lang="de-DE" dirty="0" smtClean="0"/>
+              <a:t>-ITX-Mainboard </a:t>
+            </a:r>
+            <a:r>
+              <a:rPr lang="de-DE" dirty="0" smtClean="0"/>
+              <a:t>mit x86-Prozessor (</a:t>
+            </a:r>
+            <a:r>
+              <a:rPr lang="de-DE" dirty="0" smtClean="0"/>
+              <a:t>4), </a:t>
+            </a:r>
+            <a:r>
+              <a:rPr lang="de-DE" dirty="0" smtClean="0"/>
+              <a:t>4 Festplatten </a:t>
+            </a:r>
+            <a:r>
+              <a:rPr lang="de-DE" dirty="0" smtClean="0"/>
+              <a:t>(5)</a:t>
             </a:r>
           </a:p>
           <a:p>
@@ -9394,7 +9353,15 @@
             </a:pPr>
             <a:r>
               <a:rPr lang="de-DE" dirty="0" smtClean="0"/>
-              <a:t>Stromversorgung: zentrales Netzteil (6), 2 Verteiler (7), 20 Mikro-USB-Kabel (8)</a:t>
+              <a:t>Stromversorgung: zentrales Netzteil (6), 2 Verteiler (7), 20 </a:t>
+            </a:r>
+            <a:r>
+              <a:rPr lang="de-DE" dirty="0" err="1" smtClean="0"/>
+              <a:t>Micro</a:t>
+            </a:r>
+            <a:r>
+              <a:rPr lang="de-DE" dirty="0" smtClean="0"/>
+              <a:t>-USB-Kabel (8)</a:t>
             </a:r>
           </a:p>
           <a:p>
@@ -9404,7 +9371,15 @@
             </a:pPr>
             <a:r>
               <a:rPr lang="de-DE" dirty="0" smtClean="0"/>
-              <a:t>Kühlung: 4 Kühlgebläse (9)</a:t>
+              <a:t>Kühlung: </a:t>
+            </a:r>
+            <a:r>
+              <a:rPr lang="de-DE" dirty="0" smtClean="0"/>
+              <a:t>4 Kühlgebläse </a:t>
+            </a:r>
+            <a:r>
+              <a:rPr lang="de-DE" dirty="0" smtClean="0"/>
+              <a:t>(9)</a:t>
             </a:r>
           </a:p>
           <a:p>
@@ -9542,11 +9517,7 @@
           <a:p>
             <a:r>
               <a:rPr lang="de-DE" sz="1800" dirty="0" smtClean="0"/>
-              <a:t>Einf</a:t>
-            </a:r>
-            <a:r>
-              <a:rPr lang="de-DE" sz="1800" dirty="0" smtClean="0"/>
-              <a:t>ührung und Aufgabenstellung </a:t>
+              <a:t>Einführung und Aufgabenstellung </a:t>
             </a:r>
             <a:endParaRPr lang="de-DE" sz="1800" dirty="0"/>
           </a:p>
@@ -9957,15 +9928,7 @@
             </a:r>
             <a:r>
               <a:rPr lang="de-DE" dirty="0" smtClean="0"/>
-              <a:t>-Systemarchitektur (NFS, AUFS, IP/</a:t>
-            </a:r>
-            <a:r>
-              <a:rPr lang="de-DE" dirty="0" smtClean="0"/>
-              <a:t>SSH</a:t>
-            </a:r>
-            <a:r>
-              <a:rPr lang="de-DE" dirty="0" smtClean="0"/>
-              <a:t>)</a:t>
+              <a:t>-Systemarchitektur (NFS, AUFS, IP/SSH)</a:t>
             </a:r>
           </a:p>
           <a:p>
@@ -9975,15 +9938,7 @@
             </a:pPr>
             <a:r>
               <a:rPr lang="de-DE" dirty="0" smtClean="0"/>
-              <a:t>Datenbank</a:t>
-            </a:r>
-            <a:r>
-              <a:rPr lang="de-DE" dirty="0" smtClean="0"/>
-              <a:t>-Schema (</a:t>
-            </a:r>
-            <a:r>
-              <a:rPr lang="de-DE" dirty="0" smtClean="0"/>
-              <a:t>MySQL)</a:t>
+              <a:t>Datenbank-Schema (MySQL)</a:t>
             </a:r>
           </a:p>
           <a:p>
@@ -9993,11 +9948,7 @@
             </a:pPr>
             <a:r>
               <a:rPr lang="de-DE" dirty="0" smtClean="0"/>
-              <a:t>Benchmark</a:t>
-            </a:r>
-            <a:r>
-              <a:rPr lang="de-DE" dirty="0" smtClean="0"/>
-              <a:t>-Programme und Bibliotheken (HPL, STREAM, </a:t>
+              <a:t>Benchmark-Programme und Bibliotheken (HPL, STREAM, </a:t>
             </a:r>
             <a:r>
               <a:rPr lang="de-DE" dirty="0" err="1" smtClean="0"/>
@@ -10005,11 +9956,7 @@
             </a:r>
             <a:r>
               <a:rPr lang="de-DE" dirty="0" smtClean="0"/>
-              <a:t>, BLAS</a:t>
-            </a:r>
-            <a:r>
-              <a:rPr lang="de-DE" dirty="0" smtClean="0"/>
-              <a:t>)</a:t>
+              <a:t>, BLAS)</a:t>
             </a:r>
           </a:p>
           <a:p>
@@ -10019,15 +9966,7 @@
             </a:pPr>
             <a:r>
               <a:rPr lang="de-DE" dirty="0" smtClean="0"/>
-              <a:t>MPI </a:t>
-            </a:r>
-            <a:r>
-              <a:rPr lang="de-DE" dirty="0" smtClean="0"/>
-              <a:t>(MPICH 3.0.4</a:t>
-            </a:r>
-            <a:r>
-              <a:rPr lang="de-DE" dirty="0" smtClean="0"/>
-              <a:t>)</a:t>
+              <a:t>MPI (MPICH 3.0.4)</a:t>
             </a:r>
           </a:p>
           <a:p>
@@ -10037,19 +9976,11 @@
             </a:pPr>
             <a:r>
               <a:rPr lang="de-DE" dirty="0" smtClean="0"/>
-              <a:t>Strommessung</a:t>
-            </a:r>
-            <a:r>
-              <a:rPr lang="de-DE" dirty="0" smtClean="0"/>
-              <a:t>: </a:t>
-            </a:r>
-            <a:r>
-              <a:rPr lang="de-DE" dirty="0" smtClean="0"/>
-              <a:t>Strommessgerät, </a:t>
-            </a:r>
-            <a:r>
-              <a:rPr lang="de-DE" dirty="0" smtClean="0"/>
-              <a:t>virtuelle Windows-Maschine</a:t>
+              <a:t>Strommessgerät</a:t>
+            </a:r>
+            <a:r>
+              <a:rPr lang="de-DE" dirty="0" smtClean="0"/>
+              <a:t>, virtuelle Windows-Maschine</a:t>
             </a:r>
           </a:p>
           <a:p>
@@ -10060,7 +9991,6 @@
               <a:rPr lang="de-DE" b="1" dirty="0" smtClean="0"/>
               <a:t>3.2 Zielsetzung</a:t>
             </a:r>
-            <a:endParaRPr lang="de-DE" b="1" dirty="0" smtClean="0"/>
           </a:p>
           <a:p>
             <a:pPr marL="1085850" lvl="2" indent="-285750">
@@ -10069,8 +9999,21 @@
             </a:pPr>
             <a:r>
               <a:rPr lang="de-DE" dirty="0" smtClean="0"/>
-              <a:t>Parallele Ausführung von HPC-Benchmarks </a:t>
-            </a:r>
+              <a:t>Parallele Ausführung </a:t>
+            </a:r>
+            <a:r>
+              <a:rPr lang="de-DE" dirty="0" smtClean="0"/>
+              <a:t>von </a:t>
+            </a:r>
+            <a:r>
+              <a:rPr lang="de-DE" dirty="0" smtClean="0"/>
+              <a:t>HPC-</a:t>
+            </a:r>
+            <a:r>
+              <a:rPr lang="de-DE" dirty="0" smtClean="0"/>
+              <a:t>Benchmarks</a:t>
+            </a:r>
+            <a:endParaRPr lang="de-DE" dirty="0" smtClean="0"/>
           </a:p>
           <a:p>
             <a:pPr marL="1085850" lvl="2" indent="-285750">
@@ -10079,8 +10022,13 @@
             </a:pPr>
             <a:r>
               <a:rPr lang="de-DE" dirty="0" smtClean="0"/>
-              <a:t>Sinnvolle Umsetzung der Vorgaben</a:t>
-            </a:r>
+              <a:t>Sinnvolle Umsetzung der </a:t>
+            </a:r>
+            <a:r>
+              <a:rPr lang="de-DE" dirty="0" smtClean="0"/>
+              <a:t>Vorgaben, Integration in bestehendes Konzept</a:t>
+            </a:r>
+            <a:endParaRPr lang="de-DE" dirty="0" smtClean="0"/>
           </a:p>
           <a:p>
             <a:pPr marL="1085850" lvl="2" indent="-285750">
@@ -10089,7 +10037,11 @@
             </a:pPr>
             <a:r>
               <a:rPr lang="de-DE" dirty="0" smtClean="0"/>
-              <a:t>Einarbeitung und Fehlerbehebung in </a:t>
+              <a:t>Einarbeitung </a:t>
+            </a:r>
+            <a:r>
+              <a:rPr lang="de-DE" dirty="0" smtClean="0"/>
+              <a:t>in </a:t>
             </a:r>
             <a:r>
               <a:rPr lang="de-DE" dirty="0" err="1" smtClean="0"/>
@@ -10097,8 +10049,13 @@
             </a:r>
             <a:r>
               <a:rPr lang="de-DE" dirty="0" smtClean="0"/>
-              <a:t>-Systemarchitektur</a:t>
-            </a:r>
+              <a:t>-</a:t>
+            </a:r>
+            <a:r>
+              <a:rPr lang="de-DE" dirty="0" smtClean="0"/>
+              <a:t>Systemarchitektur, Fehlerbehebung</a:t>
+            </a:r>
+            <a:endParaRPr lang="de-DE" dirty="0" smtClean="0"/>
           </a:p>
           <a:p>
             <a:pPr marL="1085850" lvl="2" indent="-285750">
@@ -10117,7 +10074,11 @@
             </a:pPr>
             <a:r>
               <a:rPr lang="de-DE" dirty="0" smtClean="0"/>
-              <a:t>Fokus auf Skalierungsverhalten des </a:t>
+              <a:t>Fokus auf </a:t>
+            </a:r>
+            <a:r>
+              <a:rPr lang="de-DE" dirty="0" smtClean="0"/>
+              <a:t>Skalierungsverhalten des </a:t>
             </a:r>
             <a:r>
               <a:rPr lang="de-DE" dirty="0" err="1" smtClean="0"/>
@@ -10131,7 +10092,11 @@
             </a:pPr>
             <a:r>
               <a:rPr lang="de-DE" b="1" dirty="0" smtClean="0"/>
-              <a:t>3.3 Fragestellung</a:t>
+              <a:t>3.3 </a:t>
+            </a:r>
+            <a:r>
+              <a:rPr lang="de-DE" b="1" dirty="0" smtClean="0"/>
+              <a:t>Resultierende Fragestellung</a:t>
             </a:r>
             <a:endParaRPr lang="de-DE" b="1" dirty="0" smtClean="0"/>
           </a:p>
@@ -10251,11 +10216,7 @@
           <a:p>
             <a:r>
               <a:rPr lang="de-DE" sz="1800" dirty="0" smtClean="0"/>
-              <a:t>Versuchsauf</a:t>
-            </a:r>
-            <a:r>
-              <a:rPr lang="de-DE" sz="1800" dirty="0" smtClean="0"/>
-              <a:t>bau und -ablauf</a:t>
+              <a:t>Versuchsaufbau und -ablauf</a:t>
             </a:r>
             <a:endParaRPr lang="de-DE" sz="1800" dirty="0"/>
           </a:p>
@@ -10293,7 +10254,6 @@
               <a:rPr lang="de-DE" b="1" dirty="0" smtClean="0"/>
               <a:t>1.1 Wie wird gemessen?</a:t>
             </a:r>
-            <a:endParaRPr lang="de-DE" b="1" dirty="0" smtClean="0"/>
           </a:p>
           <a:p>
             <a:pPr lvl="2">
@@ -10316,7 +10276,6 @@
               <a:rPr lang="de-DE" dirty="0" smtClean="0"/>
               <a:t>	</a:t>
             </a:r>
-            <a:endParaRPr lang="de-DE" dirty="0" smtClean="0"/>
           </a:p>
           <a:p>
             <a:pPr marL="457200" lvl="1" indent="0">
@@ -10330,7 +10289,6 @@
               <a:rPr lang="de-DE" dirty="0" smtClean="0"/>
               <a:t> </a:t>
             </a:r>
-            <a:endParaRPr lang="de-DE" dirty="0" smtClean="0"/>
           </a:p>
           <a:p>
             <a:pPr lvl="2">
@@ -10347,7 +10305,15 @@
             </a:r>
             <a:r>
               <a:rPr lang="de-DE" i="1" dirty="0" smtClean="0"/>
-              <a:t>Rechenleistung eines Systems an Hand von  Ausführungsrate + Ausführungsdauer</a:t>
+              <a:t>Rechenleistung eines Systems an Hand von </a:t>
+            </a:r>
+            <a:r>
+              <a:rPr lang="de-DE" i="1" dirty="0" smtClean="0"/>
+              <a:t>Ausführungsrate </a:t>
+            </a:r>
+            <a:r>
+              <a:rPr lang="de-DE" i="1" dirty="0" smtClean="0"/>
+              <a:t>+ Ausführungsdauer</a:t>
             </a:r>
             <a:endParaRPr lang="de-DE" b="1" i="1" dirty="0" smtClean="0"/>
           </a:p>
@@ -10375,7 +10341,11 @@
             </a:pPr>
             <a:r>
               <a:rPr lang="de-DE" b="1" dirty="0" smtClean="0"/>
-              <a:t>1.3 Wer misst? </a:t>
+              <a:t>1.3 </a:t>
+            </a:r>
+            <a:r>
+              <a:rPr lang="de-DE" b="1" dirty="0" smtClean="0"/>
+              <a:t>Womit wird gemessen? </a:t>
             </a:r>
             <a:endParaRPr lang="de-DE" b="1" dirty="0" smtClean="0"/>
           </a:p>
@@ -10418,13 +10388,8 @@
             </a:r>
             <a:r>
               <a:rPr lang="de-DE" dirty="0" smtClean="0"/>
-              <a:t> </a:t>
-            </a:r>
-            <a:r>
-              <a:rPr lang="de-DE" dirty="0" smtClean="0"/>
-              <a:t>Strommessgerät</a:t>
-            </a:r>
-            <a:endParaRPr lang="de-DE" dirty="0" smtClean="0"/>
+              <a:t> Strommessgerät</a:t>
+            </a:r>
           </a:p>
           <a:p>
             <a:pPr marL="400050" lvl="1" indent="0">

</xml_diff>

<commit_message>
Update ppt presentation (version for test presentation)
</commit_message>
<xml_diff>
--- a/Disputation/grei14.pptx
+++ b/Disputation/grei14.pptx
@@ -324,7 +324,7 @@
           <a:p>
             <a:fld id="{4C476B9A-09E8-F547-B409-8F77FB8D3140}" type="datetime1">
               <a:rPr lang="de-DE" smtClean="0"/>
-              <a:t>24.06.14</a:t>
+              <a:t>25.06.14</a:t>
             </a:fld>
             <a:endParaRPr lang="de-DE"/>
           </a:p>
@@ -4451,31 +4451,7 @@
             </a:pPr>
             <a:r>
               <a:rPr lang="de-DE" dirty="0" smtClean="0"/>
-              <a:t>Anpassung </a:t>
-            </a:r>
-            <a:r>
-              <a:rPr lang="de-DE" dirty="0" smtClean="0"/>
-              <a:t>der Eingabeparameter an Testsystem </a:t>
-            </a:r>
-            <a:r>
-              <a:rPr lang="de-DE" dirty="0" smtClean="0"/>
-              <a:t>erforderlich </a:t>
-            </a:r>
-            <a:r>
-              <a:rPr lang="de-DE" dirty="0" smtClean="0"/>
-              <a:t>(u.a. Problemgröße</a:t>
-            </a:r>
-            <a:r>
-              <a:rPr lang="de-DE" dirty="0" smtClean="0"/>
-              <a:t>, Blockgröße, Prozessnetz, Panel- und </a:t>
-            </a:r>
-            <a:r>
-              <a:rPr lang="de-DE" dirty="0" smtClean="0"/>
-              <a:t>Teilpanel</a:t>
-            </a:r>
-            <a:r>
-              <a:rPr lang="de-DE" dirty="0" smtClean="0"/>
-              <a:t>-</a:t>
+              <a:t>Anpassung der Eingabeparameter an Testsystem erforderlich (u.a. Problemgröße, Blockgröße, Prozessnetz, Panel- und Teilpanel-</a:t>
             </a:r>
             <a:r>
               <a:rPr lang="de-DE" dirty="0" err="1" smtClean="0"/>
@@ -4841,35 +4817,7 @@
             </a:r>
             <a:r>
               <a:rPr lang="de-DE" dirty="0" smtClean="0"/>
-              <a:t> – 4 Rechenknoten </a:t>
-            </a:r>
-            <a:r>
-              <a:rPr lang="de-DE" dirty="0" smtClean="0"/>
-              <a:t>(max</a:t>
-            </a:r>
-            <a:r>
-              <a:rPr lang="de-DE" dirty="0" smtClean="0"/>
-              <a:t>. 19 Rechenknoten, da: </a:t>
-            </a:r>
-            <a:r>
-              <a:rPr lang="de-DE" dirty="0" smtClean="0"/>
-              <a:t>pi03 </a:t>
-            </a:r>
-            <a:r>
-              <a:rPr lang="de-DE" dirty="0" smtClean="0"/>
-              <a:t>ist Berechnungsknoten</a:t>
-            </a:r>
-            <a:r>
-              <a:rPr lang="de-DE" dirty="0" smtClean="0"/>
-              <a:t>/mind. 4 </a:t>
-            </a:r>
-            <a:r>
-              <a:rPr lang="de-DE" dirty="0" smtClean="0"/>
-              <a:t>Rechenknoten, da: Minimum für HPL</a:t>
-            </a:r>
-            <a:r>
-              <a:rPr lang="de-DE" dirty="0" smtClean="0"/>
-              <a:t>)</a:t>
+              <a:t> – 4 Rechenknoten (max. 19 Rechenknoten, da: pi03 ist Berechnungsknoten/mind. 4 Rechenknoten, da: Minimum für HPL)</a:t>
             </a:r>
             <a:endParaRPr lang="de-DE" b="1" dirty="0" smtClean="0"/>
           </a:p>
@@ -4880,11 +4828,7 @@
             </a:pPr>
             <a:r>
               <a:rPr lang="de-DE" b="1" dirty="0" smtClean="0"/>
-              <a:t>Zwei Messreihen pro </a:t>
-            </a:r>
-            <a:r>
-              <a:rPr lang="de-DE" b="1" dirty="0" smtClean="0"/>
-              <a:t>Benchmark</a:t>
+              <a:t>Zwei Messreihen pro Benchmark</a:t>
             </a:r>
             <a:r>
               <a:rPr lang="de-DE" dirty="0" smtClean="0"/>
@@ -4896,27 +4840,7 @@
             </a:r>
             <a:r>
               <a:rPr lang="de-DE" dirty="0" smtClean="0"/>
-              <a:t> </a:t>
-            </a:r>
-            <a:r>
-              <a:rPr lang="de-DE" dirty="0" smtClean="0"/>
-              <a:t>Pis </a:t>
-            </a:r>
-            <a:r>
-              <a:rPr lang="de-DE" dirty="0" smtClean="0"/>
-              <a:t>angeschaltet/</a:t>
-            </a:r>
-            <a:r>
-              <a:rPr lang="de-DE" dirty="0" smtClean="0"/>
-              <a:t>Messreihe </a:t>
-            </a:r>
-            <a:r>
-              <a:rPr lang="de-DE" dirty="0" smtClean="0"/>
-              <a:t>2: nicht </a:t>
-            </a:r>
-            <a:r>
-              <a:rPr lang="de-DE" dirty="0" smtClean="0"/>
-              <a:t>aktive </a:t>
+              <a:t> Pis angeschaltet/Messreihe 2: nicht aktive </a:t>
             </a:r>
             <a:r>
               <a:rPr lang="de-DE" dirty="0" err="1" smtClean="0"/>
@@ -4938,13 +4862,8 @@
             </a:pPr>
             <a:r>
               <a:rPr lang="de-DE" b="1" dirty="0" smtClean="0"/>
-              <a:t>Auswertung </a:t>
-            </a:r>
-            <a:r>
-              <a:rPr lang="de-DE" b="1" dirty="0" smtClean="0"/>
-              <a:t>Strommessgerät</a:t>
-            </a:r>
-            <a:endParaRPr lang="de-DE" b="1" dirty="0" smtClean="0"/>
+              <a:t>Auswertung Strommessgerät</a:t>
+            </a:r>
           </a:p>
           <a:p>
             <a:pPr lvl="2" indent="-342900">
@@ -4953,13 +4872,8 @@
             </a:pPr>
             <a:r>
               <a:rPr lang="de-DE" b="1" dirty="0" smtClean="0"/>
-              <a:t>Automatisierte </a:t>
-            </a:r>
-            <a:r>
-              <a:rPr lang="de-DE" b="1" dirty="0" smtClean="0"/>
-              <a:t>Durchführung der Messungen</a:t>
-            </a:r>
-            <a:endParaRPr lang="de-DE" b="1" dirty="0" smtClean="0"/>
+              <a:t>Automatisierte Durchführung der Messungen</a:t>
+            </a:r>
           </a:p>
           <a:p>
             <a:pPr lvl="2" indent="-342900">
@@ -4968,13 +4882,8 @@
             </a:pPr>
             <a:r>
               <a:rPr lang="de-DE" b="1" dirty="0" smtClean="0"/>
-              <a:t>Protokollierung und grafische </a:t>
-            </a:r>
-            <a:r>
-              <a:rPr lang="de-DE" b="1" dirty="0" smtClean="0"/>
-              <a:t>Aufbereitung der Messergebnisse</a:t>
-            </a:r>
-            <a:endParaRPr lang="de-DE" b="1" dirty="0" smtClean="0"/>
+              <a:t>Protokollierung und grafische Aufbereitung der Messergebnisse</a:t>
+            </a:r>
           </a:p>
         </p:txBody>
       </p:sp>
@@ -5532,15 +5441,7 @@
           <a:p>
             <a:r>
               <a:rPr lang="de-DE" dirty="0" smtClean="0"/>
-              <a:t>Aktivitätsdiagramm einer </a:t>
-            </a:r>
-            <a:r>
-              <a:rPr lang="de-DE" dirty="0" smtClean="0"/>
-              <a:t>Versuchsdurchführung mit </a:t>
-            </a:r>
-            <a:r>
-              <a:rPr lang="de-DE" dirty="0" smtClean="0"/>
-              <a:t>2 Messreihen</a:t>
+              <a:t>Aktivitätsdiagramm einer Versuchsdurchführung mit 2 Messreihen</a:t>
             </a:r>
             <a:endParaRPr lang="de-DE" dirty="0"/>
           </a:p>
@@ -5618,7 +5519,6 @@
               </a:ext>
             </a:extLst>
           </a:blip>
-          <a:srcRect/>
           <a:stretch>
             <a:fillRect/>
           </a:stretch>
@@ -5805,21 +5705,46 @@
               <a:rPr lang="de-DE" b="1" dirty="0" smtClean="0"/>
               <a:t>1.1 Erwartete Ergebnisse </a:t>
             </a:r>
+            <a:endParaRPr lang="de-DE" b="1" dirty="0" smtClean="0"/>
           </a:p>
           <a:p>
             <a:pPr marL="685800" lvl="1"/>
             <a:r>
               <a:rPr lang="de-DE" dirty="0" smtClean="0"/>
-              <a:t>Gleichbleibender Stromverbrauch in Messreihe 1 (alle Rechenknoten angeschaltet)</a:t>
+              <a:t>Deutlich </a:t>
+            </a:r>
+            <a:r>
+              <a:rPr lang="de-DE" dirty="0" smtClean="0"/>
+              <a:t>niedrigerer Stromverbrauch in </a:t>
+            </a:r>
+            <a:r>
+              <a:rPr lang="de-DE" dirty="0" smtClean="0"/>
+              <a:t>Messreihe </a:t>
+            </a:r>
+            <a:r>
+              <a:rPr lang="de-DE" dirty="0" smtClean="0"/>
+              <a:t>2 </a:t>
+            </a:r>
+            <a:r>
+              <a:rPr lang="de-DE" dirty="0" smtClean="0"/>
+              <a:t>als in Messreihe 1 (</a:t>
+            </a:r>
+            <a:r>
+              <a:rPr lang="de-DE" dirty="0" smtClean="0"/>
+              <a:t>nicht aktive Rechenknoten werden heruntergefahren und von Stromversorgung getrennt</a:t>
+            </a:r>
+            <a:r>
+              <a:rPr lang="de-DE" dirty="0" smtClean="0"/>
+              <a:t>)</a:t>
             </a:r>
           </a:p>
           <a:p>
             <a:pPr marL="685800" lvl="1"/>
             <a:r>
               <a:rPr lang="de-DE" dirty="0" smtClean="0"/>
-              <a:t>Linear abnehmender Stromverbrauch in Messreihe 2 (nicht aktive Rechenknoten werden heruntergefahren und von Stromversorgung getrennt)</a:t>
-            </a:r>
-            <a:endParaRPr lang="de-DE" b="1" dirty="0" smtClean="0"/>
+              <a:t>Abnahme des Stromverbrauchs in Messreihe 2 um einen festen Wert pro abgeschaltetem Rechenknoten</a:t>
+            </a:r>
+            <a:endParaRPr lang="de-DE" dirty="0" smtClean="0"/>
           </a:p>
           <a:p>
             <a:pPr marL="400050" lvl="1" indent="0">
@@ -5835,16 +5760,28 @@
             <a:pPr marL="685800" lvl="1"/>
             <a:r>
               <a:rPr lang="de-DE" dirty="0" smtClean="0"/>
-              <a:t>Erwartungsgemäßes Skalierungsverhalten des </a:t>
-            </a:r>
-            <a:r>
-              <a:rPr lang="de-DE" dirty="0" err="1" smtClean="0"/>
-              <a:t>Bramble</a:t>
-            </a:r>
-            <a:r>
-              <a:rPr lang="de-DE" dirty="0" smtClean="0"/>
-              <a:t> bzgl. Stromverbrauchs bei paralleler Ausführung von HPL und STREAM</a:t>
-            </a:r>
+              <a:t>Abnahme des Stromverbrauchs in Messreihe um 23 W (HPL) bzw. 17 W (STREAM) </a:t>
+            </a:r>
+            <a:endParaRPr lang="de-DE" dirty="0" smtClean="0"/>
+          </a:p>
+          <a:p>
+            <a:pPr marL="685800" lvl="1"/>
+            <a:r>
+              <a:rPr lang="de-DE" dirty="0" smtClean="0"/>
+              <a:t>Abnahme des Stromverbrauchs in Messreihe 2 um 8 W (HPL) bzw. 2 W (STREAM) pro abgeschaltetem Rechenknoten</a:t>
+            </a:r>
+          </a:p>
+          <a:p>
+            <a:pPr marL="685800" lvl="1"/>
+            <a:r>
+              <a:rPr lang="de-DE" b="1" dirty="0" smtClean="0"/>
+              <a:t>Fazit: </a:t>
+            </a:r>
+            <a:r>
+              <a:rPr lang="de-DE" dirty="0" smtClean="0"/>
+              <a:t>Erwartungsgemäßes Skalierungsverhalten</a:t>
+            </a:r>
+            <a:endParaRPr lang="de-DE" dirty="0" smtClean="0"/>
           </a:p>
         </p:txBody>
       </p:sp>
@@ -6352,8 +6289,24 @@
             <a:pPr marL="685800" lvl="1"/>
             <a:r>
               <a:rPr lang="de-DE" dirty="0" smtClean="0"/>
-              <a:t>Gleichartiges Skalierungsverhalten in Messreihe 1 und Messreihe 2 bzgl. CPU-Performance</a:t>
-            </a:r>
+              <a:t>Gleichartiges Skalierungsverhalten in Messreihe 1 und Messreihe 2 bzgl. CPU-</a:t>
+            </a:r>
+            <a:r>
+              <a:rPr lang="de-DE" dirty="0" smtClean="0"/>
+              <a:t>Performance</a:t>
+            </a:r>
+          </a:p>
+          <a:p>
+            <a:pPr marL="685800" lvl="1"/>
+            <a:r>
+              <a:rPr lang="de-DE" b="1" dirty="0" smtClean="0"/>
+              <a:t>Fazit:</a:t>
+            </a:r>
+            <a:r>
+              <a:rPr lang="de-DE" dirty="0" smtClean="0"/>
+              <a:t> Erwartungsgemäßes Skalierungsverhalten</a:t>
+            </a:r>
+            <a:endParaRPr lang="de-DE" dirty="0" smtClean="0"/>
           </a:p>
         </p:txBody>
       </p:sp>
@@ -7136,7 +7089,15 @@
             </a:r>
             <a:r>
               <a:rPr lang="de-DE" dirty="0" smtClean="0"/>
-              <a:t> bzgl. Hauptspeicherzugriffe bei paralleler Ausführung von STREAM (Ausführungsrate + Ausführungsdauer) für </a:t>
+              <a:t> bzgl. </a:t>
+            </a:r>
+            <a:r>
+              <a:rPr lang="de-DE" dirty="0" smtClean="0"/>
+              <a:t>Durchsatz Hauptspeicherzugriffe </a:t>
+            </a:r>
+            <a:r>
+              <a:rPr lang="de-DE" dirty="0" smtClean="0"/>
+              <a:t>bei paralleler Ausführung von STREAM (Ausführungsrate + Ausführungsdauer) für </a:t>
             </a:r>
             <a:r>
               <a:rPr lang="de-DE" dirty="0" err="1" smtClean="0"/>
@@ -7144,15 +7105,63 @@
             </a:r>
             <a:r>
               <a:rPr lang="de-DE" dirty="0" smtClean="0"/>
-              <a:t> ≤ 18 Rechenknoten </a:t>
+              <a:t> </a:t>
+            </a:r>
+            <a:r>
+              <a:rPr lang="de-DE" dirty="0" smtClean="0"/>
+              <a:t>≤ 17 </a:t>
+            </a:r>
+            <a:r>
+              <a:rPr lang="de-DE" dirty="0" smtClean="0"/>
+              <a:t>Rechenknoten </a:t>
             </a:r>
           </a:p>
           <a:p>
             <a:pPr marL="685800" lvl="1"/>
             <a:r>
               <a:rPr lang="de-DE" dirty="0" smtClean="0"/>
-              <a:t>Gleichartiges Skalierungsverhalten in Messreihe 1 und Messreihe 2 bzgl. Durchsatz Hauptspeicher-Zugriffe</a:t>
-            </a:r>
+              <a:t>Gleichartiges Skalierungsverhalten in Messreihe 1 und Messreihe 2 bzgl. Durchsatz </a:t>
+            </a:r>
+            <a:r>
+              <a:rPr lang="de-DE" dirty="0" smtClean="0"/>
+              <a:t>Hauptspeicher</a:t>
+            </a:r>
+            <a:r>
+              <a:rPr lang="de-DE" dirty="0" smtClean="0"/>
+              <a:t>z</a:t>
+            </a:r>
+            <a:r>
+              <a:rPr lang="de-DE" dirty="0" smtClean="0"/>
+              <a:t>ugriffe </a:t>
+            </a:r>
+          </a:p>
+          <a:p>
+            <a:pPr marL="685800" lvl="1"/>
+            <a:r>
+              <a:rPr lang="de-DE" b="1" dirty="0" smtClean="0"/>
+              <a:t>Fazit:</a:t>
+            </a:r>
+            <a:r>
+              <a:rPr lang="de-DE" dirty="0" smtClean="0"/>
+              <a:t> Erwartungsgemäßes Skalierungsverhalten für </a:t>
+            </a:r>
+            <a:r>
+              <a:rPr lang="de-DE" dirty="0" err="1" smtClean="0"/>
+              <a:t>n</a:t>
+            </a:r>
+            <a:r>
+              <a:rPr lang="de-DE" dirty="0" smtClean="0"/>
+              <a:t> </a:t>
+            </a:r>
+            <a:r>
+              <a:rPr lang="de-DE" dirty="0"/>
+              <a:t>≤</a:t>
+            </a:r>
+            <a:r>
+              <a:rPr lang="de-DE" dirty="0" smtClean="0"/>
+              <a:t> 17 Rechenknoten</a:t>
+            </a:r>
+            <a:endParaRPr lang="de-DE" dirty="0" smtClean="0"/>
           </a:p>
         </p:txBody>
       </p:sp>
@@ -7578,7 +7587,19 @@
             </a:pPr>
             <a:r>
               <a:rPr lang="de-DE" dirty="0" smtClean="0"/>
-              <a:t>Warum treten für </a:t>
+              <a:t>Warum </a:t>
+            </a:r>
+            <a:r>
+              <a:rPr lang="de-DE" dirty="0"/>
+              <a:t>deutlich schlechtere </a:t>
+            </a:r>
+            <a:r>
+              <a:rPr lang="de-DE" dirty="0" smtClean="0"/>
+              <a:t>Performance </a:t>
+            </a:r>
+            <a:r>
+              <a:rPr lang="de-DE" dirty="0" smtClean="0"/>
+              <a:t>für </a:t>
             </a:r>
             <a:r>
               <a:rPr lang="de-DE" dirty="0" err="1"/>
@@ -7589,24 +7610,8 @@
               <a:t> &gt; 17 </a:t>
             </a:r>
             <a:r>
-              <a:rPr lang="de-DE" dirty="0" err="1"/>
-              <a:t>RPi</a:t>
-            </a:r>
-            <a:r>
-              <a:rPr lang="de-DE" dirty="0"/>
-              <a:t>-Knoten </a:t>
-            </a:r>
-            <a:r>
-              <a:rPr lang="de-DE" dirty="0" smtClean="0"/>
-              <a:t>deutlich </a:t>
-            </a:r>
-            <a:r>
-              <a:rPr lang="de-DE" dirty="0"/>
-              <a:t>schlechtere Performance </a:t>
-            </a:r>
-            <a:r>
-              <a:rPr lang="de-DE" dirty="0" smtClean="0"/>
-              <a:t>und verlängerte Ausführungsdauer auf? </a:t>
+              <a:rPr lang="de-DE" dirty="0" smtClean="0"/>
+              <a:t>Rechenknoten? </a:t>
             </a:r>
             <a:endParaRPr lang="de-DE" b="1" dirty="0" smtClean="0"/>
           </a:p>
@@ -7709,7 +7714,23 @@
             </a:pPr>
             <a:r>
               <a:rPr lang="de-DE" dirty="0" smtClean="0"/>
-              <a:t>Manipulation des Benchmark-Quellcodes für längere Ausführungsdauer, um Verwaltungs-Overhead zu reduzieren liefert keine verbesserten Ergebnisse</a:t>
+              <a:t>Manipulation des Benchmark-Quellcodes </a:t>
+            </a:r>
+            <a:r>
+              <a:rPr lang="de-DE" dirty="0" smtClean="0"/>
+              <a:t>zur Reduzierung des Verwaltungs</a:t>
+            </a:r>
+            <a:r>
+              <a:rPr lang="de-DE" dirty="0" smtClean="0"/>
+              <a:t>-Overhead </a:t>
+            </a:r>
+            <a:r>
+              <a:rPr lang="de-DE" dirty="0" smtClean="0"/>
+              <a:t>liefert </a:t>
+            </a:r>
+            <a:r>
+              <a:rPr lang="de-DE" dirty="0" smtClean="0"/>
+              <a:t>keine verbesserten Ergebnisse</a:t>
             </a:r>
             <a:endParaRPr lang="de-DE" dirty="0"/>
           </a:p>
@@ -7724,7 +7745,15 @@
             </a:r>
             <a:r>
               <a:rPr lang="de-DE" dirty="0" smtClean="0"/>
-              <a:t>Lineares Wachstum der Bandbreiten der HS-Zugriffe (erwartungsgemäß), Ausführungsdauer steigt jedoch deutlich an; nicht abschließend zu klären!</a:t>
+              <a:t>Lineares Wachstum der Bandbreiten der </a:t>
+            </a:r>
+            <a:r>
+              <a:rPr lang="de-DE" dirty="0" smtClean="0"/>
+              <a:t>Hauptspeicherzugriffe (</a:t>
+            </a:r>
+            <a:r>
+              <a:rPr lang="de-DE" dirty="0" smtClean="0"/>
+              <a:t>erwartungsgemäß), Ausführungsdauer steigt jedoch deutlich an; nicht abschließend zu klären!</a:t>
             </a:r>
             <a:endParaRPr lang="de-DE" dirty="0"/>
           </a:p>
@@ -7901,7 +7930,19 @@
             </a:r>
             <a:r>
               <a:rPr lang="de-DE" dirty="0" smtClean="0"/>
-              <a:t>Skalierungsverhalten eines </a:t>
+              <a:t>Untersuchung des</a:t>
+            </a:r>
+            <a:r>
+              <a:rPr lang="de-DE" b="1" dirty="0" smtClean="0"/>
+              <a:t> </a:t>
+            </a:r>
+            <a:r>
+              <a:rPr lang="de-DE" dirty="0" smtClean="0"/>
+              <a:t>Skalierungsverhaltens </a:t>
+            </a:r>
+            <a:r>
+              <a:rPr lang="de-DE" dirty="0" smtClean="0"/>
+              <a:t>eines </a:t>
             </a:r>
             <a:r>
               <a:rPr lang="de-DE" dirty="0" err="1" smtClean="0"/>
@@ -7930,7 +7971,11 @@
             </a:r>
             <a:r>
               <a:rPr lang="de-DE" dirty="0" smtClean="0"/>
-              <a:t> Lineares Skalierungsverhalten </a:t>
+              <a:t> Lineares </a:t>
+            </a:r>
+            <a:r>
+              <a:rPr lang="de-DE" dirty="0" smtClean="0"/>
+              <a:t>Skalierungsverhalten </a:t>
             </a:r>
             <a:r>
               <a:rPr lang="de-DE" dirty="0" smtClean="0">
@@ -8294,13 +8339,24 @@
             </a:r>
             <a:r>
               <a:rPr lang="de-DE" dirty="0"/>
-              <a:t>: Anschlüsse, Stromversorgung, </a:t>
+              <a:t>: </a:t>
+            </a:r>
+            <a:r>
+              <a:rPr lang="de-DE" dirty="0" smtClean="0"/>
+              <a:t>Zugang zu benötigten Schnittstellen, </a:t>
+            </a:r>
+            <a:r>
+              <a:rPr lang="de-DE" dirty="0" smtClean="0"/>
+              <a:t>Stromversorgung</a:t>
+            </a:r>
+            <a:r>
+              <a:rPr lang="de-DE" dirty="0" smtClean="0"/>
+              <a:t>, </a:t>
             </a:r>
             <a:r>
               <a:rPr lang="de-DE" dirty="0" smtClean="0"/>
               <a:t>beengter Aufbau </a:t>
             </a:r>
-            <a:endParaRPr lang="de-DE" dirty="0" smtClean="0"/>
           </a:p>
           <a:p>
             <a:pPr marL="514350" lvl="1" indent="0">
@@ -8308,7 +8364,11 @@
             </a:pPr>
             <a:r>
               <a:rPr lang="de-DE" b="1" dirty="0" smtClean="0"/>
-              <a:t>2.2 Zukünftige Versuche</a:t>
+              <a:t>2.2 </a:t>
+            </a:r>
+            <a:r>
+              <a:rPr lang="de-DE" b="1" dirty="0" smtClean="0"/>
+              <a:t>Erweiterungen des Versuchsaufbaus </a:t>
             </a:r>
             <a:endParaRPr lang="de-DE" dirty="0" smtClean="0"/>
           </a:p>
@@ -8351,19 +8411,7 @@
             </a:pPr>
             <a:r>
               <a:rPr lang="de-DE" dirty="0" smtClean="0"/>
-              <a:t>Weitere, n</a:t>
-            </a:r>
-            <a:r>
-              <a:rPr lang="de-DE" dirty="0" smtClean="0"/>
-              <a:t>och nicht behandelte</a:t>
-            </a:r>
-            <a:r>
-              <a:rPr lang="de-DE" dirty="0" smtClean="0"/>
-              <a:t> </a:t>
-            </a:r>
-            <a:r>
-              <a:rPr lang="de-DE" dirty="0" smtClean="0"/>
-              <a:t>HPC-Benchmarks </a:t>
+              <a:t>Weitere, noch nicht behandelte HPC-Benchmarks </a:t>
             </a:r>
           </a:p>
           <a:p>
@@ -8375,7 +8423,6 @@
               <a:rPr lang="de-DE" dirty="0" smtClean="0"/>
               <a:t>Unter-/Übertakten der CPUs</a:t>
             </a:r>
-            <a:endParaRPr lang="de-DE" dirty="0" smtClean="0"/>
           </a:p>
           <a:p>
             <a:pPr lvl="2">
@@ -8388,15 +8435,7 @@
             </a:r>
             <a:r>
               <a:rPr lang="de-DE" dirty="0" smtClean="0"/>
-              <a:t> der GPU (Spezifikation vor Kurzem veröffentlicht, </a:t>
-            </a:r>
-            <a:r>
-              <a:rPr lang="de-DE" dirty="0" smtClean="0"/>
-              <a:t>Wettbewerb </a:t>
-            </a:r>
-            <a:r>
-              <a:rPr lang="de-DE" dirty="0" smtClean="0"/>
-              <a:t>der </a:t>
+              <a:t> der GPU (Spezifikation vor Kurzem veröffentlicht, Wettbewerb der </a:t>
             </a:r>
             <a:r>
               <a:rPr lang="de-DE" dirty="0" err="1" smtClean="0"/>
@@ -8417,9 +8456,8 @@
             <a:endParaRPr lang="de-DE" dirty="0"/>
           </a:p>
           <a:p>
-            <a:pPr marL="800100" lvl="1" indent="-342900">
-              <a:buFont typeface="+mj-lt"/>
-              <a:buAutoNum type="arabicPeriod"/>
+            <a:pPr marL="457200" lvl="1" indent="0">
+              <a:buNone/>
             </a:pPr>
             <a:endParaRPr lang="de-DE" dirty="0" smtClean="0"/>
           </a:p>
@@ -8653,15 +8691,7 @@
             </a:pPr>
             <a:r>
               <a:rPr lang="de-DE" dirty="0" smtClean="0"/>
-              <a:t>Kosten </a:t>
-            </a:r>
-            <a:r>
-              <a:rPr lang="de-DE" dirty="0" smtClean="0"/>
-              <a:t>inklusive Zubehör: </a:t>
-            </a:r>
-            <a:r>
-              <a:rPr lang="de-DE" dirty="0" smtClean="0"/>
-              <a:t>ca. 50 Euro </a:t>
+              <a:t>Kosten inklusive Zubehör: ca. 50 Euro </a:t>
             </a:r>
             <a:endParaRPr lang="de-DE" dirty="0"/>
           </a:p>
@@ -9323,27 +9353,7 @@
             </a:pPr>
             <a:r>
               <a:rPr lang="de-DE" dirty="0" smtClean="0"/>
-              <a:t>Server: Mini</a:t>
-            </a:r>
-            <a:r>
-              <a:rPr lang="de-DE" dirty="0" smtClean="0"/>
-              <a:t>-ITX-Mainboard </a:t>
-            </a:r>
-            <a:r>
-              <a:rPr lang="de-DE" dirty="0" smtClean="0"/>
-              <a:t>mit x86-Prozessor (</a:t>
-            </a:r>
-            <a:r>
-              <a:rPr lang="de-DE" dirty="0" smtClean="0"/>
-              <a:t>4), </a:t>
-            </a:r>
-            <a:r>
-              <a:rPr lang="de-DE" dirty="0" smtClean="0"/>
-              <a:t>4 Festplatten </a:t>
-            </a:r>
-            <a:r>
-              <a:rPr lang="de-DE" dirty="0" smtClean="0"/>
-              <a:t>(5)</a:t>
+              <a:t>Server: Mini-ITX-Mainboard mit x86-Prozessor (4), 4 Festplatten (5)</a:t>
             </a:r>
           </a:p>
           <a:p>
@@ -9371,15 +9381,7 @@
             </a:pPr>
             <a:r>
               <a:rPr lang="de-DE" dirty="0" smtClean="0"/>
-              <a:t>Kühlung: </a:t>
-            </a:r>
-            <a:r>
-              <a:rPr lang="de-DE" dirty="0" smtClean="0"/>
-              <a:t>4 Kühlgebläse </a:t>
-            </a:r>
-            <a:r>
-              <a:rPr lang="de-DE" dirty="0" smtClean="0"/>
-              <a:t>(9)</a:t>
+              <a:t>Kühlung: 4 Kühlgebläse (9)</a:t>
             </a:r>
           </a:p>
           <a:p>
@@ -9976,11 +9978,7 @@
             </a:pPr>
             <a:r>
               <a:rPr lang="de-DE" dirty="0" smtClean="0"/>
-              <a:t>Strommessgerät</a:t>
-            </a:r>
-            <a:r>
-              <a:rPr lang="de-DE" dirty="0" smtClean="0"/>
-              <a:t>, virtuelle Windows-Maschine</a:t>
+              <a:t>Strommessgerät, virtuelle Windows-Maschine</a:t>
             </a:r>
           </a:p>
           <a:p>
@@ -9999,21 +9997,8 @@
             </a:pPr>
             <a:r>
               <a:rPr lang="de-DE" dirty="0" smtClean="0"/>
-              <a:t>Parallele Ausführung </a:t>
-            </a:r>
-            <a:r>
-              <a:rPr lang="de-DE" dirty="0" smtClean="0"/>
-              <a:t>von </a:t>
-            </a:r>
-            <a:r>
-              <a:rPr lang="de-DE" dirty="0" smtClean="0"/>
-              <a:t>HPC-</a:t>
-            </a:r>
-            <a:r>
-              <a:rPr lang="de-DE" dirty="0" smtClean="0"/>
-              <a:t>Benchmarks</a:t>
-            </a:r>
-            <a:endParaRPr lang="de-DE" dirty="0" smtClean="0"/>
+              <a:t>Parallele Ausführung von HPC-Benchmarks</a:t>
+            </a:r>
           </a:p>
           <a:p>
             <a:pPr marL="1085850" lvl="2" indent="-285750">
@@ -10022,13 +10007,8 @@
             </a:pPr>
             <a:r>
               <a:rPr lang="de-DE" dirty="0" smtClean="0"/>
-              <a:t>Sinnvolle Umsetzung der </a:t>
-            </a:r>
-            <a:r>
-              <a:rPr lang="de-DE" dirty="0" smtClean="0"/>
-              <a:t>Vorgaben, Integration in bestehendes Konzept</a:t>
-            </a:r>
-            <a:endParaRPr lang="de-DE" dirty="0" smtClean="0"/>
+              <a:t>Sinnvolle Umsetzung der Vorgaben, Integration in bestehendes Konzept</a:t>
+            </a:r>
           </a:p>
           <a:p>
             <a:pPr marL="1085850" lvl="2" indent="-285750">
@@ -10037,11 +10017,7 @@
             </a:pPr>
             <a:r>
               <a:rPr lang="de-DE" dirty="0" smtClean="0"/>
-              <a:t>Einarbeitung </a:t>
-            </a:r>
-            <a:r>
-              <a:rPr lang="de-DE" dirty="0" smtClean="0"/>
-              <a:t>in </a:t>
+              <a:t>Einarbeitung in </a:t>
             </a:r>
             <a:r>
               <a:rPr lang="de-DE" dirty="0" err="1" smtClean="0"/>
@@ -10049,13 +10025,8 @@
             </a:r>
             <a:r>
               <a:rPr lang="de-DE" dirty="0" smtClean="0"/>
-              <a:t>-</a:t>
-            </a:r>
-            <a:r>
-              <a:rPr lang="de-DE" dirty="0" smtClean="0"/>
-              <a:t>Systemarchitektur, Fehlerbehebung</a:t>
-            </a:r>
-            <a:endParaRPr lang="de-DE" dirty="0" smtClean="0"/>
+              <a:t>-Systemarchitektur, Fehlerbehebung</a:t>
+            </a:r>
           </a:p>
           <a:p>
             <a:pPr marL="1085850" lvl="2" indent="-285750">
@@ -10074,11 +10045,7 @@
             </a:pPr>
             <a:r>
               <a:rPr lang="de-DE" dirty="0" smtClean="0"/>
-              <a:t>Fokus auf </a:t>
-            </a:r>
-            <a:r>
-              <a:rPr lang="de-DE" dirty="0" smtClean="0"/>
-              <a:t>Skalierungsverhalten des </a:t>
+              <a:t>Fokus auf Skalierungsverhalten des </a:t>
             </a:r>
             <a:r>
               <a:rPr lang="de-DE" dirty="0" err="1" smtClean="0"/>
@@ -10092,13 +10059,8 @@
             </a:pPr>
             <a:r>
               <a:rPr lang="de-DE" b="1" dirty="0" smtClean="0"/>
-              <a:t>3.3 </a:t>
-            </a:r>
-            <a:r>
-              <a:rPr lang="de-DE" b="1" dirty="0" smtClean="0"/>
-              <a:t>Resultierende Fragestellung</a:t>
-            </a:r>
-            <a:endParaRPr lang="de-DE" b="1" dirty="0" smtClean="0"/>
+              <a:t>3.3 Resultierende Fragestellung</a:t>
+            </a:r>
           </a:p>
           <a:p>
             <a:pPr marL="400050" lvl="1" indent="0">
@@ -10305,15 +10267,7 @@
             </a:r>
             <a:r>
               <a:rPr lang="de-DE" i="1" dirty="0" smtClean="0"/>
-              <a:t>Rechenleistung eines Systems an Hand von </a:t>
-            </a:r>
-            <a:r>
-              <a:rPr lang="de-DE" i="1" dirty="0" smtClean="0"/>
-              <a:t>Ausführungsrate </a:t>
-            </a:r>
-            <a:r>
-              <a:rPr lang="de-DE" i="1" dirty="0" smtClean="0"/>
-              <a:t>+ Ausführungsdauer</a:t>
+              <a:t>Rechenleistung eines Systems an Hand von Ausführungsrate + Ausführungsdauer</a:t>
             </a:r>
             <a:endParaRPr lang="de-DE" b="1" i="1" dirty="0" smtClean="0"/>
           </a:p>
@@ -10341,13 +10295,8 @@
             </a:pPr>
             <a:r>
               <a:rPr lang="de-DE" b="1" dirty="0" smtClean="0"/>
-              <a:t>1.3 </a:t>
-            </a:r>
-            <a:r>
-              <a:rPr lang="de-DE" b="1" dirty="0" smtClean="0"/>
-              <a:t>Womit wird gemessen? </a:t>
-            </a:r>
-            <a:endParaRPr lang="de-DE" b="1" dirty="0" smtClean="0"/>
+              <a:t>1.3 Womit wird gemessen? </a:t>
+            </a:r>
           </a:p>
           <a:p>
             <a:pPr lvl="2">

</xml_diff>

<commit_message>
Update ppt presentation (comments Hannah)
</commit_message>
<xml_diff>
--- a/Disputation/grei14.pptx
+++ b/Disputation/grei14.pptx
@@ -22,18 +22,18 @@
     <p:sldId id="844" r:id="rId10"/>
     <p:sldId id="846" r:id="rId11"/>
     <p:sldId id="845" r:id="rId12"/>
-    <p:sldId id="850" r:id="rId13"/>
-    <p:sldId id="848" r:id="rId14"/>
+    <p:sldId id="848" r:id="rId13"/>
+    <p:sldId id="850" r:id="rId14"/>
     <p:sldId id="849" r:id="rId15"/>
-    <p:sldId id="851" r:id="rId16"/>
-    <p:sldId id="853" r:id="rId17"/>
-    <p:sldId id="854" r:id="rId18"/>
-    <p:sldId id="852" r:id="rId19"/>
-    <p:sldId id="855" r:id="rId20"/>
-    <p:sldId id="856" r:id="rId21"/>
-    <p:sldId id="860" r:id="rId22"/>
-    <p:sldId id="857" r:id="rId23"/>
-    <p:sldId id="858" r:id="rId24"/>
+    <p:sldId id="853" r:id="rId16"/>
+    <p:sldId id="854" r:id="rId17"/>
+    <p:sldId id="851" r:id="rId18"/>
+    <p:sldId id="855" r:id="rId19"/>
+    <p:sldId id="856" r:id="rId20"/>
+    <p:sldId id="852" r:id="rId21"/>
+    <p:sldId id="857" r:id="rId22"/>
+    <p:sldId id="858" r:id="rId23"/>
+    <p:sldId id="860" r:id="rId24"/>
     <p:sldId id="859" r:id="rId25"/>
     <p:sldId id="861" r:id="rId26"/>
     <p:sldId id="862" r:id="rId27"/>
@@ -324,7 +324,7 @@
           <a:p>
             <a:fld id="{4C476B9A-09E8-F547-B409-8F77FB8D3140}" type="datetime1">
               <a:rPr lang="de-DE" smtClean="0"/>
-              <a:t>25.06.14</a:t>
+              <a:t>26.06.14</a:t>
             </a:fld>
             <a:endParaRPr lang="de-DE"/>
           </a:p>
@@ -879,7 +879,7 @@
           <a:bodyPr/>
           <a:lstStyle/>
           <a:p>
-            <a:endParaRPr lang="de-DE"/>
+            <a:endParaRPr lang="de-DE" dirty="0"/>
           </a:p>
         </p:txBody>
       </p:sp>
@@ -964,7 +964,7 @@
           <a:bodyPr/>
           <a:lstStyle/>
           <a:p>
-            <a:endParaRPr lang="de-DE" dirty="0"/>
+            <a:endParaRPr lang="de-DE"/>
           </a:p>
         </p:txBody>
       </p:sp>
@@ -1049,7 +1049,15 @@
           <a:bodyPr/>
           <a:lstStyle/>
           <a:p>
-            <a:endParaRPr lang="de-DE"/>
+            <a:pPr marL="171450" indent="-171450">
+              <a:buFont typeface="Arial"/>
+              <a:buChar char="•"/>
+            </a:pPr>
+            <a:r>
+              <a:rPr lang="de-DE" dirty="0" smtClean="0"/>
+              <a:t>Beachte: Aufzeichnung der Messwerte wird nicht explizit gestartet, sondern implizit mit Programmaufruf!</a:t>
+            </a:r>
+            <a:endParaRPr lang="de-DE" dirty="0"/>
           </a:p>
         </p:txBody>
       </p:sp>
@@ -1304,7 +1312,170 @@
           <a:bodyPr/>
           <a:lstStyle/>
           <a:p>
-            <a:endParaRPr lang="de-DE"/>
+            <a:pPr marL="171450" indent="-171450">
+              <a:buFont typeface="Arial"/>
+              <a:buChar char="•"/>
+            </a:pPr>
+            <a:r>
+              <a:rPr lang="de-DE" dirty="0" smtClean="0"/>
+              <a:t>Erklärung Tabelle in Ausarbeitung: </a:t>
+            </a:r>
+          </a:p>
+          <a:p>
+            <a:pPr marL="685800" lvl="1" indent="-228600">
+              <a:buFont typeface="+mj-lt"/>
+              <a:buAutoNum type="arabicPeriod"/>
+            </a:pPr>
+            <a:r>
+              <a:rPr lang="de-DE" dirty="0" smtClean="0"/>
+              <a:t>Stromverbrauch im Mittel pro </a:t>
+            </a:r>
+            <a:r>
+              <a:rPr lang="de-DE" dirty="0" err="1" smtClean="0"/>
+              <a:t>ExperimentSuite</a:t>
+            </a:r>
+            <a:endParaRPr lang="de-DE" dirty="0" smtClean="0"/>
+          </a:p>
+          <a:p>
+            <a:pPr marL="685800" lvl="1" indent="-228600">
+              <a:buFont typeface="+mj-lt"/>
+              <a:buAutoNum type="arabicPeriod"/>
+            </a:pPr>
+            <a:r>
+              <a:rPr lang="de-DE" dirty="0" smtClean="0"/>
+              <a:t>max. Abweichung davon</a:t>
+            </a:r>
+          </a:p>
+          <a:p>
+            <a:pPr marL="685800" lvl="1" indent="-228600">
+              <a:buFont typeface="+mj-lt"/>
+              <a:buAutoNum type="arabicPeriod"/>
+            </a:pPr>
+            <a:r>
+              <a:rPr lang="de-DE" dirty="0" smtClean="0"/>
+              <a:t>Zuwachs pro angeschaltetem </a:t>
+            </a:r>
+            <a:r>
+              <a:rPr lang="de-DE" dirty="0" err="1" smtClean="0"/>
+              <a:t>RPi</a:t>
+            </a:r>
+            <a:r>
+              <a:rPr lang="de-DE" dirty="0" smtClean="0"/>
+              <a:t>-Knoten</a:t>
+            </a:r>
+          </a:p>
+          <a:p>
+            <a:pPr marL="685800" lvl="1" indent="-228600">
+              <a:buFont typeface="+mj-lt"/>
+              <a:buAutoNum type="arabicPeriod"/>
+            </a:pPr>
+            <a:r>
+              <a:rPr lang="de-DE" dirty="0" smtClean="0"/>
+              <a:t>Stromverbrauch im Mittel pro Messreihe</a:t>
+            </a:r>
+          </a:p>
+          <a:p>
+            <a:pPr marL="228600" lvl="0" indent="-228600">
+              <a:buFont typeface="Arial"/>
+              <a:buChar char="•"/>
+            </a:pPr>
+            <a:r>
+              <a:rPr lang="de-DE" dirty="0" smtClean="0"/>
+              <a:t>Stromverbrauch </a:t>
+            </a:r>
+            <a:r>
+              <a:rPr lang="de-DE" dirty="0" err="1" smtClean="0"/>
+              <a:t>RPi</a:t>
+            </a:r>
+            <a:r>
+              <a:rPr lang="de-DE" dirty="0" smtClean="0"/>
+              <a:t> </a:t>
+            </a:r>
+            <a:r>
+              <a:rPr lang="de-DE" dirty="0" err="1" smtClean="0"/>
+              <a:t>idle</a:t>
+            </a:r>
+            <a:r>
+              <a:rPr lang="de-DE" dirty="0" smtClean="0"/>
+              <a:t>: ca. 2.3 +- 3 W; GPU verbraucht deutlich mehr Strom als CPU</a:t>
+            </a:r>
+          </a:p>
+          <a:p>
+            <a:pPr marL="228600" lvl="0" indent="-228600">
+              <a:buFont typeface="Arial"/>
+              <a:buChar char="•"/>
+            </a:pPr>
+            <a:r>
+              <a:rPr lang="de-DE" dirty="0" smtClean="0"/>
+              <a:t>Stromverbrauch Server bei 80-90% CPU-Auslastung (theoretisch): ca. 26 W + 6.5 W (Netzteil-Overhead) </a:t>
+            </a:r>
+          </a:p>
+          <a:p>
+            <a:pPr marL="228600" lvl="0" indent="-228600">
+              <a:buFont typeface="Arial"/>
+              <a:buChar char="•"/>
+            </a:pPr>
+            <a:r>
+              <a:rPr lang="de-DE" dirty="0" smtClean="0"/>
+              <a:t>Stromverbrauch Server + Netzteil (real): ca. 43 W</a:t>
+            </a:r>
+          </a:p>
+          <a:p>
+            <a:pPr marL="228600" lvl="0" indent="-228600">
+              <a:buFont typeface="Arial"/>
+              <a:buChar char="•"/>
+            </a:pPr>
+            <a:r>
+              <a:rPr lang="de-DE" dirty="0" smtClean="0"/>
+              <a:t>Stromverbrauch gesamt </a:t>
+            </a:r>
+            <a:r>
+              <a:rPr lang="de-DE" dirty="0" err="1" smtClean="0"/>
+              <a:t>idle</a:t>
+            </a:r>
+            <a:r>
+              <a:rPr lang="de-DE" dirty="0" smtClean="0"/>
+              <a:t>: ca. 101 W</a:t>
+            </a:r>
+          </a:p>
+          <a:p>
+            <a:pPr marL="171450" indent="-171450">
+              <a:buFont typeface="Symbol" charset="0"/>
+              <a:buChar char=""/>
+            </a:pPr>
+            <a:r>
+              <a:rPr lang="de-DE" dirty="0" smtClean="0"/>
+              <a:t>relativ hoher Stromverbrauch unter Niedriglast</a:t>
+            </a:r>
+          </a:p>
+          <a:p>
+            <a:pPr marL="171450" indent="-171450">
+              <a:buFont typeface="Symbol" charset="0"/>
+              <a:buChar char=""/>
+            </a:pPr>
+            <a:r>
+              <a:rPr lang="de-DE" dirty="0" smtClean="0"/>
+              <a:t>schlechtere Ausbeute als 80-90% des Netzteils unter Niedriglast (gegenüber Herstellerangaben)</a:t>
+            </a:r>
+          </a:p>
+          <a:p>
+            <a:pPr marL="171450" indent="-171450">
+              <a:buFont typeface="Symbol" charset="0"/>
+              <a:buChar char=""/>
+            </a:pPr>
+            <a:r>
+              <a:rPr lang="de-DE" dirty="0" smtClean="0"/>
+              <a:t>Energieeffizienz der </a:t>
+            </a:r>
+            <a:r>
+              <a:rPr lang="de-DE" dirty="0" err="1" smtClean="0"/>
+              <a:t>RPis</a:t>
+            </a:r>
+            <a:r>
+              <a:rPr lang="de-DE" dirty="0" smtClean="0"/>
+              <a:t> kann unter laufendem Setup nicht ausgenutzt werden (größtmögliche theoretische Ausbeute unter Volllast: 50%)</a:t>
+            </a:r>
+            <a:endParaRPr lang="de-DE" dirty="0"/>
           </a:p>
         </p:txBody>
       </p:sp>
@@ -2239,7 +2410,109 @@
           <a:bodyPr/>
           <a:lstStyle/>
           <a:p>
-            <a:endParaRPr lang="de-DE"/>
+            <a:pPr marL="171450" indent="-171450">
+              <a:buFont typeface="Arial"/>
+              <a:buChar char="•"/>
+            </a:pPr>
+            <a:r>
+              <a:rPr lang="de-DE" dirty="0" smtClean="0"/>
+              <a:t>SDRAM: </a:t>
+            </a:r>
+            <a:r>
+              <a:rPr lang="de-DE" dirty="0" err="1" smtClean="0"/>
+              <a:t>Synchronuos</a:t>
+            </a:r>
+            <a:r>
+              <a:rPr lang="de-DE" dirty="0" smtClean="0"/>
+              <a:t> Dynamic Random Access Memory</a:t>
+            </a:r>
+          </a:p>
+          <a:p>
+            <a:pPr marL="171450" indent="-171450">
+              <a:buFont typeface="Arial"/>
+              <a:buChar char="•"/>
+            </a:pPr>
+            <a:r>
+              <a:rPr lang="de-DE" dirty="0" smtClean="0"/>
+              <a:t>Nicht flüchtiger Speicher: Auch Festspeicher/persistenter Speicher</a:t>
+            </a:r>
+          </a:p>
+          <a:p>
+            <a:pPr marL="171450" indent="-171450">
+              <a:buFont typeface="Arial"/>
+              <a:buChar char="•"/>
+            </a:pPr>
+            <a:r>
+              <a:rPr lang="de-DE" dirty="0" smtClean="0"/>
+              <a:t>Ethernet: In, </a:t>
+            </a:r>
+            <a:r>
+              <a:rPr lang="de-DE" dirty="0" err="1" smtClean="0"/>
+              <a:t>Micro</a:t>
+            </a:r>
+            <a:r>
+              <a:rPr lang="de-DE" dirty="0" smtClean="0"/>
+              <a:t>-USB: In, Audio: Out, Video: Out, USB: In, HDMI: Out </a:t>
+            </a:r>
+          </a:p>
+          <a:p>
+            <a:pPr marL="171450" indent="-171450">
+              <a:buFont typeface="Arial"/>
+              <a:buChar char="•"/>
+            </a:pPr>
+            <a:r>
+              <a:rPr lang="de-DE" dirty="0" smtClean="0"/>
+              <a:t>Unterschied Mini-/</a:t>
+            </a:r>
+            <a:r>
+              <a:rPr lang="de-DE" dirty="0" err="1" smtClean="0"/>
+              <a:t>Micro</a:t>
+            </a:r>
+            <a:r>
+              <a:rPr lang="de-DE" dirty="0" smtClean="0"/>
+              <a:t>-USB:</a:t>
+            </a:r>
+          </a:p>
+          <a:p>
+            <a:pPr marL="628650" lvl="1" indent="-171450">
+              <a:buFont typeface="Symbol" charset="2"/>
+              <a:buChar char="-"/>
+            </a:pPr>
+            <a:r>
+              <a:rPr lang="de-DE" dirty="0" smtClean="0"/>
+              <a:t>gleiche Funktion, doch seit 2011 wird fast ausschließlich </a:t>
+            </a:r>
+            <a:r>
+              <a:rPr lang="de-DE" dirty="0" err="1" smtClean="0"/>
+              <a:t>Micro</a:t>
+            </a:r>
+            <a:r>
+              <a:rPr lang="de-DE" dirty="0" smtClean="0"/>
+              <a:t>-USB-Technologie eingesetzt (geringere Größe, langlebiger)</a:t>
+            </a:r>
+          </a:p>
+          <a:p>
+            <a:pPr marL="628650" lvl="1" indent="-171450">
+              <a:buFont typeface="Symbol" charset="2"/>
+              <a:buChar char="-"/>
+            </a:pPr>
+            <a:r>
+              <a:rPr lang="de-DE" dirty="0" err="1" smtClean="0"/>
+              <a:t>RPi</a:t>
+            </a:r>
+            <a:r>
+              <a:rPr lang="de-DE" dirty="0" smtClean="0"/>
+              <a:t>: </a:t>
+            </a:r>
+            <a:r>
+              <a:rPr lang="de-DE" dirty="0" err="1" smtClean="0"/>
+              <a:t>Micro</a:t>
+            </a:r>
+            <a:r>
+              <a:rPr lang="de-DE" dirty="0" smtClean="0"/>
+              <a:t>-USB!</a:t>
+            </a:r>
+            <a:endParaRPr lang="de-DE" dirty="0"/>
           </a:p>
         </p:txBody>
       </p:sp>
@@ -2324,7 +2597,51 @@
           <a:bodyPr/>
           <a:lstStyle/>
           <a:p>
-            <a:endParaRPr lang="de-DE"/>
+            <a:pPr marL="171450" indent="-171450">
+              <a:buFont typeface="Arial"/>
+              <a:buChar char="•"/>
+            </a:pPr>
+            <a:r>
+              <a:rPr lang="de-DE" dirty="0" smtClean="0"/>
+              <a:t>Beachte: L2-Cache geteilt zwar </a:t>
+            </a:r>
+            <a:r>
+              <a:rPr lang="de-DE" dirty="0" err="1" smtClean="0"/>
+              <a:t>offizell</a:t>
+            </a:r>
+            <a:r>
+              <a:rPr lang="de-DE" dirty="0" smtClean="0"/>
+              <a:t> geteilt zw. GPU und CPU, aber anscheinend werden CPU-Anfragen daran vorbei geroutet </a:t>
+            </a:r>
+          </a:p>
+          <a:p>
+            <a:pPr marL="171450" indent="-171450">
+              <a:buFont typeface="Arial"/>
+              <a:buChar char="•"/>
+            </a:pPr>
+            <a:r>
+              <a:rPr lang="de-DE" dirty="0" smtClean="0"/>
+              <a:t>Beowulf-Cluster: historisch ab ca. 1995</a:t>
+            </a:r>
+          </a:p>
+          <a:p>
+            <a:pPr marL="171450" indent="-171450">
+              <a:buFont typeface="Arial"/>
+              <a:buChar char="•"/>
+            </a:pPr>
+            <a:r>
+              <a:rPr lang="de-DE" dirty="0" smtClean="0"/>
+              <a:t>Kosten </a:t>
+            </a:r>
+            <a:r>
+              <a:rPr lang="de-DE" dirty="0" err="1" smtClean="0"/>
+              <a:t>Bramble</a:t>
+            </a:r>
+            <a:r>
+              <a:rPr lang="de-DE" dirty="0" smtClean="0"/>
+              <a:t> insgesamt: ca. 2500 Euro</a:t>
+            </a:r>
+            <a:endParaRPr lang="de-DE" dirty="0"/>
           </a:p>
         </p:txBody>
       </p:sp>
@@ -2409,7 +2726,77 @@
           <a:bodyPr/>
           <a:lstStyle/>
           <a:p>
-            <a:endParaRPr lang="de-DE"/>
+            <a:pPr marL="171450" indent="-171450">
+              <a:buFont typeface="Arial"/>
+              <a:buChar char="•"/>
+            </a:pPr>
+            <a:r>
+              <a:rPr lang="de-DE" dirty="0" smtClean="0"/>
+              <a:t>Beachte: Prozessor: ARM 11/ARMv6</a:t>
+            </a:r>
+          </a:p>
+          <a:p>
+            <a:pPr marL="628650" lvl="1" indent="-171450">
+              <a:buFont typeface="Symbol" charset="2"/>
+              <a:buChar char="-"/>
+            </a:pPr>
+            <a:r>
+              <a:rPr lang="de-DE" dirty="0" smtClean="0"/>
+              <a:t>CISC: </a:t>
+            </a:r>
+            <a:r>
+              <a:rPr lang="de-DE" dirty="0" err="1" smtClean="0"/>
+              <a:t>Complex</a:t>
+            </a:r>
+            <a:r>
+              <a:rPr lang="de-DE" dirty="0" smtClean="0"/>
+              <a:t> </a:t>
+            </a:r>
+            <a:r>
+              <a:rPr lang="de-DE" dirty="0" err="1" smtClean="0"/>
+              <a:t>Instruction</a:t>
+            </a:r>
+            <a:r>
+              <a:rPr lang="de-DE" dirty="0" smtClean="0"/>
+              <a:t> Set Computer, variable Instruktionslänge</a:t>
+            </a:r>
+          </a:p>
+          <a:p>
+            <a:pPr marL="628650" lvl="1" indent="-171450">
+              <a:buFont typeface="Symbol" charset="2"/>
+              <a:buChar char="-"/>
+            </a:pPr>
+            <a:r>
+              <a:rPr lang="de-DE" dirty="0" smtClean="0"/>
+              <a:t>RISC: </a:t>
+            </a:r>
+            <a:r>
+              <a:rPr lang="de-DE" dirty="0" err="1" smtClean="0"/>
+              <a:t>Reduced</a:t>
+            </a:r>
+            <a:r>
+              <a:rPr lang="de-DE" dirty="0" smtClean="0"/>
+              <a:t> </a:t>
+            </a:r>
+            <a:r>
+              <a:rPr lang="de-DE" dirty="0" err="1" smtClean="0"/>
+              <a:t>Instruction</a:t>
+            </a:r>
+            <a:r>
+              <a:rPr lang="de-DE" dirty="0" smtClean="0"/>
+              <a:t> Set Computer </a:t>
+            </a:r>
+          </a:p>
+          <a:p>
+            <a:pPr marL="628650" lvl="1" indent="-171450">
+              <a:buFont typeface="Symbol" charset="2"/>
+              <a:buChar char="-"/>
+            </a:pPr>
+            <a:r>
+              <a:rPr lang="de-DE" dirty="0" smtClean="0"/>
+              <a:t>x86 heute: hybride CISC/RISC-Prozessoren (erste Umsetzung: Pentium Pro); seit ca. 2002: 64-Bit-Befehlssatzarchitektur (statt vorher 32 Bit)</a:t>
+            </a:r>
+            <a:endParaRPr lang="de-DE" dirty="0"/>
           </a:p>
         </p:txBody>
       </p:sp>
@@ -2579,7 +2966,163 @@
           <a:bodyPr/>
           <a:lstStyle/>
           <a:p>
-            <a:endParaRPr lang="de-DE"/>
+            <a:pPr marL="0" indent="0">
+              <a:buFont typeface="Arial"/>
+              <a:buNone/>
+            </a:pPr>
+            <a:r>
+              <a:rPr lang="de-DE" u="sng" dirty="0" smtClean="0"/>
+              <a:t>NFS (Network File System) </a:t>
+            </a:r>
+          </a:p>
+          <a:p>
+            <a:pPr marL="171450" indent="-171450">
+              <a:buFont typeface="Arial"/>
+              <a:buChar char="•"/>
+            </a:pPr>
+            <a:r>
+              <a:rPr lang="de-DE" dirty="0" smtClean="0"/>
+              <a:t>UNIX-Netzwerkprotokoll zum Dateizugriff über ein Netzwerk</a:t>
+            </a:r>
+          </a:p>
+          <a:p>
+            <a:pPr marL="171450" indent="-171450">
+              <a:buFont typeface="Arial"/>
+              <a:buChar char="•"/>
+            </a:pPr>
+            <a:r>
+              <a:rPr lang="de-DE" dirty="0" smtClean="0"/>
+              <a:t>die Dateien nicht wie z. B. bei FTP übertragen, sondern die Benutzer können auf Dateien, die sich auf einem entfernten Rechner befinden, so zugreifen, als ob sie auf ihrer lokalen Festplatte abgespeichert wären</a:t>
+            </a:r>
+          </a:p>
+          <a:p>
+            <a:pPr marL="171450" indent="-171450">
+              <a:buFont typeface="Arial"/>
+              <a:buChar char="•"/>
+            </a:pPr>
+            <a:r>
+              <a:rPr lang="de-DE" dirty="0" smtClean="0"/>
+              <a:t>auch “verteiltes Dateisystem“</a:t>
+            </a:r>
+          </a:p>
+          <a:p>
+            <a:pPr marL="171450" indent="-171450">
+              <a:buFont typeface="Arial"/>
+              <a:buChar char="•"/>
+            </a:pPr>
+            <a:r>
+              <a:rPr lang="de-DE" dirty="0" err="1" smtClean="0"/>
+              <a:t>nfs</a:t>
+            </a:r>
+            <a:r>
+              <a:rPr lang="de-DE" dirty="0" smtClean="0"/>
+              <a:t> 3 nutzt IP  </a:t>
+            </a:r>
+          </a:p>
+          <a:p>
+            <a:pPr marL="171450" indent="-171450">
+              <a:buFont typeface="Arial"/>
+              <a:buChar char="•"/>
+            </a:pPr>
+            <a:endParaRPr lang="de-DE" dirty="0" smtClean="0"/>
+          </a:p>
+          <a:p>
+            <a:pPr marL="0" indent="0">
+              <a:buFont typeface="Arial"/>
+              <a:buNone/>
+            </a:pPr>
+            <a:r>
+              <a:rPr lang="de-DE" u="sng" dirty="0" smtClean="0"/>
+              <a:t>AUFS (</a:t>
+            </a:r>
+            <a:r>
+              <a:rPr lang="de-DE" u="sng" dirty="0" err="1" smtClean="0"/>
+              <a:t>Advanced</a:t>
+            </a:r>
+            <a:r>
+              <a:rPr lang="de-DE" u="sng" dirty="0" smtClean="0"/>
+              <a:t> Multi Layer </a:t>
+            </a:r>
+            <a:r>
+              <a:rPr lang="de-DE" u="sng" dirty="0" err="1" smtClean="0"/>
+              <a:t>Unificated</a:t>
+            </a:r>
+            <a:r>
+              <a:rPr lang="de-DE" u="sng" dirty="0" smtClean="0"/>
+              <a:t> File System</a:t>
+            </a:r>
+          </a:p>
+          <a:p>
+            <a:pPr marL="171450" indent="-171450">
+              <a:buFont typeface="Arial"/>
+              <a:buChar char="•"/>
+            </a:pPr>
+            <a:r>
+              <a:rPr lang="de-DE" dirty="0" err="1" smtClean="0"/>
+              <a:t>Overlay</a:t>
+            </a:r>
+            <a:r>
+              <a:rPr lang="de-DE" dirty="0" smtClean="0"/>
+              <a:t>-Dateisystem zum (scheinbaren) Schreiben von Daten auf nicht beschreibbaren Datenträgern </a:t>
+            </a:r>
+          </a:p>
+          <a:p>
+            <a:pPr marL="171450" indent="-171450">
+              <a:buFont typeface="Arial"/>
+              <a:buChar char="•"/>
+            </a:pPr>
+            <a:r>
+              <a:rPr lang="de-DE" dirty="0" smtClean="0"/>
+              <a:t>Dazu werden mind. zwei Dateisysteme übereinander gelegt (ein beschreibbares Dateisystem über ein nicht beschreibbares)</a:t>
+            </a:r>
+          </a:p>
+          <a:p>
+            <a:pPr marL="171450" indent="-171450">
+              <a:buFont typeface="Arial"/>
+              <a:buChar char="•"/>
+            </a:pPr>
+            <a:r>
+              <a:rPr lang="de-DE" dirty="0" smtClean="0"/>
+              <a:t>Soll eine Datei gelesen werden, wird zunächst versucht, sie auf dem beschreibbaren Dateisystem zu lesen. Ist sie dort nicht vorhanden, wird sie aus dem darunter liegenden, nicht beschreibbaren Dateisystem gelesen</a:t>
+            </a:r>
+          </a:p>
+          <a:p>
+            <a:pPr marL="171450" indent="-171450">
+              <a:buFont typeface="Arial"/>
+              <a:buChar char="•"/>
+            </a:pPr>
+            <a:r>
+              <a:rPr lang="de-DE" dirty="0" smtClean="0"/>
+              <a:t>Ein Schreibzugriff erfolgt immer auf das beschreibbare Dateisystem</a:t>
+            </a:r>
+          </a:p>
+          <a:p>
+            <a:pPr marL="171450" indent="-171450">
+              <a:buFont typeface="Arial"/>
+              <a:buChar char="•"/>
+            </a:pPr>
+            <a:endParaRPr lang="de-DE" dirty="0" smtClean="0"/>
+          </a:p>
+          <a:p>
+            <a:pPr marL="171450" indent="-171450">
+              <a:buFont typeface="Arial"/>
+              <a:buChar char="•"/>
+            </a:pPr>
+            <a:r>
+              <a:rPr lang="de-DE" dirty="0" smtClean="0"/>
+              <a:t>Beachte: Unterschiedliche Architekturen Server/Nodes!</a:t>
+            </a:r>
+          </a:p>
+          <a:p>
+            <a:pPr marL="171450" indent="-171450">
+              <a:buFont typeface="Arial"/>
+              <a:buChar char="•"/>
+            </a:pPr>
+            <a:r>
+              <a:rPr lang="de-DE" dirty="0" smtClean="0"/>
+              <a:t>Resultierende Fragestellung: mündlich </a:t>
+            </a:r>
+            <a:endParaRPr lang="de-DE" dirty="0"/>
           </a:p>
         </p:txBody>
       </p:sp>
@@ -2664,7 +3207,15 @@
           <a:bodyPr/>
           <a:lstStyle/>
           <a:p>
-            <a:endParaRPr lang="de-DE"/>
+            <a:pPr marL="171450" indent="-171450">
+              <a:buFont typeface="Arial"/>
+              <a:buChar char="•"/>
+            </a:pPr>
+            <a:r>
+              <a:rPr lang="de-DE" smtClean="0"/>
+              <a:t>Ergänze: Keine MPICH-Implemetierung für Whetstone</a:t>
+            </a:r>
+            <a:endParaRPr lang="de-DE" dirty="0"/>
           </a:p>
         </p:txBody>
       </p:sp>
@@ -2749,7 +3300,242 @@
           <a:bodyPr/>
           <a:lstStyle/>
           <a:p>
-            <a:endParaRPr lang="de-DE"/>
+            <a:r>
+              <a:rPr lang="de-DE" u="sng" dirty="0" err="1" smtClean="0"/>
+              <a:t>HPL.dat</a:t>
+            </a:r>
+            <a:r>
+              <a:rPr lang="de-DE" dirty="0" smtClean="0"/>
+              <a:t> </a:t>
+            </a:r>
+          </a:p>
+          <a:p>
+            <a:pPr marL="171450" indent="-171450">
+              <a:buFont typeface="Arial"/>
+              <a:buChar char="•"/>
+            </a:pPr>
+            <a:r>
+              <a:rPr lang="de-DE" dirty="0" smtClean="0"/>
+              <a:t>Problemgröße N: </a:t>
+            </a:r>
+          </a:p>
+          <a:p>
+            <a:r>
+              <a:rPr lang="de-DE" dirty="0" smtClean="0"/>
+              <a:t>Proportionalitätskonstante: </a:t>
+            </a:r>
+            <a:r>
+              <a:rPr lang="de-DE" dirty="0" err="1" smtClean="0"/>
+              <a:t>k</a:t>
+            </a:r>
+            <a:r>
+              <a:rPr lang="de-DE" dirty="0" smtClean="0"/>
+              <a:t> = N^2/Menge HS</a:t>
+            </a:r>
+          </a:p>
+          <a:p>
+            <a:r>
+              <a:rPr lang="de-DE" dirty="0" smtClean="0"/>
+              <a:t>4 </a:t>
+            </a:r>
+            <a:r>
+              <a:rPr lang="de-DE" dirty="0" err="1" smtClean="0"/>
+              <a:t>RPis</a:t>
+            </a:r>
+            <a:r>
+              <a:rPr lang="de-DE" dirty="0" smtClean="0"/>
+              <a:t>: N = 2880</a:t>
+            </a:r>
+          </a:p>
+          <a:p>
+            <a:r>
+              <a:rPr lang="de-DE" dirty="0" smtClean="0"/>
+              <a:t>8 </a:t>
+            </a:r>
+            <a:r>
+              <a:rPr lang="de-DE" dirty="0" err="1" smtClean="0"/>
+              <a:t>RPis</a:t>
+            </a:r>
+            <a:r>
+              <a:rPr lang="de-DE" dirty="0" smtClean="0"/>
+              <a:t>: N = 4032 </a:t>
+            </a:r>
+          </a:p>
+          <a:p>
+            <a:r>
+              <a:rPr lang="de-DE" dirty="0" smtClean="0"/>
+              <a:t>16 </a:t>
+            </a:r>
+            <a:r>
+              <a:rPr lang="de-DE" dirty="0" err="1" smtClean="0"/>
+              <a:t>RPis</a:t>
+            </a:r>
+            <a:r>
+              <a:rPr lang="de-DE" dirty="0" smtClean="0"/>
+              <a:t>: N = 5760</a:t>
+            </a:r>
+          </a:p>
+          <a:p>
+            <a:endParaRPr lang="de-DE" dirty="0" smtClean="0"/>
+          </a:p>
+          <a:p>
+            <a:pPr marL="171450" indent="-171450">
+              <a:buFont typeface="Arial"/>
+              <a:buChar char="•"/>
+            </a:pPr>
+            <a:r>
+              <a:rPr lang="de-DE" dirty="0" smtClean="0"/>
+              <a:t>Blockgröße NB: Lösung des linearen Gleichungssystems durch L/U-</a:t>
+            </a:r>
+            <a:r>
+              <a:rPr lang="de-DE" dirty="0" err="1" smtClean="0"/>
+              <a:t>Faktorisierung</a:t>
+            </a:r>
+            <a:r>
+              <a:rPr lang="de-DE" dirty="0" smtClean="0"/>
+              <a:t>. Dazu wird eine </a:t>
+            </a:r>
+            <a:r>
+              <a:rPr lang="de-DE" dirty="0" err="1" smtClean="0"/>
+              <a:t>n</a:t>
+            </a:r>
+            <a:r>
+              <a:rPr lang="de-DE" dirty="0" smtClean="0"/>
+              <a:t> × </a:t>
+            </a:r>
+            <a:r>
+              <a:rPr lang="de-DE" dirty="0" err="1" smtClean="0"/>
+              <a:t>n</a:t>
+            </a:r>
+            <a:r>
+              <a:rPr lang="de-DE" dirty="0" smtClean="0"/>
+              <a:t> + 1-Koeffizientenmatrix der Ausgangsmatrix A erzeugt. A wird dazu Blöcke der Größe NB × NB aufgeteilt. </a:t>
+            </a:r>
+          </a:p>
+          <a:p>
+            <a:pPr marL="171450" indent="-171450">
+              <a:buFont typeface="Arial"/>
+              <a:buChar char="•"/>
+            </a:pPr>
+            <a:r>
+              <a:rPr lang="de-DE" dirty="0" smtClean="0"/>
+              <a:t>Prozessnetz (P x Q): Die Blöcke werden zur Bearbeitung einem Netz aus Prozessoren übergeben. P bezeichnet die Anzahl von Prozessoren in einer Spalte, Q die Anzahl von Prozessoren in einer Zeile des Netzes. </a:t>
+            </a:r>
+          </a:p>
+          <a:p>
+            <a:pPr marL="171450" indent="-171450">
+              <a:buFont typeface="Arial"/>
+              <a:buChar char="•"/>
+            </a:pPr>
+            <a:r>
+              <a:rPr lang="de-DE" dirty="0" smtClean="0"/>
+              <a:t>PFACTs und RFACTs: Zur Unterteilung der Matrix in Submatrizen/Unterteilung der Submatrizen werden drei Algorithmen angeboten: Links-schauende, rechts-schauende und </a:t>
+            </a:r>
+            <a:r>
+              <a:rPr lang="de-DE" dirty="0" err="1" smtClean="0"/>
+              <a:t>Crout-Faktorisierung</a:t>
+            </a:r>
+            <a:r>
+              <a:rPr lang="de-DE" dirty="0" smtClean="0"/>
+              <a:t>. </a:t>
+            </a:r>
+          </a:p>
+          <a:p>
+            <a:endParaRPr lang="de-DE" u="none" dirty="0" smtClean="0"/>
+          </a:p>
+          <a:p>
+            <a:r>
+              <a:rPr lang="de-DE" u="sng" dirty="0" smtClean="0"/>
+              <a:t>HPL-Algorithmus</a:t>
+            </a:r>
+            <a:r>
+              <a:rPr lang="de-DE" dirty="0" smtClean="0"/>
+              <a:t> </a:t>
+            </a:r>
+          </a:p>
+          <a:p>
+            <a:pPr marL="171450" indent="-171450">
+              <a:buFont typeface="Arial"/>
+              <a:buChar char="•"/>
+            </a:pPr>
+            <a:r>
+              <a:rPr lang="de-DE" dirty="0" smtClean="0"/>
+              <a:t>Reziproke: Kehrwert</a:t>
+            </a:r>
+          </a:p>
+          <a:p>
+            <a:endParaRPr lang="de-DE" dirty="0" smtClean="0"/>
+          </a:p>
+          <a:p>
+            <a:r>
+              <a:rPr lang="de-DE" u="sng" dirty="0" smtClean="0"/>
+              <a:t>STREAM-Algorithmus </a:t>
+            </a:r>
+          </a:p>
+          <a:p>
+            <a:pPr marL="171450" indent="-171450">
+              <a:buFont typeface="Arial"/>
+              <a:buChar char="•"/>
+            </a:pPr>
+            <a:r>
+              <a:rPr lang="de-DE" dirty="0" smtClean="0"/>
+              <a:t>Länge Vektoren: mind. 1000000 Elemente oder 4 x Gesamt-Cachegröße</a:t>
+            </a:r>
+          </a:p>
+          <a:p>
+            <a:pPr marL="171450" indent="-171450">
+              <a:buFont typeface="Arial"/>
+              <a:buChar char="•"/>
+            </a:pPr>
+            <a:r>
+              <a:rPr lang="de-DE" dirty="0" smtClean="0"/>
+              <a:t>hier: Cache-Gesamtgröße = max. 19 x 16 </a:t>
+            </a:r>
+            <a:r>
+              <a:rPr lang="de-DE" dirty="0" err="1" smtClean="0"/>
+              <a:t>kB</a:t>
+            </a:r>
+            <a:r>
+              <a:rPr lang="de-DE" dirty="0" smtClean="0"/>
+              <a:t> = 1216 </a:t>
+            </a:r>
+            <a:r>
+              <a:rPr lang="de-DE" dirty="0" err="1" smtClean="0"/>
+              <a:t>kB</a:t>
+            </a:r>
+            <a:r>
+              <a:rPr lang="de-DE" dirty="0" smtClean="0"/>
+              <a:t> = 1.1875 MB</a:t>
+            </a:r>
+          </a:p>
+          <a:p>
+            <a:pPr marL="171450" indent="-171450">
+              <a:buFont typeface="Arial"/>
+              <a:buChar char="•"/>
+            </a:pPr>
+            <a:r>
+              <a:rPr lang="de-DE" dirty="0" smtClean="0"/>
+              <a:t>Standard-Problemgröße = 2000000 Elemente, angemessen f. 4 MB Cache =&gt; reicht bei Weitem aus!</a:t>
+            </a:r>
+          </a:p>
+          <a:p>
+            <a:pPr marL="171450" indent="-171450">
+              <a:buFont typeface="Arial"/>
+              <a:buChar char="•"/>
+            </a:pPr>
+            <a:r>
+              <a:rPr lang="de-DE" dirty="0" smtClean="0"/>
+              <a:t>Modul TRIAD: a[i] = b[i] + </a:t>
+            </a:r>
+            <a:r>
+              <a:rPr lang="de-DE" dirty="0" err="1" smtClean="0"/>
+              <a:t>q</a:t>
+            </a:r>
+            <a:r>
+              <a:rPr lang="de-DE" dirty="0" smtClean="0"/>
+              <a:t> * c[i]</a:t>
+            </a:r>
+            <a:endParaRPr lang="de-DE" dirty="0"/>
           </a:p>
         </p:txBody>
       </p:sp>
@@ -4995,225 +5781,42 @@
           <a:p>
             <a:r>
               <a:rPr lang="de-DE" sz="1800" dirty="0" smtClean="0"/>
-              <a:t>Versuchsaufbau und -ablauf	</a:t>
+              <a:t>Versuchsaufbau und -ablauf</a:t>
             </a:r>
             <a:endParaRPr lang="de-DE" sz="1800" dirty="0"/>
           </a:p>
         </p:txBody>
       </p:sp>
-      <p:sp>
-        <p:nvSpPr>
-          <p:cNvPr id="3" name="Inhaltsplatzhalter 2"/>
-          <p:cNvSpPr>
-            <a:spLocks noGrp="1"/>
-          </p:cNvSpPr>
+      <p:pic>
+        <p:nvPicPr>
+          <p:cNvPr id="6" name="Inhaltsplatzhalter 5"/>
+          <p:cNvPicPr>
+            <a:picLocks noGrp="1" noChangeAspect="1"/>
+          </p:cNvPicPr>
           <p:nvPr>
             <p:ph idx="1"/>
           </p:nvPr>
-        </p:nvSpPr>
-        <p:spPr/>
-        <p:txBody>
-          <a:bodyPr/>
-          <a:lstStyle/>
-          <a:p>
-            <a:pPr marL="400050" lvl="1" indent="0">
-              <a:buNone/>
-            </a:pPr>
-            <a:r>
-              <a:rPr lang="de-DE" b="1" dirty="0" smtClean="0"/>
-              <a:t>3.3 Umsetzung</a:t>
-            </a:r>
-          </a:p>
-          <a:p>
-            <a:pPr lvl="2" indent="-342900">
-              <a:buFont typeface="+mj-lt"/>
-              <a:buAutoNum type="alphaLcParenR"/>
-            </a:pPr>
-            <a:r>
-              <a:rPr lang="de-DE" b="1" dirty="0" smtClean="0"/>
-              <a:t>Parallele Ausführung: </a:t>
-            </a:r>
-            <a:r>
-              <a:rPr lang="de-DE" dirty="0" smtClean="0"/>
-              <a:t>MPICH mit </a:t>
-            </a:r>
-            <a:r>
-              <a:rPr lang="de-DE" dirty="0" err="1" smtClean="0"/>
-              <a:t>mpiexec</a:t>
-            </a:r>
-            <a:r>
-              <a:rPr lang="de-DE" dirty="0" smtClean="0"/>
-              <a:t> und </a:t>
-            </a:r>
-            <a:r>
-              <a:rPr lang="de-DE" dirty="0" err="1" smtClean="0"/>
-              <a:t>Machinefile</a:t>
-            </a:r>
-            <a:endParaRPr lang="de-DE" dirty="0"/>
-          </a:p>
-          <a:p>
-            <a:pPr lvl="2" indent="-342900">
-              <a:buFont typeface="+mj-lt"/>
-              <a:buAutoNum type="alphaLcParenR"/>
-            </a:pPr>
-            <a:r>
-              <a:rPr lang="de-DE" b="1" dirty="0" smtClean="0"/>
-              <a:t>Zwei </a:t>
-            </a:r>
-            <a:r>
-              <a:rPr lang="de-DE" b="1" dirty="0"/>
-              <a:t>Messreihen pro </a:t>
-            </a:r>
-            <a:r>
-              <a:rPr lang="de-DE" b="1" dirty="0" smtClean="0"/>
-              <a:t>Benchmark:</a:t>
-            </a:r>
-            <a:r>
-              <a:rPr lang="de-DE" dirty="0"/>
-              <a:t> </a:t>
-            </a:r>
-            <a:r>
-              <a:rPr lang="de-DE" dirty="0" smtClean="0"/>
-              <a:t>Realisierung durch </a:t>
-            </a:r>
-            <a:r>
-              <a:rPr lang="de-DE" dirty="0" err="1" smtClean="0"/>
-              <a:t>Shellskripte</a:t>
-            </a:r>
-            <a:endParaRPr lang="de-DE" dirty="0"/>
-          </a:p>
-          <a:p>
-            <a:pPr lvl="2" indent="-342900">
-              <a:buFont typeface="+mj-lt"/>
-              <a:buAutoNum type="alphaLcParenR"/>
-            </a:pPr>
-            <a:r>
-              <a:rPr lang="de-DE" b="1" dirty="0" smtClean="0"/>
-              <a:t>Auswertung Strommessgerät:</a:t>
-            </a:r>
-            <a:r>
-              <a:rPr lang="de-DE" b="1" dirty="0"/>
-              <a:t> </a:t>
-            </a:r>
-            <a:r>
-              <a:rPr lang="de-DE" dirty="0" smtClean="0"/>
-              <a:t>Auswertung der </a:t>
-            </a:r>
-            <a:r>
-              <a:rPr lang="de-DE" dirty="0" err="1" smtClean="0"/>
-              <a:t>SQLite</a:t>
-            </a:r>
-            <a:r>
-              <a:rPr lang="de-DE" dirty="0" smtClean="0"/>
-              <a:t>-Datenbank auf Windows-VM </a:t>
-            </a:r>
-            <a:endParaRPr lang="de-DE" b="1" dirty="0"/>
-          </a:p>
-          <a:p>
-            <a:pPr lvl="2" indent="-342900">
-              <a:buFont typeface="+mj-lt"/>
-              <a:buAutoNum type="alphaLcParenR"/>
-            </a:pPr>
-            <a:r>
-              <a:rPr lang="de-DE" b="1" dirty="0" smtClean="0"/>
-              <a:t>Automatisierte </a:t>
-            </a:r>
-            <a:r>
-              <a:rPr lang="de-DE" b="1" dirty="0"/>
-              <a:t>Durchführung der </a:t>
-            </a:r>
-            <a:r>
-              <a:rPr lang="de-DE" b="1" dirty="0" smtClean="0"/>
-              <a:t>Messungen:</a:t>
-            </a:r>
-            <a:r>
-              <a:rPr lang="de-DE" dirty="0"/>
-              <a:t> </a:t>
-            </a:r>
-            <a:r>
-              <a:rPr lang="de-DE" dirty="0" smtClean="0"/>
-              <a:t>Realisierung durch </a:t>
-            </a:r>
-            <a:r>
-              <a:rPr lang="de-DE" dirty="0" err="1" smtClean="0"/>
-              <a:t>Shellskripte</a:t>
-            </a:r>
-            <a:r>
-              <a:rPr lang="de-DE" dirty="0" smtClean="0"/>
-              <a:t> (Schwerpunkt HERE-Files zur Navigation zwischen Server und Rechenknoten mit verschiedenen Benutzern)</a:t>
-            </a:r>
-            <a:endParaRPr lang="de-DE" dirty="0"/>
-          </a:p>
-          <a:p>
-            <a:pPr lvl="2" indent="-342900">
-              <a:buFont typeface="+mj-lt"/>
-              <a:buAutoNum type="alphaLcParenR"/>
-            </a:pPr>
-            <a:r>
-              <a:rPr lang="de-DE" b="1" dirty="0" smtClean="0"/>
-              <a:t>Protokollierung </a:t>
-            </a:r>
-            <a:r>
-              <a:rPr lang="de-DE" b="1" dirty="0"/>
-              <a:t>und grafische Aufbereitung der </a:t>
-            </a:r>
-            <a:r>
-              <a:rPr lang="de-DE" b="1" dirty="0" smtClean="0"/>
-              <a:t>Messwerte:</a:t>
-            </a:r>
-            <a:r>
-              <a:rPr lang="de-DE" dirty="0" smtClean="0"/>
-              <a:t> Realisierung durch </a:t>
-            </a:r>
-            <a:r>
-              <a:rPr lang="de-DE" dirty="0" err="1" smtClean="0"/>
-              <a:t>Shellskripte</a:t>
-            </a:r>
-            <a:r>
-              <a:rPr lang="de-DE" dirty="0" smtClean="0"/>
-              <a:t> (Schwerpunkt Kommandozeilen-MySQL); Anpassung des Datenbankschemas an tatsächliche Anforderungen; grafische Aufbereitung mit </a:t>
-            </a:r>
-            <a:r>
-              <a:rPr lang="de-DE" dirty="0" err="1" smtClean="0"/>
-              <a:t>Gnuplot</a:t>
-            </a:r>
-            <a:endParaRPr lang="de-DE" b="1" dirty="0"/>
-          </a:p>
-          <a:p>
-            <a:pPr lvl="2" indent="-342900">
-              <a:buFont typeface="+mj-lt"/>
-              <a:buAutoNum type="alphaLcParenR"/>
-            </a:pPr>
-            <a:r>
-              <a:rPr lang="de-DE" b="1" dirty="0" smtClean="0"/>
-              <a:t>Integration der Fehlerbehebung in Versuchsdurchführung: </a:t>
-            </a:r>
-            <a:r>
-              <a:rPr lang="de-DE" dirty="0" smtClean="0"/>
-              <a:t>Realisierung durch </a:t>
-            </a:r>
-            <a:r>
-              <a:rPr lang="de-DE" dirty="0" err="1" smtClean="0"/>
-              <a:t>Shellskripte</a:t>
-            </a:r>
-            <a:r>
-              <a:rPr lang="de-DE" dirty="0" smtClean="0"/>
-              <a:t>; Aufsichtsperson</a:t>
-            </a:r>
-            <a:r>
-              <a:rPr lang="de-DE" b="1" dirty="0" smtClean="0"/>
-              <a:t> </a:t>
-            </a:r>
-            <a:endParaRPr lang="de-DE" b="1" dirty="0"/>
-          </a:p>
-          <a:p>
-            <a:pPr marL="400050" lvl="1" indent="0">
-              <a:buNone/>
-            </a:pPr>
-            <a:endParaRPr lang="de-DE" dirty="0" smtClean="0"/>
-          </a:p>
-        </p:txBody>
-      </p:sp>
+        </p:nvPicPr>
+        <p:blipFill>
+          <a:blip r:embed="rId3">
+            <a:extLst>
+              <a:ext uri="{28A0092B-C50C-407E-A947-70E740481C1C}">
+                <a14:useLocalDpi xmlns:a14="http://schemas.microsoft.com/office/drawing/2010/main" val="0"/>
+              </a:ext>
+            </a:extLst>
+          </a:blip>
+          <a:srcRect/>
+          <a:stretch>
+            <a:fillRect/>
+          </a:stretch>
+        </p:blipFill>
+        <p:spPr>
+          <a:xfrm>
+            <a:off x="1353541" y="1340768"/>
+            <a:ext cx="6534188" cy="4900641"/>
+          </a:xfrm>
+        </p:spPr>
+      </p:pic>
       <p:sp>
         <p:nvSpPr>
           <p:cNvPr id="4" name="Foliennummernplatzhalter 3"/>
@@ -5274,10 +5877,40 @@
           </a:p>
         </p:txBody>
       </p:sp>
+      <p:sp>
+        <p:nvSpPr>
+          <p:cNvPr id="3" name="Textfeld 2"/>
+          <p:cNvSpPr txBox="1"/>
+          <p:nvPr/>
+        </p:nvSpPr>
+        <p:spPr>
+          <a:xfrm>
+            <a:off x="2375756" y="6129300"/>
+            <a:ext cx="4716524" cy="276999"/>
+          </a:xfrm>
+          <a:prstGeom prst="rect">
+            <a:avLst/>
+          </a:prstGeom>
+          <a:noFill/>
+        </p:spPr>
+        <p:txBody>
+          <a:bodyPr wrap="square" lIns="0" rIns="0" rtlCol="0">
+            <a:spAutoFit/>
+          </a:bodyPr>
+          <a:lstStyle/>
+          <a:p>
+            <a:r>
+              <a:rPr lang="de-DE" dirty="0" smtClean="0"/>
+              <a:t>Aktivitätsdiagramm einer Versuchsdurchführung mit 2 Messreihen</a:t>
+            </a:r>
+            <a:endParaRPr lang="de-DE" dirty="0"/>
+          </a:p>
+        </p:txBody>
+      </p:sp>
     </p:spTree>
     <p:extLst>
       <p:ext uri="{BB962C8B-B14F-4D97-AF65-F5344CB8AC3E}">
-        <p14:creationId xmlns:p14="http://schemas.microsoft.com/office/powerpoint/2010/main" val="573136144"/>
+        <p14:creationId xmlns:p14="http://schemas.microsoft.com/office/powerpoint/2010/main" val="4032125368"/>
       </p:ext>
     </p:extLst>
   </p:cSld>
@@ -5285,6 +5918,13 @@
     <a:masterClrMapping/>
   </p:clrMapOvr>
   <p:transition xmlns:p14="http://schemas.microsoft.com/office/powerpoint/2010/main" spd="med"/>
+  <p:timing>
+    <p:tnLst>
+      <p:par>
+        <p:cTn xmlns:p14="http://schemas.microsoft.com/office/powerpoint/2010/main" id="1" dur="indefinite" restart="never" nodeType="tmRoot"/>
+      </p:par>
+    </p:tnLst>
+  </p:timing>
 </p:sld>
 </file>
 
@@ -5322,41 +5962,225 @@
           <a:p>
             <a:r>
               <a:rPr lang="de-DE" sz="1800" dirty="0" smtClean="0"/>
-              <a:t>Versuchsaufbau und -ablauf</a:t>
+              <a:t>Versuchsaufbau und -ablauf	</a:t>
             </a:r>
             <a:endParaRPr lang="de-DE" sz="1800" dirty="0"/>
           </a:p>
         </p:txBody>
       </p:sp>
-      <p:pic>
-        <p:nvPicPr>
-          <p:cNvPr id="6" name="Inhaltsplatzhalter 5"/>
-          <p:cNvPicPr>
-            <a:picLocks noGrp="1" noChangeAspect="1"/>
-          </p:cNvPicPr>
+      <p:sp>
+        <p:nvSpPr>
+          <p:cNvPr id="3" name="Inhaltsplatzhalter 2"/>
+          <p:cNvSpPr>
+            <a:spLocks noGrp="1"/>
+          </p:cNvSpPr>
           <p:nvPr>
             <p:ph idx="1"/>
           </p:nvPr>
-        </p:nvPicPr>
-        <p:blipFill>
-          <a:blip r:embed="rId3">
-            <a:extLst>
-              <a:ext uri="{28A0092B-C50C-407E-A947-70E740481C1C}">
-                <a14:useLocalDpi xmlns:a14="http://schemas.microsoft.com/office/drawing/2010/main" val="0"/>
-              </a:ext>
-            </a:extLst>
-          </a:blip>
-          <a:stretch>
-            <a:fillRect/>
-          </a:stretch>
-        </p:blipFill>
-        <p:spPr>
-          <a:xfrm>
-            <a:off x="1353541" y="1340768"/>
-            <a:ext cx="6534188" cy="4900641"/>
-          </a:xfrm>
-        </p:spPr>
-      </p:pic>
+        </p:nvSpPr>
+        <p:spPr/>
+        <p:txBody>
+          <a:bodyPr/>
+          <a:lstStyle/>
+          <a:p>
+            <a:pPr marL="400050" lvl="1" indent="0">
+              <a:buNone/>
+            </a:pPr>
+            <a:r>
+              <a:rPr lang="de-DE" b="1" dirty="0" smtClean="0"/>
+              <a:t>3.3 Umsetzung</a:t>
+            </a:r>
+          </a:p>
+          <a:p>
+            <a:pPr lvl="2" indent="-342900">
+              <a:buFont typeface="+mj-lt"/>
+              <a:buAutoNum type="alphaLcParenR"/>
+            </a:pPr>
+            <a:r>
+              <a:rPr lang="de-DE" b="1" dirty="0" smtClean="0"/>
+              <a:t>Parallele Ausführung: </a:t>
+            </a:r>
+            <a:r>
+              <a:rPr lang="de-DE" dirty="0" smtClean="0"/>
+              <a:t>MPICH mit </a:t>
+            </a:r>
+            <a:r>
+              <a:rPr lang="de-DE" dirty="0" err="1" smtClean="0"/>
+              <a:t>mpiexec</a:t>
+            </a:r>
+            <a:r>
+              <a:rPr lang="de-DE" dirty="0" smtClean="0"/>
+              <a:t> und </a:t>
+            </a:r>
+            <a:r>
+              <a:rPr lang="de-DE" dirty="0" err="1" smtClean="0"/>
+              <a:t>Machinefile</a:t>
+            </a:r>
+            <a:endParaRPr lang="de-DE" dirty="0"/>
+          </a:p>
+          <a:p>
+            <a:pPr lvl="2" indent="-342900">
+              <a:buFont typeface="+mj-lt"/>
+              <a:buAutoNum type="alphaLcParenR"/>
+            </a:pPr>
+            <a:r>
+              <a:rPr lang="de-DE" b="1" dirty="0" smtClean="0"/>
+              <a:t>Zwei </a:t>
+            </a:r>
+            <a:r>
+              <a:rPr lang="de-DE" b="1" dirty="0"/>
+              <a:t>Messreihen pro </a:t>
+            </a:r>
+            <a:r>
+              <a:rPr lang="de-DE" b="1" dirty="0" smtClean="0"/>
+              <a:t>Benchmark:</a:t>
+            </a:r>
+            <a:r>
+              <a:rPr lang="de-DE" dirty="0"/>
+              <a:t> </a:t>
+            </a:r>
+            <a:r>
+              <a:rPr lang="de-DE" dirty="0" smtClean="0"/>
+              <a:t>Realisierung durch </a:t>
+            </a:r>
+            <a:r>
+              <a:rPr lang="de-DE" dirty="0" err="1" smtClean="0"/>
+              <a:t>Shellskripte</a:t>
+            </a:r>
+            <a:endParaRPr lang="de-DE" dirty="0"/>
+          </a:p>
+          <a:p>
+            <a:pPr lvl="2" indent="-342900">
+              <a:buFont typeface="+mj-lt"/>
+              <a:buAutoNum type="alphaLcParenR"/>
+            </a:pPr>
+            <a:r>
+              <a:rPr lang="de-DE" b="1" dirty="0" smtClean="0"/>
+              <a:t>Auswertung Strommessgerät:</a:t>
+            </a:r>
+            <a:r>
+              <a:rPr lang="de-DE" b="1" dirty="0"/>
+              <a:t> </a:t>
+            </a:r>
+            <a:r>
+              <a:rPr lang="de-DE" dirty="0" smtClean="0"/>
+              <a:t>Auswertung der </a:t>
+            </a:r>
+            <a:r>
+              <a:rPr lang="de-DE" dirty="0" err="1" smtClean="0"/>
+              <a:t>SQLite</a:t>
+            </a:r>
+            <a:r>
+              <a:rPr lang="de-DE" dirty="0" smtClean="0"/>
+              <a:t>-Datenbank auf Windows-VM </a:t>
+            </a:r>
+            <a:endParaRPr lang="de-DE" b="1" dirty="0"/>
+          </a:p>
+          <a:p>
+            <a:pPr lvl="2" indent="-342900">
+              <a:buFont typeface="+mj-lt"/>
+              <a:buAutoNum type="alphaLcParenR"/>
+            </a:pPr>
+            <a:r>
+              <a:rPr lang="de-DE" b="1" dirty="0" smtClean="0"/>
+              <a:t>Automatisierte </a:t>
+            </a:r>
+            <a:r>
+              <a:rPr lang="de-DE" b="1" dirty="0"/>
+              <a:t>Durchführung der </a:t>
+            </a:r>
+            <a:r>
+              <a:rPr lang="de-DE" b="1" dirty="0" smtClean="0"/>
+              <a:t>Messungen:</a:t>
+            </a:r>
+            <a:r>
+              <a:rPr lang="de-DE" dirty="0"/>
+              <a:t> </a:t>
+            </a:r>
+            <a:r>
+              <a:rPr lang="de-DE" dirty="0" smtClean="0"/>
+              <a:t>Realisierung durch </a:t>
+            </a:r>
+            <a:r>
+              <a:rPr lang="de-DE" dirty="0" err="1" smtClean="0"/>
+              <a:t>Shellskripte</a:t>
+            </a:r>
+            <a:r>
+              <a:rPr lang="de-DE" dirty="0" smtClean="0"/>
+              <a:t> (Schwerpunkt HERE-Files zur Navigation zwischen Server und Rechenknoten mit verschiedenen Benutzern)</a:t>
+            </a:r>
+            <a:endParaRPr lang="de-DE" dirty="0"/>
+          </a:p>
+          <a:p>
+            <a:pPr lvl="2" indent="-342900">
+              <a:buFont typeface="+mj-lt"/>
+              <a:buAutoNum type="alphaLcParenR"/>
+            </a:pPr>
+            <a:r>
+              <a:rPr lang="de-DE" b="1" dirty="0" smtClean="0"/>
+              <a:t>Protokollierung </a:t>
+            </a:r>
+            <a:r>
+              <a:rPr lang="de-DE" b="1" dirty="0"/>
+              <a:t>und grafische Aufbereitung der </a:t>
+            </a:r>
+            <a:r>
+              <a:rPr lang="de-DE" b="1" dirty="0" smtClean="0"/>
+              <a:t>Messwerte:</a:t>
+            </a:r>
+            <a:r>
+              <a:rPr lang="de-DE" dirty="0" smtClean="0"/>
+              <a:t> Realisierung durch </a:t>
+            </a:r>
+            <a:r>
+              <a:rPr lang="de-DE" dirty="0" err="1" smtClean="0"/>
+              <a:t>Shellskripte</a:t>
+            </a:r>
+            <a:r>
+              <a:rPr lang="de-DE" dirty="0" smtClean="0"/>
+              <a:t> (Schwerpunkt Kommandozeilen-MySQL); Anpassung des Datenbankschemas an tatsächliche Anforderungen; grafische Aufbereitung mit </a:t>
+            </a:r>
+            <a:r>
+              <a:rPr lang="de-DE" dirty="0" err="1" smtClean="0"/>
+              <a:t>Gnuplot</a:t>
+            </a:r>
+            <a:endParaRPr lang="de-DE" b="1" dirty="0"/>
+          </a:p>
+          <a:p>
+            <a:pPr lvl="2" indent="-342900">
+              <a:buFont typeface="+mj-lt"/>
+              <a:buAutoNum type="alphaLcParenR"/>
+            </a:pPr>
+            <a:r>
+              <a:rPr lang="de-DE" b="1" dirty="0" smtClean="0"/>
+              <a:t>Integration der Fehlerbehebung in Versuchsdurchführung: </a:t>
+            </a:r>
+            <a:r>
+              <a:rPr lang="de-DE" dirty="0" smtClean="0"/>
+              <a:t>Realisierung durch </a:t>
+            </a:r>
+            <a:r>
+              <a:rPr lang="de-DE" dirty="0" err="1" smtClean="0"/>
+              <a:t>Shellskripte</a:t>
+            </a:r>
+            <a:r>
+              <a:rPr lang="de-DE" dirty="0" smtClean="0"/>
+              <a:t>; Aufsichtsperson</a:t>
+            </a:r>
+            <a:r>
+              <a:rPr lang="de-DE" b="1" dirty="0" smtClean="0"/>
+              <a:t> </a:t>
+            </a:r>
+            <a:endParaRPr lang="de-DE" b="1" dirty="0"/>
+          </a:p>
+          <a:p>
+            <a:pPr marL="400050" lvl="1" indent="0">
+              <a:buNone/>
+            </a:pPr>
+            <a:endParaRPr lang="de-DE" dirty="0" smtClean="0"/>
+          </a:p>
+        </p:txBody>
+      </p:sp>
       <p:sp>
         <p:nvSpPr>
           <p:cNvPr id="4" name="Foliennummernplatzhalter 3"/>
@@ -5417,40 +6241,10 @@
           </a:p>
         </p:txBody>
       </p:sp>
-      <p:sp>
-        <p:nvSpPr>
-          <p:cNvPr id="3" name="Textfeld 2"/>
-          <p:cNvSpPr txBox="1"/>
-          <p:nvPr/>
-        </p:nvSpPr>
-        <p:spPr>
-          <a:xfrm>
-            <a:off x="2555776" y="6129300"/>
-            <a:ext cx="4687827" cy="276999"/>
-          </a:xfrm>
-          <a:prstGeom prst="rect">
-            <a:avLst/>
-          </a:prstGeom>
-          <a:noFill/>
-        </p:spPr>
-        <p:txBody>
-          <a:bodyPr wrap="none" rtlCol="0">
-            <a:spAutoFit/>
-          </a:bodyPr>
-          <a:lstStyle/>
-          <a:p>
-            <a:r>
-              <a:rPr lang="de-DE" dirty="0" smtClean="0"/>
-              <a:t>Aktivitätsdiagramm einer Versuchsdurchführung mit 2 Messreihen</a:t>
-            </a:r>
-            <a:endParaRPr lang="de-DE" dirty="0"/>
-          </a:p>
-        </p:txBody>
-      </p:sp>
     </p:spTree>
     <p:extLst>
       <p:ext uri="{BB962C8B-B14F-4D97-AF65-F5344CB8AC3E}">
-        <p14:creationId xmlns:p14="http://schemas.microsoft.com/office/powerpoint/2010/main" val="4032125368"/>
+        <p14:creationId xmlns:p14="http://schemas.microsoft.com/office/powerpoint/2010/main" val="573136144"/>
       </p:ext>
     </p:extLst>
   </p:cSld>
@@ -5668,123 +6462,37 @@
           <a:p>
             <a:r>
               <a:rPr lang="de-DE" sz="1800" dirty="0" smtClean="0"/>
-              <a:t>Ergebnisse	</a:t>
+              <a:t>Ergebnisse</a:t>
             </a:r>
             <a:endParaRPr lang="de-DE" sz="1800" dirty="0"/>
           </a:p>
         </p:txBody>
       </p:sp>
-      <p:sp>
-        <p:nvSpPr>
-          <p:cNvPr id="3" name="Inhaltsplatzhalter 2"/>
-          <p:cNvSpPr>
-            <a:spLocks noGrp="1"/>
-          </p:cNvSpPr>
+      <p:pic>
+        <p:nvPicPr>
+          <p:cNvPr id="6" name="Inhaltsplatzhalter 5" descr="strom6.pdf"/>
+          <p:cNvPicPr>
+            <a:picLocks noGrp="1" noChangeAspect="1"/>
+          </p:cNvPicPr>
           <p:nvPr>
             <p:ph idx="1"/>
           </p:nvPr>
-        </p:nvSpPr>
-        <p:spPr/>
-        <p:txBody>
-          <a:bodyPr/>
-          <a:lstStyle/>
-          <a:p>
-            <a:pPr marL="457200" indent="-457200">
-              <a:buAutoNum type="arabicPeriod"/>
-            </a:pPr>
-            <a:r>
-              <a:rPr lang="de-DE" b="1" dirty="0" smtClean="0"/>
-              <a:t>Strommessung</a:t>
-            </a:r>
-          </a:p>
-          <a:p>
-            <a:pPr marL="400050" lvl="1" indent="0">
-              <a:buNone/>
-            </a:pPr>
-            <a:r>
-              <a:rPr lang="de-DE" b="1" dirty="0" smtClean="0"/>
-              <a:t>1.1 Erwartete Ergebnisse </a:t>
-            </a:r>
-            <a:endParaRPr lang="de-DE" b="1" dirty="0" smtClean="0"/>
-          </a:p>
-          <a:p>
-            <a:pPr marL="685800" lvl="1"/>
-            <a:r>
-              <a:rPr lang="de-DE" dirty="0" smtClean="0"/>
-              <a:t>Deutlich </a:t>
-            </a:r>
-            <a:r>
-              <a:rPr lang="de-DE" dirty="0" smtClean="0"/>
-              <a:t>niedrigerer Stromverbrauch in </a:t>
-            </a:r>
-            <a:r>
-              <a:rPr lang="de-DE" dirty="0" smtClean="0"/>
-              <a:t>Messreihe </a:t>
-            </a:r>
-            <a:r>
-              <a:rPr lang="de-DE" dirty="0" smtClean="0"/>
-              <a:t>2 </a:t>
-            </a:r>
-            <a:r>
-              <a:rPr lang="de-DE" dirty="0" smtClean="0"/>
-              <a:t>als in Messreihe 1 (</a:t>
-            </a:r>
-            <a:r>
-              <a:rPr lang="de-DE" dirty="0" smtClean="0"/>
-              <a:t>nicht aktive Rechenknoten werden heruntergefahren und von Stromversorgung getrennt</a:t>
-            </a:r>
-            <a:r>
-              <a:rPr lang="de-DE" dirty="0" smtClean="0"/>
-              <a:t>)</a:t>
-            </a:r>
-          </a:p>
-          <a:p>
-            <a:pPr marL="685800" lvl="1"/>
-            <a:r>
-              <a:rPr lang="de-DE" dirty="0" smtClean="0"/>
-              <a:t>Abnahme des Stromverbrauchs in Messreihe 2 um einen festen Wert pro abgeschaltetem Rechenknoten</a:t>
-            </a:r>
-            <a:endParaRPr lang="de-DE" dirty="0" smtClean="0"/>
-          </a:p>
-          <a:p>
-            <a:pPr marL="400050" lvl="1" indent="0">
-              <a:buNone/>
-            </a:pPr>
-            <a:r>
-              <a:rPr lang="de-DE" b="1" dirty="0" smtClean="0"/>
-              <a:t>1.2 Erzielte Ergebnisse</a:t>
-            </a:r>
-            <a:endParaRPr lang="de-DE" dirty="0" smtClean="0"/>
-          </a:p>
-          <a:p>
-            <a:pPr marL="685800" lvl="1"/>
-            <a:r>
-              <a:rPr lang="de-DE" dirty="0" smtClean="0"/>
-              <a:t>Abnahme des Stromverbrauchs in Messreihe um 23 W (HPL) bzw. 17 W (STREAM) </a:t>
-            </a:r>
-            <a:endParaRPr lang="de-DE" dirty="0" smtClean="0"/>
-          </a:p>
-          <a:p>
-            <a:pPr marL="685800" lvl="1"/>
-            <a:r>
-              <a:rPr lang="de-DE" dirty="0" smtClean="0"/>
-              <a:t>Abnahme des Stromverbrauchs in Messreihe 2 um 8 W (HPL) bzw. 2 W (STREAM) pro abgeschaltetem Rechenknoten</a:t>
-            </a:r>
-          </a:p>
-          <a:p>
-            <a:pPr marL="685800" lvl="1"/>
-            <a:r>
-              <a:rPr lang="de-DE" b="1" dirty="0" smtClean="0"/>
-              <a:t>Fazit: </a:t>
-            </a:r>
-            <a:r>
-              <a:rPr lang="de-DE" dirty="0" smtClean="0"/>
-              <a:t>Erwartungsgemäßes Skalierungsverhalten</a:t>
-            </a:r>
-            <a:endParaRPr lang="de-DE" dirty="0" smtClean="0"/>
-          </a:p>
-        </p:txBody>
-      </p:sp>
+        </p:nvPicPr>
+        <p:blipFill>
+          <a:blip r:embed="rId3">
+            <a:extLst>
+              <a:ext uri="{28A0092B-C50C-407E-A947-70E740481C1C}">
+                <a14:useLocalDpi xmlns:a14="http://schemas.microsoft.com/office/drawing/2010/main" val="0"/>
+              </a:ext>
+            </a:extLst>
+          </a:blip>
+          <a:srcRect l="-11893" r="-11893"/>
+          <a:stretch>
+            <a:fillRect/>
+          </a:stretch>
+        </p:blipFill>
+        <p:spPr/>
+      </p:pic>
       <p:sp>
         <p:nvSpPr>
           <p:cNvPr id="4" name="Foliennummernplatzhalter 3"/>
@@ -5848,7 +6556,7 @@
     </p:spTree>
     <p:extLst>
       <p:ext uri="{BB962C8B-B14F-4D97-AF65-F5344CB8AC3E}">
-        <p14:creationId xmlns:p14="http://schemas.microsoft.com/office/powerpoint/2010/main" val="2160297191"/>
+        <p14:creationId xmlns:p14="http://schemas.microsoft.com/office/powerpoint/2010/main" val="2983223396"/>
       </p:ext>
     </p:extLst>
   </p:cSld>
@@ -5893,15 +6601,75 @@
           <a:p>
             <a:r>
               <a:rPr lang="de-DE" sz="1800" dirty="0" smtClean="0"/>
-              <a:t>Ergebnisse</a:t>
+              <a:t>Ergebnisse 	</a:t>
             </a:r>
             <a:endParaRPr lang="de-DE" sz="1800" dirty="0"/>
+          </a:p>
+        </p:txBody>
+      </p:sp>
+      <p:sp>
+        <p:nvSpPr>
+          <p:cNvPr id="4" name="Foliennummernplatzhalter 3"/>
+          <p:cNvSpPr>
+            <a:spLocks noGrp="1"/>
+          </p:cNvSpPr>
+          <p:nvPr>
+            <p:ph type="sldNum" sz="quarter" idx="4"/>
+          </p:nvPr>
+        </p:nvSpPr>
+        <p:spPr/>
+        <p:txBody>
+          <a:bodyPr/>
+          <a:lstStyle/>
+          <a:p>
+            <a:pPr>
+              <a:defRPr/>
+            </a:pPr>
+            <a:fld id="{70BFFA52-4234-45F6-B1A6-074E24FF43A2}" type="slidenum">
+              <a:rPr lang="de-DE" smtClean="0"/>
+              <a:pPr>
+                <a:defRPr/>
+              </a:pPr>
+              <a:t>16</a:t>
+            </a:fld>
+            <a:endParaRPr lang="de-DE" dirty="0"/>
+          </a:p>
+        </p:txBody>
+      </p:sp>
+      <p:sp>
+        <p:nvSpPr>
+          <p:cNvPr id="5" name="Fußzeilenplatzhalter 4"/>
+          <p:cNvSpPr>
+            <a:spLocks noGrp="1"/>
+          </p:cNvSpPr>
+          <p:nvPr>
+            <p:ph type="ftr" sz="quarter" idx="3"/>
+          </p:nvPr>
+        </p:nvSpPr>
+        <p:spPr/>
+        <p:txBody>
+          <a:bodyPr/>
+          <a:lstStyle/>
+          <a:p>
+            <a:r>
+              <a:rPr lang="de-DE" dirty="0" smtClean="0"/>
+              <a:t>Skalierungsverhalten eines </a:t>
+            </a:r>
+            <a:r>
+              <a:rPr lang="de-DE" dirty="0" err="1" smtClean="0"/>
+              <a:t>Raspberry</a:t>
+            </a:r>
+            <a:r>
+              <a:rPr lang="de-DE" dirty="0" smtClean="0"/>
+              <a:t> Pi-Clusters mit HPC-Benchmarks</a:t>
+            </a:r>
+            <a:endParaRPr lang="de-DE" dirty="0"/>
           </a:p>
         </p:txBody>
       </p:sp>
       <p:pic>
         <p:nvPicPr>
-          <p:cNvPr id="6" name="Inhaltsplatzhalter 5" descr="strom6.pdf"/>
+          <p:cNvPr id="7" name="Inhaltsplatzhalter 6" descr="strom5.pdf"/>
           <p:cNvPicPr>
             <a:picLocks noGrp="1" noChangeAspect="1"/>
           </p:cNvPicPr>
@@ -5924,70 +6692,10 @@
         </p:blipFill>
         <p:spPr/>
       </p:pic>
-      <p:sp>
-        <p:nvSpPr>
-          <p:cNvPr id="4" name="Foliennummernplatzhalter 3"/>
-          <p:cNvSpPr>
-            <a:spLocks noGrp="1"/>
-          </p:cNvSpPr>
-          <p:nvPr>
-            <p:ph type="sldNum" sz="quarter" idx="4"/>
-          </p:nvPr>
-        </p:nvSpPr>
-        <p:spPr/>
-        <p:txBody>
-          <a:bodyPr/>
-          <a:lstStyle/>
-          <a:p>
-            <a:pPr>
-              <a:defRPr/>
-            </a:pPr>
-            <a:fld id="{70BFFA52-4234-45F6-B1A6-074E24FF43A2}" type="slidenum">
-              <a:rPr lang="de-DE" smtClean="0"/>
-              <a:pPr>
-                <a:defRPr/>
-              </a:pPr>
-              <a:t>16</a:t>
-            </a:fld>
-            <a:endParaRPr lang="de-DE" dirty="0"/>
-          </a:p>
-        </p:txBody>
-      </p:sp>
-      <p:sp>
-        <p:nvSpPr>
-          <p:cNvPr id="5" name="Fußzeilenplatzhalter 4"/>
-          <p:cNvSpPr>
-            <a:spLocks noGrp="1"/>
-          </p:cNvSpPr>
-          <p:nvPr>
-            <p:ph type="ftr" sz="quarter" idx="3"/>
-          </p:nvPr>
-        </p:nvSpPr>
-        <p:spPr/>
-        <p:txBody>
-          <a:bodyPr/>
-          <a:lstStyle/>
-          <a:p>
-            <a:r>
-              <a:rPr lang="de-DE" dirty="0" smtClean="0"/>
-              <a:t>Skalierungsverhalten eines </a:t>
-            </a:r>
-            <a:r>
-              <a:rPr lang="de-DE" dirty="0" err="1" smtClean="0"/>
-              <a:t>Raspberry</a:t>
-            </a:r>
-            <a:r>
-              <a:rPr lang="de-DE" dirty="0" smtClean="0"/>
-              <a:t> Pi-Clusters mit HPC-Benchmarks</a:t>
-            </a:r>
-            <a:endParaRPr lang="de-DE" dirty="0"/>
-          </a:p>
-        </p:txBody>
-      </p:sp>
     </p:spTree>
     <p:extLst>
       <p:ext uri="{BB962C8B-B14F-4D97-AF65-F5344CB8AC3E}">
-        <p14:creationId xmlns:p14="http://schemas.microsoft.com/office/powerpoint/2010/main" val="2983223396"/>
+        <p14:creationId xmlns:p14="http://schemas.microsoft.com/office/powerpoint/2010/main" val="1812769818"/>
       </p:ext>
     </p:extLst>
   </p:cSld>
@@ -6032,9 +6740,98 @@
           <a:p>
             <a:r>
               <a:rPr lang="de-DE" sz="1800" dirty="0" smtClean="0"/>
-              <a:t>Ergebnisse 	</a:t>
+              <a:t>Ergebnisse	</a:t>
             </a:r>
             <a:endParaRPr lang="de-DE" sz="1800" dirty="0"/>
+          </a:p>
+        </p:txBody>
+      </p:sp>
+      <p:sp>
+        <p:nvSpPr>
+          <p:cNvPr id="3" name="Inhaltsplatzhalter 2"/>
+          <p:cNvSpPr>
+            <a:spLocks noGrp="1"/>
+          </p:cNvSpPr>
+          <p:nvPr>
+            <p:ph idx="1"/>
+          </p:nvPr>
+        </p:nvSpPr>
+        <p:spPr/>
+        <p:txBody>
+          <a:bodyPr/>
+          <a:lstStyle/>
+          <a:p>
+            <a:pPr marL="457200" indent="-457200">
+              <a:buAutoNum type="arabicPeriod"/>
+            </a:pPr>
+            <a:r>
+              <a:rPr lang="de-DE" b="1" dirty="0" smtClean="0"/>
+              <a:t>Strommessung</a:t>
+            </a:r>
+          </a:p>
+          <a:p>
+            <a:pPr marL="685800" lvl="1"/>
+            <a:r>
+              <a:rPr lang="de-DE" b="1" dirty="0" smtClean="0"/>
+              <a:t>Erwartete Ergebnisse: </a:t>
+            </a:r>
+            <a:endParaRPr lang="de-DE" b="1" dirty="0" smtClean="0"/>
+          </a:p>
+          <a:p>
+            <a:pPr marL="1085850" lvl="2"/>
+            <a:r>
+              <a:rPr lang="de-DE" dirty="0" smtClean="0"/>
+              <a:t>Deutlich niedrigerer Stromverbrauch in Messreihe 2 als in Messreihe 1 (nicht aktive Rechenknoten werden heruntergefahren und von Stromversorgung getrennt</a:t>
+            </a:r>
+            <a:r>
+              <a:rPr lang="de-DE" dirty="0" smtClean="0"/>
+              <a:t>) </a:t>
+            </a:r>
+            <a:r>
+              <a:rPr lang="de-DE" dirty="0">
+                <a:latin typeface="Zapf Dingbats"/>
+                <a:ea typeface="Zapf Dingbats"/>
+                <a:cs typeface="Zapf Dingbats"/>
+                <a:sym typeface="Zapf Dingbats"/>
+              </a:rPr>
+              <a:t>✓</a:t>
+            </a:r>
+            <a:endParaRPr lang="de-DE" dirty="0" smtClean="0"/>
+          </a:p>
+          <a:p>
+            <a:pPr marL="1085850" lvl="2"/>
+            <a:r>
+              <a:rPr lang="de-DE" dirty="0" smtClean="0"/>
+              <a:t>Abnahme des Stromverbrauchs in Messreihe 2 um einen festen Wert pro abgeschaltetem </a:t>
+            </a:r>
+            <a:r>
+              <a:rPr lang="de-DE" dirty="0" smtClean="0"/>
+              <a:t>Rechenknoten </a:t>
+            </a:r>
+            <a:r>
+              <a:rPr lang="de-DE" dirty="0" smtClean="0">
+                <a:latin typeface="Zapf Dingbats"/>
+                <a:ea typeface="Zapf Dingbats"/>
+                <a:cs typeface="Zapf Dingbats"/>
+                <a:sym typeface="Zapf Dingbats"/>
+              </a:rPr>
+              <a:t>✓</a:t>
+            </a:r>
+          </a:p>
+          <a:p>
+            <a:pPr marL="685800" lvl="1"/>
+            <a:r>
+              <a:rPr lang="de-DE" b="1" dirty="0" smtClean="0"/>
+              <a:t>Fazit</a:t>
+            </a:r>
+            <a:r>
+              <a:rPr lang="de-DE" b="1" dirty="0" smtClean="0"/>
+              <a:t>: </a:t>
+            </a:r>
+            <a:r>
+              <a:rPr lang="de-DE" dirty="0" smtClean="0"/>
+              <a:t>Erwartungsgemäßes Skalierungsverhalten</a:t>
+            </a:r>
           </a:p>
         </p:txBody>
       </p:sp>
@@ -6098,35 +6895,10 @@
           </a:p>
         </p:txBody>
       </p:sp>
-      <p:pic>
-        <p:nvPicPr>
-          <p:cNvPr id="7" name="Inhaltsplatzhalter 6" descr="strom5.pdf"/>
-          <p:cNvPicPr>
-            <a:picLocks noGrp="1" noChangeAspect="1"/>
-          </p:cNvPicPr>
-          <p:nvPr>
-            <p:ph idx="1"/>
-          </p:nvPr>
-        </p:nvPicPr>
-        <p:blipFill>
-          <a:blip r:embed="rId3">
-            <a:extLst>
-              <a:ext uri="{28A0092B-C50C-407E-A947-70E740481C1C}">
-                <a14:useLocalDpi xmlns:a14="http://schemas.microsoft.com/office/drawing/2010/main" val="0"/>
-              </a:ext>
-            </a:extLst>
-          </a:blip>
-          <a:srcRect l="-11893" r="-11893"/>
-          <a:stretch>
-            <a:fillRect/>
-          </a:stretch>
-        </p:blipFill>
-        <p:spPr/>
-      </p:pic>
     </p:spTree>
     <p:extLst>
       <p:ext uri="{BB962C8B-B14F-4D97-AF65-F5344CB8AC3E}">
-        <p14:creationId xmlns:p14="http://schemas.microsoft.com/office/powerpoint/2010/main" val="1812769818"/>
+        <p14:creationId xmlns:p14="http://schemas.microsoft.com/office/powerpoint/2010/main" val="2160297191"/>
       </p:ext>
     </p:extLst>
   </p:cSld>
@@ -6177,139 +6949,31 @@
           </a:p>
         </p:txBody>
       </p:sp>
-      <p:sp>
-        <p:nvSpPr>
-          <p:cNvPr id="3" name="Inhaltsplatzhalter 2"/>
-          <p:cNvSpPr>
-            <a:spLocks noGrp="1"/>
-          </p:cNvSpPr>
+      <p:pic>
+        <p:nvPicPr>
+          <p:cNvPr id="6" name="Inhaltsplatzhalter 5" descr="hpl5.pdf"/>
+          <p:cNvPicPr>
+            <a:picLocks noGrp="1" noChangeAspect="1"/>
+          </p:cNvPicPr>
           <p:nvPr>
             <p:ph idx="1"/>
           </p:nvPr>
-        </p:nvSpPr>
-        <p:spPr/>
-        <p:txBody>
-          <a:bodyPr/>
-          <a:lstStyle/>
-          <a:p>
-            <a:pPr marL="457200" indent="-457200">
-              <a:buFont typeface="+mj-lt"/>
-              <a:buAutoNum type="arabicPeriod" startAt="2"/>
-            </a:pPr>
-            <a:r>
-              <a:rPr lang="de-DE" b="1" dirty="0" smtClean="0"/>
-              <a:t>HPL</a:t>
-            </a:r>
-          </a:p>
-          <a:p>
-            <a:pPr marL="400050" lvl="1" indent="0">
-              <a:buNone/>
-            </a:pPr>
-            <a:r>
-              <a:rPr lang="de-DE" b="1" dirty="0" smtClean="0"/>
-              <a:t>2.1 Erwartete Ergebnisse </a:t>
-            </a:r>
-          </a:p>
-          <a:p>
-            <a:pPr marL="685800" lvl="1"/>
-            <a:r>
-              <a:rPr lang="de-DE" dirty="0" smtClean="0"/>
-              <a:t>Lineares Skalierungsverhalten des </a:t>
-            </a:r>
-            <a:r>
-              <a:rPr lang="de-DE" dirty="0" err="1" smtClean="0"/>
-              <a:t>Bramble</a:t>
-            </a:r>
-            <a:r>
-              <a:rPr lang="de-DE" dirty="0" smtClean="0"/>
-              <a:t> bei Hinzunahme von Ressourcen bzgl. Ausführungsrate</a:t>
-            </a:r>
-          </a:p>
-          <a:p>
-            <a:pPr marL="685800" lvl="1"/>
-            <a:r>
-              <a:rPr lang="de-DE" dirty="0"/>
-              <a:t>Lineares Skalierungsverhalten des </a:t>
-            </a:r>
-            <a:r>
-              <a:rPr lang="de-DE" dirty="0" err="1"/>
-              <a:t>Bramble</a:t>
-            </a:r>
-            <a:r>
-              <a:rPr lang="de-DE" dirty="0"/>
-              <a:t> bei Hinzunahme von Ressourcen bzgl. </a:t>
-            </a:r>
-            <a:r>
-              <a:rPr lang="de-DE" dirty="0" smtClean="0"/>
-              <a:t>Ausführungsdauer</a:t>
-            </a:r>
-          </a:p>
-          <a:p>
-            <a:pPr marL="685800" lvl="1"/>
-            <a:r>
-              <a:rPr lang="de-DE" dirty="0" smtClean="0"/>
-              <a:t>Gleichartiges </a:t>
-            </a:r>
-            <a:r>
-              <a:rPr lang="de-DE" dirty="0"/>
-              <a:t>Skalierungsverhalten </a:t>
-            </a:r>
-            <a:r>
-              <a:rPr lang="de-DE" dirty="0" smtClean="0"/>
-              <a:t>in Messreihe 1 und Messreihe 2</a:t>
-            </a:r>
-            <a:endParaRPr lang="de-DE" b="1" dirty="0" smtClean="0"/>
-          </a:p>
-          <a:p>
-            <a:pPr marL="400050" lvl="1" indent="0">
-              <a:buNone/>
-            </a:pPr>
-            <a:r>
-              <a:rPr lang="de-DE" b="1" dirty="0" smtClean="0"/>
-              <a:t>2.2 Erzielte Ergebnisse</a:t>
-            </a:r>
-            <a:endParaRPr lang="de-DE" dirty="0" smtClean="0"/>
-          </a:p>
-          <a:p>
-            <a:pPr marL="685800" lvl="1"/>
-            <a:r>
-              <a:rPr lang="de-DE" dirty="0" smtClean="0"/>
-              <a:t>Erwartungsgemäßes Skalierungsverhalten des </a:t>
-            </a:r>
-            <a:r>
-              <a:rPr lang="de-DE" dirty="0" err="1" smtClean="0"/>
-              <a:t>Bramble</a:t>
-            </a:r>
-            <a:r>
-              <a:rPr lang="de-DE" dirty="0" smtClean="0"/>
-              <a:t> bzgl. CPU-Performance bei paralleler Ausführung von HPL (Ausführungsrate + Ausführungsdauer)</a:t>
-            </a:r>
-          </a:p>
-          <a:p>
-            <a:pPr marL="685800" lvl="1"/>
-            <a:r>
-              <a:rPr lang="de-DE" dirty="0" smtClean="0"/>
-              <a:t>Gleichartiges Skalierungsverhalten in Messreihe 1 und Messreihe 2 bzgl. CPU-</a:t>
-            </a:r>
-            <a:r>
-              <a:rPr lang="de-DE" dirty="0" smtClean="0"/>
-              <a:t>Performance</a:t>
-            </a:r>
-          </a:p>
-          <a:p>
-            <a:pPr marL="685800" lvl="1"/>
-            <a:r>
-              <a:rPr lang="de-DE" b="1" dirty="0" smtClean="0"/>
-              <a:t>Fazit:</a:t>
-            </a:r>
-            <a:r>
-              <a:rPr lang="de-DE" dirty="0" smtClean="0"/>
-              <a:t> Erwartungsgemäßes Skalierungsverhalten</a:t>
-            </a:r>
-            <a:endParaRPr lang="de-DE" dirty="0" smtClean="0"/>
-          </a:p>
-        </p:txBody>
-      </p:sp>
+        </p:nvPicPr>
+        <p:blipFill>
+          <a:blip r:embed="rId3">
+            <a:extLst>
+              <a:ext uri="{28A0092B-C50C-407E-A947-70E740481C1C}">
+                <a14:useLocalDpi xmlns:a14="http://schemas.microsoft.com/office/drawing/2010/main" val="0"/>
+              </a:ext>
+            </a:extLst>
+          </a:blip>
+          <a:srcRect l="-11893" r="-11893"/>
+          <a:stretch>
+            <a:fillRect/>
+          </a:stretch>
+        </p:blipFill>
+        <p:spPr/>
+      </p:pic>
       <p:sp>
         <p:nvSpPr>
           <p:cNvPr id="4" name="Foliennummernplatzhalter 3"/>
@@ -6373,7 +7037,7 @@
     </p:spTree>
     <p:extLst>
       <p:ext uri="{BB962C8B-B14F-4D97-AF65-F5344CB8AC3E}">
-        <p14:creationId xmlns:p14="http://schemas.microsoft.com/office/powerpoint/2010/main" val="3034494494"/>
+        <p14:creationId xmlns:p14="http://schemas.microsoft.com/office/powerpoint/2010/main" val="3524707835"/>
       </p:ext>
     </p:extLst>
   </p:cSld>
@@ -6424,9 +7088,69 @@
           </a:p>
         </p:txBody>
       </p:sp>
+      <p:sp>
+        <p:nvSpPr>
+          <p:cNvPr id="4" name="Foliennummernplatzhalter 3"/>
+          <p:cNvSpPr>
+            <a:spLocks noGrp="1"/>
+          </p:cNvSpPr>
+          <p:nvPr>
+            <p:ph type="sldNum" sz="quarter" idx="4"/>
+          </p:nvPr>
+        </p:nvSpPr>
+        <p:spPr/>
+        <p:txBody>
+          <a:bodyPr/>
+          <a:lstStyle/>
+          <a:p>
+            <a:pPr>
+              <a:defRPr/>
+            </a:pPr>
+            <a:fld id="{70BFFA52-4234-45F6-B1A6-074E24FF43A2}" type="slidenum">
+              <a:rPr lang="de-DE" smtClean="0"/>
+              <a:pPr>
+                <a:defRPr/>
+              </a:pPr>
+              <a:t>19</a:t>
+            </a:fld>
+            <a:endParaRPr lang="de-DE" dirty="0"/>
+          </a:p>
+        </p:txBody>
+      </p:sp>
+      <p:sp>
+        <p:nvSpPr>
+          <p:cNvPr id="5" name="Fußzeilenplatzhalter 4"/>
+          <p:cNvSpPr>
+            <a:spLocks noGrp="1"/>
+          </p:cNvSpPr>
+          <p:nvPr>
+            <p:ph type="ftr" sz="quarter" idx="3"/>
+          </p:nvPr>
+        </p:nvSpPr>
+        <p:spPr/>
+        <p:txBody>
+          <a:bodyPr/>
+          <a:lstStyle/>
+          <a:p>
+            <a:r>
+              <a:rPr lang="de-DE" dirty="0" smtClean="0"/>
+              <a:t>Skalierungsverhalten eines </a:t>
+            </a:r>
+            <a:r>
+              <a:rPr lang="de-DE" dirty="0" err="1" smtClean="0"/>
+              <a:t>Raspberry</a:t>
+            </a:r>
+            <a:r>
+              <a:rPr lang="de-DE" dirty="0" smtClean="0"/>
+              <a:t> Pi-Clusters mit HPC-Benchmarks</a:t>
+            </a:r>
+            <a:endParaRPr lang="de-DE" dirty="0"/>
+          </a:p>
+        </p:txBody>
+      </p:sp>
       <p:pic>
         <p:nvPicPr>
-          <p:cNvPr id="6" name="Inhaltsplatzhalter 5" descr="hpl5.pdf"/>
+          <p:cNvPr id="7" name="Inhaltsplatzhalter 6" descr="hpl6.pdf"/>
           <p:cNvPicPr>
             <a:picLocks noGrp="1" noChangeAspect="1"/>
           </p:cNvPicPr>
@@ -6449,70 +7173,10 @@
         </p:blipFill>
         <p:spPr/>
       </p:pic>
-      <p:sp>
-        <p:nvSpPr>
-          <p:cNvPr id="4" name="Foliennummernplatzhalter 3"/>
-          <p:cNvSpPr>
-            <a:spLocks noGrp="1"/>
-          </p:cNvSpPr>
-          <p:nvPr>
-            <p:ph type="sldNum" sz="quarter" idx="4"/>
-          </p:nvPr>
-        </p:nvSpPr>
-        <p:spPr/>
-        <p:txBody>
-          <a:bodyPr/>
-          <a:lstStyle/>
-          <a:p>
-            <a:pPr>
-              <a:defRPr/>
-            </a:pPr>
-            <a:fld id="{70BFFA52-4234-45F6-B1A6-074E24FF43A2}" type="slidenum">
-              <a:rPr lang="de-DE" smtClean="0"/>
-              <a:pPr>
-                <a:defRPr/>
-              </a:pPr>
-              <a:t>19</a:t>
-            </a:fld>
-            <a:endParaRPr lang="de-DE" dirty="0"/>
-          </a:p>
-        </p:txBody>
-      </p:sp>
-      <p:sp>
-        <p:nvSpPr>
-          <p:cNvPr id="5" name="Fußzeilenplatzhalter 4"/>
-          <p:cNvSpPr>
-            <a:spLocks noGrp="1"/>
-          </p:cNvSpPr>
-          <p:nvPr>
-            <p:ph type="ftr" sz="quarter" idx="3"/>
-          </p:nvPr>
-        </p:nvSpPr>
-        <p:spPr/>
-        <p:txBody>
-          <a:bodyPr/>
-          <a:lstStyle/>
-          <a:p>
-            <a:r>
-              <a:rPr lang="de-DE" dirty="0" smtClean="0"/>
-              <a:t>Skalierungsverhalten eines </a:t>
-            </a:r>
-            <a:r>
-              <a:rPr lang="de-DE" dirty="0" err="1" smtClean="0"/>
-              <a:t>Raspberry</a:t>
-            </a:r>
-            <a:r>
-              <a:rPr lang="de-DE" dirty="0" smtClean="0"/>
-              <a:t> Pi-Clusters mit HPC-Benchmarks</a:t>
-            </a:r>
-            <a:endParaRPr lang="de-DE" dirty="0"/>
-          </a:p>
-        </p:txBody>
-      </p:sp>
     </p:spTree>
     <p:extLst>
       <p:ext uri="{BB962C8B-B14F-4D97-AF65-F5344CB8AC3E}">
-        <p14:creationId xmlns:p14="http://schemas.microsoft.com/office/powerpoint/2010/main" val="3524707835"/>
+        <p14:creationId xmlns:p14="http://schemas.microsoft.com/office/powerpoint/2010/main" val="2852590459"/>
       </p:ext>
     </p:extLst>
   </p:cSld>
@@ -6843,6 +7507,142 @@
       </p:sp>
       <p:sp>
         <p:nvSpPr>
+          <p:cNvPr id="3" name="Inhaltsplatzhalter 2"/>
+          <p:cNvSpPr>
+            <a:spLocks noGrp="1"/>
+          </p:cNvSpPr>
+          <p:nvPr>
+            <p:ph idx="1"/>
+          </p:nvPr>
+        </p:nvSpPr>
+        <p:spPr/>
+        <p:txBody>
+          <a:bodyPr/>
+          <a:lstStyle/>
+          <a:p>
+            <a:pPr marL="457200" indent="-457200">
+              <a:buFont typeface="+mj-lt"/>
+              <a:buAutoNum type="arabicPeriod" startAt="2"/>
+            </a:pPr>
+            <a:r>
+              <a:rPr lang="de-DE" b="1" dirty="0" smtClean="0"/>
+              <a:t>HPL</a:t>
+            </a:r>
+          </a:p>
+          <a:p>
+            <a:pPr marL="685800" lvl="1"/>
+            <a:r>
+              <a:rPr lang="de-DE" b="1" dirty="0" smtClean="0"/>
+              <a:t>Erwartete Ergebnisse: </a:t>
+            </a:r>
+            <a:endParaRPr lang="de-DE" b="1" dirty="0" smtClean="0"/>
+          </a:p>
+          <a:p>
+            <a:pPr marL="1085850" lvl="2"/>
+            <a:r>
+              <a:rPr lang="de-DE" dirty="0" smtClean="0"/>
+              <a:t>Lineares Skalierungsverhalten des </a:t>
+            </a:r>
+            <a:r>
+              <a:rPr lang="de-DE" dirty="0" err="1" smtClean="0"/>
+              <a:t>Bramble</a:t>
+            </a:r>
+            <a:r>
+              <a:rPr lang="de-DE" dirty="0" smtClean="0"/>
+              <a:t> bei Hinzunahme von Ressourcen bzgl. </a:t>
+            </a:r>
+            <a:r>
+              <a:rPr lang="de-DE" dirty="0" smtClean="0"/>
+              <a:t>Ausführungsrate </a:t>
+            </a:r>
+            <a:r>
+              <a:rPr lang="de-DE" dirty="0">
+                <a:latin typeface="Zapf Dingbats"/>
+                <a:ea typeface="Zapf Dingbats"/>
+                <a:cs typeface="Zapf Dingbats"/>
+                <a:sym typeface="Zapf Dingbats"/>
+              </a:rPr>
+              <a:t>✓</a:t>
+            </a:r>
+            <a:endParaRPr lang="de-DE" dirty="0" smtClean="0"/>
+          </a:p>
+          <a:p>
+            <a:pPr marL="1085850" lvl="2"/>
+            <a:r>
+              <a:rPr lang="de-DE" dirty="0"/>
+              <a:t>Lineares Skalierungsverhalten des </a:t>
+            </a:r>
+            <a:r>
+              <a:rPr lang="de-DE" dirty="0" err="1"/>
+              <a:t>Bramble</a:t>
+            </a:r>
+            <a:r>
+              <a:rPr lang="de-DE" dirty="0"/>
+              <a:t> bei Hinzunahme von Ressourcen bzgl. </a:t>
+            </a:r>
+            <a:r>
+              <a:rPr lang="de-DE" dirty="0" smtClean="0"/>
+              <a:t>Ausführungsdauer </a:t>
+            </a:r>
+            <a:r>
+              <a:rPr lang="de-DE" dirty="0">
+                <a:latin typeface="Zapf Dingbats"/>
+                <a:ea typeface="Zapf Dingbats"/>
+                <a:cs typeface="Zapf Dingbats"/>
+                <a:sym typeface="Zapf Dingbats"/>
+              </a:rPr>
+              <a:t>✓</a:t>
+            </a:r>
+            <a:endParaRPr lang="de-DE" dirty="0" smtClean="0"/>
+          </a:p>
+          <a:p>
+            <a:pPr marL="1085850" lvl="2"/>
+            <a:r>
+              <a:rPr lang="de-DE" dirty="0" smtClean="0"/>
+              <a:t>Gleichartiges </a:t>
+            </a:r>
+            <a:r>
+              <a:rPr lang="de-DE" dirty="0"/>
+              <a:t>Skalierungsverhalten </a:t>
+            </a:r>
+            <a:r>
+              <a:rPr lang="de-DE" dirty="0" smtClean="0"/>
+              <a:t>in Messreihe 1 und Messreihe </a:t>
+            </a:r>
+            <a:r>
+              <a:rPr lang="de-DE" dirty="0" smtClean="0"/>
+              <a:t>2 </a:t>
+            </a:r>
+            <a:r>
+              <a:rPr lang="de-DE" dirty="0">
+                <a:latin typeface="Zapf Dingbats"/>
+                <a:ea typeface="Zapf Dingbats"/>
+                <a:cs typeface="Zapf Dingbats"/>
+                <a:sym typeface="Zapf Dingbats"/>
+              </a:rPr>
+              <a:t>✓</a:t>
+            </a:r>
+            <a:endParaRPr lang="de-DE" b="1" dirty="0"/>
+          </a:p>
+          <a:p>
+            <a:pPr marL="685800" lvl="1"/>
+            <a:r>
+              <a:rPr lang="de-DE" b="1" dirty="0" smtClean="0"/>
+              <a:t>Fazit</a:t>
+            </a:r>
+            <a:r>
+              <a:rPr lang="de-DE" b="1" dirty="0" smtClean="0"/>
+              <a:t>:</a:t>
+            </a:r>
+            <a:r>
+              <a:rPr lang="de-DE" dirty="0" smtClean="0"/>
+              <a:t> Erwartungsgemäßes Skalierungsverhalten</a:t>
+            </a:r>
+          </a:p>
+        </p:txBody>
+      </p:sp>
+      <p:sp>
+        <p:nvSpPr>
           <p:cNvPr id="4" name="Foliennummernplatzhalter 3"/>
           <p:cNvSpPr>
             <a:spLocks noGrp="1"/>
@@ -6901,35 +7701,10 @@
           </a:p>
         </p:txBody>
       </p:sp>
-      <p:pic>
-        <p:nvPicPr>
-          <p:cNvPr id="7" name="Inhaltsplatzhalter 6" descr="hpl6.pdf"/>
-          <p:cNvPicPr>
-            <a:picLocks noGrp="1" noChangeAspect="1"/>
-          </p:cNvPicPr>
-          <p:nvPr>
-            <p:ph idx="1"/>
-          </p:nvPr>
-        </p:nvPicPr>
-        <p:blipFill>
-          <a:blip r:embed="rId3">
-            <a:extLst>
-              <a:ext uri="{28A0092B-C50C-407E-A947-70E740481C1C}">
-                <a14:useLocalDpi xmlns:a14="http://schemas.microsoft.com/office/drawing/2010/main" val="0"/>
-              </a:ext>
-            </a:extLst>
-          </a:blip>
-          <a:srcRect l="-11893" r="-11893"/>
-          <a:stretch>
-            <a:fillRect/>
-          </a:stretch>
-        </p:blipFill>
-        <p:spPr/>
-      </p:pic>
     </p:spTree>
     <p:extLst>
       <p:ext uri="{BB962C8B-B14F-4D97-AF65-F5344CB8AC3E}">
-        <p14:creationId xmlns:p14="http://schemas.microsoft.com/office/powerpoint/2010/main" val="2852590459"/>
+        <p14:creationId xmlns:p14="http://schemas.microsoft.com/office/powerpoint/2010/main" val="3034494494"/>
       </p:ext>
     </p:extLst>
   </p:cSld>
@@ -6982,191 +7757,6 @@
       </p:sp>
       <p:sp>
         <p:nvSpPr>
-          <p:cNvPr id="3" name="Inhaltsplatzhalter 2"/>
-          <p:cNvSpPr>
-            <a:spLocks noGrp="1"/>
-          </p:cNvSpPr>
-          <p:nvPr>
-            <p:ph idx="1"/>
-          </p:nvPr>
-        </p:nvSpPr>
-        <p:spPr/>
-        <p:txBody>
-          <a:bodyPr/>
-          <a:lstStyle/>
-          <a:p>
-            <a:pPr marL="457200" indent="-457200">
-              <a:buFont typeface="+mj-lt"/>
-              <a:buAutoNum type="arabicPeriod" startAt="3"/>
-            </a:pPr>
-            <a:r>
-              <a:rPr lang="de-DE" b="1" dirty="0" smtClean="0"/>
-              <a:t>STREAM</a:t>
-            </a:r>
-          </a:p>
-          <a:p>
-            <a:pPr marL="400050" lvl="1" indent="0">
-              <a:buNone/>
-            </a:pPr>
-            <a:r>
-              <a:rPr lang="de-DE" b="1" dirty="0" smtClean="0"/>
-              <a:t>3.1 Erwartete Ergebnisse </a:t>
-            </a:r>
-          </a:p>
-          <a:p>
-            <a:pPr marL="685800" lvl="1"/>
-            <a:r>
-              <a:rPr lang="de-DE" dirty="0" smtClean="0"/>
-              <a:t>Lineares Skalierungsverhalten des </a:t>
-            </a:r>
-            <a:r>
-              <a:rPr lang="de-DE" dirty="0" err="1" smtClean="0"/>
-              <a:t>Bramble</a:t>
-            </a:r>
-            <a:r>
-              <a:rPr lang="de-DE" dirty="0" smtClean="0"/>
-              <a:t> bei Hinzunahme von Ressourcen bzgl. Ausführungsrate</a:t>
-            </a:r>
-          </a:p>
-          <a:p>
-            <a:pPr marL="685800" lvl="1"/>
-            <a:r>
-              <a:rPr lang="de-DE" dirty="0" smtClean="0"/>
-              <a:t>Konstantes </a:t>
-            </a:r>
-            <a:r>
-              <a:rPr lang="de-DE" dirty="0"/>
-              <a:t>Skalierungsverhalten des </a:t>
-            </a:r>
-            <a:r>
-              <a:rPr lang="de-DE" dirty="0" err="1"/>
-              <a:t>Bramble</a:t>
-            </a:r>
-            <a:r>
-              <a:rPr lang="de-DE" dirty="0"/>
-              <a:t> bei Hinzunahme von Ressourcen bzgl. </a:t>
-            </a:r>
-            <a:r>
-              <a:rPr lang="de-DE" dirty="0" smtClean="0"/>
-              <a:t>Ausführungsdauer</a:t>
-            </a:r>
-          </a:p>
-          <a:p>
-            <a:pPr marL="685800" lvl="1"/>
-            <a:r>
-              <a:rPr lang="de-DE" dirty="0" smtClean="0"/>
-              <a:t>Gleichartiges </a:t>
-            </a:r>
-            <a:r>
-              <a:rPr lang="de-DE" dirty="0"/>
-              <a:t>Skalierungsverhalten </a:t>
-            </a:r>
-            <a:r>
-              <a:rPr lang="de-DE" dirty="0" smtClean="0"/>
-              <a:t>in Messreihe 1 und Messreihe 2</a:t>
-            </a:r>
-            <a:endParaRPr lang="de-DE" b="1" dirty="0" smtClean="0"/>
-          </a:p>
-          <a:p>
-            <a:pPr marL="400050" lvl="1" indent="0">
-              <a:buNone/>
-            </a:pPr>
-            <a:r>
-              <a:rPr lang="de-DE" b="1" dirty="0" smtClean="0"/>
-              <a:t>3.2 Erzielte Ergebnisse</a:t>
-            </a:r>
-            <a:endParaRPr lang="de-DE" dirty="0" smtClean="0"/>
-          </a:p>
-          <a:p>
-            <a:pPr marL="685800" lvl="1"/>
-            <a:r>
-              <a:rPr lang="de-DE" dirty="0" smtClean="0"/>
-              <a:t>Erwartungsgemäßes Skalierungsverhalten des </a:t>
-            </a:r>
-            <a:r>
-              <a:rPr lang="de-DE" dirty="0" err="1" smtClean="0"/>
-              <a:t>Bramble</a:t>
-            </a:r>
-            <a:r>
-              <a:rPr lang="de-DE" dirty="0" smtClean="0"/>
-              <a:t> bzgl. </a:t>
-            </a:r>
-            <a:r>
-              <a:rPr lang="de-DE" dirty="0" smtClean="0"/>
-              <a:t>Durchsatz Hauptspeicherzugriffe </a:t>
-            </a:r>
-            <a:r>
-              <a:rPr lang="de-DE" dirty="0" smtClean="0"/>
-              <a:t>bei paralleler Ausführung von STREAM (Ausführungsrate + Ausführungsdauer) für </a:t>
-            </a:r>
-            <a:r>
-              <a:rPr lang="de-DE" dirty="0" err="1" smtClean="0"/>
-              <a:t>n</a:t>
-            </a:r>
-            <a:r>
-              <a:rPr lang="de-DE" dirty="0" smtClean="0"/>
-              <a:t> </a:t>
-            </a:r>
-            <a:r>
-              <a:rPr lang="de-DE" dirty="0" smtClean="0"/>
-              <a:t>≤ 17 </a:t>
-            </a:r>
-            <a:r>
-              <a:rPr lang="de-DE" dirty="0" smtClean="0"/>
-              <a:t>Rechenknoten </a:t>
-            </a:r>
-          </a:p>
-          <a:p>
-            <a:pPr marL="685800" lvl="1"/>
-            <a:r>
-              <a:rPr lang="de-DE" dirty="0" smtClean="0"/>
-              <a:t>Gleichartiges Skalierungsverhalten in Messreihe 1 und Messreihe 2 bzgl. Durchsatz </a:t>
-            </a:r>
-            <a:r>
-              <a:rPr lang="de-DE" dirty="0" smtClean="0"/>
-              <a:t>Hauptspeicher</a:t>
-            </a:r>
-            <a:r>
-              <a:rPr lang="de-DE" dirty="0" smtClean="0"/>
-              <a:t>z</a:t>
-            </a:r>
-            <a:r>
-              <a:rPr lang="de-DE" dirty="0" smtClean="0"/>
-              <a:t>ugriffe </a:t>
-            </a:r>
-          </a:p>
-          <a:p>
-            <a:pPr marL="685800" lvl="1"/>
-            <a:r>
-              <a:rPr lang="de-DE" b="1" dirty="0" smtClean="0"/>
-              <a:t>Fazit:</a:t>
-            </a:r>
-            <a:r>
-              <a:rPr lang="de-DE" dirty="0" smtClean="0"/>
-              <a:t> Erwartungsgemäßes Skalierungsverhalten für </a:t>
-            </a:r>
-            <a:r>
-              <a:rPr lang="de-DE" dirty="0" err="1" smtClean="0"/>
-              <a:t>n</a:t>
-            </a:r>
-            <a:r>
-              <a:rPr lang="de-DE" dirty="0" smtClean="0"/>
-              <a:t> </a:t>
-            </a:r>
-            <a:r>
-              <a:rPr lang="de-DE" dirty="0"/>
-              <a:t>≤</a:t>
-            </a:r>
-            <a:r>
-              <a:rPr lang="de-DE" dirty="0" smtClean="0"/>
-              <a:t> 17 Rechenknoten</a:t>
-            </a:r>
-            <a:endParaRPr lang="de-DE" dirty="0" smtClean="0"/>
-          </a:p>
-        </p:txBody>
-      </p:sp>
-      <p:sp>
-        <p:nvSpPr>
           <p:cNvPr id="4" name="Foliennummernplatzhalter 3"/>
           <p:cNvSpPr>
             <a:spLocks noGrp="1"/>
@@ -7225,10 +7815,35 @@
           </a:p>
         </p:txBody>
       </p:sp>
+      <p:pic>
+        <p:nvPicPr>
+          <p:cNvPr id="6" name="Inhaltsplatzhalter 5" descr="stream5.pdf"/>
+          <p:cNvPicPr>
+            <a:picLocks noGrp="1" noChangeAspect="1"/>
+          </p:cNvPicPr>
+          <p:nvPr>
+            <p:ph idx="1"/>
+          </p:nvPr>
+        </p:nvPicPr>
+        <p:blipFill>
+          <a:blip r:embed="rId3">
+            <a:extLst>
+              <a:ext uri="{28A0092B-C50C-407E-A947-70E740481C1C}">
+                <a14:useLocalDpi xmlns:a14="http://schemas.microsoft.com/office/drawing/2010/main" val="0"/>
+              </a:ext>
+            </a:extLst>
+          </a:blip>
+          <a:srcRect l="-11893" r="-11893"/>
+          <a:stretch>
+            <a:fillRect/>
+          </a:stretch>
+        </p:blipFill>
+        <p:spPr/>
+      </p:pic>
     </p:spTree>
     <p:extLst>
       <p:ext uri="{BB962C8B-B14F-4D97-AF65-F5344CB8AC3E}">
-        <p14:creationId xmlns:p14="http://schemas.microsoft.com/office/powerpoint/2010/main" val="346354108"/>
+        <p14:creationId xmlns:p14="http://schemas.microsoft.com/office/powerpoint/2010/main" val="4095032389"/>
       </p:ext>
     </p:extLst>
   </p:cSld>
@@ -7341,7 +7956,7 @@
       </p:sp>
       <p:pic>
         <p:nvPicPr>
-          <p:cNvPr id="6" name="Inhaltsplatzhalter 5" descr="stream5.pdf"/>
+          <p:cNvPr id="7" name="Inhaltsplatzhalter 6" descr="stream6.pdf"/>
           <p:cNvPicPr>
             <a:picLocks noGrp="1" noChangeAspect="1"/>
           </p:cNvPicPr>
@@ -7367,7 +7982,7 @@
     </p:spTree>
     <p:extLst>
       <p:ext uri="{BB962C8B-B14F-4D97-AF65-F5344CB8AC3E}">
-        <p14:creationId xmlns:p14="http://schemas.microsoft.com/office/powerpoint/2010/main" val="4095032389"/>
+        <p14:creationId xmlns:p14="http://schemas.microsoft.com/office/powerpoint/2010/main" val="3639631481"/>
       </p:ext>
     </p:extLst>
   </p:cSld>
@@ -7420,6 +8035,186 @@
       </p:sp>
       <p:sp>
         <p:nvSpPr>
+          <p:cNvPr id="3" name="Inhaltsplatzhalter 2"/>
+          <p:cNvSpPr>
+            <a:spLocks noGrp="1"/>
+          </p:cNvSpPr>
+          <p:nvPr>
+            <p:ph idx="1"/>
+          </p:nvPr>
+        </p:nvSpPr>
+        <p:spPr/>
+        <p:txBody>
+          <a:bodyPr/>
+          <a:lstStyle/>
+          <a:p>
+            <a:pPr marL="457200" indent="-457200">
+              <a:buFont typeface="+mj-lt"/>
+              <a:buAutoNum type="arabicPeriod" startAt="3"/>
+            </a:pPr>
+            <a:r>
+              <a:rPr lang="de-DE" b="1" dirty="0" smtClean="0"/>
+              <a:t>STREAM</a:t>
+            </a:r>
+          </a:p>
+          <a:p>
+            <a:pPr marL="685800" lvl="1"/>
+            <a:r>
+              <a:rPr lang="de-DE" b="1" dirty="0" smtClean="0"/>
+              <a:t>Erwartete Ergebnisse: </a:t>
+            </a:r>
+            <a:endParaRPr lang="de-DE" b="1" dirty="0" smtClean="0"/>
+          </a:p>
+          <a:p>
+            <a:pPr marL="1085850" lvl="2"/>
+            <a:r>
+              <a:rPr lang="de-DE" dirty="0" smtClean="0"/>
+              <a:t>Lineares Skalierungsverhalten des </a:t>
+            </a:r>
+            <a:r>
+              <a:rPr lang="de-DE" dirty="0" err="1" smtClean="0"/>
+              <a:t>Bramble</a:t>
+            </a:r>
+            <a:r>
+              <a:rPr lang="de-DE" dirty="0" smtClean="0"/>
+              <a:t> bei Hinzunahme von Ressourcen bzgl. </a:t>
+            </a:r>
+            <a:r>
+              <a:rPr lang="de-DE" dirty="0"/>
+              <a:t>Ausführungsrate </a:t>
+            </a:r>
+            <a:r>
+              <a:rPr lang="de-DE" dirty="0" smtClean="0">
+                <a:latin typeface="Zapf Dingbats"/>
+                <a:ea typeface="Zapf Dingbats"/>
+                <a:cs typeface="Zapf Dingbats"/>
+                <a:sym typeface="Zapf Dingbats"/>
+              </a:rPr>
+              <a:t>✓ </a:t>
+            </a:r>
+            <a:r>
+              <a:rPr lang="de-DE" dirty="0"/>
+              <a:t>(für </a:t>
+            </a:r>
+            <a:r>
+              <a:rPr lang="de-DE" dirty="0" err="1"/>
+              <a:t>n</a:t>
+            </a:r>
+            <a:r>
+              <a:rPr lang="de-DE" dirty="0"/>
+              <a:t> ≤ 17 Rechenknoten)</a:t>
+            </a:r>
+            <a:endParaRPr lang="de-DE" dirty="0" smtClean="0"/>
+          </a:p>
+          <a:p>
+            <a:pPr marL="1085850" lvl="2"/>
+            <a:r>
+              <a:rPr lang="de-DE" dirty="0" smtClean="0"/>
+              <a:t>Konstantes </a:t>
+            </a:r>
+            <a:r>
+              <a:rPr lang="de-DE" dirty="0"/>
+              <a:t>Skalierungsverhalten des </a:t>
+            </a:r>
+            <a:r>
+              <a:rPr lang="de-DE" dirty="0" err="1"/>
+              <a:t>Bramble</a:t>
+            </a:r>
+            <a:r>
+              <a:rPr lang="de-DE" dirty="0"/>
+              <a:t> bei Hinzunahme von Ressourcen bzgl. </a:t>
+            </a:r>
+            <a:r>
+              <a:rPr lang="de-DE" dirty="0" smtClean="0"/>
+              <a:t>Ausführungsdauer </a:t>
+            </a:r>
+            <a:r>
+              <a:rPr lang="de-DE" dirty="0" smtClean="0">
+                <a:latin typeface="Zapf Dingbats"/>
+                <a:ea typeface="Zapf Dingbats"/>
+                <a:cs typeface="Zapf Dingbats"/>
+                <a:sym typeface="Zapf Dingbats"/>
+              </a:rPr>
+              <a:t>✓ </a:t>
+            </a:r>
+            <a:r>
+              <a:rPr lang="de-DE" dirty="0"/>
+              <a:t>(für </a:t>
+            </a:r>
+            <a:r>
+              <a:rPr lang="de-DE" dirty="0" err="1"/>
+              <a:t>n</a:t>
+            </a:r>
+            <a:r>
+              <a:rPr lang="de-DE" dirty="0"/>
+              <a:t> ≤ 17 Rechenknoten)</a:t>
+            </a:r>
+            <a:endParaRPr lang="de-DE" dirty="0" smtClean="0"/>
+          </a:p>
+          <a:p>
+            <a:pPr marL="1085850" lvl="2"/>
+            <a:r>
+              <a:rPr lang="de-DE" dirty="0" smtClean="0"/>
+              <a:t>Gleichartiges </a:t>
+            </a:r>
+            <a:r>
+              <a:rPr lang="de-DE" dirty="0"/>
+              <a:t>Skalierungsverhalten </a:t>
+            </a:r>
+            <a:r>
+              <a:rPr lang="de-DE" dirty="0" smtClean="0"/>
+              <a:t>in Messreihe 1 und Messreihe </a:t>
+            </a:r>
+            <a:r>
+              <a:rPr lang="de-DE" dirty="0" smtClean="0"/>
+              <a:t>2 </a:t>
+            </a:r>
+            <a:r>
+              <a:rPr lang="de-DE" dirty="0" smtClean="0">
+                <a:latin typeface="Zapf Dingbats"/>
+                <a:ea typeface="Zapf Dingbats"/>
+                <a:cs typeface="Zapf Dingbats"/>
+                <a:sym typeface="Zapf Dingbats"/>
+              </a:rPr>
+              <a:t>✓</a:t>
+            </a:r>
+            <a:endParaRPr lang="de-DE" b="1" dirty="0" smtClean="0"/>
+          </a:p>
+          <a:p>
+            <a:pPr marL="685800" lvl="1"/>
+            <a:r>
+              <a:rPr lang="de-DE" b="1" dirty="0" smtClean="0"/>
+              <a:t>Fazit</a:t>
+            </a:r>
+            <a:r>
+              <a:rPr lang="de-DE" b="1" dirty="0" smtClean="0"/>
+              <a:t>:</a:t>
+            </a:r>
+            <a:r>
+              <a:rPr lang="de-DE" dirty="0" smtClean="0"/>
+              <a:t> Erwartungsgemäßes Skalierungsverhalten für </a:t>
+            </a:r>
+            <a:r>
+              <a:rPr lang="de-DE" dirty="0" err="1" smtClean="0"/>
+              <a:t>n</a:t>
+            </a:r>
+            <a:r>
+              <a:rPr lang="de-DE" dirty="0" smtClean="0"/>
+              <a:t> </a:t>
+            </a:r>
+            <a:r>
+              <a:rPr lang="de-DE" dirty="0"/>
+              <a:t>≤</a:t>
+            </a:r>
+            <a:r>
+              <a:rPr lang="de-DE" dirty="0" smtClean="0"/>
+              <a:t> 17 Rechenknoten</a:t>
+            </a:r>
+          </a:p>
+        </p:txBody>
+      </p:sp>
+      <p:sp>
+        <p:nvSpPr>
           <p:cNvPr id="4" name="Foliennummernplatzhalter 3"/>
           <p:cNvSpPr>
             <a:spLocks noGrp="1"/>
@@ -7478,35 +8273,10 @@
           </a:p>
         </p:txBody>
       </p:sp>
-      <p:pic>
-        <p:nvPicPr>
-          <p:cNvPr id="7" name="Inhaltsplatzhalter 6" descr="stream6.pdf"/>
-          <p:cNvPicPr>
-            <a:picLocks noGrp="1" noChangeAspect="1"/>
-          </p:cNvPicPr>
-          <p:nvPr>
-            <p:ph idx="1"/>
-          </p:nvPr>
-        </p:nvPicPr>
-        <p:blipFill>
-          <a:blip r:embed="rId3">
-            <a:extLst>
-              <a:ext uri="{28A0092B-C50C-407E-A947-70E740481C1C}">
-                <a14:useLocalDpi xmlns:a14="http://schemas.microsoft.com/office/drawing/2010/main" val="0"/>
-              </a:ext>
-            </a:extLst>
-          </a:blip>
-          <a:srcRect l="-11893" r="-11893"/>
-          <a:stretch>
-            <a:fillRect/>
-          </a:stretch>
-        </p:blipFill>
-        <p:spPr/>
-      </p:pic>
     </p:spTree>
     <p:extLst>
       <p:ext uri="{BB962C8B-B14F-4D97-AF65-F5344CB8AC3E}">
-        <p14:creationId xmlns:p14="http://schemas.microsoft.com/office/powerpoint/2010/main" val="3639631481"/>
+        <p14:creationId xmlns:p14="http://schemas.microsoft.com/office/powerpoint/2010/main" val="346354108"/>
       </p:ext>
     </p:extLst>
   </p:cSld>
@@ -7595,11 +8365,7 @@
             </a:r>
             <a:r>
               <a:rPr lang="de-DE" dirty="0" smtClean="0"/>
-              <a:t>Performance </a:t>
-            </a:r>
-            <a:r>
-              <a:rPr lang="de-DE" dirty="0" smtClean="0"/>
-              <a:t>für </a:t>
+              <a:t>Performance für </a:t>
             </a:r>
             <a:r>
               <a:rPr lang="de-DE" dirty="0" err="1"/>
@@ -7628,6 +8394,16 @@
               <a:rPr lang="de-DE" dirty="0" smtClean="0"/>
               <a:t>Erwünschter Effekt? </a:t>
             </a:r>
+            <a:r>
+              <a:rPr lang="de-DE" dirty="0" smtClean="0">
+                <a:latin typeface="Zapf Dingbats"/>
+                <a:ea typeface="Zapf Dingbats"/>
+                <a:cs typeface="Zapf Dingbats"/>
+                <a:sym typeface="Zapf Dingbats"/>
+              </a:rPr>
+              <a:t>✗</a:t>
+            </a:r>
+            <a:endParaRPr lang="de-DE" dirty="0" smtClean="0"/>
           </a:p>
           <a:p>
             <a:pPr lvl="3" indent="-285750">
@@ -7636,8 +8412,13 @@
             </a:pPr>
             <a:r>
               <a:rPr lang="de-DE" dirty="0" smtClean="0"/>
-              <a:t>kein erwünschter Effekt, lineares Wachstum erwartet</a:t>
-            </a:r>
+              <a:t>kein erwünschter Effekt, lineares Wachstum </a:t>
+            </a:r>
+            <a:r>
+              <a:rPr lang="de-DE" dirty="0" smtClean="0"/>
+              <a:t>erwartet </a:t>
+            </a:r>
+            <a:endParaRPr lang="de-DE" dirty="0" smtClean="0"/>
           </a:p>
           <a:p>
             <a:pPr marL="1200150" lvl="2" indent="-342900">
@@ -7654,8 +8435,22 @@
             </a:r>
             <a:r>
               <a:rPr lang="de-DE" dirty="0" smtClean="0"/>
-              <a:t>Systemzeit, Netz-Dateisystem?</a:t>
-            </a:r>
+              <a:t>Systemzeit, Netz-Dateisystem</a:t>
+            </a:r>
+            <a:r>
+              <a:rPr lang="de-DE" dirty="0" smtClean="0"/>
+              <a:t>?</a:t>
+            </a:r>
+            <a:r>
+              <a:rPr lang="de-DE" dirty="0">
+                <a:latin typeface="Zapf Dingbats"/>
+                <a:ea typeface="Zapf Dingbats"/>
+                <a:cs typeface="Zapf Dingbats"/>
+                <a:sym typeface="Zapf Dingbats"/>
+              </a:rPr>
+              <a:t> ✗</a:t>
+            </a:r>
+            <a:endParaRPr lang="de-DE" dirty="0" smtClean="0"/>
           </a:p>
           <a:p>
             <a:pPr marL="1619250" lvl="3" indent="-342900">
@@ -7704,8 +8499,22 @@
             </a:r>
             <a:r>
               <a:rPr lang="de-DE" dirty="0" smtClean="0"/>
-              <a:t>Funktionsweise von MPICH?</a:t>
-            </a:r>
+              <a:t>Funktionsweise von MPICH</a:t>
+            </a:r>
+            <a:r>
+              <a:rPr lang="de-DE" dirty="0" smtClean="0"/>
+              <a:t>? </a:t>
+            </a:r>
+            <a:r>
+              <a:rPr lang="de-DE" dirty="0">
+                <a:latin typeface="Zapf Dingbats"/>
+                <a:ea typeface="Zapf Dingbats"/>
+                <a:cs typeface="Zapf Dingbats"/>
+                <a:sym typeface="Zapf Dingbats"/>
+              </a:rPr>
+              <a:t>✗</a:t>
+            </a:r>
+            <a:endParaRPr lang="de-DE" dirty="0" smtClean="0"/>
           </a:p>
           <a:p>
             <a:pPr marL="1619250" lvl="3" indent="-342900">
@@ -7714,23 +8523,7 @@
             </a:pPr>
             <a:r>
               <a:rPr lang="de-DE" dirty="0" smtClean="0"/>
-              <a:t>Manipulation des Benchmark-Quellcodes </a:t>
-            </a:r>
-            <a:r>
-              <a:rPr lang="de-DE" dirty="0" smtClean="0"/>
-              <a:t>zur Reduzierung des Verwaltungs</a:t>
-            </a:r>
-            <a:r>
-              <a:rPr lang="de-DE" dirty="0" smtClean="0"/>
-              <a:t>-Overhead </a:t>
-            </a:r>
-            <a:r>
-              <a:rPr lang="de-DE" dirty="0" smtClean="0"/>
-              <a:t>liefert </a:t>
-            </a:r>
-            <a:r>
-              <a:rPr lang="de-DE" dirty="0" smtClean="0"/>
-              <a:t>keine verbesserten Ergebnisse</a:t>
+              <a:t>Manipulation des Benchmark-Quellcodes zur Reduzierung des Verwaltungs-Overhead liefert keine verbesserten Ergebnisse</a:t>
             </a:r>
             <a:endParaRPr lang="de-DE" dirty="0"/>
           </a:p>
@@ -7745,15 +8538,7 @@
             </a:r>
             <a:r>
               <a:rPr lang="de-DE" dirty="0" smtClean="0"/>
-              <a:t>Lineares Wachstum der Bandbreiten der </a:t>
-            </a:r>
-            <a:r>
-              <a:rPr lang="de-DE" dirty="0" smtClean="0"/>
-              <a:t>Hauptspeicherzugriffe (</a:t>
-            </a:r>
-            <a:r>
-              <a:rPr lang="de-DE" dirty="0" smtClean="0"/>
-              <a:t>erwartungsgemäß), Ausführungsdauer steigt jedoch deutlich an; nicht abschließend zu klären!</a:t>
+              <a:t>Lineares Wachstum der Bandbreiten der Hauptspeicherzugriffe (erwartungsgemäß), Ausführungsdauer steigt jedoch deutlich an; nicht abschließend zu klären!</a:t>
             </a:r>
             <a:endParaRPr lang="de-DE" dirty="0"/>
           </a:p>
@@ -7938,11 +8723,7 @@
             </a:r>
             <a:r>
               <a:rPr lang="de-DE" dirty="0" smtClean="0"/>
-              <a:t>Skalierungsverhaltens </a:t>
-            </a:r>
-            <a:r>
-              <a:rPr lang="de-DE" dirty="0" smtClean="0"/>
-              <a:t>eines </a:t>
+              <a:t>Skalierungsverhaltens eines </a:t>
             </a:r>
             <a:r>
               <a:rPr lang="de-DE" dirty="0" err="1" smtClean="0"/>
@@ -7971,11 +8752,7 @@
             </a:r>
             <a:r>
               <a:rPr lang="de-DE" dirty="0" smtClean="0"/>
-              <a:t> Lineares </a:t>
-            </a:r>
-            <a:r>
-              <a:rPr lang="de-DE" dirty="0" smtClean="0"/>
-              <a:t>Skalierungsverhalten </a:t>
+              <a:t> Lineares Skalierungsverhalten </a:t>
             </a:r>
             <a:r>
               <a:rPr lang="de-DE" dirty="0" smtClean="0">
@@ -8019,7 +8796,15 @@
             </a:pPr>
             <a:r>
               <a:rPr lang="de-DE" b="1" dirty="0" smtClean="0"/>
-              <a:t>Durchsatz HS-Zugriffe (STREAM):</a:t>
+              <a:t>Durchsatz </a:t>
+            </a:r>
+            <a:r>
+              <a:rPr lang="de-DE" b="1" dirty="0" smtClean="0"/>
+              <a:t>Hauptspeicherzugriffe </a:t>
+            </a:r>
+            <a:r>
+              <a:rPr lang="de-DE" b="1" dirty="0" smtClean="0"/>
+              <a:t>(STREAM):</a:t>
             </a:r>
             <a:r>
               <a:rPr lang="de-DE" dirty="0" smtClean="0"/>
@@ -8343,19 +9128,7 @@
             </a:r>
             <a:r>
               <a:rPr lang="de-DE" dirty="0" smtClean="0"/>
-              <a:t>Zugang zu benötigten Schnittstellen, </a:t>
-            </a:r>
-            <a:r>
-              <a:rPr lang="de-DE" dirty="0" smtClean="0"/>
-              <a:t>Stromversorgung</a:t>
-            </a:r>
-            <a:r>
-              <a:rPr lang="de-DE" dirty="0" smtClean="0"/>
-              <a:t>, </a:t>
-            </a:r>
-            <a:r>
-              <a:rPr lang="de-DE" dirty="0" smtClean="0"/>
-              <a:t>beengter Aufbau </a:t>
+              <a:t>Zugang zu benötigten Schnittstellen, Stromversorgung, beengter Aufbau </a:t>
             </a:r>
           </a:p>
           <a:p>
@@ -8364,11 +9137,7 @@
             </a:pPr>
             <a:r>
               <a:rPr lang="de-DE" b="1" dirty="0" smtClean="0"/>
-              <a:t>2.2 </a:t>
-            </a:r>
-            <a:r>
-              <a:rPr lang="de-DE" b="1" dirty="0" smtClean="0"/>
-              <a:t>Erweiterungen des Versuchsaufbaus </a:t>
+              <a:t>2.2 Erweiterungen des Versuchsaufbaus </a:t>
             </a:r>
             <a:endParaRPr lang="de-DE" dirty="0" smtClean="0"/>
           </a:p>
@@ -8701,129 +9470,13 @@
             </a:pPr>
             <a:r>
               <a:rPr lang="de-DE" b="1" dirty="0" smtClean="0"/>
-              <a:t>1.2 Spezifikation</a:t>
-            </a:r>
-          </a:p>
-          <a:p>
-            <a:pPr lvl="2">
-              <a:buFont typeface="Arial"/>
-              <a:buChar char="•"/>
-            </a:pPr>
-            <a:r>
-              <a:rPr lang="de-DE" dirty="0"/>
-              <a:t>CPU: ARM116JZF-S (Taktfrequenz 700 MHz)</a:t>
-            </a:r>
-          </a:p>
-          <a:p>
-            <a:pPr lvl="2">
-              <a:buFont typeface="Arial"/>
-              <a:buChar char="•"/>
-            </a:pPr>
-            <a:r>
-              <a:rPr lang="de-DE" dirty="0"/>
-              <a:t>GPU: </a:t>
-            </a:r>
-            <a:r>
-              <a:rPr lang="de-DE" dirty="0" err="1"/>
-              <a:t>Broadcom</a:t>
-            </a:r>
-            <a:r>
-              <a:rPr lang="de-DE" dirty="0"/>
-              <a:t> </a:t>
-            </a:r>
-            <a:r>
-              <a:rPr lang="de-DE" dirty="0" err="1"/>
-              <a:t>VideoCore</a:t>
-            </a:r>
-            <a:r>
-              <a:rPr lang="de-DE" dirty="0"/>
-              <a:t> IV</a:t>
-            </a:r>
-          </a:p>
-          <a:p>
-            <a:pPr lvl="2">
-              <a:buFont typeface="Arial"/>
-              <a:buChar char="•"/>
-            </a:pPr>
-            <a:r>
-              <a:rPr lang="de-DE" dirty="0" smtClean="0"/>
-              <a:t>Arbeitsspeicher: 512 MB SDRAM </a:t>
-            </a:r>
-          </a:p>
-          <a:p>
-            <a:pPr lvl="2">
-              <a:buFont typeface="Arial"/>
-              <a:buChar char="•"/>
-            </a:pPr>
-            <a:r>
-              <a:rPr lang="de-DE" dirty="0" smtClean="0"/>
-              <a:t>„</a:t>
-            </a:r>
-            <a:r>
-              <a:rPr lang="de-DE" dirty="0"/>
-              <a:t>Festplatte“: 4 GB SD-Karte (Klasse </a:t>
-            </a:r>
-            <a:r>
-              <a:rPr lang="de-DE" dirty="0" smtClean="0"/>
-              <a:t>4)</a:t>
-            </a:r>
-            <a:endParaRPr lang="de-DE" dirty="0"/>
-          </a:p>
-          <a:p>
-            <a:pPr lvl="2">
-              <a:buFont typeface="Arial"/>
-              <a:buChar char="•"/>
-            </a:pPr>
-            <a:r>
-              <a:rPr lang="de-DE" dirty="0"/>
-              <a:t>Stromversorgung: </a:t>
-            </a:r>
-            <a:r>
-              <a:rPr lang="de-DE" dirty="0" err="1" smtClean="0"/>
-              <a:t>Micro</a:t>
-            </a:r>
-            <a:r>
-              <a:rPr lang="de-DE" dirty="0"/>
-              <a:t>-USB (5 </a:t>
-            </a:r>
-            <a:r>
-              <a:rPr lang="de-DE" dirty="0" smtClean="0"/>
-              <a:t>V)</a:t>
-            </a:r>
-            <a:endParaRPr lang="de-DE" dirty="0"/>
-          </a:p>
-          <a:p>
-            <a:pPr lvl="2">
-              <a:buFont typeface="Arial"/>
-              <a:buChar char="•"/>
-            </a:pPr>
-            <a:r>
-              <a:rPr lang="de-DE" dirty="0"/>
-              <a:t>Weitere </a:t>
-            </a:r>
-            <a:r>
-              <a:rPr lang="de-DE" dirty="0" smtClean="0"/>
-              <a:t>wichtige Schnittstellen</a:t>
-            </a:r>
-            <a:r>
-              <a:rPr lang="de-DE" dirty="0"/>
-              <a:t>: Ethernet, HDMI, GPIO, 2 x USB 2.0</a:t>
-            </a:r>
-          </a:p>
-          <a:p>
-            <a:pPr lvl="2">
-              <a:buFont typeface="Arial"/>
-              <a:buChar char="•"/>
-            </a:pPr>
-            <a:r>
-              <a:rPr lang="de-DE" dirty="0"/>
-              <a:t>Betriebssysteme: hauptsächlich </a:t>
-            </a:r>
-            <a:r>
-              <a:rPr lang="de-DE" dirty="0" smtClean="0"/>
-              <a:t>Linux/Unix-Varianten</a:t>
-            </a:r>
-            <a:endParaRPr lang="de-DE" dirty="0"/>
+              <a:t>1.2 </a:t>
+            </a:r>
+            <a:r>
+              <a:rPr lang="de-DE" b="1" dirty="0" smtClean="0"/>
+              <a:t>Spezifikation</a:t>
+            </a:r>
+            <a:endParaRPr lang="de-DE" b="1" dirty="0" smtClean="0"/>
           </a:p>
         </p:txBody>
       </p:sp>
@@ -8895,7 +9548,7 @@
         </p:nvGrpSpPr>
         <p:grpSpPr>
           <a:xfrm>
-            <a:off x="6300192" y="3429000"/>
+            <a:off x="3023828" y="4113076"/>
             <a:ext cx="2545288" cy="1717159"/>
             <a:chOff x="6300192" y="3429000"/>
             <a:chExt cx="2545288" cy="1717159"/>
@@ -9047,7 +9700,12 @@
             <a:fillRect/>
           </a:stretch>
         </p:blipFill>
-        <p:spPr/>
+        <p:spPr>
+          <a:xfrm>
+            <a:off x="-468560" y="1232756"/>
+            <a:ext cx="8666222" cy="4900641"/>
+          </a:xfrm>
+        </p:spPr>
       </p:pic>
       <p:sp>
         <p:nvSpPr>
@@ -9117,7 +9775,7 @@
         </p:nvSpPr>
         <p:spPr>
           <a:xfrm>
-            <a:off x="3527884" y="6093296"/>
+            <a:off x="1979712" y="5913276"/>
             <a:ext cx="2545288" cy="276999"/>
           </a:xfrm>
           <a:prstGeom prst="rect">
@@ -9146,6 +9804,123 @@
             <a:r>
               <a:rPr lang="de-DE" dirty="0" smtClean="0"/>
               <a:t>/</a:t>
+            </a:r>
+            <a:endParaRPr lang="de-DE" dirty="0"/>
+          </a:p>
+        </p:txBody>
+      </p:sp>
+      <p:sp>
+        <p:nvSpPr>
+          <p:cNvPr id="3" name="Rechteck 2"/>
+          <p:cNvSpPr/>
+          <p:nvPr/>
+        </p:nvSpPr>
+        <p:spPr>
+          <a:xfrm>
+            <a:off x="4463988" y="4365104"/>
+            <a:ext cx="4572000" cy="1754327"/>
+          </a:xfrm>
+          <a:prstGeom prst="rect">
+            <a:avLst/>
+          </a:prstGeom>
+        </p:spPr>
+        <p:txBody>
+          <a:bodyPr>
+            <a:spAutoFit/>
+          </a:bodyPr>
+          <a:lstStyle/>
+          <a:p>
+            <a:pPr lvl="2">
+              <a:buFont typeface="Arial"/>
+              <a:buChar char="•"/>
+            </a:pPr>
+            <a:r>
+              <a:rPr lang="de-DE" dirty="0"/>
+              <a:t>CPU: ARM116JZF-S (Taktfrequenz 700 MHz)</a:t>
+            </a:r>
+          </a:p>
+          <a:p>
+            <a:pPr lvl="2">
+              <a:buFont typeface="Arial"/>
+              <a:buChar char="•"/>
+            </a:pPr>
+            <a:r>
+              <a:rPr lang="de-DE" dirty="0"/>
+              <a:t>GPU: </a:t>
+            </a:r>
+            <a:r>
+              <a:rPr lang="de-DE" dirty="0" err="1"/>
+              <a:t>Broadcom</a:t>
+            </a:r>
+            <a:r>
+              <a:rPr lang="de-DE" dirty="0"/>
+              <a:t> </a:t>
+            </a:r>
+            <a:r>
+              <a:rPr lang="de-DE" dirty="0" err="1"/>
+              <a:t>VideoCore</a:t>
+            </a:r>
+            <a:r>
+              <a:rPr lang="de-DE" dirty="0"/>
+              <a:t> IV</a:t>
+            </a:r>
+          </a:p>
+          <a:p>
+            <a:pPr lvl="2">
+              <a:buFont typeface="Arial"/>
+              <a:buChar char="•"/>
+            </a:pPr>
+            <a:r>
+              <a:rPr lang="de-DE" dirty="0"/>
+              <a:t>Arbeitsspeicher: 512 MB SDRAM </a:t>
+            </a:r>
+          </a:p>
+          <a:p>
+            <a:pPr lvl="2">
+              <a:buFont typeface="Arial"/>
+              <a:buChar char="•"/>
+            </a:pPr>
+            <a:r>
+              <a:rPr lang="de-DE" dirty="0"/>
+              <a:t>„Festplatte“: 4 GB SD-Karte (Klasse 4)</a:t>
+            </a:r>
+          </a:p>
+          <a:p>
+            <a:pPr lvl="2">
+              <a:buFont typeface="Arial"/>
+              <a:buChar char="•"/>
+            </a:pPr>
+            <a:r>
+              <a:rPr lang="de-DE" dirty="0"/>
+              <a:t>Stromversorgung: </a:t>
+            </a:r>
+            <a:r>
+              <a:rPr lang="de-DE" dirty="0" err="1"/>
+              <a:t>Micro</a:t>
+            </a:r>
+            <a:r>
+              <a:rPr lang="de-DE" dirty="0"/>
+              <a:t>-USB (5 V)</a:t>
+            </a:r>
+          </a:p>
+          <a:p>
+            <a:pPr lvl="2">
+              <a:buFont typeface="Arial"/>
+              <a:buChar char="•"/>
+            </a:pPr>
+            <a:r>
+              <a:rPr lang="de-DE" dirty="0"/>
+              <a:t>Weitere wichtige Schnittstellen: Ethernet, HDMI, GPIO, 2 x USB 2.0</a:t>
+            </a:r>
+          </a:p>
+          <a:p>
+            <a:pPr lvl="2">
+              <a:buFont typeface="Arial"/>
+              <a:buChar char="•"/>
+            </a:pPr>
+            <a:r>
+              <a:rPr lang="de-DE" dirty="0"/>
+              <a:t>Betriebssysteme: hauptsächlich Linux/Unix-Varianten</a:t>
             </a:r>
             <a:endParaRPr lang="de-DE" dirty="0"/>
           </a:p>
@@ -9319,93 +10094,8 @@
             </a:r>
           </a:p>
           <a:p>
-            <a:pPr lvl="2">
-              <a:buFont typeface="Arial"/>
-              <a:buChar char="•"/>
-            </a:pPr>
-            <a:r>
-              <a:rPr lang="de-DE" dirty="0" smtClean="0"/>
-              <a:t>20 </a:t>
-            </a:r>
-            <a:r>
-              <a:rPr lang="de-DE" dirty="0" err="1" smtClean="0"/>
-              <a:t>Raspberry</a:t>
-            </a:r>
-            <a:r>
-              <a:rPr lang="de-DE" dirty="0" smtClean="0"/>
-              <a:t> Pi Modell B-Einzelrechner (1)</a:t>
-            </a:r>
-          </a:p>
-          <a:p>
-            <a:pPr lvl="2">
-              <a:buFont typeface="Arial"/>
-              <a:buChar char="•"/>
-            </a:pPr>
-            <a:r>
-              <a:rPr lang="de-DE" dirty="0" smtClean="0"/>
-              <a:t>Verbindung über Ethernet-Kabel und 24 Port Gigabit-Switch (2, 3)</a:t>
-            </a:r>
-          </a:p>
-          <a:p>
-            <a:pPr lvl="2">
-              <a:buFont typeface="Arial"/>
-              <a:buChar char="•"/>
-            </a:pPr>
-            <a:r>
-              <a:rPr lang="de-DE" dirty="0" smtClean="0"/>
-              <a:t>Server: Mini-ITX-Mainboard mit x86-Prozessor (4), 4 Festplatten (5)</a:t>
-            </a:r>
-          </a:p>
-          <a:p>
-            <a:pPr lvl="2">
-              <a:buFont typeface="Arial"/>
-              <a:buChar char="•"/>
-            </a:pPr>
-            <a:r>
-              <a:rPr lang="de-DE" dirty="0" smtClean="0"/>
-              <a:t>Stromversorgung: zentrales Netzteil (6), 2 Verteiler (7), 20 </a:t>
-            </a:r>
-            <a:r>
-              <a:rPr lang="de-DE" dirty="0" err="1" smtClean="0"/>
-              <a:t>Micro</a:t>
-            </a:r>
-            <a:r>
-              <a:rPr lang="de-DE" dirty="0" smtClean="0"/>
-              <a:t>-USB-Kabel (8)</a:t>
-            </a:r>
-          </a:p>
-          <a:p>
-            <a:pPr lvl="2">
-              <a:buFont typeface="Arial"/>
-              <a:buChar char="•"/>
-            </a:pPr>
-            <a:r>
-              <a:rPr lang="de-DE" dirty="0" smtClean="0"/>
-              <a:t>Kühlung: 4 Kühlgebläse (9)</a:t>
-            </a:r>
-          </a:p>
-          <a:p>
-            <a:pPr lvl="2">
-              <a:buFont typeface="Arial"/>
-              <a:buChar char="•"/>
-            </a:pPr>
-            <a:r>
-              <a:rPr lang="de-DE" dirty="0" smtClean="0"/>
-              <a:t>Betriebssystem: Debian (Server), </a:t>
-            </a:r>
-            <a:r>
-              <a:rPr lang="de-DE" dirty="0" err="1" smtClean="0"/>
-              <a:t>Raspbian</a:t>
-            </a:r>
-            <a:r>
-              <a:rPr lang="de-DE" dirty="0" smtClean="0"/>
-              <a:t> (Knoten)</a:t>
-            </a:r>
-          </a:p>
-          <a:p>
-            <a:pPr lvl="2">
-              <a:buFont typeface="Arial"/>
-              <a:buChar char="•"/>
+            <a:pPr marL="914400" lvl="2" indent="0">
+              <a:buNone/>
             </a:pPr>
             <a:endParaRPr lang="de-DE" dirty="0" smtClean="0"/>
           </a:p>
@@ -9623,7 +10313,7 @@
         </p:nvSpPr>
         <p:spPr>
           <a:xfrm>
-            <a:off x="3275856" y="5769260"/>
+            <a:off x="1871700" y="5625244"/>
             <a:ext cx="2382984" cy="276999"/>
           </a:xfrm>
           <a:prstGeom prst="rect">
@@ -9646,6 +10336,112 @@
               <a:t>: Schematischer Aufbau </a:t>
             </a:r>
             <a:endParaRPr lang="de-DE" dirty="0"/>
+          </a:p>
+        </p:txBody>
+      </p:sp>
+      <p:sp>
+        <p:nvSpPr>
+          <p:cNvPr id="9" name="Rechteck 8"/>
+          <p:cNvSpPr/>
+          <p:nvPr/>
+        </p:nvSpPr>
+        <p:spPr>
+          <a:xfrm>
+            <a:off x="5472100" y="4041068"/>
+            <a:ext cx="3564396" cy="2308324"/>
+          </a:xfrm>
+          <a:prstGeom prst="rect">
+            <a:avLst/>
+          </a:prstGeom>
+        </p:spPr>
+        <p:txBody>
+          <a:bodyPr wrap="square" anchor="b" anchorCtr="1">
+            <a:spAutoFit/>
+          </a:bodyPr>
+          <a:lstStyle/>
+          <a:p>
+            <a:pPr lvl="2">
+              <a:buFont typeface="Arial"/>
+              <a:buChar char="•"/>
+            </a:pPr>
+            <a:r>
+              <a:rPr lang="de-DE" dirty="0"/>
+              <a:t>20 </a:t>
+            </a:r>
+            <a:r>
+              <a:rPr lang="de-DE" dirty="0" err="1"/>
+              <a:t>Raspberry</a:t>
+            </a:r>
+            <a:r>
+              <a:rPr lang="de-DE" dirty="0"/>
+              <a:t> Pi Modell B-Einzelrechner (1)</a:t>
+            </a:r>
+          </a:p>
+          <a:p>
+            <a:pPr lvl="2">
+              <a:buFont typeface="Arial"/>
+              <a:buChar char="•"/>
+            </a:pPr>
+            <a:r>
+              <a:rPr lang="de-DE" dirty="0"/>
+              <a:t>Verbindung über Ethernet-Kabel und 24 Port Gigabit-Switch (2, 3)</a:t>
+            </a:r>
+          </a:p>
+          <a:p>
+            <a:pPr lvl="2">
+              <a:buFont typeface="Arial"/>
+              <a:buChar char="•"/>
+            </a:pPr>
+            <a:r>
+              <a:rPr lang="de-DE" dirty="0"/>
+              <a:t>Server: Mini-ITX-Mainboard mit x86-Prozessor (4), 4 Festplatten (5)</a:t>
+            </a:r>
+          </a:p>
+          <a:p>
+            <a:pPr lvl="2">
+              <a:buFont typeface="Arial"/>
+              <a:buChar char="•"/>
+            </a:pPr>
+            <a:r>
+              <a:rPr lang="de-DE" dirty="0"/>
+              <a:t>Stromversorgung: zentrales Netzteil (6), 2 Verteiler (7), 20 </a:t>
+            </a:r>
+            <a:r>
+              <a:rPr lang="de-DE" dirty="0" err="1"/>
+              <a:t>Micro</a:t>
+            </a:r>
+            <a:r>
+              <a:rPr lang="de-DE" dirty="0"/>
+              <a:t>-USB-Kabel (8)</a:t>
+            </a:r>
+          </a:p>
+          <a:p>
+            <a:pPr lvl="2">
+              <a:buFont typeface="Arial"/>
+              <a:buChar char="•"/>
+            </a:pPr>
+            <a:r>
+              <a:rPr lang="de-DE" dirty="0"/>
+              <a:t>Kühlung: 4 Kühlgebläse (9)</a:t>
+            </a:r>
+          </a:p>
+          <a:p>
+            <a:pPr lvl="2">
+              <a:buFont typeface="Arial"/>
+              <a:buChar char="•"/>
+            </a:pPr>
+            <a:r>
+              <a:rPr lang="de-DE" dirty="0"/>
+              <a:t>Betriebssystem: Debian (Server), </a:t>
+            </a:r>
+            <a:r>
+              <a:rPr lang="de-DE" dirty="0" err="1"/>
+              <a:t>Raspbian</a:t>
+            </a:r>
+            <a:r>
+              <a:rPr lang="de-DE" dirty="0"/>
+              <a:t> (Knoten)</a:t>
+            </a:r>
           </a:p>
         </p:txBody>
       </p:sp>
@@ -9660,6 +10456,13 @@
     <a:masterClrMapping/>
   </p:clrMapOvr>
   <p:transition xmlns:p14="http://schemas.microsoft.com/office/powerpoint/2010/main" spd="med"/>
+  <p:timing>
+    <p:tnLst>
+      <p:par>
+        <p:cTn xmlns:p14="http://schemas.microsoft.com/office/powerpoint/2010/main" id="1" dur="indefinite" restart="never" nodeType="tmRoot"/>
+      </p:par>
+    </p:tnLst>
+  </p:timing>
 </p:sld>
 </file>
 

</xml_diff>